<commit_message>
added some plots to poster
</commit_message>
<xml_diff>
--- a/presentations/nc_bmes_sympo/nc_bmes_sympo.pptx
+++ b/presentations/nc_bmes_sympo/nc_bmes_sympo.pptx
@@ -184,7 +184,7 @@
           <a:bodyPr lIns="0" rIns="0" tIns="0" bIns="0" anchor="b"/>
           <a:p>
             <a:pPr algn="r"/>
-            <a:fld id="{A21CCE39-CB4B-4962-8299-F4769BE6A32C}" type="slidenum">
+            <a:fld id="{34B7F01C-B757-4F82-AC51-F40337BD395B}" type="slidenum">
               <a:rPr lang="en-US" sz="1400">
                 <a:latin typeface="Times New Roman"/>
               </a:rPr>
@@ -219,14 +219,14 @@
       </p:grpSpPr>
       <p:sp>
         <p:nvSpPr>
-          <p:cNvPr id="60" name="TextShape 1"/>
-          <p:cNvSpPr txBox="1"/>
+          <p:cNvPr id="66" name="CustomShape 1"/>
+          <p:cNvSpPr/>
           <p:nvPr/>
         </p:nvSpPr>
         <p:spPr>
           <a:xfrm>
             <a:off x="3954600" y="8685360"/>
-            <a:ext cx="3024000" cy="456840"/>
+            <a:ext cx="3023640" cy="456480"/>
           </a:xfrm>
           <a:prstGeom prst="rect">
             <a:avLst/>
@@ -236,15 +236,21 @@
             <a:noFill/>
           </a:ln>
         </p:spPr>
-        <p:txBody>
-          <a:bodyPr anchor="b"/>
+        <p:style>
+          <a:lnRef idx="0"/>
+          <a:fillRef idx="0"/>
+          <a:effectRef idx="0"/>
+          <a:fontRef idx="minor"/>
+        </p:style>
+        <p:txBody>
+          <a:bodyPr lIns="90000" rIns="90000" tIns="45000" bIns="45000" anchor="b"/>
           <a:p>
             <a:pPr algn="r">
               <a:lnSpc>
                 <a:spcPct val="100000"/>
               </a:lnSpc>
             </a:pPr>
-            <a:fld id="{6903BDDE-0869-4358-A98E-DAF7F63E299B}" type="slidenum">
+            <a:fld id="{5E38DC49-69C0-490F-A2BF-A94AB64D3105}" type="slidenum">
               <a:rPr lang="en-US" sz="1200" strike="noStrike">
                 <a:latin typeface="Arial"/>
               </a:rPr>
@@ -256,7 +262,7 @@
       </p:sp>
       <p:sp>
         <p:nvSpPr>
-          <p:cNvPr id="61" name="PlaceHolder 2"/>
+          <p:cNvPr id="67" name="PlaceHolder 2"/>
           <p:cNvSpPr>
             <a:spLocks noGrp="1"/>
           </p:cNvSpPr>
@@ -267,14 +273,14 @@
         <p:spPr>
           <a:xfrm>
             <a:off x="698400" y="4343400"/>
-            <a:ext cx="5582880" cy="4114440"/>
-          </a:xfrm>
-          <a:prstGeom prst="rect">
-            <a:avLst/>
-          </a:prstGeom>
-        </p:spPr>
-        <p:txBody>
-          <a:bodyPr/>
+            <a:ext cx="5582520" cy="4114080"/>
+          </a:xfrm>
+          <a:prstGeom prst="rect">
+            <a:avLst/>
+          </a:prstGeom>
+        </p:spPr>
+        <p:txBody>
+          <a:bodyPr lIns="0" rIns="0" tIns="0" bIns="0"/>
           <a:p>
             <a:endParaRPr/>
           </a:p>
@@ -346,6 +352,7 @@
         <p:txBody>
           <a:bodyPr lIns="0" rIns="0" tIns="0" bIns="0" anchor="ctr"/>
           <a:p>
+            <a:pPr algn="ctr"/>
             <a:endParaRPr/>
           </a:p>
         </p:txBody>
@@ -446,6 +453,7 @@
         <p:txBody>
           <a:bodyPr lIns="0" rIns="0" tIns="0" bIns="0" anchor="ctr"/>
           <a:p>
+            <a:pPr algn="ctr"/>
             <a:endParaRPr/>
           </a:p>
         </p:txBody>
@@ -598,6 +606,7 @@
         <p:txBody>
           <a:bodyPr lIns="0" rIns="0" tIns="0" bIns="0" anchor="ctr"/>
           <a:p>
+            <a:pPr algn="ctr"/>
             <a:endParaRPr/>
           </a:p>
         </p:txBody>
@@ -744,6 +753,7 @@
         <p:txBody>
           <a:bodyPr lIns="0" rIns="0" tIns="0" bIns="0" anchor="ctr"/>
           <a:p>
+            <a:pPr algn="ctr"/>
             <a:endParaRPr/>
           </a:p>
         </p:txBody>
@@ -819,6 +829,7 @@
         <p:txBody>
           <a:bodyPr lIns="0" rIns="0" tIns="0" bIns="0" anchor="ctr"/>
           <a:p>
+            <a:pPr algn="ctr"/>
             <a:endParaRPr/>
           </a:p>
         </p:txBody>
@@ -893,6 +904,7 @@
         <p:txBody>
           <a:bodyPr lIns="0" rIns="0" tIns="0" bIns="0" anchor="ctr"/>
           <a:p>
+            <a:pPr algn="ctr"/>
             <a:endParaRPr/>
           </a:p>
         </p:txBody>
@@ -993,6 +1005,7 @@
         <p:txBody>
           <a:bodyPr lIns="0" rIns="0" tIns="0" bIns="0" anchor="ctr"/>
           <a:p>
+            <a:pPr algn="ctr"/>
             <a:endParaRPr/>
           </a:p>
         </p:txBody>
@@ -1090,6 +1103,7 @@
         <p:txBody>
           <a:bodyPr lIns="0" rIns="0" tIns="0" bIns="0" anchor="ctr"/>
           <a:p>
+            <a:pPr algn="ctr"/>
             <a:endParaRPr/>
           </a:p>
         </p:txBody>
@@ -1216,6 +1230,7 @@
         <p:txBody>
           <a:bodyPr lIns="0" rIns="0" tIns="0" bIns="0" anchor="ctr"/>
           <a:p>
+            <a:pPr algn="ctr"/>
             <a:endParaRPr/>
           </a:p>
         </p:txBody>
@@ -1342,6 +1357,7 @@
         <p:txBody>
           <a:bodyPr lIns="0" rIns="0" tIns="0" bIns="0" anchor="ctr"/>
           <a:p>
+            <a:pPr algn="ctr"/>
             <a:endParaRPr/>
           </a:p>
         </p:txBody>
@@ -1462,7 +1478,7 @@
         <p:spPr>
           <a:xfrm>
             <a:off x="0" y="0"/>
-            <a:ext cx="32918040" cy="2408040"/>
+            <a:ext cx="32917680" cy="2407680"/>
           </a:xfrm>
           <a:prstGeom prst="rect">
             <a:avLst/>
@@ -1493,7 +1509,7 @@
         <p:spPr>
           <a:xfrm>
             <a:off x="519840" y="2895480"/>
-            <a:ext cx="7038720" cy="15871320"/>
+            <a:ext cx="7038360" cy="15870960"/>
           </a:xfrm>
           <a:prstGeom prst="rect">
             <a:avLst/>
@@ -1524,7 +1540,7 @@
         <p:spPr>
           <a:xfrm>
             <a:off x="199080" y="1515960"/>
-            <a:ext cx="3190320" cy="1104120"/>
+            <a:ext cx="3189960" cy="1103760"/>
           </a:xfrm>
           <a:prstGeom prst="rect">
             <a:avLst/>
@@ -1554,6 +1570,7 @@
                   <a:srgbClr val="f8f8f8"/>
                 </a:solidFill>
                 <a:latin typeface="Verdana"/>
+                <a:ea typeface="DejaVu Sans"/>
               </a:rPr>
               <a:t>DUKE BME</a:t>
             </a:r>
@@ -1570,7 +1587,7 @@
         <p:spPr>
           <a:xfrm>
             <a:off x="0" y="0"/>
-            <a:ext cx="32918040" cy="19202040"/>
+            <a:ext cx="32917680" cy="19201680"/>
           </a:xfrm>
           <a:prstGeom prst="rect">
             <a:avLst/>
@@ -1599,7 +1616,7 @@
         <p:spPr>
           <a:xfrm>
             <a:off x="8534520" y="2903760"/>
-            <a:ext cx="16032240" cy="15871320"/>
+            <a:ext cx="16031880" cy="15870960"/>
           </a:xfrm>
           <a:prstGeom prst="rect">
             <a:avLst/>
@@ -1630,7 +1647,7 @@
         <p:spPr>
           <a:xfrm>
             <a:off x="25420320" y="2903760"/>
-            <a:ext cx="7036200" cy="15871320"/>
+            <a:ext cx="7035840" cy="15870960"/>
           </a:xfrm>
           <a:prstGeom prst="rect">
             <a:avLst/>
@@ -1661,7 +1678,7 @@
         <p:spPr>
           <a:xfrm>
             <a:off x="714240" y="333360"/>
-            <a:ext cx="2114280" cy="1447560"/>
+            <a:ext cx="2113920" cy="1447200"/>
           </a:xfrm>
           <a:prstGeom prst="rect">
             <a:avLst/>
@@ -1687,7 +1704,7 @@
         <p:spPr>
           <a:xfrm>
             <a:off x="895320" y="333360"/>
-            <a:ext cx="1428480" cy="1371240"/>
+            <a:ext cx="1428120" cy="1370880"/>
           </a:xfrm>
           <a:prstGeom prst="rect">
             <a:avLst/>
@@ -1713,7 +1730,7 @@
         <p:spPr>
           <a:xfrm>
             <a:off x="64800" y="187200"/>
-            <a:ext cx="3089880" cy="1739520"/>
+            <a:ext cx="3089520" cy="1739160"/>
           </a:xfrm>
           <a:prstGeom prst="rect">
             <a:avLst/>
@@ -1743,7 +1760,7 @@
         <p:spPr>
           <a:xfrm>
             <a:off x="931680" y="249480"/>
-            <a:ext cx="1553400" cy="1502640"/>
+            <a:ext cx="1553040" cy="1502280"/>
           </a:xfrm>
           <a:prstGeom prst="rect">
             <a:avLst/>
@@ -1775,9 +1792,10 @@
         <p:txBody>
           <a:bodyPr lIns="0" rIns="0" tIns="0" bIns="0" anchor="ctr"/>
           <a:p>
+            <a:pPr algn="ctr"/>
             <a:r>
-              <a:rPr lang="en-US" sz="2100">
-                <a:latin typeface="Arial Narrow"/>
+              <a:rPr lang="en-US" sz="4400">
+                <a:latin typeface="Arial"/>
               </a:rPr>
               <a:t>Click to edit the title text format</a:t>
             </a:r>
@@ -1813,8 +1831,8 @@
               <a:buChar char=""/>
             </a:pPr>
             <a:r>
-              <a:rPr lang="en-US">
-                <a:latin typeface="Calibri"/>
+              <a:rPr lang="en-US" sz="3200">
+                <a:latin typeface="Arial"/>
               </a:rPr>
               <a:t>Click to edit the outline text format</a:t>
             </a:r>
@@ -1827,8 +1845,8 @@
               <a:buChar char=""/>
             </a:pPr>
             <a:r>
-              <a:rPr lang="en-US" sz="1500">
-                <a:latin typeface="Calibri"/>
+              <a:rPr lang="en-US" sz="2800">
+                <a:latin typeface="Arial"/>
               </a:rPr>
               <a:t>Second Outline Level</a:t>
             </a:r>
@@ -1841,8 +1859,8 @@
               <a:buChar char=""/>
             </a:pPr>
             <a:r>
-              <a:rPr lang="en-US" sz="1200">
-                <a:latin typeface="Calibri"/>
+              <a:rPr lang="en-US" sz="2400">
+                <a:latin typeface="Arial"/>
               </a:rPr>
               <a:t>Third Outline Level</a:t>
             </a:r>
@@ -1855,8 +1873,8 @@
               <a:buChar char=""/>
             </a:pPr>
             <a:r>
-              <a:rPr lang="en-US" sz="1200">
-                <a:latin typeface="Calibri"/>
+              <a:rPr lang="en-US" sz="2000">
+                <a:latin typeface="Arial"/>
               </a:rPr>
               <a:t>Fourth Outline Level</a:t>
             </a:r>
@@ -1870,7 +1888,7 @@
             </a:pPr>
             <a:r>
               <a:rPr lang="en-US" sz="2000">
-                <a:latin typeface="Calibri"/>
+                <a:latin typeface="Arial"/>
               </a:rPr>
               <a:t>Fifth Outline Level</a:t>
             </a:r>
@@ -1884,7 +1902,7 @@
             </a:pPr>
             <a:r>
               <a:rPr lang="en-US" sz="2000">
-                <a:latin typeface="Calibri"/>
+                <a:latin typeface="Arial"/>
               </a:rPr>
               <a:t>Sixth Outline Level</a:t>
             </a:r>
@@ -1898,7 +1916,7 @@
             </a:pPr>
             <a:r>
               <a:rPr lang="en-US" sz="2000">
-                <a:latin typeface="Calibri"/>
+                <a:latin typeface="Arial"/>
               </a:rPr>
               <a:t>Seventh Outline Level</a:t>
             </a:r>
@@ -1952,7 +1970,7 @@
         <p:spPr>
           <a:xfrm>
             <a:off x="4316400" y="434520"/>
-            <a:ext cx="24186960" cy="786960"/>
+            <a:ext cx="24186600" cy="786600"/>
           </a:xfrm>
           <a:prstGeom prst="rect">
             <a:avLst/>
@@ -1982,6 +2000,7 @@
                   <a:srgbClr val="f8f8f8"/>
                 </a:solidFill>
                 <a:latin typeface="Calibri"/>
+                <a:ea typeface="DejaVu Sans"/>
               </a:rPr>
               <a:t>Simulating the Effects of Nonlinear Acoustic Propagation on Radiation Force</a:t>
             </a:r>
@@ -2017,7 +2036,7 @@
         <p:spPr>
           <a:xfrm>
             <a:off x="6521040" y="1035720"/>
-            <a:ext cx="19757160" cy="1749960"/>
+            <a:ext cx="19756800" cy="1749600"/>
           </a:xfrm>
           <a:prstGeom prst="rect">
             <a:avLst/>
@@ -2047,6 +2066,7 @@
                   <a:srgbClr val="f8f8f8"/>
                 </a:solidFill>
                 <a:latin typeface="Arial"/>
+                <a:ea typeface="DejaVu Sans"/>
               </a:rPr>
               <a:t>Ningrui Li, Mark L. Palmeri, Kathryn R. Nightingale</a:t>
             </a:r>
@@ -2064,6 +2084,7 @@
                   <a:srgbClr val="f8f8f8"/>
                 </a:solidFill>
                 <a:latin typeface="Arial"/>
+                <a:ea typeface="DejaVu Sans"/>
               </a:rPr>
               <a:t>Department of Biomedical Engineering, Duke University, Durham, NC, United States.</a:t>
             </a:r>
@@ -2088,7 +2109,7 @@
         <p:spPr>
           <a:xfrm>
             <a:off x="25426440" y="2895840"/>
-            <a:ext cx="7035840" cy="528120"/>
+            <a:ext cx="7035480" cy="527760"/>
           </a:xfrm>
           <a:prstGeom prst="rect">
             <a:avLst/>
@@ -2120,6 +2141,7 @@
                   <a:srgbClr val="f8f8f8"/>
                 </a:solidFill>
                 <a:latin typeface="Calibri"/>
+                <a:ea typeface="DejaVu Sans"/>
               </a:rPr>
               <a:t>RESULTS</a:t>
             </a:r>
@@ -2136,7 +2158,7 @@
         <p:spPr>
           <a:xfrm>
             <a:off x="525960" y="2886840"/>
-            <a:ext cx="7037280" cy="538200"/>
+            <a:ext cx="7036920" cy="537840"/>
           </a:xfrm>
           <a:prstGeom prst="rect">
             <a:avLst/>
@@ -2168,6 +2190,7 @@
                   <a:srgbClr val="f8f8f8"/>
                 </a:solidFill>
                 <a:latin typeface="Calibri"/>
+                <a:ea typeface="DejaVu Sans"/>
               </a:rPr>
               <a:t>INTRODUCTION</a:t>
             </a:r>
@@ -2184,7 +2207,7 @@
         <p:spPr>
           <a:xfrm>
             <a:off x="25426440" y="10249560"/>
-            <a:ext cx="7035840" cy="528120"/>
+            <a:ext cx="7035480" cy="527760"/>
           </a:xfrm>
           <a:prstGeom prst="rect">
             <a:avLst/>
@@ -2216,6 +2239,7 @@
                   <a:srgbClr val="f8f8f8"/>
                 </a:solidFill>
                 <a:latin typeface="Calibri"/>
+                <a:ea typeface="DejaVu Sans"/>
               </a:rPr>
               <a:t>CONCLUSIONS</a:t>
             </a:r>
@@ -2232,7 +2256,7 @@
         <p:spPr>
           <a:xfrm>
             <a:off x="25425000" y="16093440"/>
-            <a:ext cx="7036200" cy="528840"/>
+            <a:ext cx="7035840" cy="528480"/>
           </a:xfrm>
           <a:prstGeom prst="rect">
             <a:avLst/>
@@ -2264,6 +2288,7 @@
                   <a:srgbClr val="f8f8f8"/>
                 </a:solidFill>
                 <a:latin typeface="Calibri"/>
+                <a:ea typeface="DejaVu Sans"/>
               </a:rPr>
               <a:t>REFERENCES</a:t>
             </a:r>
@@ -2280,7 +2305,7 @@
         <p:spPr>
           <a:xfrm>
             <a:off x="514800" y="7554600"/>
-            <a:ext cx="7048800" cy="538200"/>
+            <a:ext cx="7048440" cy="537840"/>
           </a:xfrm>
           <a:prstGeom prst="rect">
             <a:avLst/>
@@ -2312,6 +2337,7 @@
                   <a:srgbClr val="f8f8f8"/>
                 </a:solidFill>
                 <a:latin typeface="Calibri"/>
+                <a:ea typeface="DejaVu Sans"/>
               </a:rPr>
               <a:t>METHODS</a:t>
             </a:r>
@@ -2328,7 +2354,7 @@
         <p:spPr>
           <a:xfrm>
             <a:off x="8532000" y="2889360"/>
-            <a:ext cx="16027560" cy="529920"/>
+            <a:ext cx="16027200" cy="529560"/>
           </a:xfrm>
           <a:prstGeom prst="rect">
             <a:avLst/>
@@ -2360,6 +2386,7 @@
                   <a:srgbClr val="f8f8f8"/>
                 </a:solidFill>
                 <a:latin typeface="Calibri"/>
+                <a:ea typeface="DejaVu Sans"/>
               </a:rPr>
               <a:t>RESULTS</a:t>
             </a:r>
@@ -2367,6 +2394,213 @@
           </a:p>
         </p:txBody>
       </p:sp>
+      <p:sp>
+        <p:nvSpPr>
+          <p:cNvPr id="60" name="CustomShape 10"/>
+          <p:cNvSpPr/>
+          <p:nvPr/>
+        </p:nvSpPr>
+        <p:spPr>
+          <a:xfrm>
+            <a:off x="822960" y="3587760"/>
+            <a:ext cx="6400440" cy="3909960"/>
+          </a:xfrm>
+          <a:prstGeom prst="rect">
+            <a:avLst/>
+          </a:prstGeom>
+          <a:noFill/>
+          <a:ln>
+            <a:noFill/>
+          </a:ln>
+        </p:spPr>
+        <p:style>
+          <a:lnRef idx="0"/>
+          <a:fillRef idx="0"/>
+          <a:effectRef idx="0"/>
+          <a:fontRef idx="minor"/>
+        </p:style>
+        <p:txBody>
+          <a:bodyPr lIns="90000" rIns="90000" tIns="45000" bIns="45000"/>
+          <a:p>
+            <a:r>
+              <a:rPr lang="en-US" sz="1600" strike="noStrike">
+                <a:latin typeface="Arial"/>
+              </a:rPr>
+              <a:t>	</a:t>
+            </a:r>
+            <a:r>
+              <a:rPr lang="en-US" sz="1600" strike="noStrike">
+                <a:latin typeface="Arial"/>
+              </a:rPr>
+              <a:t>Shear waves can be induced in tissues by acoustic radiation force created using an ultrasound probe. The shear wave speed of tissue can be measured by tracking the propagation of shear waves from their source using time-of-flight methods [1]. Tissue stiffness can be characterized using these shear wave speed measurements, and this allows differentiation between healthy tissue and lesions. </a:t>
+            </a:r>
+            <a:endParaRPr/>
+          </a:p>
+          <a:p>
+            <a:r>
+              <a:rPr lang="en-US" sz="1600" strike="noStrike">
+                <a:latin typeface="Arial"/>
+              </a:rPr>
+              <a:t>	</a:t>
+            </a:r>
+            <a:r>
+              <a:rPr lang="en-US" sz="1600" strike="noStrike">
+                <a:latin typeface="Arial"/>
+              </a:rPr>
+              <a:t>However, shear wave speed measurements have been shown to exhibit a depth dependent bias, which has the potential to cause misdiagnosis [2]. It was hypothesized that this depth dependence was caused by out-of-plane shear wave sources generated through nonlinear effects in acoustic propagation. The Khokhlov-Zabolotskaya-Kuznetsov (KZK) nonlinear wave equation [3] was used to simulate acoustic waves propagating in differing media with various nonlinear coefficients . The simulated intensity field distributions showed that as nonlinearity increased, the maximum intensities tended towards shallower locations.</a:t>
+            </a:r>
+            <a:endParaRPr/>
+          </a:p>
+        </p:txBody>
+      </p:sp>
+      <p:sp>
+        <p:nvSpPr>
+          <p:cNvPr id="61" name="CustomShape 11"/>
+          <p:cNvSpPr/>
+          <p:nvPr/>
+        </p:nvSpPr>
+        <p:spPr>
+          <a:xfrm>
+            <a:off x="25603200" y="16733520"/>
+            <a:ext cx="6674760" cy="1625760"/>
+          </a:xfrm>
+          <a:prstGeom prst="rect">
+            <a:avLst/>
+          </a:prstGeom>
+          <a:noFill/>
+          <a:ln>
+            <a:noFill/>
+          </a:ln>
+        </p:spPr>
+        <p:style>
+          <a:lnRef idx="0"/>
+          <a:fillRef idx="0"/>
+          <a:effectRef idx="0"/>
+          <a:fontRef idx="minor"/>
+        </p:style>
+        <p:txBody>
+          <a:bodyPr lIns="90000" rIns="90000" tIns="45000" bIns="45000"/>
+          <a:p>
+            <a:r>
+              <a:rPr lang="en-US" sz="1200" strike="noStrike">
+                <a:latin typeface="Arial"/>
+              </a:rPr>
+              <a:t>[1] Sarvazyan, A. P., Rudenko, O. V., Swanson, S. D., Fowlkes, J. B., &amp; Emelianov, S. Y. (1998). Shear wave elasticity imaging: a new ultrasonic technology of medical diagnostics. Ultrasound in medicine &amp; biology, 24(9), 1419-1435.</a:t>
+            </a:r>
+            <a:endParaRPr/>
+          </a:p>
+          <a:p>
+            <a:r>
+              <a:rPr lang="en-US" sz="1200" strike="noStrike">
+                <a:latin typeface="Arial"/>
+              </a:rPr>
+              <a:t>[2] Zhao, H., Song, P., Urban, M. W., Kinnick, R. R., Yin, M., Greenleaf, J. F., &amp; Chen, S. (2011). Bias observed in time-of-flight shear wave speed measurements using radiation force of a focused ultrasound beam. Ultrasound in medicine &amp; biology, 37(11), 1884-1892.</a:t>
+            </a:r>
+            <a:endParaRPr/>
+          </a:p>
+          <a:p>
+            <a:r>
+              <a:rPr lang="en-US" sz="1200" strike="noStrike">
+                <a:latin typeface="Arial"/>
+              </a:rPr>
+              <a:t>[3] Pinton, G. F., Dahl, J., Rosenzweig, S., &amp; Trahey, G. E. (2009). A heterogeneous nonlinear attenuating full-wave model of ultrasound. Ultrasonics, Ferroelectrics, and Frequency Control, IEEE Transactions on, 56(3), 474-488.</a:t>
+            </a:r>
+            <a:endParaRPr/>
+          </a:p>
+        </p:txBody>
+      </p:sp>
+      <p:pic>
+        <p:nvPicPr>
+          <p:cNvPr id="62" name="" descr=""/>
+          <p:cNvPicPr/>
+          <p:nvPr/>
+        </p:nvPicPr>
+        <p:blipFill>
+          <a:blip r:embed="rId1"/>
+          <a:stretch/>
+        </p:blipFill>
+        <p:spPr>
+          <a:xfrm>
+            <a:off x="1188720" y="8321040"/>
+            <a:ext cx="5302440" cy="3749040"/>
+          </a:xfrm>
+          <a:prstGeom prst="rect">
+            <a:avLst/>
+          </a:prstGeom>
+          <a:ln>
+            <a:noFill/>
+          </a:ln>
+        </p:spPr>
+      </p:pic>
+      <p:pic>
+        <p:nvPicPr>
+          <p:cNvPr id="63" name="" descr=""/>
+          <p:cNvPicPr/>
+          <p:nvPr/>
+        </p:nvPicPr>
+        <p:blipFill>
+          <a:blip r:embed="rId2"/>
+          <a:stretch/>
+        </p:blipFill>
+        <p:spPr>
+          <a:xfrm>
+            <a:off x="8686800" y="5760720"/>
+            <a:ext cx="3657600" cy="2421000"/>
+          </a:xfrm>
+          <a:prstGeom prst="rect">
+            <a:avLst/>
+          </a:prstGeom>
+          <a:ln>
+            <a:noFill/>
+          </a:ln>
+        </p:spPr>
+      </p:pic>
+      <p:pic>
+        <p:nvPicPr>
+          <p:cNvPr id="64" name="" descr=""/>
+          <p:cNvPicPr/>
+          <p:nvPr/>
+        </p:nvPicPr>
+        <p:blipFill>
+          <a:blip r:embed="rId3"/>
+          <a:stretch/>
+        </p:blipFill>
+        <p:spPr>
+          <a:xfrm>
+            <a:off x="12801600" y="5900040"/>
+            <a:ext cx="5669280" cy="2603880"/>
+          </a:xfrm>
+          <a:prstGeom prst="rect">
+            <a:avLst/>
+          </a:prstGeom>
+          <a:ln>
+            <a:noFill/>
+          </a:ln>
+        </p:spPr>
+      </p:pic>
+      <p:pic>
+        <p:nvPicPr>
+          <p:cNvPr id="65" name="" descr=""/>
+          <p:cNvPicPr/>
+          <p:nvPr/>
+        </p:nvPicPr>
+        <p:blipFill>
+          <a:blip r:embed="rId4"/>
+          <a:stretch/>
+        </p:blipFill>
+        <p:spPr>
+          <a:xfrm>
+            <a:off x="19658160" y="5717160"/>
+            <a:ext cx="5122080" cy="2969640"/>
+          </a:xfrm>
+          <a:prstGeom prst="rect">
+            <a:avLst/>
+          </a:prstGeom>
+          <a:ln>
+            <a:noFill/>
+          </a:ln>
+        </p:spPr>
+      </p:pic>
     </p:spTree>
   </p:cSld>
   <p:timing>

</xml_diff>

<commit_message>
added general plot layout for results sections. also added centertrace plots
</commit_message>
<xml_diff>
--- a/presentations/nc_bmes_sympo/nc_bmes_sympo.pptx
+++ b/presentations/nc_bmes_sympo/nc_bmes_sympo.pptx
@@ -184,7 +184,7 @@
           <a:bodyPr lIns="0" rIns="0" tIns="0" bIns="0" anchor="b"/>
           <a:p>
             <a:pPr algn="r"/>
-            <a:fld id="{34B7F01C-B757-4F82-AC51-F40337BD395B}" type="slidenum">
+            <a:fld id="{DC9C303B-0E3F-45B9-B75A-9E0D9D9A3B13}" type="slidenum">
               <a:rPr lang="en-US" sz="1400">
                 <a:latin typeface="Times New Roman"/>
               </a:rPr>
@@ -219,14 +219,14 @@
       </p:grpSpPr>
       <p:sp>
         <p:nvSpPr>
-          <p:cNvPr id="66" name="CustomShape 1"/>
+          <p:cNvPr id="73" name="CustomShape 1"/>
           <p:cNvSpPr/>
           <p:nvPr/>
         </p:nvSpPr>
         <p:spPr>
           <a:xfrm>
             <a:off x="3954600" y="8685360"/>
-            <a:ext cx="3023640" cy="456480"/>
+            <a:ext cx="3023280" cy="456120"/>
           </a:xfrm>
           <a:prstGeom prst="rect">
             <a:avLst/>
@@ -250,8 +250,11 @@
                 <a:spcPct val="100000"/>
               </a:lnSpc>
             </a:pPr>
-            <a:fld id="{5E38DC49-69C0-490F-A2BF-A94AB64D3105}" type="slidenum">
+            <a:fld id="{88847165-7EE8-4398-84DE-C7CE60080A61}" type="slidenum">
               <a:rPr lang="en-US" sz="1200" strike="noStrike">
+                <a:solidFill>
+                  <a:srgbClr val="000000"/>
+                </a:solidFill>
                 <a:latin typeface="Arial"/>
               </a:rPr>
               <a:t>&lt;number&gt;</a:t>
@@ -262,7 +265,7 @@
       </p:sp>
       <p:sp>
         <p:nvSpPr>
-          <p:cNvPr id="67" name="PlaceHolder 2"/>
+          <p:cNvPr id="74" name="PlaceHolder 2"/>
           <p:cNvSpPr>
             <a:spLocks noGrp="1"/>
           </p:cNvSpPr>
@@ -273,7 +276,7 @@
         <p:spPr>
           <a:xfrm>
             <a:off x="698400" y="4343400"/>
-            <a:ext cx="5582520" cy="4114080"/>
+            <a:ext cx="5582160" cy="4113720"/>
           </a:xfrm>
           <a:prstGeom prst="rect">
             <a:avLst/>
@@ -1478,7 +1481,7 @@
         <p:spPr>
           <a:xfrm>
             <a:off x="0" y="0"/>
-            <a:ext cx="32917680" cy="2407680"/>
+            <a:ext cx="32917320" cy="2407320"/>
           </a:xfrm>
           <a:prstGeom prst="rect">
             <a:avLst/>
@@ -1509,7 +1512,7 @@
         <p:spPr>
           <a:xfrm>
             <a:off x="519840" y="2895480"/>
-            <a:ext cx="7038360" cy="15870960"/>
+            <a:ext cx="7038000" cy="15870600"/>
           </a:xfrm>
           <a:prstGeom prst="rect">
             <a:avLst/>
@@ -1540,7 +1543,7 @@
         <p:spPr>
           <a:xfrm>
             <a:off x="199080" y="1515960"/>
-            <a:ext cx="3189960" cy="1103760"/>
+            <a:ext cx="3189600" cy="1103400"/>
           </a:xfrm>
           <a:prstGeom prst="rect">
             <a:avLst/>
@@ -1587,7 +1590,7 @@
         <p:spPr>
           <a:xfrm>
             <a:off x="0" y="0"/>
-            <a:ext cx="32917680" cy="19201680"/>
+            <a:ext cx="32917320" cy="19201320"/>
           </a:xfrm>
           <a:prstGeom prst="rect">
             <a:avLst/>
@@ -1616,7 +1619,7 @@
         <p:spPr>
           <a:xfrm>
             <a:off x="8534520" y="2903760"/>
-            <a:ext cx="16031880" cy="15870960"/>
+            <a:ext cx="16031520" cy="15870600"/>
           </a:xfrm>
           <a:prstGeom prst="rect">
             <a:avLst/>
@@ -1647,7 +1650,7 @@
         <p:spPr>
           <a:xfrm>
             <a:off x="25420320" y="2903760"/>
-            <a:ext cx="7035840" cy="15870960"/>
+            <a:ext cx="7035480" cy="15870600"/>
           </a:xfrm>
           <a:prstGeom prst="rect">
             <a:avLst/>
@@ -1678,7 +1681,7 @@
         <p:spPr>
           <a:xfrm>
             <a:off x="714240" y="333360"/>
-            <a:ext cx="2113920" cy="1447200"/>
+            <a:ext cx="2113560" cy="1446840"/>
           </a:xfrm>
           <a:prstGeom prst="rect">
             <a:avLst/>
@@ -1704,7 +1707,7 @@
         <p:spPr>
           <a:xfrm>
             <a:off x="895320" y="333360"/>
-            <a:ext cx="1428120" cy="1370880"/>
+            <a:ext cx="1427760" cy="1370520"/>
           </a:xfrm>
           <a:prstGeom prst="rect">
             <a:avLst/>
@@ -1730,7 +1733,7 @@
         <p:spPr>
           <a:xfrm>
             <a:off x="64800" y="187200"/>
-            <a:ext cx="3089520" cy="1739160"/>
+            <a:ext cx="3089160" cy="1738800"/>
           </a:xfrm>
           <a:prstGeom prst="rect">
             <a:avLst/>
@@ -1760,7 +1763,7 @@
         <p:spPr>
           <a:xfrm>
             <a:off x="931680" y="249480"/>
-            <a:ext cx="1553040" cy="1502280"/>
+            <a:ext cx="1552680" cy="1501920"/>
           </a:xfrm>
           <a:prstGeom prst="rect">
             <a:avLst/>
@@ -1970,7 +1973,7 @@
         <p:spPr>
           <a:xfrm>
             <a:off x="4316400" y="434520"/>
-            <a:ext cx="24186600" cy="786600"/>
+            <a:ext cx="24186240" cy="786240"/>
           </a:xfrm>
           <a:prstGeom prst="rect">
             <a:avLst/>
@@ -2036,7 +2039,7 @@
         <p:spPr>
           <a:xfrm>
             <a:off x="6521040" y="1035720"/>
-            <a:ext cx="19756800" cy="1749600"/>
+            <a:ext cx="19756440" cy="1749240"/>
           </a:xfrm>
           <a:prstGeom prst="rect">
             <a:avLst/>
@@ -2109,7 +2112,7 @@
         <p:spPr>
           <a:xfrm>
             <a:off x="25426440" y="2895840"/>
-            <a:ext cx="7035480" cy="527760"/>
+            <a:ext cx="7035120" cy="527400"/>
           </a:xfrm>
           <a:prstGeom prst="rect">
             <a:avLst/>
@@ -2158,7 +2161,7 @@
         <p:spPr>
           <a:xfrm>
             <a:off x="525960" y="2886840"/>
-            <a:ext cx="7036920" cy="537840"/>
+            <a:ext cx="7036560" cy="537480"/>
           </a:xfrm>
           <a:prstGeom prst="rect">
             <a:avLst/>
@@ -2207,7 +2210,7 @@
         <p:spPr>
           <a:xfrm>
             <a:off x="25426440" y="10249560"/>
-            <a:ext cx="7035480" cy="527760"/>
+            <a:ext cx="7035120" cy="527400"/>
           </a:xfrm>
           <a:prstGeom prst="rect">
             <a:avLst/>
@@ -2256,7 +2259,7 @@
         <p:spPr>
           <a:xfrm>
             <a:off x="25425000" y="16093440"/>
-            <a:ext cx="7035840" cy="528480"/>
+            <a:ext cx="7035480" cy="528120"/>
           </a:xfrm>
           <a:prstGeom prst="rect">
             <a:avLst/>
@@ -2305,7 +2308,7 @@
         <p:spPr>
           <a:xfrm>
             <a:off x="514800" y="7554600"/>
-            <a:ext cx="7048440" cy="537840"/>
+            <a:ext cx="7048080" cy="537480"/>
           </a:xfrm>
           <a:prstGeom prst="rect">
             <a:avLst/>
@@ -2354,7 +2357,7 @@
         <p:spPr>
           <a:xfrm>
             <a:off x="8532000" y="2889360"/>
-            <a:ext cx="16027200" cy="529560"/>
+            <a:ext cx="16026840" cy="529200"/>
           </a:xfrm>
           <a:prstGeom prst="rect">
             <a:avLst/>
@@ -2403,7 +2406,7 @@
         <p:spPr>
           <a:xfrm>
             <a:off x="822960" y="3587760"/>
-            <a:ext cx="6400440" cy="3909960"/>
+            <a:ext cx="6400080" cy="3909600"/>
           </a:xfrm>
           <a:prstGeom prst="rect">
             <a:avLst/>
@@ -2424,13 +2427,21 @@
           <a:p>
             <a:r>
               <a:rPr lang="en-US" sz="1600" strike="noStrike">
+                <a:solidFill>
+                  <a:srgbClr val="000000"/>
+                </a:solidFill>
                 <a:latin typeface="Arial"/>
+                <a:ea typeface="DejaVu Sans"/>
               </a:rPr>
               <a:t>	</a:t>
             </a:r>
             <a:r>
               <a:rPr lang="en-US" sz="1600" strike="noStrike">
+                <a:solidFill>
+                  <a:srgbClr val="000000"/>
+                </a:solidFill>
                 <a:latin typeface="Arial"/>
+                <a:ea typeface="DejaVu Sans"/>
               </a:rPr>
               <a:t>Shear waves can be induced in tissues by acoustic radiation force created using an ultrasound probe. The shear wave speed of tissue can be measured by tracking the propagation of shear waves from their source using time-of-flight methods [1]. Tissue stiffness can be characterized using these shear wave speed measurements, and this allows differentiation between healthy tissue and lesions. </a:t>
             </a:r>
@@ -2439,13 +2450,21 @@
           <a:p>
             <a:r>
               <a:rPr lang="en-US" sz="1600" strike="noStrike">
+                <a:solidFill>
+                  <a:srgbClr val="000000"/>
+                </a:solidFill>
                 <a:latin typeface="Arial"/>
+                <a:ea typeface="DejaVu Sans"/>
               </a:rPr>
               <a:t>	</a:t>
             </a:r>
             <a:r>
               <a:rPr lang="en-US" sz="1600" strike="noStrike">
+                <a:solidFill>
+                  <a:srgbClr val="000000"/>
+                </a:solidFill>
                 <a:latin typeface="Arial"/>
+                <a:ea typeface="DejaVu Sans"/>
               </a:rPr>
               <a:t>However, shear wave speed measurements have been shown to exhibit a depth dependent bias, which has the potential to cause misdiagnosis [2]. It was hypothesized that this depth dependence was caused by out-of-plane shear wave sources generated through nonlinear effects in acoustic propagation. The Khokhlov-Zabolotskaya-Kuznetsov (KZK) nonlinear wave equation [3] was used to simulate acoustic waves propagating in differing media with various nonlinear coefficients . The simulated intensity field distributions showed that as nonlinearity increased, the maximum intensities tended towards shallower locations.</a:t>
             </a:r>
@@ -2462,7 +2481,7 @@
         <p:spPr>
           <a:xfrm>
             <a:off x="25603200" y="16733520"/>
-            <a:ext cx="6674760" cy="1625760"/>
+            <a:ext cx="6674400" cy="1625400"/>
           </a:xfrm>
           <a:prstGeom prst="rect">
             <a:avLst/>
@@ -2483,7 +2502,11 @@
           <a:p>
             <a:r>
               <a:rPr lang="en-US" sz="1200" strike="noStrike">
+                <a:solidFill>
+                  <a:srgbClr val="000000"/>
+                </a:solidFill>
                 <a:latin typeface="Arial"/>
+                <a:ea typeface="DejaVu Sans"/>
               </a:rPr>
               <a:t>[1] Sarvazyan, A. P., Rudenko, O. V., Swanson, S. D., Fowlkes, J. B., &amp; Emelianov, S. Y. (1998). Shear wave elasticity imaging: a new ultrasonic technology of medical diagnostics. Ultrasound in medicine &amp; biology, 24(9), 1419-1435.</a:t>
             </a:r>
@@ -2492,7 +2515,11 @@
           <a:p>
             <a:r>
               <a:rPr lang="en-US" sz="1200" strike="noStrike">
+                <a:solidFill>
+                  <a:srgbClr val="000000"/>
+                </a:solidFill>
                 <a:latin typeface="Arial"/>
+                <a:ea typeface="DejaVu Sans"/>
               </a:rPr>
               <a:t>[2] Zhao, H., Song, P., Urban, M. W., Kinnick, R. R., Yin, M., Greenleaf, J. F., &amp; Chen, S. (2011). Bias observed in time-of-flight shear wave speed measurements using radiation force of a focused ultrasound beam. Ultrasound in medicine &amp; biology, 37(11), 1884-1892.</a:t>
             </a:r>
@@ -2501,7 +2528,11 @@
           <a:p>
             <a:r>
               <a:rPr lang="en-US" sz="1200" strike="noStrike">
+                <a:solidFill>
+                  <a:srgbClr val="000000"/>
+                </a:solidFill>
                 <a:latin typeface="Arial"/>
+                <a:ea typeface="DejaVu Sans"/>
               </a:rPr>
               <a:t>[3] Pinton, G. F., Dahl, J., Rosenzweig, S., &amp; Trahey, G. E. (2009). A heterogeneous nonlinear attenuating full-wave model of ultrasound. Ultrasonics, Ferroelectrics, and Frequency Control, IEEE Transactions on, 56(3), 474-488.</a:t>
             </a:r>
@@ -2522,7 +2553,7 @@
         <p:spPr>
           <a:xfrm>
             <a:off x="1188720" y="8321040"/>
-            <a:ext cx="5302440" cy="3749040"/>
+            <a:ext cx="5302080" cy="3748680"/>
           </a:xfrm>
           <a:prstGeom prst="rect">
             <a:avLst/>
@@ -2544,8 +2575,8 @@
         </p:blipFill>
         <p:spPr>
           <a:xfrm>
-            <a:off x="8686800" y="5760720"/>
-            <a:ext cx="3657600" cy="2421000"/>
+            <a:off x="9052560" y="4297680"/>
+            <a:ext cx="5029200" cy="4023360"/>
           </a:xfrm>
           <a:prstGeom prst="rect">
             <a:avLst/>
@@ -2555,9 +2586,41 @@
           </a:ln>
         </p:spPr>
       </p:pic>
+      <p:sp>
+        <p:nvSpPr>
+          <p:cNvPr id="64" name="TextShape 12"/>
+          <p:cNvSpPr txBox="1"/>
+          <p:nvPr/>
+        </p:nvSpPr>
+        <p:spPr>
+          <a:xfrm>
+            <a:off x="10149840" y="3749040"/>
+            <a:ext cx="2454480" cy="346320"/>
+          </a:xfrm>
+          <a:prstGeom prst="rect">
+            <a:avLst/>
+          </a:prstGeom>
+          <a:noFill/>
+          <a:ln>
+            <a:noFill/>
+          </a:ln>
+        </p:spPr>
+        <p:txBody>
+          <a:bodyPr lIns="90000" rIns="90000" tIns="45000" bIns="45000"/>
+          <a:p>
+            <a:r>
+              <a:rPr lang="en-US">
+                <a:latin typeface="Arial"/>
+              </a:rPr>
+              <a:t>α = 0.005 dB/cm/MHz </a:t>
+            </a:r>
+            <a:endParaRPr/>
+          </a:p>
+        </p:txBody>
+      </p:sp>
       <p:pic>
         <p:nvPicPr>
-          <p:cNvPr id="64" name="" descr=""/>
+          <p:cNvPr id="65" name="" descr=""/>
           <p:cNvPicPr/>
           <p:nvPr/>
         </p:nvPicPr>
@@ -2567,8 +2630,8 @@
         </p:blipFill>
         <p:spPr>
           <a:xfrm>
-            <a:off x="12801600" y="5900040"/>
-            <a:ext cx="5669280" cy="2603880"/>
+            <a:off x="8869680" y="8686800"/>
+            <a:ext cx="5486400" cy="2560320"/>
           </a:xfrm>
           <a:prstGeom prst="rect">
             <a:avLst/>
@@ -2580,7 +2643,7 @@
       </p:pic>
       <p:pic>
         <p:nvPicPr>
-          <p:cNvPr id="65" name="" descr=""/>
+          <p:cNvPr id="66" name="" descr=""/>
           <p:cNvPicPr/>
           <p:nvPr/>
         </p:nvPicPr>
@@ -2590,8 +2653,155 @@
         </p:blipFill>
         <p:spPr>
           <a:xfrm>
-            <a:off x="19658160" y="5717160"/>
-            <a:ext cx="5122080" cy="2969640"/>
+            <a:off x="8869680" y="11521440"/>
+            <a:ext cx="5486400" cy="2926080"/>
+          </a:xfrm>
+          <a:prstGeom prst="rect">
+            <a:avLst/>
+          </a:prstGeom>
+          <a:ln>
+            <a:noFill/>
+          </a:ln>
+        </p:spPr>
+      </p:pic>
+      <p:pic>
+        <p:nvPicPr>
+          <p:cNvPr id="67" name="" descr=""/>
+          <p:cNvPicPr/>
+          <p:nvPr/>
+        </p:nvPicPr>
+        <p:blipFill>
+          <a:blip r:embed="rId5"/>
+          <a:stretch/>
+        </p:blipFill>
+        <p:spPr>
+          <a:xfrm>
+            <a:off x="8869680" y="14904720"/>
+            <a:ext cx="5486400" cy="2373120"/>
+          </a:xfrm>
+          <a:prstGeom prst="rect">
+            <a:avLst/>
+          </a:prstGeom>
+          <a:ln>
+            <a:noFill/>
+          </a:ln>
+        </p:spPr>
+      </p:pic>
+      <p:pic>
+        <p:nvPicPr>
+          <p:cNvPr id="68" name="" descr=""/>
+          <p:cNvPicPr/>
+          <p:nvPr/>
+        </p:nvPicPr>
+        <p:blipFill>
+          <a:blip r:embed="rId6"/>
+          <a:stretch/>
+        </p:blipFill>
+        <p:spPr>
+          <a:xfrm>
+            <a:off x="16643160" y="4754880"/>
+            <a:ext cx="3565080" cy="3017520"/>
+          </a:xfrm>
+          <a:prstGeom prst="rect">
+            <a:avLst/>
+          </a:prstGeom>
+          <a:ln>
+            <a:noFill/>
+          </a:ln>
+        </p:spPr>
+      </p:pic>
+      <p:sp>
+        <p:nvSpPr>
+          <p:cNvPr id="69" name="TextShape 13"/>
+          <p:cNvSpPr txBox="1"/>
+          <p:nvPr/>
+        </p:nvSpPr>
+        <p:spPr>
+          <a:xfrm>
+            <a:off x="17373600" y="3749040"/>
+            <a:ext cx="2201400" cy="346320"/>
+          </a:xfrm>
+          <a:prstGeom prst="rect">
+            <a:avLst/>
+          </a:prstGeom>
+          <a:noFill/>
+          <a:ln>
+            <a:noFill/>
+          </a:ln>
+        </p:spPr>
+        <p:txBody>
+          <a:bodyPr lIns="90000" rIns="90000" tIns="45000" bIns="45000"/>
+          <a:p>
+            <a:r>
+              <a:rPr lang="en-US">
+                <a:latin typeface="Arial"/>
+              </a:rPr>
+              <a:t>α = 1.5 dB/cm/MHz </a:t>
+            </a:r>
+            <a:endParaRPr/>
+          </a:p>
+        </p:txBody>
+      </p:sp>
+      <p:pic>
+        <p:nvPicPr>
+          <p:cNvPr id="70" name="" descr=""/>
+          <p:cNvPicPr/>
+          <p:nvPr/>
+        </p:nvPicPr>
+        <p:blipFill>
+          <a:blip r:embed="rId7"/>
+          <a:stretch/>
+        </p:blipFill>
+        <p:spPr>
+          <a:xfrm>
+            <a:off x="17007840" y="8595360"/>
+            <a:ext cx="1828800" cy="2743200"/>
+          </a:xfrm>
+          <a:prstGeom prst="rect">
+            <a:avLst/>
+          </a:prstGeom>
+          <a:ln>
+            <a:noFill/>
+          </a:ln>
+        </p:spPr>
+      </p:pic>
+      <p:pic>
+        <p:nvPicPr>
+          <p:cNvPr id="71" name="" descr=""/>
+          <p:cNvPicPr/>
+          <p:nvPr/>
+        </p:nvPicPr>
+        <p:blipFill>
+          <a:blip r:embed="rId8"/>
+          <a:stretch/>
+        </p:blipFill>
+        <p:spPr>
+          <a:xfrm>
+            <a:off x="17099280" y="11612880"/>
+            <a:ext cx="1463040" cy="2834640"/>
+          </a:xfrm>
+          <a:prstGeom prst="rect">
+            <a:avLst/>
+          </a:prstGeom>
+          <a:ln>
+            <a:noFill/>
+          </a:ln>
+        </p:spPr>
+      </p:pic>
+      <p:pic>
+        <p:nvPicPr>
+          <p:cNvPr id="72" name="" descr=""/>
+          <p:cNvPicPr/>
+          <p:nvPr/>
+        </p:nvPicPr>
+        <p:blipFill>
+          <a:blip r:embed="rId9"/>
+          <a:stretch/>
+        </p:blipFill>
+        <p:spPr>
+          <a:xfrm>
+            <a:off x="17076240" y="14721840"/>
+            <a:ext cx="1486080" cy="3291840"/>
           </a:xfrm>
           <a:prstGeom prst="rect">
             <a:avLst/>

</xml_diff>

<commit_message>
updated poster + increased font size of nonlinearity example plot
</commit_message>
<xml_diff>
--- a/presentations/nc_bmes_sympo/nc_bmes_sympo.pptx
+++ b/presentations/nc_bmes_sympo/nc_bmes_sympo.pptx
@@ -184,7 +184,7 @@
           <a:bodyPr lIns="0" rIns="0" tIns="0" bIns="0" anchor="b"/>
           <a:p>
             <a:pPr algn="r"/>
-            <a:fld id="{DC9C303B-0E3F-45B9-B75A-9E0D9D9A3B13}" type="slidenum">
+            <a:fld id="{AEEC5A99-F4DE-4440-8F7F-7156E8958592}" type="slidenum">
               <a:rPr lang="en-US" sz="1400">
                 <a:latin typeface="Times New Roman"/>
               </a:rPr>
@@ -219,14 +219,14 @@
       </p:grpSpPr>
       <p:sp>
         <p:nvSpPr>
-          <p:cNvPr id="73" name="CustomShape 1"/>
+          <p:cNvPr id="79" name="CustomShape 1"/>
           <p:cNvSpPr/>
           <p:nvPr/>
         </p:nvSpPr>
         <p:spPr>
           <a:xfrm>
             <a:off x="3954600" y="8685360"/>
-            <a:ext cx="3023280" cy="456120"/>
+            <a:ext cx="3022920" cy="455760"/>
           </a:xfrm>
           <a:prstGeom prst="rect">
             <a:avLst/>
@@ -250,7 +250,7 @@
                 <a:spcPct val="100000"/>
               </a:lnSpc>
             </a:pPr>
-            <a:fld id="{88847165-7EE8-4398-84DE-C7CE60080A61}" type="slidenum">
+            <a:fld id="{B1DD043B-C6F4-4A82-92B9-F76576D43F0E}" type="slidenum">
               <a:rPr lang="en-US" sz="1200" strike="noStrike">
                 <a:solidFill>
                   <a:srgbClr val="000000"/>
@@ -265,7 +265,7 @@
       </p:sp>
       <p:sp>
         <p:nvSpPr>
-          <p:cNvPr id="74" name="PlaceHolder 2"/>
+          <p:cNvPr id="80" name="PlaceHolder 2"/>
           <p:cNvSpPr>
             <a:spLocks noGrp="1"/>
           </p:cNvSpPr>
@@ -276,7 +276,7 @@
         <p:spPr>
           <a:xfrm>
             <a:off x="698400" y="4343400"/>
-            <a:ext cx="5582160" cy="4113720"/>
+            <a:ext cx="5581800" cy="4113360"/>
           </a:xfrm>
           <a:prstGeom prst="rect">
             <a:avLst/>
@@ -1481,7 +1481,7 @@
         <p:spPr>
           <a:xfrm>
             <a:off x="0" y="0"/>
-            <a:ext cx="32917320" cy="2407320"/>
+            <a:ext cx="32916960" cy="2406960"/>
           </a:xfrm>
           <a:prstGeom prst="rect">
             <a:avLst/>
@@ -1512,7 +1512,7 @@
         <p:spPr>
           <a:xfrm>
             <a:off x="519840" y="2895480"/>
-            <a:ext cx="7038000" cy="15870600"/>
+            <a:ext cx="7037640" cy="15870240"/>
           </a:xfrm>
           <a:prstGeom prst="rect">
             <a:avLst/>
@@ -1543,7 +1543,7 @@
         <p:spPr>
           <a:xfrm>
             <a:off x="199080" y="1515960"/>
-            <a:ext cx="3189600" cy="1103400"/>
+            <a:ext cx="3189240" cy="1103040"/>
           </a:xfrm>
           <a:prstGeom prst="rect">
             <a:avLst/>
@@ -1590,7 +1590,7 @@
         <p:spPr>
           <a:xfrm>
             <a:off x="0" y="0"/>
-            <a:ext cx="32917320" cy="19201320"/>
+            <a:ext cx="32916960" cy="19200960"/>
           </a:xfrm>
           <a:prstGeom prst="rect">
             <a:avLst/>
@@ -1619,7 +1619,7 @@
         <p:spPr>
           <a:xfrm>
             <a:off x="8534520" y="2903760"/>
-            <a:ext cx="16031520" cy="15870600"/>
+            <a:ext cx="16031160" cy="15870240"/>
           </a:xfrm>
           <a:prstGeom prst="rect">
             <a:avLst/>
@@ -1650,7 +1650,7 @@
         <p:spPr>
           <a:xfrm>
             <a:off x="25420320" y="2903760"/>
-            <a:ext cx="7035480" cy="15870600"/>
+            <a:ext cx="7035120" cy="15870240"/>
           </a:xfrm>
           <a:prstGeom prst="rect">
             <a:avLst/>
@@ -1681,7 +1681,7 @@
         <p:spPr>
           <a:xfrm>
             <a:off x="714240" y="333360"/>
-            <a:ext cx="2113560" cy="1446840"/>
+            <a:ext cx="2113200" cy="1446480"/>
           </a:xfrm>
           <a:prstGeom prst="rect">
             <a:avLst/>
@@ -1707,7 +1707,7 @@
         <p:spPr>
           <a:xfrm>
             <a:off x="895320" y="333360"/>
-            <a:ext cx="1427760" cy="1370520"/>
+            <a:ext cx="1427400" cy="1370160"/>
           </a:xfrm>
           <a:prstGeom prst="rect">
             <a:avLst/>
@@ -1733,7 +1733,7 @@
         <p:spPr>
           <a:xfrm>
             <a:off x="64800" y="187200"/>
-            <a:ext cx="3089160" cy="1738800"/>
+            <a:ext cx="3088800" cy="1738440"/>
           </a:xfrm>
           <a:prstGeom prst="rect">
             <a:avLst/>
@@ -1763,7 +1763,7 @@
         <p:spPr>
           <a:xfrm>
             <a:off x="931680" y="249480"/>
-            <a:ext cx="1552680" cy="1501920"/>
+            <a:ext cx="1552320" cy="1501560"/>
           </a:xfrm>
           <a:prstGeom prst="rect">
             <a:avLst/>
@@ -1973,7 +1973,7 @@
         <p:spPr>
           <a:xfrm>
             <a:off x="4316400" y="434520"/>
-            <a:ext cx="24186240" cy="786240"/>
+            <a:ext cx="24185880" cy="785880"/>
           </a:xfrm>
           <a:prstGeom prst="rect">
             <a:avLst/>
@@ -2039,7 +2039,7 @@
         <p:spPr>
           <a:xfrm>
             <a:off x="6521040" y="1035720"/>
-            <a:ext cx="19756440" cy="1749240"/>
+            <a:ext cx="19756080" cy="1748880"/>
           </a:xfrm>
           <a:prstGeom prst="rect">
             <a:avLst/>
@@ -2112,7 +2112,7 @@
         <p:spPr>
           <a:xfrm>
             <a:off x="25426440" y="2895840"/>
-            <a:ext cx="7035120" cy="527400"/>
+            <a:ext cx="7034760" cy="527040"/>
           </a:xfrm>
           <a:prstGeom prst="rect">
             <a:avLst/>
@@ -2161,7 +2161,7 @@
         <p:spPr>
           <a:xfrm>
             <a:off x="525960" y="2886840"/>
-            <a:ext cx="7036560" cy="537480"/>
+            <a:ext cx="7036200" cy="537120"/>
           </a:xfrm>
           <a:prstGeom prst="rect">
             <a:avLst/>
@@ -2210,7 +2210,7 @@
         <p:spPr>
           <a:xfrm>
             <a:off x="25426440" y="10249560"/>
-            <a:ext cx="7035120" cy="527400"/>
+            <a:ext cx="7034760" cy="527040"/>
           </a:xfrm>
           <a:prstGeom prst="rect">
             <a:avLst/>
@@ -2259,7 +2259,7 @@
         <p:spPr>
           <a:xfrm>
             <a:off x="25425000" y="16093440"/>
-            <a:ext cx="7035480" cy="528120"/>
+            <a:ext cx="7035120" cy="527760"/>
           </a:xfrm>
           <a:prstGeom prst="rect">
             <a:avLst/>
@@ -2307,8 +2307,8 @@
         </p:nvSpPr>
         <p:spPr>
           <a:xfrm>
-            <a:off x="514800" y="7554600"/>
-            <a:ext cx="7048080" cy="537480"/>
+            <a:off x="548640" y="11441520"/>
+            <a:ext cx="7040880" cy="537120"/>
           </a:xfrm>
           <a:prstGeom prst="rect">
             <a:avLst/>
@@ -2357,7 +2357,7 @@
         <p:spPr>
           <a:xfrm>
             <a:off x="8532000" y="2889360"/>
-            <a:ext cx="16026840" cy="529200"/>
+            <a:ext cx="16026480" cy="528840"/>
           </a:xfrm>
           <a:prstGeom prst="rect">
             <a:avLst/>
@@ -2405,8 +2405,8 @@
         </p:nvSpPr>
         <p:spPr>
           <a:xfrm>
-            <a:off x="822960" y="3587760"/>
-            <a:ext cx="6400080" cy="3909600"/>
+            <a:off x="822960" y="3497400"/>
+            <a:ext cx="6399720" cy="3909240"/>
           </a:xfrm>
           <a:prstGeom prst="rect">
             <a:avLst/>
@@ -2425,6 +2425,7 @@
         <p:txBody>
           <a:bodyPr lIns="90000" rIns="90000" tIns="45000" bIns="45000"/>
           <a:p>
+            <a:pPr algn="just"/>
             <a:r>
               <a:rPr lang="en-US" sz="1600" strike="noStrike">
                 <a:solidFill>
@@ -2443,11 +2444,12 @@
                 <a:latin typeface="Arial"/>
                 <a:ea typeface="DejaVu Sans"/>
               </a:rPr>
-              <a:t>Shear waves can be induced in tissues by acoustic radiation force created using an ultrasound probe. The shear wave speed of tissue can be measured by tracking the propagation of shear waves from their source using time-of-flight methods [1]. Tissue stiffness can be characterized using these shear wave speed measurements, and this allows differentiation between healthy tissue and lesions. </a:t>
-            </a:r>
-            <a:endParaRPr/>
-          </a:p>
-          <a:p>
+              <a:t>Shear waves can be induced in tissues by acoustic radiation force created using an ultrasound probe. The shear wave speed of tissue can be measured by tracking the propagation of shear waves from their source using time-of-flight methods [1]. Tissue stiffness can be characterized using these shear wave speed measurements. </a:t>
+            </a:r>
+            <a:endParaRPr/>
+          </a:p>
+          <a:p>
+            <a:pPr algn="just"/>
             <a:r>
               <a:rPr lang="en-US" sz="1600" strike="noStrike">
                 <a:solidFill>
@@ -2466,7 +2468,51 @@
                 <a:latin typeface="Arial"/>
                 <a:ea typeface="DejaVu Sans"/>
               </a:rPr>
-              <a:t>However, shear wave speed measurements have been shown to exhibit a depth dependent bias, which has the potential to cause misdiagnosis [2]. It was hypothesized that this depth dependence was caused by out-of-plane shear wave sources generated through nonlinear effects in acoustic propagation. The Khokhlov-Zabolotskaya-Kuznetsov (KZK) nonlinear wave equation [3] was used to simulate acoustic waves propagating in differing media with various nonlinear coefficients . The simulated intensity field distributions showed that as nonlinearity increased, the maximum intensities tended towards shallower locations.</a:t>
+              <a:t>Shear wave speed measurements have been shown to exhibit a depth dependent bias, which has the potential to cause misdiagnosis [2]. It was hypothesized that this depth dependence was caused by out-of-plane shear wave sources generated through nonlinear effects in acoustic propagation. These nonlinear effects are due to localized heating caused by acoustic waves with </a:t>
+            </a:r>
+            <a:r>
+              <a:rPr lang="en-US" sz="1600" strike="noStrike">
+                <a:solidFill>
+                  <a:srgbClr val="000000"/>
+                </a:solidFill>
+                <a:latin typeface="Arial"/>
+                <a:ea typeface="DejaVu Sans"/>
+              </a:rPr>
+              <a:t>high pressure amplitudes This increases </a:t>
+            </a:r>
+            <a:r>
+              <a:rPr lang="en-US" sz="1600" strike="noStrike">
+                <a:solidFill>
+                  <a:srgbClr val="000000"/>
+                </a:solidFill>
+                <a:latin typeface="Arial"/>
+                <a:ea typeface="DejaVu Sans"/>
+              </a:rPr>
+              <a:t>the sound speed in that specific region. Figure 1 shows the resulting sawtooth wave.</a:t>
+            </a:r>
+            <a:endParaRPr/>
+          </a:p>
+          <a:p>
+            <a:pPr algn="just"/>
+            <a:r>
+              <a:rPr lang="en-US" sz="1600" strike="noStrike">
+                <a:solidFill>
+                  <a:srgbClr val="000000"/>
+                </a:solidFill>
+                <a:latin typeface="Arial"/>
+                <a:ea typeface="DejaVu Sans"/>
+              </a:rPr>
+              <a:t> </a:t>
+            </a:r>
+            <a:r>
+              <a:rPr lang="en-US" sz="1600" strike="noStrike">
+                <a:solidFill>
+                  <a:srgbClr val="000000"/>
+                </a:solidFill>
+                <a:latin typeface="Arial"/>
+                <a:ea typeface="DejaVu Sans"/>
+              </a:rPr>
+              <a:t>The Khokhlov-Zabolotskaya-Kuznetsov (KZK) nonlinear wave equation [3] was used to simulate acoustic waves propagating in differing media with various nonlinear coefficients. The simulated intensity field distributions showed that as nonlinearity increased, the maximum intensities tended towards shallower, laterally offset locations. It was also shown that as attenuation increased, the effects of nonlinearity were also diminished.</a:t>
             </a:r>
             <a:endParaRPr/>
           </a:p>
@@ -2481,7 +2527,7 @@
         <p:spPr>
           <a:xfrm>
             <a:off x="25603200" y="16733520"/>
-            <a:ext cx="6674400" cy="1625400"/>
+            <a:ext cx="6674040" cy="1625040"/>
           </a:xfrm>
           <a:prstGeom prst="rect">
             <a:avLst/>
@@ -2552,8 +2598,8 @@
         </p:blipFill>
         <p:spPr>
           <a:xfrm>
-            <a:off x="1188720" y="8321040"/>
-            <a:ext cx="5302080" cy="3748680"/>
+            <a:off x="9052560" y="4297680"/>
+            <a:ext cx="3474720" cy="2560320"/>
           </a:xfrm>
           <a:prstGeom prst="rect">
             <a:avLst/>
@@ -2563,9 +2609,47 @@
           </a:ln>
         </p:spPr>
       </p:pic>
+      <p:sp>
+        <p:nvSpPr>
+          <p:cNvPr id="63" name="CustomShape 12"/>
+          <p:cNvSpPr/>
+          <p:nvPr/>
+        </p:nvSpPr>
+        <p:spPr>
+          <a:xfrm>
+            <a:off x="10149840" y="3749040"/>
+            <a:ext cx="2454120" cy="345960"/>
+          </a:xfrm>
+          <a:prstGeom prst="rect">
+            <a:avLst/>
+          </a:prstGeom>
+          <a:noFill/>
+          <a:ln>
+            <a:noFill/>
+          </a:ln>
+        </p:spPr>
+        <p:style>
+          <a:lnRef idx="0"/>
+          <a:fillRef idx="0"/>
+          <a:effectRef idx="0"/>
+          <a:fontRef idx="minor"/>
+        </p:style>
+        <p:txBody>
+          <a:bodyPr lIns="90000" rIns="90000" tIns="45000" bIns="45000"/>
+          <a:p>
+            <a:r>
+              <a:rPr lang="en-US" strike="noStrike">
+                <a:latin typeface="Arial"/>
+              </a:rPr>
+              <a:t>α = 0.005 dB/cm/MHz </a:t>
+            </a:r>
+            <a:endParaRPr/>
+          </a:p>
+        </p:txBody>
+      </p:sp>
       <p:pic>
         <p:nvPicPr>
-          <p:cNvPr id="63" name="" descr=""/>
+          <p:cNvPr id="64" name="" descr=""/>
           <p:cNvPicPr/>
           <p:nvPr/>
         </p:nvPicPr>
@@ -2575,8 +2659,8 @@
         </p:blipFill>
         <p:spPr>
           <a:xfrm>
-            <a:off x="9052560" y="4297680"/>
-            <a:ext cx="5029200" cy="4023360"/>
+            <a:off x="9235440" y="7498080"/>
+            <a:ext cx="3108960" cy="1097280"/>
           </a:xfrm>
           <a:prstGeom prst="rect">
             <a:avLst/>
@@ -2586,38 +2670,6 @@
           </a:ln>
         </p:spPr>
       </p:pic>
-      <p:sp>
-        <p:nvSpPr>
-          <p:cNvPr id="64" name="TextShape 12"/>
-          <p:cNvSpPr txBox="1"/>
-          <p:nvPr/>
-        </p:nvSpPr>
-        <p:spPr>
-          <a:xfrm>
-            <a:off x="10149840" y="3749040"/>
-            <a:ext cx="2454480" cy="346320"/>
-          </a:xfrm>
-          <a:prstGeom prst="rect">
-            <a:avLst/>
-          </a:prstGeom>
-          <a:noFill/>
-          <a:ln>
-            <a:noFill/>
-          </a:ln>
-        </p:spPr>
-        <p:txBody>
-          <a:bodyPr lIns="90000" rIns="90000" tIns="45000" bIns="45000"/>
-          <a:p>
-            <a:r>
-              <a:rPr lang="en-US">
-                <a:latin typeface="Arial"/>
-              </a:rPr>
-              <a:t>α = 0.005 dB/cm/MHz </a:t>
-            </a:r>
-            <a:endParaRPr/>
-          </a:p>
-        </p:txBody>
-      </p:sp>
       <p:pic>
         <p:nvPicPr>
           <p:cNvPr id="65" name="" descr=""/>
@@ -2630,8 +2682,8 @@
         </p:blipFill>
         <p:spPr>
           <a:xfrm>
-            <a:off x="8869680" y="8686800"/>
-            <a:ext cx="5486400" cy="2560320"/>
+            <a:off x="9235440" y="9326880"/>
+            <a:ext cx="3840480" cy="2011680"/>
           </a:xfrm>
           <a:prstGeom prst="rect">
             <a:avLst/>
@@ -2653,8 +2705,8 @@
         </p:blipFill>
         <p:spPr>
           <a:xfrm>
-            <a:off x="8869680" y="11521440"/>
-            <a:ext cx="5486400" cy="2926080"/>
+            <a:off x="8870040" y="12252960"/>
+            <a:ext cx="3565800" cy="1554480"/>
           </a:xfrm>
           <a:prstGeom prst="rect">
             <a:avLst/>
@@ -2676,8 +2728,8 @@
         </p:blipFill>
         <p:spPr>
           <a:xfrm>
-            <a:off x="8869680" y="14904720"/>
-            <a:ext cx="5486400" cy="2373120"/>
+            <a:off x="19386720" y="4572000"/>
+            <a:ext cx="3564720" cy="3017160"/>
           </a:xfrm>
           <a:prstGeom prst="rect">
             <a:avLst/>
@@ -2687,9 +2739,47 @@
           </a:ln>
         </p:spPr>
       </p:pic>
+      <p:sp>
+        <p:nvSpPr>
+          <p:cNvPr id="68" name="CustomShape 13"/>
+          <p:cNvSpPr/>
+          <p:nvPr/>
+        </p:nvSpPr>
+        <p:spPr>
+          <a:xfrm>
+            <a:off x="19933920" y="3677400"/>
+            <a:ext cx="2201040" cy="345960"/>
+          </a:xfrm>
+          <a:prstGeom prst="rect">
+            <a:avLst/>
+          </a:prstGeom>
+          <a:noFill/>
+          <a:ln>
+            <a:noFill/>
+          </a:ln>
+        </p:spPr>
+        <p:style>
+          <a:lnRef idx="0"/>
+          <a:fillRef idx="0"/>
+          <a:effectRef idx="0"/>
+          <a:fontRef idx="minor"/>
+        </p:style>
+        <p:txBody>
+          <a:bodyPr lIns="90000" rIns="90000" tIns="45000" bIns="45000"/>
+          <a:p>
+            <a:r>
+              <a:rPr lang="en-US" strike="noStrike">
+                <a:latin typeface="Arial"/>
+              </a:rPr>
+              <a:t>α = 1.5 dB/cm/MHz </a:t>
+            </a:r>
+            <a:endParaRPr/>
+          </a:p>
+        </p:txBody>
+      </p:sp>
       <p:pic>
         <p:nvPicPr>
-          <p:cNvPr id="68" name="" descr=""/>
+          <p:cNvPr id="69" name="" descr=""/>
           <p:cNvPicPr/>
           <p:nvPr/>
         </p:nvPicPr>
@@ -2699,8 +2789,8 @@
         </p:blipFill>
         <p:spPr>
           <a:xfrm>
-            <a:off x="16643160" y="4754880"/>
-            <a:ext cx="3565080" cy="3017520"/>
+            <a:off x="20117160" y="7955640"/>
+            <a:ext cx="1828440" cy="2742840"/>
           </a:xfrm>
           <a:prstGeom prst="rect">
             <a:avLst/>
@@ -2710,38 +2800,6 @@
           </a:ln>
         </p:spPr>
       </p:pic>
-      <p:sp>
-        <p:nvSpPr>
-          <p:cNvPr id="69" name="TextShape 13"/>
-          <p:cNvSpPr txBox="1"/>
-          <p:nvPr/>
-        </p:nvSpPr>
-        <p:spPr>
-          <a:xfrm>
-            <a:off x="17373600" y="3749040"/>
-            <a:ext cx="2201400" cy="346320"/>
-          </a:xfrm>
-          <a:prstGeom prst="rect">
-            <a:avLst/>
-          </a:prstGeom>
-          <a:noFill/>
-          <a:ln>
-            <a:noFill/>
-          </a:ln>
-        </p:spPr>
-        <p:txBody>
-          <a:bodyPr lIns="90000" rIns="90000" tIns="45000" bIns="45000"/>
-          <a:p>
-            <a:r>
-              <a:rPr lang="en-US">
-                <a:latin typeface="Arial"/>
-              </a:rPr>
-              <a:t>α = 1.5 dB/cm/MHz </a:t>
-            </a:r>
-            <a:endParaRPr/>
-          </a:p>
-        </p:txBody>
-      </p:sp>
       <p:pic>
         <p:nvPicPr>
           <p:cNvPr id="70" name="" descr=""/>
@@ -2754,8 +2812,8 @@
         </p:blipFill>
         <p:spPr>
           <a:xfrm>
-            <a:off x="17007840" y="8595360"/>
-            <a:ext cx="1828800" cy="2743200"/>
+            <a:off x="20299680" y="11156040"/>
+            <a:ext cx="1462680" cy="2834280"/>
           </a:xfrm>
           <a:prstGeom prst="rect">
             <a:avLst/>
@@ -2777,8 +2835,8 @@
         </p:blipFill>
         <p:spPr>
           <a:xfrm>
-            <a:off x="17099280" y="11612880"/>
-            <a:ext cx="1463040" cy="2834640"/>
+            <a:off x="20277000" y="14447520"/>
+            <a:ext cx="1485720" cy="2560320"/>
           </a:xfrm>
           <a:prstGeom prst="rect">
             <a:avLst/>
@@ -2788,9 +2846,112 @@
           </a:ln>
         </p:spPr>
       </p:pic>
+      <p:sp>
+        <p:nvSpPr>
+          <p:cNvPr id="72" name="TextShape 14"/>
+          <p:cNvSpPr txBox="1"/>
+          <p:nvPr/>
+        </p:nvSpPr>
+        <p:spPr>
+          <a:xfrm>
+            <a:off x="25694640" y="10972800"/>
+            <a:ext cx="6492240" cy="346320"/>
+          </a:xfrm>
+          <a:prstGeom prst="rect">
+            <a:avLst/>
+          </a:prstGeom>
+          <a:noFill/>
+          <a:ln>
+            <a:noFill/>
+          </a:ln>
+        </p:spPr>
+        <p:txBody>
+          <a:bodyPr lIns="90000" rIns="90000" tIns="45000" bIns="45000"/>
+          <a:p>
+            <a:r>
+              <a:rPr lang="en-US">
+                <a:latin typeface="Arial"/>
+              </a:rPr>
+              <a:t>The</a:t>
+            </a:r>
+            <a:endParaRPr/>
+          </a:p>
+        </p:txBody>
+      </p:sp>
+      <p:sp>
+        <p:nvSpPr>
+          <p:cNvPr id="73" name="TextShape 15"/>
+          <p:cNvSpPr txBox="1"/>
+          <p:nvPr/>
+        </p:nvSpPr>
+        <p:spPr>
+          <a:xfrm>
+            <a:off x="822960" y="12088440"/>
+            <a:ext cx="6492240" cy="1670400"/>
+          </a:xfrm>
+          <a:prstGeom prst="rect">
+            <a:avLst/>
+          </a:prstGeom>
+          <a:noFill/>
+          <a:ln>
+            <a:noFill/>
+          </a:ln>
+        </p:spPr>
+        <p:txBody>
+          <a:bodyPr lIns="90000" rIns="90000" tIns="45000" bIns="45000"/>
+          <a:p>
+            <a:pPr algn="just"/>
+            <a:r>
+              <a:rPr lang="en-US" sz="1600">
+                <a:latin typeface="Arial"/>
+              </a:rPr>
+              <a:t>	</a:t>
+            </a:r>
+            <a:r>
+              <a:rPr lang="en-US" sz="1600">
+                <a:latin typeface="Arial"/>
+              </a:rPr>
+              <a:t>A curvilinear C5-2 transducer focused at 70 mm in depth was simulated with 7 excitation cycles at an excitation frequency of 2.36 MHz to generate the face pressures used as an input to the KZK simulations. These face pressure waves was scaled to an amplitude of 0.4 MPa to match pressure amplitudes that were measured experimentally. As shown in Figure 2, appropriate time delays were applied to focus the acoustic waves correctly. </a:t>
+            </a:r>
+            <a:endParaRPr/>
+          </a:p>
+        </p:txBody>
+      </p:sp>
+      <p:sp>
+        <p:nvSpPr>
+          <p:cNvPr id="74" name="TextShape 16"/>
+          <p:cNvSpPr txBox="1"/>
+          <p:nvPr/>
+        </p:nvSpPr>
+        <p:spPr>
+          <a:xfrm>
+            <a:off x="2377440" y="11057400"/>
+            <a:ext cx="3291840" cy="541800"/>
+          </a:xfrm>
+          <a:prstGeom prst="rect">
+            <a:avLst/>
+          </a:prstGeom>
+          <a:noFill/>
+          <a:ln>
+            <a:noFill/>
+          </a:ln>
+        </p:spPr>
+        <p:txBody>
+          <a:bodyPr lIns="90000" rIns="90000" tIns="45000" bIns="45000"/>
+          <a:p>
+            <a:r>
+              <a:rPr lang="en-US" sz="1600">
+                <a:latin typeface="Arial"/>
+              </a:rPr>
+              <a:t>Figure 1: Nonlinear Acoustic Wave</a:t>
+            </a:r>
+            <a:endParaRPr/>
+          </a:p>
+        </p:txBody>
+      </p:sp>
       <p:pic>
         <p:nvPicPr>
-          <p:cNvPr id="72" name="" descr=""/>
+          <p:cNvPr id="75" name="" descr=""/>
           <p:cNvPicPr/>
           <p:nvPr/>
         </p:nvPicPr>
@@ -2800,8 +2961,8 @@
         </p:blipFill>
         <p:spPr>
           <a:xfrm>
-            <a:off x="17076240" y="14721840"/>
-            <a:ext cx="1486080" cy="3291840"/>
+            <a:off x="2286000" y="8503920"/>
+            <a:ext cx="3383280" cy="2468880"/>
           </a:xfrm>
           <a:prstGeom prst="rect">
             <a:avLst/>
@@ -2811,6 +2972,99 @@
           </a:ln>
         </p:spPr>
       </p:pic>
+      <p:sp>
+        <p:nvSpPr>
+          <p:cNvPr id="76" name="TextShape 17"/>
+          <p:cNvSpPr txBox="1"/>
+          <p:nvPr/>
+        </p:nvSpPr>
+        <p:spPr>
+          <a:xfrm>
+            <a:off x="822960" y="17623080"/>
+            <a:ext cx="6400800" cy="993240"/>
+          </a:xfrm>
+          <a:prstGeom prst="rect">
+            <a:avLst/>
+          </a:prstGeom>
+          <a:noFill/>
+          <a:ln>
+            <a:noFill/>
+          </a:ln>
+        </p:spPr>
+        <p:txBody>
+          <a:bodyPr lIns="90000" rIns="90000" tIns="45000" bIns="45000"/>
+          <a:p>
+            <a:r>
+              <a:rPr lang="en-US" sz="1600">
+                <a:latin typeface="Arial"/>
+              </a:rPr>
+              <a:t>	</a:t>
+            </a:r>
+            <a:r>
+              <a:rPr lang="en-US" sz="1600">
+                <a:latin typeface="Arial"/>
+              </a:rPr>
+              <a:t>Using these face pressure inputs, KZK simulations were run with various combinations of attenuation coefficients (α = 0.005, 0.3, 1.0, and 1.5 dB/cm/MHz) and nonlinear coefficients (β = 0, 3.5, and 7). The resulting intensity fields were visualized using ParaView.</a:t>
+            </a:r>
+            <a:endParaRPr/>
+          </a:p>
+        </p:txBody>
+      </p:sp>
+      <p:pic>
+        <p:nvPicPr>
+          <p:cNvPr id="77" name="" descr=""/>
+          <p:cNvPicPr/>
+          <p:nvPr/>
+        </p:nvPicPr>
+        <p:blipFill>
+          <a:blip r:embed="rId10"/>
+          <a:stretch/>
+        </p:blipFill>
+        <p:spPr>
+          <a:xfrm>
+            <a:off x="1920240" y="13758840"/>
+            <a:ext cx="4389120" cy="3383280"/>
+          </a:xfrm>
+          <a:prstGeom prst="rect">
+            <a:avLst/>
+          </a:prstGeom>
+          <a:ln>
+            <a:noFill/>
+          </a:ln>
+        </p:spPr>
+      </p:pic>
+      <p:sp>
+        <p:nvSpPr>
+          <p:cNvPr id="78" name="TextShape 18"/>
+          <p:cNvSpPr txBox="1"/>
+          <p:nvPr/>
+        </p:nvSpPr>
+        <p:spPr>
+          <a:xfrm>
+            <a:off x="2194560" y="17190720"/>
+            <a:ext cx="3931920" cy="316080"/>
+          </a:xfrm>
+          <a:prstGeom prst="rect">
+            <a:avLst/>
+          </a:prstGeom>
+          <a:noFill/>
+          <a:ln>
+            <a:noFill/>
+          </a:ln>
+        </p:spPr>
+        <p:txBody>
+          <a:bodyPr lIns="90000" rIns="90000" tIns="45000" bIns="45000"/>
+          <a:p>
+            <a:r>
+              <a:rPr lang="en-US" sz="1600">
+                <a:latin typeface="Arial"/>
+              </a:rPr>
+              <a:t>Figure 2: Simulated Element Time Delays</a:t>
+            </a:r>
+            <a:endParaRPr/>
+          </a:p>
+        </p:txBody>
+      </p:sp>
     </p:spTree>
   </p:cSld>
   <p:timing>

</xml_diff>

<commit_message>
updated isocontour plots formatting on poster
</commit_message>
<xml_diff>
--- a/presentations/nc_bmes_sympo/nc_bmes_sympo.pptx
+++ b/presentations/nc_bmes_sympo/nc_bmes_sympo.pptx
@@ -1,22 +1,409 @@
 
 <file path=ppt/presentation.xml><?xml version="1.0" encoding="utf-8"?>
-<p:presentation xmlns:a="http://schemas.openxmlformats.org/drawingml/2006/main" xmlns:p="http://schemas.openxmlformats.org/presentationml/2006/main" xmlns:r="http://schemas.openxmlformats.org/officeDocument/2006/relationships">
+<p:presentation xmlns:a="http://schemas.openxmlformats.org/drawingml/2006/main" xmlns:r="http://schemas.openxmlformats.org/officeDocument/2006/relationships" xmlns:p="http://schemas.openxmlformats.org/presentationml/2006/main">
   <p:sldMasterIdLst>
-    <p:sldMasterId id="2147483648" r:id="rId2"/>
+    <p:sldMasterId id="2147483648" r:id="rId1"/>
   </p:sldMasterIdLst>
   <p:notesMasterIdLst>
     <p:notesMasterId r:id="rId3"/>
   </p:notesMasterIdLst>
   <p:sldIdLst>
-    <p:sldId id="256" r:id="rId4"/>
+    <p:sldId id="256" r:id="rId2"/>
   </p:sldIdLst>
   <p:sldSz cx="32918400" cy="19202400"/>
-  <p:notesSz cx="6980237" cy="9144000"/>
+  <p:notesSz cx="6980238" cy="9144000"/>
+  <p:defaultTextStyle>
+    <a:defPPr>
+      <a:defRPr lang="en-US"/>
+    </a:defPPr>
+    <a:lvl1pPr marL="0" algn="l" defTabSz="914400" rtl="0" eaLnBrk="1" latinLnBrk="0" hangingPunct="1">
+      <a:defRPr sz="1800" kern="1200">
+        <a:solidFill>
+          <a:schemeClr val="tx1"/>
+        </a:solidFill>
+        <a:latin typeface="+mn-lt"/>
+        <a:ea typeface="+mn-ea"/>
+        <a:cs typeface="+mn-cs"/>
+      </a:defRPr>
+    </a:lvl1pPr>
+    <a:lvl2pPr marL="457200" algn="l" defTabSz="914400" rtl="0" eaLnBrk="1" latinLnBrk="0" hangingPunct="1">
+      <a:defRPr sz="1800" kern="1200">
+        <a:solidFill>
+          <a:schemeClr val="tx1"/>
+        </a:solidFill>
+        <a:latin typeface="+mn-lt"/>
+        <a:ea typeface="+mn-ea"/>
+        <a:cs typeface="+mn-cs"/>
+      </a:defRPr>
+    </a:lvl2pPr>
+    <a:lvl3pPr marL="914400" algn="l" defTabSz="914400" rtl="0" eaLnBrk="1" latinLnBrk="0" hangingPunct="1">
+      <a:defRPr sz="1800" kern="1200">
+        <a:solidFill>
+          <a:schemeClr val="tx1"/>
+        </a:solidFill>
+        <a:latin typeface="+mn-lt"/>
+        <a:ea typeface="+mn-ea"/>
+        <a:cs typeface="+mn-cs"/>
+      </a:defRPr>
+    </a:lvl3pPr>
+    <a:lvl4pPr marL="1371600" algn="l" defTabSz="914400" rtl="0" eaLnBrk="1" latinLnBrk="0" hangingPunct="1">
+      <a:defRPr sz="1800" kern="1200">
+        <a:solidFill>
+          <a:schemeClr val="tx1"/>
+        </a:solidFill>
+        <a:latin typeface="+mn-lt"/>
+        <a:ea typeface="+mn-ea"/>
+        <a:cs typeface="+mn-cs"/>
+      </a:defRPr>
+    </a:lvl4pPr>
+    <a:lvl5pPr marL="1828800" algn="l" defTabSz="914400" rtl="0" eaLnBrk="1" latinLnBrk="0" hangingPunct="1">
+      <a:defRPr sz="1800" kern="1200">
+        <a:solidFill>
+          <a:schemeClr val="tx1"/>
+        </a:solidFill>
+        <a:latin typeface="+mn-lt"/>
+        <a:ea typeface="+mn-ea"/>
+        <a:cs typeface="+mn-cs"/>
+      </a:defRPr>
+    </a:lvl5pPr>
+    <a:lvl6pPr marL="2286000" algn="l" defTabSz="914400" rtl="0" eaLnBrk="1" latinLnBrk="0" hangingPunct="1">
+      <a:defRPr sz="1800" kern="1200">
+        <a:solidFill>
+          <a:schemeClr val="tx1"/>
+        </a:solidFill>
+        <a:latin typeface="+mn-lt"/>
+        <a:ea typeface="+mn-ea"/>
+        <a:cs typeface="+mn-cs"/>
+      </a:defRPr>
+    </a:lvl6pPr>
+    <a:lvl7pPr marL="2743200" algn="l" defTabSz="914400" rtl="0" eaLnBrk="1" latinLnBrk="0" hangingPunct="1">
+      <a:defRPr sz="1800" kern="1200">
+        <a:solidFill>
+          <a:schemeClr val="tx1"/>
+        </a:solidFill>
+        <a:latin typeface="+mn-lt"/>
+        <a:ea typeface="+mn-ea"/>
+        <a:cs typeface="+mn-cs"/>
+      </a:defRPr>
+    </a:lvl7pPr>
+    <a:lvl8pPr marL="3200400" algn="l" defTabSz="914400" rtl="0" eaLnBrk="1" latinLnBrk="0" hangingPunct="1">
+      <a:defRPr sz="1800" kern="1200">
+        <a:solidFill>
+          <a:schemeClr val="tx1"/>
+        </a:solidFill>
+        <a:latin typeface="+mn-lt"/>
+        <a:ea typeface="+mn-ea"/>
+        <a:cs typeface="+mn-cs"/>
+      </a:defRPr>
+    </a:lvl8pPr>
+    <a:lvl9pPr marL="3657600" algn="l" defTabSz="914400" rtl="0" eaLnBrk="1" latinLnBrk="0" hangingPunct="1">
+      <a:defRPr sz="1800" kern="1200">
+        <a:solidFill>
+          <a:schemeClr val="tx1"/>
+        </a:solidFill>
+        <a:latin typeface="+mn-lt"/>
+        <a:ea typeface="+mn-ea"/>
+        <a:cs typeface="+mn-cs"/>
+      </a:defRPr>
+    </a:lvl9pPr>
+  </p:defaultTextStyle>
 </p:presentation>
 </file>
 
 <file path=ppt/notesMasters/notesMaster1.xml><?xml version="1.0" encoding="utf-8"?>
-<p:notesMaster xmlns:a="http://schemas.openxmlformats.org/drawingml/2006/main" xmlns:p="http://schemas.openxmlformats.org/presentationml/2006/main" xmlns:r="http://schemas.openxmlformats.org/officeDocument/2006/relationships">
+<p:notesMaster xmlns:a="http://schemas.openxmlformats.org/drawingml/2006/main" xmlns:r="http://schemas.openxmlformats.org/officeDocument/2006/relationships" xmlns:p="http://schemas.openxmlformats.org/presentationml/2006/main">
+  <p:cSld>
+    <p:bg>
+      <p:bgRef idx="1001">
+        <a:schemeClr val="bg1"/>
+      </p:bgRef>
+    </p:bg>
+    <p:spTree>
+      <p:nvGrpSpPr>
+        <p:cNvPr id="1" name=""/>
+        <p:cNvGrpSpPr/>
+        <p:nvPr/>
+      </p:nvGrpSpPr>
+      <p:grpSpPr>
+        <a:xfrm>
+          <a:off x="0" y="0"/>
+          <a:ext cx="0" cy="0"/>
+          <a:chOff x="0" y="0"/>
+          <a:chExt cx="0" cy="0"/>
+        </a:xfrm>
+      </p:grpSpPr>
+      <p:sp>
+        <p:nvSpPr>
+          <p:cNvPr id="46" name="PlaceHolder 1"/>
+          <p:cNvSpPr>
+            <a:spLocks noGrp="1"/>
+          </p:cNvSpPr>
+          <p:nvPr>
+            <p:ph type="body"/>
+          </p:nvPr>
+        </p:nvSpPr>
+        <p:spPr>
+          <a:xfrm>
+            <a:off x="777240" y="4777560"/>
+            <a:ext cx="6217560" cy="4525920"/>
+          </a:xfrm>
+          <a:prstGeom prst="rect">
+            <a:avLst/>
+          </a:prstGeom>
+        </p:spPr>
+        <p:txBody>
+          <a:bodyPr lIns="0" tIns="0" rIns="0" bIns="0"/>
+          <a:lstStyle/>
+          <a:p>
+            <a:r>
+              <a:rPr lang="en-US" sz="2000">
+                <a:latin typeface="Arial"/>
+              </a:rPr>
+              <a:t>Click to edit the notes format</a:t>
+            </a:r>
+            <a:endParaRPr/>
+          </a:p>
+        </p:txBody>
+      </p:sp>
+      <p:sp>
+        <p:nvSpPr>
+          <p:cNvPr id="47" name="PlaceHolder 2"/>
+          <p:cNvSpPr>
+            <a:spLocks noGrp="1"/>
+          </p:cNvSpPr>
+          <p:nvPr>
+            <p:ph type="hdr"/>
+          </p:nvPr>
+        </p:nvSpPr>
+        <p:spPr>
+          <a:xfrm>
+            <a:off x="0" y="0"/>
+            <a:ext cx="3372840" cy="502560"/>
+          </a:xfrm>
+          <a:prstGeom prst="rect">
+            <a:avLst/>
+          </a:prstGeom>
+        </p:spPr>
+        <p:txBody>
+          <a:bodyPr lIns="0" tIns="0" rIns="0" bIns="0"/>
+          <a:lstStyle/>
+          <a:p>
+            <a:r>
+              <a:rPr lang="en-US" sz="1400">
+                <a:latin typeface="Times New Roman"/>
+              </a:rPr>
+              <a:t>&lt;header&gt;</a:t>
+            </a:r>
+            <a:endParaRPr/>
+          </a:p>
+        </p:txBody>
+      </p:sp>
+      <p:sp>
+        <p:nvSpPr>
+          <p:cNvPr id="48" name="PlaceHolder 3"/>
+          <p:cNvSpPr>
+            <a:spLocks noGrp="1"/>
+          </p:cNvSpPr>
+          <p:nvPr>
+            <p:ph type="dt"/>
+          </p:nvPr>
+        </p:nvSpPr>
+        <p:spPr>
+          <a:xfrm>
+            <a:off x="4399200" y="0"/>
+            <a:ext cx="3372840" cy="502560"/>
+          </a:xfrm>
+          <a:prstGeom prst="rect">
+            <a:avLst/>
+          </a:prstGeom>
+        </p:spPr>
+        <p:txBody>
+          <a:bodyPr lIns="0" tIns="0" rIns="0" bIns="0"/>
+          <a:lstStyle/>
+          <a:p>
+            <a:pPr algn="r"/>
+            <a:r>
+              <a:rPr lang="en-US" sz="1400">
+                <a:latin typeface="Times New Roman"/>
+              </a:rPr>
+              <a:t>&lt;date/time&gt;</a:t>
+            </a:r>
+            <a:endParaRPr/>
+          </a:p>
+        </p:txBody>
+      </p:sp>
+      <p:sp>
+        <p:nvSpPr>
+          <p:cNvPr id="49" name="PlaceHolder 4"/>
+          <p:cNvSpPr>
+            <a:spLocks noGrp="1"/>
+          </p:cNvSpPr>
+          <p:nvPr>
+            <p:ph type="ftr"/>
+          </p:nvPr>
+        </p:nvSpPr>
+        <p:spPr>
+          <a:xfrm>
+            <a:off x="0" y="9555480"/>
+            <a:ext cx="3372840" cy="502560"/>
+          </a:xfrm>
+          <a:prstGeom prst="rect">
+            <a:avLst/>
+          </a:prstGeom>
+        </p:spPr>
+        <p:txBody>
+          <a:bodyPr lIns="0" tIns="0" rIns="0" bIns="0" anchor="b"/>
+          <a:lstStyle/>
+          <a:p>
+            <a:r>
+              <a:rPr lang="en-US" sz="1400">
+                <a:latin typeface="Times New Roman"/>
+              </a:rPr>
+              <a:t>&lt;footer&gt;</a:t>
+            </a:r>
+            <a:endParaRPr/>
+          </a:p>
+        </p:txBody>
+      </p:sp>
+      <p:sp>
+        <p:nvSpPr>
+          <p:cNvPr id="50" name="PlaceHolder 5"/>
+          <p:cNvSpPr>
+            <a:spLocks noGrp="1"/>
+          </p:cNvSpPr>
+          <p:nvPr>
+            <p:ph type="sldNum"/>
+          </p:nvPr>
+        </p:nvSpPr>
+        <p:spPr>
+          <a:xfrm>
+            <a:off x="4399200" y="9555480"/>
+            <a:ext cx="3372840" cy="502560"/>
+          </a:xfrm>
+          <a:prstGeom prst="rect">
+            <a:avLst/>
+          </a:prstGeom>
+        </p:spPr>
+        <p:txBody>
+          <a:bodyPr lIns="0" tIns="0" rIns="0" bIns="0" anchor="b"/>
+          <a:lstStyle/>
+          <a:p>
+            <a:pPr algn="r"/>
+            <a:fld id="{AEEC5A99-F4DE-4440-8F7F-7156E8958592}" type="slidenum">
+              <a:rPr lang="en-US" sz="1400">
+                <a:latin typeface="Times New Roman"/>
+              </a:rPr>
+              <a:t>‹#›</a:t>
+            </a:fld>
+            <a:endParaRPr/>
+          </a:p>
+        </p:txBody>
+      </p:sp>
+    </p:spTree>
+    <p:extLst>
+      <p:ext uri="{BB962C8B-B14F-4D97-AF65-F5344CB8AC3E}">
+        <p14:creationId xmlns:p14="http://schemas.microsoft.com/office/powerpoint/2010/main" val="4194691798"/>
+      </p:ext>
+    </p:extLst>
+  </p:cSld>
+  <p:clrMap bg1="lt1" tx1="dk1" bg2="lt2" tx2="dk2" accent1="accent1" accent2="accent2" accent3="accent3" accent4="accent4" accent5="accent5" accent6="accent6" hlink="hlink" folHlink="folHlink"/>
+  <p:notesStyle>
+    <a:lvl1pPr marL="0" algn="l" defTabSz="914400" rtl="0" eaLnBrk="1" latinLnBrk="0" hangingPunct="1">
+      <a:defRPr sz="1200" kern="1200">
+        <a:solidFill>
+          <a:schemeClr val="tx1"/>
+        </a:solidFill>
+        <a:latin typeface="+mn-lt"/>
+        <a:ea typeface="+mn-ea"/>
+        <a:cs typeface="+mn-cs"/>
+      </a:defRPr>
+    </a:lvl1pPr>
+    <a:lvl2pPr marL="457200" algn="l" defTabSz="914400" rtl="0" eaLnBrk="1" latinLnBrk="0" hangingPunct="1">
+      <a:defRPr sz="1200" kern="1200">
+        <a:solidFill>
+          <a:schemeClr val="tx1"/>
+        </a:solidFill>
+        <a:latin typeface="+mn-lt"/>
+        <a:ea typeface="+mn-ea"/>
+        <a:cs typeface="+mn-cs"/>
+      </a:defRPr>
+    </a:lvl2pPr>
+    <a:lvl3pPr marL="914400" algn="l" defTabSz="914400" rtl="0" eaLnBrk="1" latinLnBrk="0" hangingPunct="1">
+      <a:defRPr sz="1200" kern="1200">
+        <a:solidFill>
+          <a:schemeClr val="tx1"/>
+        </a:solidFill>
+        <a:latin typeface="+mn-lt"/>
+        <a:ea typeface="+mn-ea"/>
+        <a:cs typeface="+mn-cs"/>
+      </a:defRPr>
+    </a:lvl3pPr>
+    <a:lvl4pPr marL="1371600" algn="l" defTabSz="914400" rtl="0" eaLnBrk="1" latinLnBrk="0" hangingPunct="1">
+      <a:defRPr sz="1200" kern="1200">
+        <a:solidFill>
+          <a:schemeClr val="tx1"/>
+        </a:solidFill>
+        <a:latin typeface="+mn-lt"/>
+        <a:ea typeface="+mn-ea"/>
+        <a:cs typeface="+mn-cs"/>
+      </a:defRPr>
+    </a:lvl4pPr>
+    <a:lvl5pPr marL="1828800" algn="l" defTabSz="914400" rtl="0" eaLnBrk="1" latinLnBrk="0" hangingPunct="1">
+      <a:defRPr sz="1200" kern="1200">
+        <a:solidFill>
+          <a:schemeClr val="tx1"/>
+        </a:solidFill>
+        <a:latin typeface="+mn-lt"/>
+        <a:ea typeface="+mn-ea"/>
+        <a:cs typeface="+mn-cs"/>
+      </a:defRPr>
+    </a:lvl5pPr>
+    <a:lvl6pPr marL="2286000" algn="l" defTabSz="914400" rtl="0" eaLnBrk="1" latinLnBrk="0" hangingPunct="1">
+      <a:defRPr sz="1200" kern="1200">
+        <a:solidFill>
+          <a:schemeClr val="tx1"/>
+        </a:solidFill>
+        <a:latin typeface="+mn-lt"/>
+        <a:ea typeface="+mn-ea"/>
+        <a:cs typeface="+mn-cs"/>
+      </a:defRPr>
+    </a:lvl6pPr>
+    <a:lvl7pPr marL="2743200" algn="l" defTabSz="914400" rtl="0" eaLnBrk="1" latinLnBrk="0" hangingPunct="1">
+      <a:defRPr sz="1200" kern="1200">
+        <a:solidFill>
+          <a:schemeClr val="tx1"/>
+        </a:solidFill>
+        <a:latin typeface="+mn-lt"/>
+        <a:ea typeface="+mn-ea"/>
+        <a:cs typeface="+mn-cs"/>
+      </a:defRPr>
+    </a:lvl7pPr>
+    <a:lvl8pPr marL="3200400" algn="l" defTabSz="914400" rtl="0" eaLnBrk="1" latinLnBrk="0" hangingPunct="1">
+      <a:defRPr sz="1200" kern="1200">
+        <a:solidFill>
+          <a:schemeClr val="tx1"/>
+        </a:solidFill>
+        <a:latin typeface="+mn-lt"/>
+        <a:ea typeface="+mn-ea"/>
+        <a:cs typeface="+mn-cs"/>
+      </a:defRPr>
+    </a:lvl8pPr>
+    <a:lvl9pPr marL="3657600" algn="l" defTabSz="914400" rtl="0" eaLnBrk="1" latinLnBrk="0" hangingPunct="1">
+      <a:defRPr sz="1200" kern="1200">
+        <a:solidFill>
+          <a:schemeClr val="tx1"/>
+        </a:solidFill>
+        <a:latin typeface="+mn-lt"/>
+        <a:ea typeface="+mn-ea"/>
+        <a:cs typeface="+mn-cs"/>
+      </a:defRPr>
+    </a:lvl9pPr>
+  </p:notesStyle>
+</p:notesMaster>
+</file>
+
+<file path=ppt/notesSlides/notesSlide1.xml><?xml version="1.0" encoding="utf-8"?>
+<p:notes xmlns:a="http://schemas.openxmlformats.org/drawingml/2006/main" xmlns:r="http://schemas.openxmlformats.org/officeDocument/2006/relationships" xmlns:p="http://schemas.openxmlformats.org/presentationml/2006/main">
   <p:cSld>
     <p:spTree>
       <p:nvGrpSpPr>
@@ -34,191 +421,6 @@
       </p:grpSpPr>
       <p:sp>
         <p:nvSpPr>
-          <p:cNvPr id="46" name="PlaceHolder 1"/>
-          <p:cNvSpPr>
-            <a:spLocks noGrp="1"/>
-          </p:cNvSpPr>
-          <p:nvPr>
-            <p:ph type="body"/>
-          </p:nvPr>
-        </p:nvSpPr>
-        <p:spPr>
-          <a:xfrm>
-            <a:off x="777240" y="4777560"/>
-            <a:ext cx="6217560" cy="4525920"/>
-          </a:xfrm>
-          <a:prstGeom prst="rect">
-            <a:avLst/>
-          </a:prstGeom>
-        </p:spPr>
-        <p:txBody>
-          <a:bodyPr lIns="0" rIns="0" tIns="0" bIns="0"/>
-          <a:p>
-            <a:r>
-              <a:rPr lang="en-US" sz="2000">
-                <a:latin typeface="Arial"/>
-              </a:rPr>
-              <a:t>Click to edit the notes format</a:t>
-            </a:r>
-            <a:endParaRPr/>
-          </a:p>
-        </p:txBody>
-      </p:sp>
-      <p:sp>
-        <p:nvSpPr>
-          <p:cNvPr id="47" name="PlaceHolder 2"/>
-          <p:cNvSpPr>
-            <a:spLocks noGrp="1"/>
-          </p:cNvSpPr>
-          <p:nvPr>
-            <p:ph type="hdr"/>
-          </p:nvPr>
-        </p:nvSpPr>
-        <p:spPr>
-          <a:xfrm>
-            <a:off x="0" y="0"/>
-            <a:ext cx="3372840" cy="502560"/>
-          </a:xfrm>
-          <a:prstGeom prst="rect">
-            <a:avLst/>
-          </a:prstGeom>
-        </p:spPr>
-        <p:txBody>
-          <a:bodyPr lIns="0" rIns="0" tIns="0" bIns="0"/>
-          <a:p>
-            <a:r>
-              <a:rPr lang="en-US" sz="1400">
-                <a:latin typeface="Times New Roman"/>
-              </a:rPr>
-              <a:t>&lt;header&gt;</a:t>
-            </a:r>
-            <a:endParaRPr/>
-          </a:p>
-        </p:txBody>
-      </p:sp>
-      <p:sp>
-        <p:nvSpPr>
-          <p:cNvPr id="48" name="PlaceHolder 3"/>
-          <p:cNvSpPr>
-            <a:spLocks noGrp="1"/>
-          </p:cNvSpPr>
-          <p:nvPr>
-            <p:ph type="dt"/>
-          </p:nvPr>
-        </p:nvSpPr>
-        <p:spPr>
-          <a:xfrm>
-            <a:off x="4399200" y="0"/>
-            <a:ext cx="3372840" cy="502560"/>
-          </a:xfrm>
-          <a:prstGeom prst="rect">
-            <a:avLst/>
-          </a:prstGeom>
-        </p:spPr>
-        <p:txBody>
-          <a:bodyPr lIns="0" rIns="0" tIns="0" bIns="0"/>
-          <a:p>
-            <a:pPr algn="r"/>
-            <a:r>
-              <a:rPr lang="en-US" sz="1400">
-                <a:latin typeface="Times New Roman"/>
-              </a:rPr>
-              <a:t>&lt;date/time&gt;</a:t>
-            </a:r>
-            <a:endParaRPr/>
-          </a:p>
-        </p:txBody>
-      </p:sp>
-      <p:sp>
-        <p:nvSpPr>
-          <p:cNvPr id="49" name="PlaceHolder 4"/>
-          <p:cNvSpPr>
-            <a:spLocks noGrp="1"/>
-          </p:cNvSpPr>
-          <p:nvPr>
-            <p:ph type="ftr"/>
-          </p:nvPr>
-        </p:nvSpPr>
-        <p:spPr>
-          <a:xfrm>
-            <a:off x="0" y="9555480"/>
-            <a:ext cx="3372840" cy="502560"/>
-          </a:xfrm>
-          <a:prstGeom prst="rect">
-            <a:avLst/>
-          </a:prstGeom>
-        </p:spPr>
-        <p:txBody>
-          <a:bodyPr lIns="0" rIns="0" tIns="0" bIns="0" anchor="b"/>
-          <a:p>
-            <a:r>
-              <a:rPr lang="en-US" sz="1400">
-                <a:latin typeface="Times New Roman"/>
-              </a:rPr>
-              <a:t>&lt;footer&gt;</a:t>
-            </a:r>
-            <a:endParaRPr/>
-          </a:p>
-        </p:txBody>
-      </p:sp>
-      <p:sp>
-        <p:nvSpPr>
-          <p:cNvPr id="50" name="PlaceHolder 5"/>
-          <p:cNvSpPr>
-            <a:spLocks noGrp="1"/>
-          </p:cNvSpPr>
-          <p:nvPr>
-            <p:ph type="sldNum"/>
-          </p:nvPr>
-        </p:nvSpPr>
-        <p:spPr>
-          <a:xfrm>
-            <a:off x="4399200" y="9555480"/>
-            <a:ext cx="3372840" cy="502560"/>
-          </a:xfrm>
-          <a:prstGeom prst="rect">
-            <a:avLst/>
-          </a:prstGeom>
-        </p:spPr>
-        <p:txBody>
-          <a:bodyPr lIns="0" rIns="0" tIns="0" bIns="0" anchor="b"/>
-          <a:p>
-            <a:pPr algn="r"/>
-            <a:fld id="{AEEC5A99-F4DE-4440-8F7F-7156E8958592}" type="slidenum">
-              <a:rPr lang="en-US" sz="1400">
-                <a:latin typeface="Times New Roman"/>
-              </a:rPr>
-              <a:t>&lt;number&gt;</a:t>
-            </a:fld>
-            <a:endParaRPr/>
-          </a:p>
-        </p:txBody>
-      </p:sp>
-    </p:spTree>
-  </p:cSld>
-  <p:clrMap bg1="lt1" bg2="lt2" tx1="dk1" tx2="dk2" accent1="accent1" accent2="accent2" accent3="accent3" accent4="accent4" accent5="accent5" accent6="accent6" hlink="hlink" folHlink="folHlink"/>
-</p:notesMaster>
-</file>
-
-<file path=ppt/notesSlides/notesSlide1.xml><?xml version="1.0" encoding="utf-8"?>
-<p:notes xmlns:a="http://schemas.openxmlformats.org/drawingml/2006/main" xmlns:p="http://schemas.openxmlformats.org/presentationml/2006/main" xmlns:r="http://schemas.openxmlformats.org/officeDocument/2006/relationships">
-  <p:cSld>
-    <p:spTree>
-      <p:nvGrpSpPr>
-        <p:cNvPr id="1" name=""/>
-        <p:cNvGrpSpPr/>
-        <p:nvPr/>
-      </p:nvGrpSpPr>
-      <p:grpSpPr>
-        <a:xfrm>
-          <a:off x="0" y="0"/>
-          <a:ext cx="0" cy="0"/>
-          <a:chOff x="0" y="0"/>
-          <a:chExt cx="0" cy="0"/>
-        </a:xfrm>
-      </p:grpSpPr>
-      <p:sp>
-        <p:nvSpPr>
           <p:cNvPr id="79" name="CustomShape 1"/>
           <p:cNvSpPr/>
           <p:nvPr/>
@@ -237,13 +439,20 @@
           </a:ln>
         </p:spPr>
         <p:style>
-          <a:lnRef idx="0"/>
-          <a:fillRef idx="0"/>
-          <a:effectRef idx="0"/>
+          <a:lnRef idx="0">
+            <a:scrgbClr r="0" g="0" b="0"/>
+          </a:lnRef>
+          <a:fillRef idx="0">
+            <a:scrgbClr r="0" g="0" b="0"/>
+          </a:fillRef>
+          <a:effectRef idx="0">
+            <a:scrgbClr r="0" g="0" b="0"/>
+          </a:effectRef>
           <a:fontRef idx="minor"/>
         </p:style>
         <p:txBody>
-          <a:bodyPr lIns="90000" rIns="90000" tIns="45000" bIns="45000" anchor="b"/>
+          <a:bodyPr lIns="90000" tIns="45000" rIns="90000" bIns="45000" anchor="b"/>
+          <a:lstStyle/>
           <a:p>
             <a:pPr algn="r">
               <a:lnSpc>
@@ -257,7 +466,7 @@
                 </a:solidFill>
                 <a:latin typeface="Arial"/>
               </a:rPr>
-              <a:t>&lt;number&gt;</a:t>
+              <a:t>1</a:t>
             </a:fld>
             <a:endParaRPr/>
           </a:p>
@@ -283,19 +492,28 @@
           </a:prstGeom>
         </p:spPr>
         <p:txBody>
-          <a:bodyPr lIns="0" rIns="0" tIns="0" bIns="0"/>
-          <a:p>
-            <a:endParaRPr/>
+          <a:bodyPr lIns="0" tIns="0" rIns="0" bIns="0"/>
+          <a:lstStyle/>
+          <a:p>
+            <a:endParaRPr dirty="0"/>
           </a:p>
         </p:txBody>
       </p:sp>
     </p:spTree>
+    <p:extLst>
+      <p:ext uri="{BB962C8B-B14F-4D97-AF65-F5344CB8AC3E}">
+        <p14:creationId xmlns:p14="http://schemas.microsoft.com/office/powerpoint/2010/main" val="2279249999"/>
+      </p:ext>
+    </p:extLst>
   </p:cSld>
+  <p:clrMapOvr>
+    <a:masterClrMapping/>
+  </p:clrMapOvr>
 </p:notes>
 </file>
 
 <file path=ppt/slideLayouts/slideLayout1.xml><?xml version="1.0" encoding="utf-8"?>
-<p:sldLayout xmlns:a="http://schemas.openxmlformats.org/drawingml/2006/main" xmlns:p="http://schemas.openxmlformats.org/presentationml/2006/main" xmlns:r="http://schemas.openxmlformats.org/officeDocument/2006/relationships" type="blank" preserve="1">
+<p:sldLayout xmlns:a="http://schemas.openxmlformats.org/drawingml/2006/main" xmlns:r="http://schemas.openxmlformats.org/officeDocument/2006/relationships" xmlns:p="http://schemas.openxmlformats.org/presentationml/2006/main" type="blank" preserve="1">
   <p:cSld name="Blank Slide">
     <p:spTree>
       <p:nvGrpSpPr>
@@ -313,11 +531,14 @@
       </p:grpSpPr>
     </p:spTree>
   </p:cSld>
+  <p:clrMapOvr>
+    <a:masterClrMapping/>
+  </p:clrMapOvr>
 </p:sldLayout>
 </file>
 
 <file path=ppt/slideLayouts/slideLayout10.xml><?xml version="1.0" encoding="utf-8"?>
-<p:sldLayout xmlns:a="http://schemas.openxmlformats.org/drawingml/2006/main" xmlns:p="http://schemas.openxmlformats.org/presentationml/2006/main" xmlns:r="http://schemas.openxmlformats.org/officeDocument/2006/relationships" type="objOverTx" preserve="1">
+<p:sldLayout xmlns:a="http://schemas.openxmlformats.org/drawingml/2006/main" xmlns:r="http://schemas.openxmlformats.org/officeDocument/2006/relationships" xmlns:p="http://schemas.openxmlformats.org/presentationml/2006/main" type="objOverTx" preserve="1">
   <p:cSld name="Title, Content over Content">
     <p:spTree>
       <p:nvGrpSpPr>
@@ -353,7 +574,8 @@
           </a:prstGeom>
         </p:spPr>
         <p:txBody>
-          <a:bodyPr lIns="0" rIns="0" tIns="0" bIns="0" anchor="ctr"/>
+          <a:bodyPr lIns="0" tIns="0" rIns="0" bIns="0" anchor="ctr"/>
+          <a:lstStyle/>
           <a:p>
             <a:pPr algn="ctr"/>
             <a:endParaRPr/>
@@ -380,7 +602,8 @@
           </a:prstGeom>
         </p:spPr>
         <p:txBody>
-          <a:bodyPr lIns="0" rIns="0" tIns="0" bIns="0"/>
+          <a:bodyPr lIns="0" tIns="0" rIns="0" bIns="0"/>
+          <a:lstStyle/>
           <a:p>
             <a:endParaRPr/>
           </a:p>
@@ -406,7 +629,8 @@
           </a:prstGeom>
         </p:spPr>
         <p:txBody>
-          <a:bodyPr lIns="0" rIns="0" tIns="0" bIns="0"/>
+          <a:bodyPr lIns="0" tIns="0" rIns="0" bIns="0"/>
+          <a:lstStyle/>
           <a:p>
             <a:endParaRPr/>
           </a:p>
@@ -414,11 +638,14 @@
       </p:sp>
     </p:spTree>
   </p:cSld>
+  <p:clrMapOvr>
+    <a:masterClrMapping/>
+  </p:clrMapOvr>
 </p:sldLayout>
 </file>
 
 <file path=ppt/slideLayouts/slideLayout11.xml><?xml version="1.0" encoding="utf-8"?>
-<p:sldLayout xmlns:a="http://schemas.openxmlformats.org/drawingml/2006/main" xmlns:p="http://schemas.openxmlformats.org/presentationml/2006/main" xmlns:r="http://schemas.openxmlformats.org/officeDocument/2006/relationships" type="fourObj" preserve="1">
+<p:sldLayout xmlns:a="http://schemas.openxmlformats.org/drawingml/2006/main" xmlns:r="http://schemas.openxmlformats.org/officeDocument/2006/relationships" xmlns:p="http://schemas.openxmlformats.org/presentationml/2006/main" type="fourObj" preserve="1">
   <p:cSld name="Title, 4 Content">
     <p:spTree>
       <p:nvGrpSpPr>
@@ -454,7 +681,8 @@
           </a:prstGeom>
         </p:spPr>
         <p:txBody>
-          <a:bodyPr lIns="0" rIns="0" tIns="0" bIns="0" anchor="ctr"/>
+          <a:bodyPr lIns="0" tIns="0" rIns="0" bIns="0" anchor="ctr"/>
+          <a:lstStyle/>
           <a:p>
             <a:pPr algn="ctr"/>
             <a:endParaRPr/>
@@ -481,7 +709,8 @@
           </a:prstGeom>
         </p:spPr>
         <p:txBody>
-          <a:bodyPr lIns="0" rIns="0" tIns="0" bIns="0"/>
+          <a:bodyPr lIns="0" tIns="0" rIns="0" bIns="0"/>
+          <a:lstStyle/>
           <a:p>
             <a:endParaRPr/>
           </a:p>
@@ -507,7 +736,8 @@
           </a:prstGeom>
         </p:spPr>
         <p:txBody>
-          <a:bodyPr lIns="0" rIns="0" tIns="0" bIns="0"/>
+          <a:bodyPr lIns="0" tIns="0" rIns="0" bIns="0"/>
+          <a:lstStyle/>
           <a:p>
             <a:endParaRPr/>
           </a:p>
@@ -533,7 +763,8 @@
           </a:prstGeom>
         </p:spPr>
         <p:txBody>
-          <a:bodyPr lIns="0" rIns="0" tIns="0" bIns="0"/>
+          <a:bodyPr lIns="0" tIns="0" rIns="0" bIns="0"/>
+          <a:lstStyle/>
           <a:p>
             <a:endParaRPr/>
           </a:p>
@@ -559,7 +790,8 @@
           </a:prstGeom>
         </p:spPr>
         <p:txBody>
-          <a:bodyPr lIns="0" rIns="0" tIns="0" bIns="0"/>
+          <a:bodyPr lIns="0" tIns="0" rIns="0" bIns="0"/>
+          <a:lstStyle/>
           <a:p>
             <a:endParaRPr/>
           </a:p>
@@ -567,11 +799,14 @@
       </p:sp>
     </p:spTree>
   </p:cSld>
+  <p:clrMapOvr>
+    <a:masterClrMapping/>
+  </p:clrMapOvr>
 </p:sldLayout>
 </file>
 
 <file path=ppt/slideLayouts/slideLayout12.xml><?xml version="1.0" encoding="utf-8"?>
-<p:sldLayout xmlns:a="http://schemas.openxmlformats.org/drawingml/2006/main" xmlns:p="http://schemas.openxmlformats.org/presentationml/2006/main" xmlns:r="http://schemas.openxmlformats.org/officeDocument/2006/relationships" type="blank" preserve="1">
+<p:sldLayout xmlns:a="http://schemas.openxmlformats.org/drawingml/2006/main" xmlns:r="http://schemas.openxmlformats.org/officeDocument/2006/relationships" xmlns:p="http://schemas.openxmlformats.org/presentationml/2006/main" type="blank" preserve="1">
   <p:cSld name="Title, 6 Content">
     <p:spTree>
       <p:nvGrpSpPr>
@@ -607,7 +842,8 @@
           </a:prstGeom>
         </p:spPr>
         <p:txBody>
-          <a:bodyPr lIns="0" rIns="0" tIns="0" bIns="0" anchor="ctr"/>
+          <a:bodyPr lIns="0" tIns="0" rIns="0" bIns="0" anchor="ctr"/>
+          <a:lstStyle/>
           <a:p>
             <a:pPr algn="ctr"/>
             <a:endParaRPr/>
@@ -634,7 +870,8 @@
           </a:prstGeom>
         </p:spPr>
         <p:txBody>
-          <a:bodyPr lIns="0" rIns="0" tIns="0" bIns="0"/>
+          <a:bodyPr lIns="0" tIns="0" rIns="0" bIns="0"/>
+          <a:lstStyle/>
           <a:p>
             <a:endParaRPr/>
           </a:p>
@@ -660,7 +897,8 @@
           </a:prstGeom>
         </p:spPr>
         <p:txBody>
-          <a:bodyPr lIns="0" rIns="0" tIns="0" bIns="0"/>
+          <a:bodyPr lIns="0" tIns="0" rIns="0" bIns="0"/>
+          <a:lstStyle/>
           <a:p>
             <a:endParaRPr/>
           </a:p>
@@ -668,7 +906,7 @@
       </p:sp>
       <p:pic>
         <p:nvPicPr>
-          <p:cNvPr id="44" name="" descr=""/>
+          <p:cNvPr id="44" name="Picture 43"/>
           <p:cNvPicPr/>
           <p:nvPr/>
         </p:nvPicPr>
@@ -691,12 +929,12 @@
       </p:pic>
       <p:pic>
         <p:nvPicPr>
-          <p:cNvPr id="45" name="" descr=""/>
+          <p:cNvPr id="45" name="Picture 44"/>
           <p:cNvPicPr/>
           <p:nvPr/>
         </p:nvPicPr>
         <p:blipFill>
-          <a:blip r:embed="rId3"/>
+          <a:blip r:embed="rId2"/>
           <a:stretch/>
         </p:blipFill>
         <p:spPr>
@@ -714,11 +952,14 @@
       </p:pic>
     </p:spTree>
   </p:cSld>
+  <p:clrMapOvr>
+    <a:masterClrMapping/>
+  </p:clrMapOvr>
 </p:sldLayout>
 </file>
 
 <file path=ppt/slideLayouts/slideLayout2.xml><?xml version="1.0" encoding="utf-8"?>
-<p:sldLayout xmlns:a="http://schemas.openxmlformats.org/drawingml/2006/main" xmlns:p="http://schemas.openxmlformats.org/presentationml/2006/main" xmlns:r="http://schemas.openxmlformats.org/officeDocument/2006/relationships" type="tx" preserve="1">
+<p:sldLayout xmlns:a="http://schemas.openxmlformats.org/drawingml/2006/main" xmlns:r="http://schemas.openxmlformats.org/officeDocument/2006/relationships" xmlns:p="http://schemas.openxmlformats.org/presentationml/2006/main" type="tx" preserve="1">
   <p:cSld name="Title Slide">
     <p:spTree>
       <p:nvGrpSpPr>
@@ -754,7 +995,8 @@
           </a:prstGeom>
         </p:spPr>
         <p:txBody>
-          <a:bodyPr lIns="0" rIns="0" tIns="0" bIns="0" anchor="ctr"/>
+          <a:bodyPr lIns="0" tIns="0" rIns="0" bIns="0" anchor="ctr"/>
+          <a:lstStyle/>
           <a:p>
             <a:pPr algn="ctr"/>
             <a:endParaRPr/>
@@ -781,7 +1023,8 @@
           </a:prstGeom>
         </p:spPr>
         <p:txBody>
-          <a:bodyPr lIns="0" rIns="0" tIns="0" bIns="0" anchor="ctr"/>
+          <a:bodyPr lIns="0" tIns="0" rIns="0" bIns="0" anchor="ctr"/>
+          <a:lstStyle/>
           <a:p>
             <a:pPr algn="ctr"/>
             <a:endParaRPr/>
@@ -790,11 +1033,14 @@
       </p:sp>
     </p:spTree>
   </p:cSld>
+  <p:clrMapOvr>
+    <a:masterClrMapping/>
+  </p:clrMapOvr>
 </p:sldLayout>
 </file>
 
 <file path=ppt/slideLayouts/slideLayout3.xml><?xml version="1.0" encoding="utf-8"?>
-<p:sldLayout xmlns:a="http://schemas.openxmlformats.org/drawingml/2006/main" xmlns:p="http://schemas.openxmlformats.org/presentationml/2006/main" xmlns:r="http://schemas.openxmlformats.org/officeDocument/2006/relationships" type="obj" preserve="1">
+<p:sldLayout xmlns:a="http://schemas.openxmlformats.org/drawingml/2006/main" xmlns:r="http://schemas.openxmlformats.org/officeDocument/2006/relationships" xmlns:p="http://schemas.openxmlformats.org/presentationml/2006/main" type="obj" preserve="1">
   <p:cSld name="Title, Content">
     <p:spTree>
       <p:nvGrpSpPr>
@@ -830,7 +1076,8 @@
           </a:prstGeom>
         </p:spPr>
         <p:txBody>
-          <a:bodyPr lIns="0" rIns="0" tIns="0" bIns="0" anchor="ctr"/>
+          <a:bodyPr lIns="0" tIns="0" rIns="0" bIns="0" anchor="ctr"/>
+          <a:lstStyle/>
           <a:p>
             <a:pPr algn="ctr"/>
             <a:endParaRPr/>
@@ -857,7 +1104,8 @@
           </a:prstGeom>
         </p:spPr>
         <p:txBody>
-          <a:bodyPr lIns="0" rIns="0" tIns="0" bIns="0"/>
+          <a:bodyPr lIns="0" tIns="0" rIns="0" bIns="0"/>
+          <a:lstStyle/>
           <a:p>
             <a:endParaRPr/>
           </a:p>
@@ -865,11 +1113,14 @@
       </p:sp>
     </p:spTree>
   </p:cSld>
+  <p:clrMapOvr>
+    <a:masterClrMapping/>
+  </p:clrMapOvr>
 </p:sldLayout>
 </file>
 
 <file path=ppt/slideLayouts/slideLayout4.xml><?xml version="1.0" encoding="utf-8"?>
-<p:sldLayout xmlns:a="http://schemas.openxmlformats.org/drawingml/2006/main" xmlns:p="http://schemas.openxmlformats.org/presentationml/2006/main" xmlns:r="http://schemas.openxmlformats.org/officeDocument/2006/relationships" type="twoObj" preserve="1">
+<p:sldLayout xmlns:a="http://schemas.openxmlformats.org/drawingml/2006/main" xmlns:r="http://schemas.openxmlformats.org/officeDocument/2006/relationships" xmlns:p="http://schemas.openxmlformats.org/presentationml/2006/main" type="twoObj" preserve="1">
   <p:cSld name="Title, 2 Content">
     <p:spTree>
       <p:nvGrpSpPr>
@@ -905,7 +1156,8 @@
           </a:prstGeom>
         </p:spPr>
         <p:txBody>
-          <a:bodyPr lIns="0" rIns="0" tIns="0" bIns="0" anchor="ctr"/>
+          <a:bodyPr lIns="0" tIns="0" rIns="0" bIns="0" anchor="ctr"/>
+          <a:lstStyle/>
           <a:p>
             <a:pPr algn="ctr"/>
             <a:endParaRPr/>
@@ -932,7 +1184,8 @@
           </a:prstGeom>
         </p:spPr>
         <p:txBody>
-          <a:bodyPr lIns="0" rIns="0" tIns="0" bIns="0"/>
+          <a:bodyPr lIns="0" tIns="0" rIns="0" bIns="0"/>
+          <a:lstStyle/>
           <a:p>
             <a:endParaRPr/>
           </a:p>
@@ -958,7 +1211,8 @@
           </a:prstGeom>
         </p:spPr>
         <p:txBody>
-          <a:bodyPr lIns="0" rIns="0" tIns="0" bIns="0"/>
+          <a:bodyPr lIns="0" tIns="0" rIns="0" bIns="0"/>
+          <a:lstStyle/>
           <a:p>
             <a:endParaRPr/>
           </a:p>
@@ -966,11 +1220,14 @@
       </p:sp>
     </p:spTree>
   </p:cSld>
+  <p:clrMapOvr>
+    <a:masterClrMapping/>
+  </p:clrMapOvr>
 </p:sldLayout>
 </file>
 
 <file path=ppt/slideLayouts/slideLayout5.xml><?xml version="1.0" encoding="utf-8"?>
-<p:sldLayout xmlns:a="http://schemas.openxmlformats.org/drawingml/2006/main" xmlns:p="http://schemas.openxmlformats.org/presentationml/2006/main" xmlns:r="http://schemas.openxmlformats.org/officeDocument/2006/relationships" type="titleOnly" preserve="1">
+<p:sldLayout xmlns:a="http://schemas.openxmlformats.org/drawingml/2006/main" xmlns:r="http://schemas.openxmlformats.org/officeDocument/2006/relationships" xmlns:p="http://schemas.openxmlformats.org/presentationml/2006/main" type="titleOnly" preserve="1">
   <p:cSld name="Title Only">
     <p:spTree>
       <p:nvGrpSpPr>
@@ -1006,7 +1263,8 @@
           </a:prstGeom>
         </p:spPr>
         <p:txBody>
-          <a:bodyPr lIns="0" rIns="0" tIns="0" bIns="0" anchor="ctr"/>
+          <a:bodyPr lIns="0" tIns="0" rIns="0" bIns="0" anchor="ctr"/>
+          <a:lstStyle/>
           <a:p>
             <a:pPr algn="ctr"/>
             <a:endParaRPr/>
@@ -1015,11 +1273,14 @@
       </p:sp>
     </p:spTree>
   </p:cSld>
+  <p:clrMapOvr>
+    <a:masterClrMapping/>
+  </p:clrMapOvr>
 </p:sldLayout>
 </file>
 
 <file path=ppt/slideLayouts/slideLayout6.xml><?xml version="1.0" encoding="utf-8"?>
-<p:sldLayout xmlns:a="http://schemas.openxmlformats.org/drawingml/2006/main" xmlns:p="http://schemas.openxmlformats.org/presentationml/2006/main" xmlns:r="http://schemas.openxmlformats.org/officeDocument/2006/relationships" type="objOnly" preserve="1">
+<p:sldLayout xmlns:a="http://schemas.openxmlformats.org/drawingml/2006/main" xmlns:r="http://schemas.openxmlformats.org/officeDocument/2006/relationships" xmlns:p="http://schemas.openxmlformats.org/presentationml/2006/main" type="objOnly" preserve="1">
   <p:cSld name="Centered Text">
     <p:spTree>
       <p:nvGrpSpPr>
@@ -1055,7 +1316,8 @@
           </a:prstGeom>
         </p:spPr>
         <p:txBody>
-          <a:bodyPr lIns="0" rIns="0" tIns="0" bIns="0" anchor="ctr"/>
+          <a:bodyPr lIns="0" tIns="0" rIns="0" bIns="0" anchor="ctr"/>
+          <a:lstStyle/>
           <a:p>
             <a:pPr algn="ctr"/>
             <a:endParaRPr/>
@@ -1064,11 +1326,14 @@
       </p:sp>
     </p:spTree>
   </p:cSld>
+  <p:clrMapOvr>
+    <a:masterClrMapping/>
+  </p:clrMapOvr>
 </p:sldLayout>
 </file>
 
 <file path=ppt/slideLayouts/slideLayout7.xml><?xml version="1.0" encoding="utf-8"?>
-<p:sldLayout xmlns:a="http://schemas.openxmlformats.org/drawingml/2006/main" xmlns:p="http://schemas.openxmlformats.org/presentationml/2006/main" xmlns:r="http://schemas.openxmlformats.org/officeDocument/2006/relationships" type="twoObjAndObj" preserve="1">
+<p:sldLayout xmlns:a="http://schemas.openxmlformats.org/drawingml/2006/main" xmlns:r="http://schemas.openxmlformats.org/officeDocument/2006/relationships" xmlns:p="http://schemas.openxmlformats.org/presentationml/2006/main" type="twoObjAndObj" preserve="1">
   <p:cSld name="Title, 2 Content and Content">
     <p:spTree>
       <p:nvGrpSpPr>
@@ -1104,7 +1369,8 @@
           </a:prstGeom>
         </p:spPr>
         <p:txBody>
-          <a:bodyPr lIns="0" rIns="0" tIns="0" bIns="0" anchor="ctr"/>
+          <a:bodyPr lIns="0" tIns="0" rIns="0" bIns="0" anchor="ctr"/>
+          <a:lstStyle/>
           <a:p>
             <a:pPr algn="ctr"/>
             <a:endParaRPr/>
@@ -1131,7 +1397,8 @@
           </a:prstGeom>
         </p:spPr>
         <p:txBody>
-          <a:bodyPr lIns="0" rIns="0" tIns="0" bIns="0"/>
+          <a:bodyPr lIns="0" tIns="0" rIns="0" bIns="0"/>
+          <a:lstStyle/>
           <a:p>
             <a:endParaRPr/>
           </a:p>
@@ -1157,7 +1424,8 @@
           </a:prstGeom>
         </p:spPr>
         <p:txBody>
-          <a:bodyPr lIns="0" rIns="0" tIns="0" bIns="0"/>
+          <a:bodyPr lIns="0" tIns="0" rIns="0" bIns="0"/>
+          <a:lstStyle/>
           <a:p>
             <a:endParaRPr/>
           </a:p>
@@ -1183,7 +1451,8 @@
           </a:prstGeom>
         </p:spPr>
         <p:txBody>
-          <a:bodyPr lIns="0" rIns="0" tIns="0" bIns="0"/>
+          <a:bodyPr lIns="0" tIns="0" rIns="0" bIns="0"/>
+          <a:lstStyle/>
           <a:p>
             <a:endParaRPr/>
           </a:p>
@@ -1191,11 +1460,14 @@
       </p:sp>
     </p:spTree>
   </p:cSld>
+  <p:clrMapOvr>
+    <a:masterClrMapping/>
+  </p:clrMapOvr>
 </p:sldLayout>
 </file>
 
 <file path=ppt/slideLayouts/slideLayout8.xml><?xml version="1.0" encoding="utf-8"?>
-<p:sldLayout xmlns:a="http://schemas.openxmlformats.org/drawingml/2006/main" xmlns:p="http://schemas.openxmlformats.org/presentationml/2006/main" xmlns:r="http://schemas.openxmlformats.org/officeDocument/2006/relationships" type="objAndTwoObj" preserve="1">
+<p:sldLayout xmlns:a="http://schemas.openxmlformats.org/drawingml/2006/main" xmlns:r="http://schemas.openxmlformats.org/officeDocument/2006/relationships" xmlns:p="http://schemas.openxmlformats.org/presentationml/2006/main" type="objAndTwoObj" preserve="1">
   <p:cSld name="Title Content and 2 Content">
     <p:spTree>
       <p:nvGrpSpPr>
@@ -1231,7 +1503,8 @@
           </a:prstGeom>
         </p:spPr>
         <p:txBody>
-          <a:bodyPr lIns="0" rIns="0" tIns="0" bIns="0" anchor="ctr"/>
+          <a:bodyPr lIns="0" tIns="0" rIns="0" bIns="0" anchor="ctr"/>
+          <a:lstStyle/>
           <a:p>
             <a:pPr algn="ctr"/>
             <a:endParaRPr/>
@@ -1258,7 +1531,8 @@
           </a:prstGeom>
         </p:spPr>
         <p:txBody>
-          <a:bodyPr lIns="0" rIns="0" tIns="0" bIns="0"/>
+          <a:bodyPr lIns="0" tIns="0" rIns="0" bIns="0"/>
+          <a:lstStyle/>
           <a:p>
             <a:endParaRPr/>
           </a:p>
@@ -1284,7 +1558,8 @@
           </a:prstGeom>
         </p:spPr>
         <p:txBody>
-          <a:bodyPr lIns="0" rIns="0" tIns="0" bIns="0"/>
+          <a:bodyPr lIns="0" tIns="0" rIns="0" bIns="0"/>
+          <a:lstStyle/>
           <a:p>
             <a:endParaRPr/>
           </a:p>
@@ -1310,7 +1585,8 @@
           </a:prstGeom>
         </p:spPr>
         <p:txBody>
-          <a:bodyPr lIns="0" rIns="0" tIns="0" bIns="0"/>
+          <a:bodyPr lIns="0" tIns="0" rIns="0" bIns="0"/>
+          <a:lstStyle/>
           <a:p>
             <a:endParaRPr/>
           </a:p>
@@ -1318,11 +1594,14 @@
       </p:sp>
     </p:spTree>
   </p:cSld>
+  <p:clrMapOvr>
+    <a:masterClrMapping/>
+  </p:clrMapOvr>
 </p:sldLayout>
 </file>
 
 <file path=ppt/slideLayouts/slideLayout9.xml><?xml version="1.0" encoding="utf-8"?>
-<p:sldLayout xmlns:a="http://schemas.openxmlformats.org/drawingml/2006/main" xmlns:p="http://schemas.openxmlformats.org/presentationml/2006/main" xmlns:r="http://schemas.openxmlformats.org/officeDocument/2006/relationships" type="twoObjOverTx" preserve="1">
+<p:sldLayout xmlns:a="http://schemas.openxmlformats.org/drawingml/2006/main" xmlns:r="http://schemas.openxmlformats.org/officeDocument/2006/relationships" xmlns:p="http://schemas.openxmlformats.org/presentationml/2006/main" type="twoObjOverTx" preserve="1">
   <p:cSld name="Title, 2 Content over Content">
     <p:spTree>
       <p:nvGrpSpPr>
@@ -1358,7 +1637,8 @@
           </a:prstGeom>
         </p:spPr>
         <p:txBody>
-          <a:bodyPr lIns="0" rIns="0" tIns="0" bIns="0" anchor="ctr"/>
+          <a:bodyPr lIns="0" tIns="0" rIns="0" bIns="0" anchor="ctr"/>
+          <a:lstStyle/>
           <a:p>
             <a:pPr algn="ctr"/>
             <a:endParaRPr/>
@@ -1385,7 +1665,8 @@
           </a:prstGeom>
         </p:spPr>
         <p:txBody>
-          <a:bodyPr lIns="0" rIns="0" tIns="0" bIns="0"/>
+          <a:bodyPr lIns="0" tIns="0" rIns="0" bIns="0"/>
+          <a:lstStyle/>
           <a:p>
             <a:endParaRPr/>
           </a:p>
@@ -1411,7 +1692,8 @@
           </a:prstGeom>
         </p:spPr>
         <p:txBody>
-          <a:bodyPr lIns="0" rIns="0" tIns="0" bIns="0"/>
+          <a:bodyPr lIns="0" tIns="0" rIns="0" bIns="0"/>
+          <a:lstStyle/>
           <a:p>
             <a:endParaRPr/>
           </a:p>
@@ -1437,7 +1719,8 @@
           </a:prstGeom>
         </p:spPr>
         <p:txBody>
-          <a:bodyPr lIns="0" rIns="0" tIns="0" bIns="0"/>
+          <a:bodyPr lIns="0" tIns="0" rIns="0" bIns="0"/>
+          <a:lstStyle/>
           <a:p>
             <a:endParaRPr/>
           </a:p>
@@ -1445,17 +1728,21 @@
       </p:sp>
     </p:spTree>
   </p:cSld>
+  <p:clrMapOvr>
+    <a:masterClrMapping/>
+  </p:clrMapOvr>
 </p:sldLayout>
 </file>
 
 <file path=ppt/slideMasters/slideMaster1.xml><?xml version="1.0" encoding="utf-8"?>
-<p:sldMaster xmlns:a="http://schemas.openxmlformats.org/drawingml/2006/main" xmlns:p="http://schemas.openxmlformats.org/presentationml/2006/main" xmlns:r="http://schemas.openxmlformats.org/officeDocument/2006/relationships">
+<p:sldMaster xmlns:a="http://schemas.openxmlformats.org/drawingml/2006/main" xmlns:r="http://schemas.openxmlformats.org/officeDocument/2006/relationships" xmlns:p="http://schemas.openxmlformats.org/presentationml/2006/main">
   <p:cSld>
     <p:bg>
       <p:bgPr>
         <a:solidFill>
-          <a:srgbClr val="63729d"/>
+          <a:srgbClr val="63729D"/>
         </a:solidFill>
+        <a:effectLst/>
       </p:bgPr>
     </p:bg>
     <p:spTree>
@@ -1474,7 +1761,7 @@
       </p:grpSpPr>
       <p:sp>
         <p:nvSpPr>
-          <p:cNvPr id="0" name="CustomShape 1"/>
+          <p:cNvPr id="12" name="CustomShape 1"/>
           <p:cNvSpPr/>
           <p:nvPr/>
         </p:nvSpPr>
@@ -1487,7 +1774,7 @@
             <a:avLst/>
           </a:prstGeom>
           <a:solidFill>
-            <a:srgbClr val="000d26"/>
+            <a:srgbClr val="000D26"/>
           </a:solidFill>
           <a:ln w="9360">
             <a:solidFill>
@@ -1497,15 +1784,21 @@
           </a:ln>
         </p:spPr>
         <p:style>
-          <a:lnRef idx="0"/>
-          <a:fillRef idx="0"/>
-          <a:effectRef idx="0"/>
+          <a:lnRef idx="0">
+            <a:scrgbClr r="0" g="0" b="0"/>
+          </a:lnRef>
+          <a:fillRef idx="0">
+            <a:scrgbClr r="0" g="0" b="0"/>
+          </a:fillRef>
+          <a:effectRef idx="0">
+            <a:scrgbClr r="0" g="0" b="0"/>
+          </a:effectRef>
           <a:fontRef idx="minor"/>
         </p:style>
       </p:sp>
       <p:sp>
         <p:nvSpPr>
-          <p:cNvPr id="1" name="CustomShape 2"/>
+          <p:cNvPr id="13" name="CustomShape 2"/>
           <p:cNvSpPr/>
           <p:nvPr/>
         </p:nvSpPr>
@@ -1518,7 +1811,7 @@
             <a:avLst/>
           </a:prstGeom>
           <a:solidFill>
-            <a:srgbClr val="e6eaee"/>
+            <a:srgbClr val="E6EAEE"/>
           </a:solidFill>
           <a:ln w="9360">
             <a:solidFill>
@@ -1528,9 +1821,15 @@
           </a:ln>
         </p:spPr>
         <p:style>
-          <a:lnRef idx="0"/>
-          <a:fillRef idx="0"/>
-          <a:effectRef idx="0"/>
+          <a:lnRef idx="0">
+            <a:scrgbClr r="0" g="0" b="0"/>
+          </a:lnRef>
+          <a:fillRef idx="0">
+            <a:scrgbClr r="0" g="0" b="0"/>
+          </a:fillRef>
+          <a:effectRef idx="0">
+            <a:scrgbClr r="0" g="0" b="0"/>
+          </a:effectRef>
           <a:fontRef idx="minor"/>
         </p:style>
       </p:sp>
@@ -1554,13 +1853,20 @@
           </a:ln>
         </p:spPr>
         <p:style>
-          <a:lnRef idx="0"/>
-          <a:fillRef idx="0"/>
-          <a:effectRef idx="0"/>
+          <a:lnRef idx="0">
+            <a:scrgbClr r="0" g="0" b="0"/>
+          </a:lnRef>
+          <a:fillRef idx="0">
+            <a:scrgbClr r="0" g="0" b="0"/>
+          </a:fillRef>
+          <a:effectRef idx="0">
+            <a:scrgbClr r="0" g="0" b="0"/>
+          </a:effectRef>
           <a:fontRef idx="minor"/>
         </p:style>
         <p:txBody>
-          <a:bodyPr wrap="none" lIns="285120" rIns="285120" tIns="285120" bIns="285120"/>
+          <a:bodyPr wrap="none" lIns="285120" tIns="285120" rIns="285120" bIns="285120"/>
+          <a:lstStyle/>
           <a:p>
             <a:pPr>
               <a:lnSpc>
@@ -1568,9 +1874,9 @@
               </a:lnSpc>
             </a:pPr>
             <a:r>
-              <a:rPr b="1" lang="en-US" sz="3500" strike="noStrike">
+              <a:rPr lang="en-US" sz="3500" b="1" strike="noStrike">
                 <a:solidFill>
-                  <a:srgbClr val="f8f8f8"/>
+                  <a:srgbClr val="F8F8F8"/>
                 </a:solidFill>
                 <a:latin typeface="Verdana"/>
                 <a:ea typeface="DejaVu Sans"/>
@@ -1604,9 +1910,15 @@
           </a:ln>
         </p:spPr>
         <p:style>
-          <a:lnRef idx="0"/>
-          <a:fillRef idx="0"/>
-          <a:effectRef idx="0"/>
+          <a:lnRef idx="0">
+            <a:scrgbClr r="0" g="0" b="0"/>
+          </a:lnRef>
+          <a:fillRef idx="0">
+            <a:scrgbClr r="0" g="0" b="0"/>
+          </a:fillRef>
+          <a:effectRef idx="0">
+            <a:scrgbClr r="0" g="0" b="0"/>
+          </a:effectRef>
           <a:fontRef idx="minor"/>
         </p:style>
       </p:sp>
@@ -1625,7 +1937,7 @@
             <a:avLst/>
           </a:prstGeom>
           <a:solidFill>
-            <a:srgbClr val="e6eaee"/>
+            <a:srgbClr val="E6EAEE"/>
           </a:solidFill>
           <a:ln w="9360">
             <a:solidFill>
@@ -1635,9 +1947,15 @@
           </a:ln>
         </p:spPr>
         <p:style>
-          <a:lnRef idx="0"/>
-          <a:fillRef idx="0"/>
-          <a:effectRef idx="0"/>
+          <a:lnRef idx="0">
+            <a:scrgbClr r="0" g="0" b="0"/>
+          </a:lnRef>
+          <a:fillRef idx="0">
+            <a:scrgbClr r="0" g="0" b="0"/>
+          </a:fillRef>
+          <a:effectRef idx="0">
+            <a:scrgbClr r="0" g="0" b="0"/>
+          </a:effectRef>
           <a:fontRef idx="minor"/>
         </p:style>
       </p:sp>
@@ -1656,7 +1974,7 @@
             <a:avLst/>
           </a:prstGeom>
           <a:solidFill>
-            <a:srgbClr val="e6eaee"/>
+            <a:srgbClr val="E6EAEE"/>
           </a:solidFill>
           <a:ln w="9360">
             <a:solidFill>
@@ -1666,9 +1984,15 @@
           </a:ln>
         </p:spPr>
         <p:style>
-          <a:lnRef idx="0"/>
-          <a:fillRef idx="0"/>
-          <a:effectRef idx="0"/>
+          <a:lnRef idx="0">
+            <a:scrgbClr r="0" g="0" b="0"/>
+          </a:lnRef>
+          <a:fillRef idx="0">
+            <a:scrgbClr r="0" g="0" b="0"/>
+          </a:fillRef>
+          <a:effectRef idx="0">
+            <a:scrgbClr r="0" g="0" b="0"/>
+          </a:effectRef>
           <a:fontRef idx="minor"/>
         </p:style>
       </p:sp>
@@ -1692,9 +2016,15 @@
           </a:ln>
         </p:spPr>
         <p:style>
-          <a:lnRef idx="0"/>
-          <a:fillRef idx="0"/>
-          <a:effectRef idx="0"/>
+          <a:lnRef idx="0">
+            <a:scrgbClr r="0" g="0" b="0"/>
+          </a:lnRef>
+          <a:fillRef idx="0">
+            <a:scrgbClr r="0" g="0" b="0"/>
+          </a:fillRef>
+          <a:effectRef idx="0">
+            <a:scrgbClr r="0" g="0" b="0"/>
+          </a:effectRef>
           <a:fontRef idx="minor"/>
         </p:style>
       </p:sp>
@@ -1718,9 +2048,15 @@
           </a:ln>
         </p:spPr>
         <p:style>
-          <a:lnRef idx="0"/>
-          <a:fillRef idx="0"/>
-          <a:effectRef idx="0"/>
+          <a:lnRef idx="0">
+            <a:scrgbClr r="0" g="0" b="0"/>
+          </a:lnRef>
+          <a:fillRef idx="0">
+            <a:scrgbClr r="0" g="0" b="0"/>
+          </a:fillRef>
+          <a:effectRef idx="0">
+            <a:scrgbClr r="0" g="0" b="0"/>
+          </a:effectRef>
           <a:fontRef idx="minor"/>
         </p:style>
       </p:sp>
@@ -1744,20 +2080,26 @@
           </a:ln>
         </p:spPr>
         <p:style>
-          <a:lnRef idx="0"/>
-          <a:fillRef idx="0"/>
-          <a:effectRef idx="0"/>
+          <a:lnRef idx="0">
+            <a:scrgbClr r="0" g="0" b="0"/>
+          </a:lnRef>
+          <a:fillRef idx="0">
+            <a:scrgbClr r="0" g="0" b="0"/>
+          </a:fillRef>
+          <a:effectRef idx="0">
+            <a:scrgbClr r="0" g="0" b="0"/>
+          </a:effectRef>
           <a:fontRef idx="minor"/>
         </p:style>
       </p:sp>
       <p:pic>
         <p:nvPicPr>
-          <p:cNvPr id="9" name="Picture 17" descr=""/>
+          <p:cNvPr id="9" name="Picture 17"/>
           <p:cNvPicPr/>
           <p:nvPr/>
         </p:nvPicPr>
         <p:blipFill>
-          <a:blip r:embed="rId2"/>
+          <a:blip r:embed="rId14"/>
           <a:stretch/>
         </p:blipFill>
         <p:spPr>
@@ -1793,7 +2135,8 @@
           </a:prstGeom>
         </p:spPr>
         <p:txBody>
-          <a:bodyPr lIns="0" rIns="0" tIns="0" bIns="0" anchor="ctr"/>
+          <a:bodyPr lIns="0" tIns="0" rIns="0" bIns="0" anchor="ctr"/>
+          <a:lstStyle/>
           <a:p>
             <a:pPr algn="ctr"/>
             <a:r>
@@ -1826,7 +2169,8 @@
           </a:prstGeom>
         </p:spPr>
         <p:txBody>
-          <a:bodyPr lIns="0" rIns="0" tIns="0" bIns="0"/>
+          <a:bodyPr lIns="0" tIns="0" rIns="0" bIns="0"/>
+          <a:lstStyle/>
           <a:p>
             <a:pPr>
               <a:buSzPct val="45000"/>
@@ -1929,26 +2273,306 @@
       </p:sp>
     </p:spTree>
   </p:cSld>
-  <p:clrMap bg1="lt1" bg2="lt2" tx1="dk1" tx2="dk2" accent1="accent1" accent2="accent2" accent3="accent3" accent4="accent4" accent5="accent5" accent6="accent6" hlink="hlink" folHlink="folHlink"/>
+  <p:clrMap bg1="lt1" tx1="dk1" bg2="lt2" tx2="dk2" accent1="accent1" accent2="accent2" accent3="accent3" accent4="accent4" accent5="accent5" accent6="accent6" hlink="hlink" folHlink="folHlink"/>
   <p:sldLayoutIdLst>
-    <p:sldLayoutId id="2147483649" r:id="rId3"/>
-    <p:sldLayoutId id="2147483650" r:id="rId4"/>
-    <p:sldLayoutId id="2147483651" r:id="rId5"/>
-    <p:sldLayoutId id="2147483652" r:id="rId6"/>
-    <p:sldLayoutId id="2147483653" r:id="rId7"/>
-    <p:sldLayoutId id="2147483654" r:id="rId8"/>
-    <p:sldLayoutId id="2147483655" r:id="rId9"/>
-    <p:sldLayoutId id="2147483656" r:id="rId10"/>
-    <p:sldLayoutId id="2147483657" r:id="rId11"/>
-    <p:sldLayoutId id="2147483658" r:id="rId12"/>
-    <p:sldLayoutId id="2147483659" r:id="rId13"/>
-    <p:sldLayoutId id="2147483660" r:id="rId14"/>
+    <p:sldLayoutId id="2147483649" r:id="rId1"/>
+    <p:sldLayoutId id="2147483650" r:id="rId2"/>
+    <p:sldLayoutId id="2147483651" r:id="rId3"/>
+    <p:sldLayoutId id="2147483652" r:id="rId4"/>
+    <p:sldLayoutId id="2147483653" r:id="rId5"/>
+    <p:sldLayoutId id="2147483654" r:id="rId6"/>
+    <p:sldLayoutId id="2147483655" r:id="rId7"/>
+    <p:sldLayoutId id="2147483656" r:id="rId8"/>
+    <p:sldLayoutId id="2147483657" r:id="rId9"/>
+    <p:sldLayoutId id="2147483658" r:id="rId10"/>
+    <p:sldLayoutId id="2147483659" r:id="rId11"/>
+    <p:sldLayoutId id="2147483660" r:id="rId12"/>
   </p:sldLayoutIdLst>
+  <p:txStyles>
+    <p:titleStyle>
+      <a:lvl1pPr algn="l" defTabSz="914400" rtl="0" eaLnBrk="1" latinLnBrk="0" hangingPunct="1">
+        <a:lnSpc>
+          <a:spcPct val="90000"/>
+        </a:lnSpc>
+        <a:spcBef>
+          <a:spcPct val="0"/>
+        </a:spcBef>
+        <a:buNone/>
+        <a:defRPr sz="4400" kern="1200">
+          <a:solidFill>
+            <a:schemeClr val="tx1"/>
+          </a:solidFill>
+          <a:latin typeface="+mj-lt"/>
+          <a:ea typeface="+mj-ea"/>
+          <a:cs typeface="+mj-cs"/>
+        </a:defRPr>
+      </a:lvl1pPr>
+    </p:titleStyle>
+    <p:bodyStyle>
+      <a:lvl1pPr marL="228600" indent="-228600" algn="l" defTabSz="914400" rtl="0" eaLnBrk="1" latinLnBrk="0" hangingPunct="1">
+        <a:lnSpc>
+          <a:spcPct val="90000"/>
+        </a:lnSpc>
+        <a:spcBef>
+          <a:spcPts val="1000"/>
+        </a:spcBef>
+        <a:buFont typeface="Arial" panose="020B0604020202020204" pitchFamily="34" charset="0"/>
+        <a:buChar char="•"/>
+        <a:defRPr sz="2800" kern="1200">
+          <a:solidFill>
+            <a:schemeClr val="tx1"/>
+          </a:solidFill>
+          <a:latin typeface="+mn-lt"/>
+          <a:ea typeface="+mn-ea"/>
+          <a:cs typeface="+mn-cs"/>
+        </a:defRPr>
+      </a:lvl1pPr>
+      <a:lvl2pPr marL="685800" indent="-228600" algn="l" defTabSz="914400" rtl="0" eaLnBrk="1" latinLnBrk="0" hangingPunct="1">
+        <a:lnSpc>
+          <a:spcPct val="90000"/>
+        </a:lnSpc>
+        <a:spcBef>
+          <a:spcPts val="500"/>
+        </a:spcBef>
+        <a:buFont typeface="Arial" panose="020B0604020202020204" pitchFamily="34" charset="0"/>
+        <a:buChar char="•"/>
+        <a:defRPr sz="2400" kern="1200">
+          <a:solidFill>
+            <a:schemeClr val="tx1"/>
+          </a:solidFill>
+          <a:latin typeface="+mn-lt"/>
+          <a:ea typeface="+mn-ea"/>
+          <a:cs typeface="+mn-cs"/>
+        </a:defRPr>
+      </a:lvl2pPr>
+      <a:lvl3pPr marL="1143000" indent="-228600" algn="l" defTabSz="914400" rtl="0" eaLnBrk="1" latinLnBrk="0" hangingPunct="1">
+        <a:lnSpc>
+          <a:spcPct val="90000"/>
+        </a:lnSpc>
+        <a:spcBef>
+          <a:spcPts val="500"/>
+        </a:spcBef>
+        <a:buFont typeface="Arial" panose="020B0604020202020204" pitchFamily="34" charset="0"/>
+        <a:buChar char="•"/>
+        <a:defRPr sz="2000" kern="1200">
+          <a:solidFill>
+            <a:schemeClr val="tx1"/>
+          </a:solidFill>
+          <a:latin typeface="+mn-lt"/>
+          <a:ea typeface="+mn-ea"/>
+          <a:cs typeface="+mn-cs"/>
+        </a:defRPr>
+      </a:lvl3pPr>
+      <a:lvl4pPr marL="1600200" indent="-228600" algn="l" defTabSz="914400" rtl="0" eaLnBrk="1" latinLnBrk="0" hangingPunct="1">
+        <a:lnSpc>
+          <a:spcPct val="90000"/>
+        </a:lnSpc>
+        <a:spcBef>
+          <a:spcPts val="500"/>
+        </a:spcBef>
+        <a:buFont typeface="Arial" panose="020B0604020202020204" pitchFamily="34" charset="0"/>
+        <a:buChar char="•"/>
+        <a:defRPr sz="1800" kern="1200">
+          <a:solidFill>
+            <a:schemeClr val="tx1"/>
+          </a:solidFill>
+          <a:latin typeface="+mn-lt"/>
+          <a:ea typeface="+mn-ea"/>
+          <a:cs typeface="+mn-cs"/>
+        </a:defRPr>
+      </a:lvl4pPr>
+      <a:lvl5pPr marL="2057400" indent="-228600" algn="l" defTabSz="914400" rtl="0" eaLnBrk="1" latinLnBrk="0" hangingPunct="1">
+        <a:lnSpc>
+          <a:spcPct val="90000"/>
+        </a:lnSpc>
+        <a:spcBef>
+          <a:spcPts val="500"/>
+        </a:spcBef>
+        <a:buFont typeface="Arial" panose="020B0604020202020204" pitchFamily="34" charset="0"/>
+        <a:buChar char="•"/>
+        <a:defRPr sz="1800" kern="1200">
+          <a:solidFill>
+            <a:schemeClr val="tx1"/>
+          </a:solidFill>
+          <a:latin typeface="+mn-lt"/>
+          <a:ea typeface="+mn-ea"/>
+          <a:cs typeface="+mn-cs"/>
+        </a:defRPr>
+      </a:lvl5pPr>
+      <a:lvl6pPr marL="2514600" indent="-228600" algn="l" defTabSz="914400" rtl="0" eaLnBrk="1" latinLnBrk="0" hangingPunct="1">
+        <a:lnSpc>
+          <a:spcPct val="90000"/>
+        </a:lnSpc>
+        <a:spcBef>
+          <a:spcPts val="500"/>
+        </a:spcBef>
+        <a:buFont typeface="Arial" panose="020B0604020202020204" pitchFamily="34" charset="0"/>
+        <a:buChar char="•"/>
+        <a:defRPr sz="1800" kern="1200">
+          <a:solidFill>
+            <a:schemeClr val="tx1"/>
+          </a:solidFill>
+          <a:latin typeface="+mn-lt"/>
+          <a:ea typeface="+mn-ea"/>
+          <a:cs typeface="+mn-cs"/>
+        </a:defRPr>
+      </a:lvl6pPr>
+      <a:lvl7pPr marL="2971800" indent="-228600" algn="l" defTabSz="914400" rtl="0" eaLnBrk="1" latinLnBrk="0" hangingPunct="1">
+        <a:lnSpc>
+          <a:spcPct val="90000"/>
+        </a:lnSpc>
+        <a:spcBef>
+          <a:spcPts val="500"/>
+        </a:spcBef>
+        <a:buFont typeface="Arial" panose="020B0604020202020204" pitchFamily="34" charset="0"/>
+        <a:buChar char="•"/>
+        <a:defRPr sz="1800" kern="1200">
+          <a:solidFill>
+            <a:schemeClr val="tx1"/>
+          </a:solidFill>
+          <a:latin typeface="+mn-lt"/>
+          <a:ea typeface="+mn-ea"/>
+          <a:cs typeface="+mn-cs"/>
+        </a:defRPr>
+      </a:lvl7pPr>
+      <a:lvl8pPr marL="3429000" indent="-228600" algn="l" defTabSz="914400" rtl="0" eaLnBrk="1" latinLnBrk="0" hangingPunct="1">
+        <a:lnSpc>
+          <a:spcPct val="90000"/>
+        </a:lnSpc>
+        <a:spcBef>
+          <a:spcPts val="500"/>
+        </a:spcBef>
+        <a:buFont typeface="Arial" panose="020B0604020202020204" pitchFamily="34" charset="0"/>
+        <a:buChar char="•"/>
+        <a:defRPr sz="1800" kern="1200">
+          <a:solidFill>
+            <a:schemeClr val="tx1"/>
+          </a:solidFill>
+          <a:latin typeface="+mn-lt"/>
+          <a:ea typeface="+mn-ea"/>
+          <a:cs typeface="+mn-cs"/>
+        </a:defRPr>
+      </a:lvl8pPr>
+      <a:lvl9pPr marL="3886200" indent="-228600" algn="l" defTabSz="914400" rtl="0" eaLnBrk="1" latinLnBrk="0" hangingPunct="1">
+        <a:lnSpc>
+          <a:spcPct val="90000"/>
+        </a:lnSpc>
+        <a:spcBef>
+          <a:spcPts val="500"/>
+        </a:spcBef>
+        <a:buFont typeface="Arial" panose="020B0604020202020204" pitchFamily="34" charset="0"/>
+        <a:buChar char="•"/>
+        <a:defRPr sz="1800" kern="1200">
+          <a:solidFill>
+            <a:schemeClr val="tx1"/>
+          </a:solidFill>
+          <a:latin typeface="+mn-lt"/>
+          <a:ea typeface="+mn-ea"/>
+          <a:cs typeface="+mn-cs"/>
+        </a:defRPr>
+      </a:lvl9pPr>
+    </p:bodyStyle>
+    <p:otherStyle>
+      <a:defPPr>
+        <a:defRPr lang="en-US"/>
+      </a:defPPr>
+      <a:lvl1pPr marL="0" algn="l" defTabSz="914400" rtl="0" eaLnBrk="1" latinLnBrk="0" hangingPunct="1">
+        <a:defRPr sz="1800" kern="1200">
+          <a:solidFill>
+            <a:schemeClr val="tx1"/>
+          </a:solidFill>
+          <a:latin typeface="+mn-lt"/>
+          <a:ea typeface="+mn-ea"/>
+          <a:cs typeface="+mn-cs"/>
+        </a:defRPr>
+      </a:lvl1pPr>
+      <a:lvl2pPr marL="457200" algn="l" defTabSz="914400" rtl="0" eaLnBrk="1" latinLnBrk="0" hangingPunct="1">
+        <a:defRPr sz="1800" kern="1200">
+          <a:solidFill>
+            <a:schemeClr val="tx1"/>
+          </a:solidFill>
+          <a:latin typeface="+mn-lt"/>
+          <a:ea typeface="+mn-ea"/>
+          <a:cs typeface="+mn-cs"/>
+        </a:defRPr>
+      </a:lvl2pPr>
+      <a:lvl3pPr marL="914400" algn="l" defTabSz="914400" rtl="0" eaLnBrk="1" latinLnBrk="0" hangingPunct="1">
+        <a:defRPr sz="1800" kern="1200">
+          <a:solidFill>
+            <a:schemeClr val="tx1"/>
+          </a:solidFill>
+          <a:latin typeface="+mn-lt"/>
+          <a:ea typeface="+mn-ea"/>
+          <a:cs typeface="+mn-cs"/>
+        </a:defRPr>
+      </a:lvl3pPr>
+      <a:lvl4pPr marL="1371600" algn="l" defTabSz="914400" rtl="0" eaLnBrk="1" latinLnBrk="0" hangingPunct="1">
+        <a:defRPr sz="1800" kern="1200">
+          <a:solidFill>
+            <a:schemeClr val="tx1"/>
+          </a:solidFill>
+          <a:latin typeface="+mn-lt"/>
+          <a:ea typeface="+mn-ea"/>
+          <a:cs typeface="+mn-cs"/>
+        </a:defRPr>
+      </a:lvl4pPr>
+      <a:lvl5pPr marL="1828800" algn="l" defTabSz="914400" rtl="0" eaLnBrk="1" latinLnBrk="0" hangingPunct="1">
+        <a:defRPr sz="1800" kern="1200">
+          <a:solidFill>
+            <a:schemeClr val="tx1"/>
+          </a:solidFill>
+          <a:latin typeface="+mn-lt"/>
+          <a:ea typeface="+mn-ea"/>
+          <a:cs typeface="+mn-cs"/>
+        </a:defRPr>
+      </a:lvl5pPr>
+      <a:lvl6pPr marL="2286000" algn="l" defTabSz="914400" rtl="0" eaLnBrk="1" latinLnBrk="0" hangingPunct="1">
+        <a:defRPr sz="1800" kern="1200">
+          <a:solidFill>
+            <a:schemeClr val="tx1"/>
+          </a:solidFill>
+          <a:latin typeface="+mn-lt"/>
+          <a:ea typeface="+mn-ea"/>
+          <a:cs typeface="+mn-cs"/>
+        </a:defRPr>
+      </a:lvl6pPr>
+      <a:lvl7pPr marL="2743200" algn="l" defTabSz="914400" rtl="0" eaLnBrk="1" latinLnBrk="0" hangingPunct="1">
+        <a:defRPr sz="1800" kern="1200">
+          <a:solidFill>
+            <a:schemeClr val="tx1"/>
+          </a:solidFill>
+          <a:latin typeface="+mn-lt"/>
+          <a:ea typeface="+mn-ea"/>
+          <a:cs typeface="+mn-cs"/>
+        </a:defRPr>
+      </a:lvl7pPr>
+      <a:lvl8pPr marL="3200400" algn="l" defTabSz="914400" rtl="0" eaLnBrk="1" latinLnBrk="0" hangingPunct="1">
+        <a:defRPr sz="1800" kern="1200">
+          <a:solidFill>
+            <a:schemeClr val="tx1"/>
+          </a:solidFill>
+          <a:latin typeface="+mn-lt"/>
+          <a:ea typeface="+mn-ea"/>
+          <a:cs typeface="+mn-cs"/>
+        </a:defRPr>
+      </a:lvl8pPr>
+      <a:lvl9pPr marL="3657600" algn="l" defTabSz="914400" rtl="0" eaLnBrk="1" latinLnBrk="0" hangingPunct="1">
+        <a:defRPr sz="1800" kern="1200">
+          <a:solidFill>
+            <a:schemeClr val="tx1"/>
+          </a:solidFill>
+          <a:latin typeface="+mn-lt"/>
+          <a:ea typeface="+mn-ea"/>
+          <a:cs typeface="+mn-cs"/>
+        </a:defRPr>
+      </a:lvl9pPr>
+    </p:otherStyle>
+  </p:txStyles>
 </p:sldMaster>
 </file>
 
 <file path=ppt/slides/slide1.xml><?xml version="1.0" encoding="utf-8"?>
-<p:sld xmlns:a="http://schemas.openxmlformats.org/drawingml/2006/main" xmlns:p="http://schemas.openxmlformats.org/presentationml/2006/main" xmlns:r="http://schemas.openxmlformats.org/officeDocument/2006/relationships">
+<p:sld xmlns:a="http://schemas.openxmlformats.org/drawingml/2006/main" xmlns:r="http://schemas.openxmlformats.org/officeDocument/2006/relationships" xmlns:p="http://schemas.openxmlformats.org/presentationml/2006/main">
   <p:cSld>
     <p:spTree>
       <p:nvGrpSpPr>
@@ -1984,13 +2608,20 @@
           </a:ln>
         </p:spPr>
         <p:style>
-          <a:lnRef idx="0"/>
-          <a:fillRef idx="0"/>
-          <a:effectRef idx="0"/>
+          <a:lnRef idx="0">
+            <a:scrgbClr r="0" g="0" b="0"/>
+          </a:lnRef>
+          <a:fillRef idx="0">
+            <a:scrgbClr r="0" g="0" b="0"/>
+          </a:fillRef>
+          <a:effectRef idx="0">
+            <a:scrgbClr r="0" g="0" b="0"/>
+          </a:effectRef>
           <a:fontRef idx="minor"/>
         </p:style>
         <p:txBody>
-          <a:bodyPr lIns="56520" rIns="56520" tIns="28080" bIns="28080"/>
+          <a:bodyPr lIns="56520" tIns="28080" rIns="56520" bIns="28080"/>
+          <a:lstStyle/>
           <a:p>
             <a:pPr algn="ctr">
               <a:lnSpc>
@@ -1998,9 +2629,9 @@
               </a:lnSpc>
             </a:pPr>
             <a:r>
-              <a:rPr b="1" lang="en-US" sz="4800" strike="noStrike">
+              <a:rPr lang="en-US" sz="4800" b="1" strike="noStrike">
                 <a:solidFill>
-                  <a:srgbClr val="f8f8f8"/>
+                  <a:srgbClr val="F8F8F8"/>
                 </a:solidFill>
                 <a:latin typeface="Calibri"/>
                 <a:ea typeface="DejaVu Sans"/>
@@ -2050,13 +2681,20 @@
           </a:ln>
         </p:spPr>
         <p:style>
-          <a:lnRef idx="0"/>
-          <a:fillRef idx="0"/>
-          <a:effectRef idx="0"/>
+          <a:lnRef idx="0">
+            <a:scrgbClr r="0" g="0" b="0"/>
+          </a:lnRef>
+          <a:fillRef idx="0">
+            <a:scrgbClr r="0" g="0" b="0"/>
+          </a:fillRef>
+          <a:effectRef idx="0">
+            <a:scrgbClr r="0" g="0" b="0"/>
+          </a:effectRef>
           <a:fontRef idx="minor"/>
         </p:style>
         <p:txBody>
-          <a:bodyPr lIns="329040" rIns="329040" tIns="329040" bIns="329040"/>
+          <a:bodyPr lIns="329040" tIns="329040" rIns="329040" bIns="329040"/>
+          <a:lstStyle/>
           <a:p>
             <a:pPr algn="ctr">
               <a:lnSpc>
@@ -2064,9 +2702,9 @@
               </a:lnSpc>
             </a:pPr>
             <a:r>
-              <a:rPr b="1" lang="en-US" sz="2800" strike="noStrike">
+              <a:rPr lang="en-US" sz="2800" b="1" strike="noStrike">
                 <a:solidFill>
-                  <a:srgbClr val="f8f8f8"/>
+                  <a:srgbClr val="F8F8F8"/>
                 </a:solidFill>
                 <a:latin typeface="Arial"/>
                 <a:ea typeface="DejaVu Sans"/>
@@ -2082,9 +2720,9 @@
               </a:lnSpc>
             </a:pPr>
             <a:r>
-              <a:rPr b="1" lang="en-US" sz="1600" strike="noStrike">
+              <a:rPr lang="en-US" sz="1600" b="1" strike="noStrike">
                 <a:solidFill>
-                  <a:srgbClr val="f8f8f8"/>
+                  <a:srgbClr val="F8F8F8"/>
                 </a:solidFill>
                 <a:latin typeface="Arial"/>
                 <a:ea typeface="DejaVu Sans"/>
@@ -2118,20 +2756,27 @@
             <a:avLst/>
           </a:prstGeom>
           <a:solidFill>
-            <a:srgbClr val="000d26"/>
+            <a:srgbClr val="000D26"/>
           </a:solidFill>
           <a:ln w="9360">
             <a:noFill/>
           </a:ln>
         </p:spPr>
         <p:style>
-          <a:lnRef idx="0"/>
-          <a:fillRef idx="0"/>
-          <a:effectRef idx="0"/>
+          <a:lnRef idx="0">
+            <a:scrgbClr r="0" g="0" b="0"/>
+          </a:lnRef>
+          <a:fillRef idx="0">
+            <a:scrgbClr r="0" g="0" b="0"/>
+          </a:fillRef>
+          <a:effectRef idx="0">
+            <a:scrgbClr r="0" g="0" b="0"/>
+          </a:effectRef>
           <a:fontRef idx="minor"/>
         </p:style>
         <p:txBody>
-          <a:bodyPr lIns="56520" rIns="56520" tIns="28080" bIns="28080" anchor="ctr"/>
+          <a:bodyPr lIns="56520" tIns="28080" rIns="56520" bIns="28080" anchor="ctr"/>
+          <a:lstStyle/>
           <a:p>
             <a:pPr algn="ctr">
               <a:lnSpc>
@@ -2139,9 +2784,9 @@
               </a:lnSpc>
             </a:pPr>
             <a:r>
-              <a:rPr b="1" lang="en-US" sz="2800" strike="noStrike">
+              <a:rPr lang="en-US" sz="2800" b="1" strike="noStrike">
                 <a:solidFill>
-                  <a:srgbClr val="f8f8f8"/>
+                  <a:srgbClr val="F8F8F8"/>
                 </a:solidFill>
                 <a:latin typeface="Calibri"/>
                 <a:ea typeface="DejaVu Sans"/>
@@ -2167,20 +2812,27 @@
             <a:avLst/>
           </a:prstGeom>
           <a:solidFill>
-            <a:srgbClr val="000d26"/>
+            <a:srgbClr val="000D26"/>
           </a:solidFill>
           <a:ln w="9360">
             <a:noFill/>
           </a:ln>
         </p:spPr>
         <p:style>
-          <a:lnRef idx="0"/>
-          <a:fillRef idx="0"/>
-          <a:effectRef idx="0"/>
+          <a:lnRef idx="0">
+            <a:scrgbClr r="0" g="0" b="0"/>
+          </a:lnRef>
+          <a:fillRef idx="0">
+            <a:scrgbClr r="0" g="0" b="0"/>
+          </a:fillRef>
+          <a:effectRef idx="0">
+            <a:scrgbClr r="0" g="0" b="0"/>
+          </a:effectRef>
           <a:fontRef idx="minor"/>
         </p:style>
         <p:txBody>
-          <a:bodyPr lIns="56520" rIns="56520" tIns="28080" bIns="28080" anchor="ctr"/>
+          <a:bodyPr lIns="56520" tIns="28080" rIns="56520" bIns="28080" anchor="ctr"/>
+          <a:lstStyle/>
           <a:p>
             <a:pPr algn="ctr">
               <a:lnSpc>
@@ -2188,9 +2840,9 @@
               </a:lnSpc>
             </a:pPr>
             <a:r>
-              <a:rPr b="1" lang="en-US" sz="2800" strike="noStrike">
+              <a:rPr lang="en-US" sz="2800" b="1" strike="noStrike">
                 <a:solidFill>
-                  <a:srgbClr val="f8f8f8"/>
+                  <a:srgbClr val="F8F8F8"/>
                 </a:solidFill>
                 <a:latin typeface="Calibri"/>
                 <a:ea typeface="DejaVu Sans"/>
@@ -2216,20 +2868,27 @@
             <a:avLst/>
           </a:prstGeom>
           <a:solidFill>
-            <a:srgbClr val="000d26"/>
+            <a:srgbClr val="000D26"/>
           </a:solidFill>
           <a:ln w="9360">
             <a:noFill/>
           </a:ln>
         </p:spPr>
         <p:style>
-          <a:lnRef idx="0"/>
-          <a:fillRef idx="0"/>
-          <a:effectRef idx="0"/>
+          <a:lnRef idx="0">
+            <a:scrgbClr r="0" g="0" b="0"/>
+          </a:lnRef>
+          <a:fillRef idx="0">
+            <a:scrgbClr r="0" g="0" b="0"/>
+          </a:fillRef>
+          <a:effectRef idx="0">
+            <a:scrgbClr r="0" g="0" b="0"/>
+          </a:effectRef>
           <a:fontRef idx="minor"/>
         </p:style>
         <p:txBody>
-          <a:bodyPr lIns="56520" rIns="56520" tIns="28080" bIns="28080" anchor="ctr"/>
+          <a:bodyPr lIns="56520" tIns="28080" rIns="56520" bIns="28080" anchor="ctr"/>
+          <a:lstStyle/>
           <a:p>
             <a:pPr algn="ctr">
               <a:lnSpc>
@@ -2237,9 +2896,9 @@
               </a:lnSpc>
             </a:pPr>
             <a:r>
-              <a:rPr b="1" lang="en-US" sz="2800" strike="noStrike">
+              <a:rPr lang="en-US" sz="2800" b="1" strike="noStrike">
                 <a:solidFill>
-                  <a:srgbClr val="f8f8f8"/>
+                  <a:srgbClr val="F8F8F8"/>
                 </a:solidFill>
                 <a:latin typeface="Calibri"/>
                 <a:ea typeface="DejaVu Sans"/>
@@ -2265,20 +2924,27 @@
             <a:avLst/>
           </a:prstGeom>
           <a:solidFill>
-            <a:srgbClr val="000d26"/>
+            <a:srgbClr val="000D26"/>
           </a:solidFill>
           <a:ln w="9360">
             <a:noFill/>
           </a:ln>
         </p:spPr>
         <p:style>
-          <a:lnRef idx="0"/>
-          <a:fillRef idx="0"/>
-          <a:effectRef idx="0"/>
+          <a:lnRef idx="0">
+            <a:scrgbClr r="0" g="0" b="0"/>
+          </a:lnRef>
+          <a:fillRef idx="0">
+            <a:scrgbClr r="0" g="0" b="0"/>
+          </a:fillRef>
+          <a:effectRef idx="0">
+            <a:scrgbClr r="0" g="0" b="0"/>
+          </a:effectRef>
           <a:fontRef idx="minor"/>
         </p:style>
         <p:txBody>
-          <a:bodyPr lIns="56520" rIns="56520" tIns="28080" bIns="28080" anchor="ctr"/>
+          <a:bodyPr lIns="56520" tIns="28080" rIns="56520" bIns="28080" anchor="ctr"/>
+          <a:lstStyle/>
           <a:p>
             <a:pPr algn="ctr">
               <a:lnSpc>
@@ -2286,9 +2952,9 @@
               </a:lnSpc>
             </a:pPr>
             <a:r>
-              <a:rPr b="1" lang="en-US" sz="2800" strike="noStrike">
+              <a:rPr lang="en-US" sz="2800" b="1" strike="noStrike">
                 <a:solidFill>
-                  <a:srgbClr val="f8f8f8"/>
+                  <a:srgbClr val="F8F8F8"/>
                 </a:solidFill>
                 <a:latin typeface="Calibri"/>
                 <a:ea typeface="DejaVu Sans"/>
@@ -2307,27 +2973,34 @@
         </p:nvSpPr>
         <p:spPr>
           <a:xfrm>
-            <a:off x="548640" y="11441520"/>
+            <a:off x="525960" y="11449080"/>
             <a:ext cx="7040880" cy="537120"/>
           </a:xfrm>
           <a:prstGeom prst="rect">
             <a:avLst/>
           </a:prstGeom>
           <a:solidFill>
-            <a:srgbClr val="000d26"/>
+            <a:srgbClr val="000D26"/>
           </a:solidFill>
           <a:ln w="9360">
             <a:noFill/>
           </a:ln>
         </p:spPr>
         <p:style>
-          <a:lnRef idx="0"/>
-          <a:fillRef idx="0"/>
-          <a:effectRef idx="0"/>
+          <a:lnRef idx="0">
+            <a:scrgbClr r="0" g="0" b="0"/>
+          </a:lnRef>
+          <a:fillRef idx="0">
+            <a:scrgbClr r="0" g="0" b="0"/>
+          </a:fillRef>
+          <a:effectRef idx="0">
+            <a:scrgbClr r="0" g="0" b="0"/>
+          </a:effectRef>
           <a:fontRef idx="minor"/>
         </p:style>
         <p:txBody>
-          <a:bodyPr lIns="56520" rIns="56520" tIns="28080" bIns="28080" anchor="ctr"/>
+          <a:bodyPr lIns="56520" tIns="28080" rIns="56520" bIns="28080" anchor="ctr"/>
+          <a:lstStyle/>
           <a:p>
             <a:pPr algn="ctr">
               <a:lnSpc>
@@ -2335,9 +3008,9 @@
               </a:lnSpc>
             </a:pPr>
             <a:r>
-              <a:rPr b="1" lang="en-US" sz="2800" strike="noStrike">
+              <a:rPr lang="en-US" sz="2800" b="1" strike="noStrike">
                 <a:solidFill>
-                  <a:srgbClr val="f8f8f8"/>
+                  <a:srgbClr val="F8F8F8"/>
                 </a:solidFill>
                 <a:latin typeface="Calibri"/>
                 <a:ea typeface="DejaVu Sans"/>
@@ -2357,26 +3030,33 @@
         <p:spPr>
           <a:xfrm>
             <a:off x="8532000" y="2889360"/>
-            <a:ext cx="16026480" cy="528840"/>
+            <a:ext cx="16040686" cy="528840"/>
           </a:xfrm>
           <a:prstGeom prst="rect">
             <a:avLst/>
           </a:prstGeom>
           <a:solidFill>
-            <a:srgbClr val="000d26"/>
+            <a:srgbClr val="000D26"/>
           </a:solidFill>
           <a:ln w="9360">
             <a:noFill/>
           </a:ln>
         </p:spPr>
         <p:style>
-          <a:lnRef idx="0"/>
-          <a:fillRef idx="0"/>
-          <a:effectRef idx="0"/>
+          <a:lnRef idx="0">
+            <a:scrgbClr r="0" g="0" b="0"/>
+          </a:lnRef>
+          <a:fillRef idx="0">
+            <a:scrgbClr r="0" g="0" b="0"/>
+          </a:fillRef>
+          <a:effectRef idx="0">
+            <a:scrgbClr r="0" g="0" b="0"/>
+          </a:effectRef>
           <a:fontRef idx="minor"/>
         </p:style>
         <p:txBody>
-          <a:bodyPr lIns="56520" rIns="56520" tIns="28080" bIns="28080" anchor="ctr"/>
+          <a:bodyPr lIns="56520" tIns="28080" rIns="56520" bIns="28080" anchor="ctr"/>
+          <a:lstStyle/>
           <a:p>
             <a:pPr algn="ctr">
               <a:lnSpc>
@@ -2384,9 +3064,9 @@
               </a:lnSpc>
             </a:pPr>
             <a:r>
-              <a:rPr b="1" lang="en-US" sz="2800" strike="noStrike">
+              <a:rPr lang="en-US" sz="2800" b="1" strike="noStrike">
                 <a:solidFill>
-                  <a:srgbClr val="f8f8f8"/>
+                  <a:srgbClr val="F8F8F8"/>
                 </a:solidFill>
                 <a:latin typeface="Calibri"/>
                 <a:ea typeface="DejaVu Sans"/>
@@ -2417,17 +3097,72 @@
           </a:ln>
         </p:spPr>
         <p:style>
-          <a:lnRef idx="0"/>
-          <a:fillRef idx="0"/>
-          <a:effectRef idx="0"/>
+          <a:lnRef idx="0">
+            <a:scrgbClr r="0" g="0" b="0"/>
+          </a:lnRef>
+          <a:fillRef idx="0">
+            <a:scrgbClr r="0" g="0" b="0"/>
+          </a:fillRef>
+          <a:effectRef idx="0">
+            <a:scrgbClr r="0" g="0" b="0"/>
+          </a:effectRef>
           <a:fontRef idx="minor"/>
         </p:style>
         <p:txBody>
-          <a:bodyPr lIns="90000" rIns="90000" tIns="45000" bIns="45000"/>
+          <a:bodyPr lIns="90000" tIns="45000" rIns="90000" bIns="45000"/>
+          <a:lstStyle/>
           <a:p>
             <a:pPr algn="just"/>
             <a:r>
-              <a:rPr lang="en-US" sz="1600" strike="noStrike">
+              <a:rPr lang="en-US" sz="1600" strike="noStrike" dirty="0">
+                <a:solidFill>
+                  <a:srgbClr val="000000"/>
+                </a:solidFill>
+                <a:latin typeface="Arial"/>
+                <a:ea typeface="DejaVu Sans"/>
+              </a:rPr>
+              <a:t>	Shear waves can be induced in tissues by acoustic radiation force created using an ultrasound probe. The shear wave speed of tissue can be measured by tracking the propagation of shear waves from their source using time-of-flight methods [1]. Tissue stiffness can be characterized using these shear wave speed measurements. </a:t>
+            </a:r>
+            <a:endParaRPr dirty="0"/>
+          </a:p>
+          <a:p>
+            <a:pPr algn="just"/>
+            <a:r>
+              <a:rPr lang="en-US" sz="1600" strike="noStrike" dirty="0">
+                <a:solidFill>
+                  <a:srgbClr val="000000"/>
+                </a:solidFill>
+                <a:latin typeface="Arial"/>
+                <a:ea typeface="DejaVu Sans"/>
+              </a:rPr>
+              <a:t>	Shear wave speed measurements have been shown to exhibit a depth dependent bias, which has the potential to cause misdiagnosis [2]. It was hypothesized that this depth dependence was caused by out-of-plane shear wave sources generated through nonlinear effects in acoustic propagation. These nonlinear effects are due to localized heating caused by acoustic waves with high pressure amplitudes This increases the sound speed in that specific region. Figure 1 shows the resulting </a:t>
+            </a:r>
+            <a:r>
+              <a:rPr lang="en-US" sz="1600" strike="noStrike" dirty="0" err="1">
+                <a:solidFill>
+                  <a:srgbClr val="000000"/>
+                </a:solidFill>
+                <a:latin typeface="Arial"/>
+                <a:ea typeface="DejaVu Sans"/>
+              </a:rPr>
+              <a:t>sawtooth</a:t>
+            </a:r>
+            <a:r>
+              <a:rPr lang="en-US" sz="1600" strike="noStrike" dirty="0">
+                <a:solidFill>
+                  <a:srgbClr val="000000"/>
+                </a:solidFill>
+                <a:latin typeface="Arial"/>
+                <a:ea typeface="DejaVu Sans"/>
+              </a:rPr>
+              <a:t> wave.</a:t>
+            </a:r>
+            <a:endParaRPr dirty="0"/>
+          </a:p>
+          <a:p>
+            <a:pPr algn="just"/>
+            <a:r>
+              <a:rPr lang="en-US" sz="1600" dirty="0">
                 <a:solidFill>
                   <a:srgbClr val="000000"/>
                 </a:solidFill>
@@ -2437,84 +3172,36 @@
               <a:t>	</a:t>
             </a:r>
             <a:r>
-              <a:rPr lang="en-US" sz="1600" strike="noStrike">
+              <a:rPr lang="en-US" sz="1600" strike="noStrike" dirty="0" smtClean="0">
                 <a:solidFill>
                   <a:srgbClr val="000000"/>
                 </a:solidFill>
                 <a:latin typeface="Arial"/>
                 <a:ea typeface="DejaVu Sans"/>
               </a:rPr>
-              <a:t>Shear waves can be induced in tissues by acoustic radiation force created using an ultrasound probe. The shear wave speed of tissue can be measured by tracking the propagation of shear waves from their source using time-of-flight methods [1]. Tissue stiffness can be characterized using these shear wave speed measurements. </a:t>
-            </a:r>
-            <a:endParaRPr/>
-          </a:p>
-          <a:p>
-            <a:pPr algn="just"/>
-            <a:r>
-              <a:rPr lang="en-US" sz="1600" strike="noStrike">
+              <a:t>The </a:t>
+            </a:r>
+            <a:r>
+              <a:rPr lang="en-US" sz="1600" strike="noStrike" dirty="0" err="1">
                 <a:solidFill>
                   <a:srgbClr val="000000"/>
                 </a:solidFill>
                 <a:latin typeface="Arial"/>
                 <a:ea typeface="DejaVu Sans"/>
               </a:rPr>
-              <a:t>	</a:t>
-            </a:r>
-            <a:r>
-              <a:rPr lang="en-US" sz="1600" strike="noStrike">
+              <a:t>Khokhlov-Zabolotskaya-Kuznetsov</a:t>
+            </a:r>
+            <a:r>
+              <a:rPr lang="en-US" sz="1600" strike="noStrike" dirty="0">
                 <a:solidFill>
                   <a:srgbClr val="000000"/>
                 </a:solidFill>
                 <a:latin typeface="Arial"/>
                 <a:ea typeface="DejaVu Sans"/>
               </a:rPr>
-              <a:t>Shear wave speed measurements have been shown to exhibit a depth dependent bias, which has the potential to cause misdiagnosis [2]. It was hypothesized that this depth dependence was caused by out-of-plane shear wave sources generated through nonlinear effects in acoustic propagation. These nonlinear effects are due to localized heating caused by acoustic waves with </a:t>
-            </a:r>
-            <a:r>
-              <a:rPr lang="en-US" sz="1600" strike="noStrike">
-                <a:solidFill>
-                  <a:srgbClr val="000000"/>
-                </a:solidFill>
-                <a:latin typeface="Arial"/>
-                <a:ea typeface="DejaVu Sans"/>
-              </a:rPr>
-              <a:t>high pressure amplitudes This increases </a:t>
-            </a:r>
-            <a:r>
-              <a:rPr lang="en-US" sz="1600" strike="noStrike">
-                <a:solidFill>
-                  <a:srgbClr val="000000"/>
-                </a:solidFill>
-                <a:latin typeface="Arial"/>
-                <a:ea typeface="DejaVu Sans"/>
-              </a:rPr>
-              <a:t>the sound speed in that specific region. Figure 1 shows the resulting sawtooth wave.</a:t>
-            </a:r>
-            <a:endParaRPr/>
-          </a:p>
-          <a:p>
-            <a:pPr algn="just"/>
-            <a:r>
-              <a:rPr lang="en-US" sz="1600" strike="noStrike">
-                <a:solidFill>
-                  <a:srgbClr val="000000"/>
-                </a:solidFill>
-                <a:latin typeface="Arial"/>
-                <a:ea typeface="DejaVu Sans"/>
-              </a:rPr>
-              <a:t> </a:t>
-            </a:r>
-            <a:r>
-              <a:rPr lang="en-US" sz="1600" strike="noStrike">
-                <a:solidFill>
-                  <a:srgbClr val="000000"/>
-                </a:solidFill>
-                <a:latin typeface="Arial"/>
-                <a:ea typeface="DejaVu Sans"/>
-              </a:rPr>
-              <a:t>The Khokhlov-Zabolotskaya-Kuznetsov (KZK) nonlinear wave equation [3] was used to simulate acoustic waves propagating in differing media with various nonlinear coefficients. The simulated intensity field distributions showed that as nonlinearity increased, the maximum intensities tended towards shallower, laterally offset locations. It was also shown that as attenuation increased, the effects of nonlinearity were also diminished.</a:t>
-            </a:r>
-            <a:endParaRPr/>
+              <a:t> (KZK) nonlinear wave equation [3] was used to simulate acoustic waves propagating in differing media with various nonlinear coefficients. The simulated intensity field distributions showed that as nonlinearity increased, the maximum intensities tended towards shallower, laterally offset locations. It was also shown that as attenuation increased, the effects of nonlinearity were also diminished.</a:t>
+            </a:r>
+            <a:endParaRPr dirty="0"/>
           </a:p>
         </p:txBody>
       </p:sp>
@@ -2538,13 +3225,20 @@
           </a:ln>
         </p:spPr>
         <p:style>
-          <a:lnRef idx="0"/>
-          <a:fillRef idx="0"/>
-          <a:effectRef idx="0"/>
+          <a:lnRef idx="0">
+            <a:scrgbClr r="0" g="0" b="0"/>
+          </a:lnRef>
+          <a:fillRef idx="0">
+            <a:scrgbClr r="0" g="0" b="0"/>
+          </a:fillRef>
+          <a:effectRef idx="0">
+            <a:scrgbClr r="0" g="0" b="0"/>
+          </a:effectRef>
           <a:fontRef idx="minor"/>
         </p:style>
         <p:txBody>
-          <a:bodyPr lIns="90000" rIns="90000" tIns="45000" bIns="45000"/>
+          <a:bodyPr lIns="90000" tIns="45000" rIns="90000" bIns="45000"/>
+          <a:lstStyle/>
           <a:p>
             <a:r>
               <a:rPr lang="en-US" sz="1200" strike="noStrike">
@@ -2588,91 +3282,7 @@
       </p:sp>
       <p:pic>
         <p:nvPicPr>
-          <p:cNvPr id="62" name="" descr=""/>
-          <p:cNvPicPr/>
-          <p:nvPr/>
-        </p:nvPicPr>
-        <p:blipFill>
-          <a:blip r:embed="rId1"/>
-          <a:stretch/>
-        </p:blipFill>
-        <p:spPr>
-          <a:xfrm>
-            <a:off x="9052560" y="4297680"/>
-            <a:ext cx="3474720" cy="2560320"/>
-          </a:xfrm>
-          <a:prstGeom prst="rect">
-            <a:avLst/>
-          </a:prstGeom>
-          <a:ln>
-            <a:noFill/>
-          </a:ln>
-        </p:spPr>
-      </p:pic>
-      <p:sp>
-        <p:nvSpPr>
-          <p:cNvPr id="63" name="CustomShape 12"/>
-          <p:cNvSpPr/>
-          <p:nvPr/>
-        </p:nvSpPr>
-        <p:spPr>
-          <a:xfrm>
-            <a:off x="10149840" y="3749040"/>
-            <a:ext cx="2454120" cy="345960"/>
-          </a:xfrm>
-          <a:prstGeom prst="rect">
-            <a:avLst/>
-          </a:prstGeom>
-          <a:noFill/>
-          <a:ln>
-            <a:noFill/>
-          </a:ln>
-        </p:spPr>
-        <p:style>
-          <a:lnRef idx="0"/>
-          <a:fillRef idx="0"/>
-          <a:effectRef idx="0"/>
-          <a:fontRef idx="minor"/>
-        </p:style>
-        <p:txBody>
-          <a:bodyPr lIns="90000" rIns="90000" tIns="45000" bIns="45000"/>
-          <a:p>
-            <a:r>
-              <a:rPr lang="en-US" strike="noStrike">
-                <a:latin typeface="Arial"/>
-              </a:rPr>
-              <a:t>α = 0.005 dB/cm/MHz </a:t>
-            </a:r>
-            <a:endParaRPr/>
-          </a:p>
-        </p:txBody>
-      </p:sp>
-      <p:pic>
-        <p:nvPicPr>
-          <p:cNvPr id="64" name="" descr=""/>
-          <p:cNvPicPr/>
-          <p:nvPr/>
-        </p:nvPicPr>
-        <p:blipFill>
-          <a:blip r:embed="rId2"/>
-          <a:stretch/>
-        </p:blipFill>
-        <p:spPr>
-          <a:xfrm>
-            <a:off x="9235440" y="7498080"/>
-            <a:ext cx="3108960" cy="1097280"/>
-          </a:xfrm>
-          <a:prstGeom prst="rect">
-            <a:avLst/>
-          </a:prstGeom>
-          <a:ln>
-            <a:noFill/>
-          </a:ln>
-        </p:spPr>
-      </p:pic>
-      <p:pic>
-        <p:nvPicPr>
-          <p:cNvPr id="65" name="" descr=""/>
+          <p:cNvPr id="62" name="Picture 61"/>
           <p:cNvPicPr/>
           <p:nvPr/>
         </p:nvPicPr>
@@ -2682,73 +3292,29 @@
         </p:blipFill>
         <p:spPr>
           <a:xfrm>
-            <a:off x="9235440" y="9326880"/>
-            <a:ext cx="3840480" cy="2011680"/>
+            <a:off x="11531853" y="4723374"/>
+            <a:ext cx="4315719" cy="3391709"/>
           </a:xfrm>
           <a:prstGeom prst="rect">
             <a:avLst/>
           </a:prstGeom>
           <a:ln>
-            <a:noFill/>
+            <a:solidFill>
+              <a:schemeClr val="tx1"/>
+            </a:solidFill>
           </a:ln>
         </p:spPr>
       </p:pic>
-      <p:pic>
-        <p:nvPicPr>
-          <p:cNvPr id="66" name="" descr=""/>
-          <p:cNvPicPr/>
-          <p:nvPr/>
-        </p:nvPicPr>
-        <p:blipFill>
-          <a:blip r:embed="rId4"/>
-          <a:stretch/>
-        </p:blipFill>
-        <p:spPr>
-          <a:xfrm>
-            <a:off x="8870040" y="12252960"/>
-            <a:ext cx="3565800" cy="1554480"/>
-          </a:xfrm>
-          <a:prstGeom prst="rect">
-            <a:avLst/>
-          </a:prstGeom>
-          <a:ln>
-            <a:noFill/>
-          </a:ln>
-        </p:spPr>
-      </p:pic>
-      <p:pic>
-        <p:nvPicPr>
-          <p:cNvPr id="67" name="" descr=""/>
-          <p:cNvPicPr/>
-          <p:nvPr/>
-        </p:nvPicPr>
-        <p:blipFill>
-          <a:blip r:embed="rId5"/>
-          <a:stretch/>
-        </p:blipFill>
-        <p:spPr>
-          <a:xfrm>
-            <a:off x="19386720" y="4572000"/>
-            <a:ext cx="3564720" cy="3017160"/>
-          </a:xfrm>
-          <a:prstGeom prst="rect">
-            <a:avLst/>
-          </a:prstGeom>
-          <a:ln>
-            <a:noFill/>
-          </a:ln>
-        </p:spPr>
-      </p:pic>
-      <p:sp>
-        <p:nvSpPr>
-          <p:cNvPr id="68" name="CustomShape 13"/>
+      <p:sp>
+        <p:nvSpPr>
+          <p:cNvPr id="63" name="CustomShape 12"/>
           <p:cNvSpPr/>
           <p:nvPr/>
         </p:nvSpPr>
         <p:spPr>
           <a:xfrm>
-            <a:off x="19933920" y="3677400"/>
-            <a:ext cx="2201040" cy="345960"/>
+            <a:off x="8682273" y="6204980"/>
+            <a:ext cx="2454120" cy="345960"/>
           </a:xfrm>
           <a:prstGeom prst="rect">
             <a:avLst/>
@@ -2759,50 +3325,112 @@
           </a:ln>
         </p:spPr>
         <p:style>
-          <a:lnRef idx="0"/>
-          <a:fillRef idx="0"/>
-          <a:effectRef idx="0"/>
+          <a:lnRef idx="0">
+            <a:scrgbClr r="0" g="0" b="0"/>
+          </a:lnRef>
+          <a:fillRef idx="0">
+            <a:scrgbClr r="0" g="0" b="0"/>
+          </a:fillRef>
+          <a:effectRef idx="0">
+            <a:scrgbClr r="0" g="0" b="0"/>
+          </a:effectRef>
           <a:fontRef idx="minor"/>
         </p:style>
         <p:txBody>
-          <a:bodyPr lIns="90000" rIns="90000" tIns="45000" bIns="45000"/>
-          <a:p>
-            <a:r>
-              <a:rPr lang="en-US" strike="noStrike">
+          <a:bodyPr lIns="90000" tIns="45000" rIns="90000" bIns="45000"/>
+          <a:lstStyle/>
+          <a:p>
+            <a:r>
+              <a:rPr lang="en-US" strike="noStrike" dirty="0">
                 <a:latin typeface="Arial"/>
               </a:rPr>
-              <a:t>α = 1.5 dB/cm/MHz </a:t>
-            </a:r>
-            <a:endParaRPr/>
+              <a:t>α = 0.005 dB/cm/MHz </a:t>
+            </a:r>
+            <a:endParaRPr dirty="0"/>
           </a:p>
         </p:txBody>
       </p:sp>
       <p:pic>
         <p:nvPicPr>
-          <p:cNvPr id="69" name="" descr=""/>
+          <p:cNvPr id="64" name="Picture 63"/>
           <p:cNvPicPr/>
           <p:nvPr/>
         </p:nvPicPr>
-        <p:blipFill>
-          <a:blip r:embed="rId6"/>
+        <p:blipFill rotWithShape="1">
+          <a:blip r:embed="rId4"/>
+          <a:srcRect l="38156" r="38176" b="2711"/>
           <a:stretch/>
         </p:blipFill>
         <p:spPr>
           <a:xfrm>
-            <a:off x="20117160" y="7955640"/>
-            <a:ext cx="1828440" cy="2742840"/>
+            <a:off x="16352519" y="4720531"/>
+            <a:ext cx="1879643" cy="3391707"/>
           </a:xfrm>
           <a:prstGeom prst="rect">
             <a:avLst/>
           </a:prstGeom>
           <a:ln>
-            <a:noFill/>
+            <a:solidFill>
+              <a:schemeClr val="tx1"/>
+            </a:solidFill>
           </a:ln>
         </p:spPr>
       </p:pic>
       <p:pic>
         <p:nvPicPr>
-          <p:cNvPr id="70" name="" descr=""/>
+          <p:cNvPr id="65" name="Picture 64"/>
+          <p:cNvPicPr/>
+          <p:nvPr/>
+        </p:nvPicPr>
+        <p:blipFill rotWithShape="1">
+          <a:blip r:embed="rId5"/>
+          <a:srcRect l="38119" t="2043" r="38041" b="2049"/>
+          <a:stretch/>
+        </p:blipFill>
+        <p:spPr>
+          <a:xfrm>
+            <a:off x="18737109" y="4723374"/>
+            <a:ext cx="1970241" cy="3388864"/>
+          </a:xfrm>
+          <a:prstGeom prst="rect">
+            <a:avLst/>
+          </a:prstGeom>
+          <a:ln>
+            <a:solidFill>
+              <a:schemeClr val="tx1"/>
+            </a:solidFill>
+          </a:ln>
+        </p:spPr>
+      </p:pic>
+      <p:pic>
+        <p:nvPicPr>
+          <p:cNvPr id="66" name="Picture 65"/>
+          <p:cNvPicPr/>
+          <p:nvPr/>
+        </p:nvPicPr>
+        <p:blipFill rotWithShape="1">
+          <a:blip r:embed="rId6"/>
+          <a:srcRect l="38102" t="-1" r="38355" b="2381"/>
+          <a:stretch/>
+        </p:blipFill>
+        <p:spPr>
+          <a:xfrm>
+            <a:off x="21130260" y="4722484"/>
+            <a:ext cx="1893030" cy="3389754"/>
+          </a:xfrm>
+          <a:prstGeom prst="rect">
+            <a:avLst/>
+          </a:prstGeom>
+          <a:ln>
+            <a:solidFill>
+              <a:schemeClr val="tx1"/>
+            </a:solidFill>
+          </a:ln>
+        </p:spPr>
+      </p:pic>
+      <p:pic>
+        <p:nvPicPr>
+          <p:cNvPr id="67" name="Picture 66"/>
           <p:cNvPicPr/>
           <p:nvPr/>
         </p:nvPicPr>
@@ -2812,50 +3440,29 @@
         </p:blipFill>
         <p:spPr>
           <a:xfrm>
-            <a:off x="20299680" y="11156040"/>
-            <a:ext cx="1462680" cy="2834280"/>
+            <a:off x="11531852" y="8786800"/>
+            <a:ext cx="4315719" cy="3389754"/>
           </a:xfrm>
           <a:prstGeom prst="rect">
             <a:avLst/>
           </a:prstGeom>
           <a:ln>
-            <a:noFill/>
+            <a:solidFill>
+              <a:schemeClr val="tx1"/>
+            </a:solidFill>
           </a:ln>
         </p:spPr>
       </p:pic>
-      <p:pic>
-        <p:nvPicPr>
-          <p:cNvPr id="71" name="" descr=""/>
-          <p:cNvPicPr/>
-          <p:nvPr/>
-        </p:nvPicPr>
-        <p:blipFill>
-          <a:blip r:embed="rId8"/>
-          <a:stretch/>
-        </p:blipFill>
-        <p:spPr>
-          <a:xfrm>
-            <a:off x="20277000" y="14447520"/>
-            <a:ext cx="1485720" cy="2560320"/>
-          </a:xfrm>
-          <a:prstGeom prst="rect">
-            <a:avLst/>
-          </a:prstGeom>
-          <a:ln>
-            <a:noFill/>
-          </a:ln>
-        </p:spPr>
-      </p:pic>
-      <p:sp>
-        <p:nvSpPr>
-          <p:cNvPr id="72" name="TextShape 14"/>
-          <p:cNvSpPr txBox="1"/>
-          <p:nvPr/>
-        </p:nvSpPr>
-        <p:spPr>
-          <a:xfrm>
-            <a:off x="25694640" y="10972800"/>
-            <a:ext cx="6492240" cy="346320"/>
+      <p:sp>
+        <p:nvSpPr>
+          <p:cNvPr id="68" name="CustomShape 13"/>
+          <p:cNvSpPr/>
+          <p:nvPr/>
+        </p:nvSpPr>
+        <p:spPr>
+          <a:xfrm>
+            <a:off x="8855402" y="10340100"/>
+            <a:ext cx="2201040" cy="345960"/>
           </a:xfrm>
           <a:prstGeom prst="rect">
             <a:avLst/>
@@ -2865,8 +3472,132 @@
             <a:noFill/>
           </a:ln>
         </p:spPr>
-        <p:txBody>
-          <a:bodyPr lIns="90000" rIns="90000" tIns="45000" bIns="45000"/>
+        <p:style>
+          <a:lnRef idx="0">
+            <a:scrgbClr r="0" g="0" b="0"/>
+          </a:lnRef>
+          <a:fillRef idx="0">
+            <a:scrgbClr r="0" g="0" b="0"/>
+          </a:fillRef>
+          <a:effectRef idx="0">
+            <a:scrgbClr r="0" g="0" b="0"/>
+          </a:effectRef>
+          <a:fontRef idx="minor"/>
+        </p:style>
+        <p:txBody>
+          <a:bodyPr lIns="90000" tIns="45000" rIns="90000" bIns="45000"/>
+          <a:lstStyle/>
+          <a:p>
+            <a:r>
+              <a:rPr lang="en-US" strike="noStrike" dirty="0">
+                <a:latin typeface="Arial"/>
+              </a:rPr>
+              <a:t>α = 1.5 dB/cm/MHz </a:t>
+            </a:r>
+            <a:endParaRPr dirty="0"/>
+          </a:p>
+        </p:txBody>
+      </p:sp>
+      <p:pic>
+        <p:nvPicPr>
+          <p:cNvPr id="69" name="Picture 68"/>
+          <p:cNvPicPr/>
+          <p:nvPr/>
+        </p:nvPicPr>
+        <p:blipFill rotWithShape="1">
+          <a:blip r:embed="rId8"/>
+          <a:srcRect l="20829" r="20043" b="1675"/>
+          <a:stretch/>
+        </p:blipFill>
+        <p:spPr>
+          <a:xfrm>
+            <a:off x="16352519" y="8786803"/>
+            <a:ext cx="1898203" cy="3389751"/>
+          </a:xfrm>
+          <a:prstGeom prst="rect">
+            <a:avLst/>
+          </a:prstGeom>
+          <a:ln>
+            <a:solidFill>
+              <a:schemeClr val="tx1"/>
+            </a:solidFill>
+          </a:ln>
+        </p:spPr>
+      </p:pic>
+      <p:pic>
+        <p:nvPicPr>
+          <p:cNvPr id="70" name="Picture 69"/>
+          <p:cNvPicPr/>
+          <p:nvPr/>
+        </p:nvPicPr>
+        <p:blipFill rotWithShape="1">
+          <a:blip r:embed="rId9"/>
+          <a:srcRect l="10860" t="6515" r="11361" b="2710"/>
+          <a:stretch/>
+        </p:blipFill>
+        <p:spPr>
+          <a:xfrm>
+            <a:off x="18780738" y="8786800"/>
+            <a:ext cx="1882981" cy="3389754"/>
+          </a:xfrm>
+          <a:prstGeom prst="rect">
+            <a:avLst/>
+          </a:prstGeom>
+          <a:ln>
+            <a:solidFill>
+              <a:schemeClr val="tx1"/>
+            </a:solidFill>
+          </a:ln>
+        </p:spPr>
+      </p:pic>
+      <p:pic>
+        <p:nvPicPr>
+          <p:cNvPr id="71" name="Picture 70"/>
+          <p:cNvPicPr/>
+          <p:nvPr/>
+        </p:nvPicPr>
+        <p:blipFill rotWithShape="1">
+          <a:blip r:embed="rId10"/>
+          <a:srcRect l="20244" r="20399"/>
+          <a:stretch/>
+        </p:blipFill>
+        <p:spPr>
+          <a:xfrm>
+            <a:off x="21130260" y="8786801"/>
+            <a:ext cx="1893030" cy="3389754"/>
+          </a:xfrm>
+          <a:prstGeom prst="rect">
+            <a:avLst/>
+          </a:prstGeom>
+          <a:ln>
+            <a:solidFill>
+              <a:schemeClr val="tx1"/>
+            </a:solidFill>
+          </a:ln>
+        </p:spPr>
+      </p:pic>
+      <p:sp>
+        <p:nvSpPr>
+          <p:cNvPr id="72" name="TextShape 14"/>
+          <p:cNvSpPr txBox="1"/>
+          <p:nvPr/>
+        </p:nvSpPr>
+        <p:spPr>
+          <a:xfrm>
+            <a:off x="25694640" y="10972800"/>
+            <a:ext cx="6492240" cy="346320"/>
+          </a:xfrm>
+          <a:prstGeom prst="rect">
+            <a:avLst/>
+          </a:prstGeom>
+          <a:noFill/>
+          <a:ln>
+            <a:noFill/>
+          </a:ln>
+        </p:spPr>
+        <p:txBody>
+          <a:bodyPr lIns="90000" tIns="45000" rIns="90000" bIns="45000"/>
+          <a:lstStyle/>
           <a:p>
             <a:r>
               <a:rPr lang="en-US">
@@ -2898,22 +3629,23 @@
           </a:ln>
         </p:spPr>
         <p:txBody>
-          <a:bodyPr lIns="90000" rIns="90000" tIns="45000" bIns="45000"/>
+          <a:bodyPr lIns="90000" tIns="45000" rIns="90000" bIns="45000"/>
+          <a:lstStyle/>
           <a:p>
             <a:pPr algn="just"/>
             <a:r>
-              <a:rPr lang="en-US" sz="1600">
+              <a:rPr lang="en-US" sz="1600" dirty="0" smtClean="0">
                 <a:latin typeface="Arial"/>
               </a:rPr>
-              <a:t>	</a:t>
-            </a:r>
-            <a:r>
-              <a:rPr lang="en-US" sz="1600">
+              <a:t>	A </a:t>
+            </a:r>
+            <a:r>
+              <a:rPr lang="en-US" sz="1600" dirty="0">
                 <a:latin typeface="Arial"/>
               </a:rPr>
-              <a:t>A curvilinear C5-2 transducer focused at 70 mm in depth was simulated with 7 excitation cycles at an excitation frequency of 2.36 MHz to generate the face pressures used as an input to the KZK simulations. These face pressure waves was scaled to an amplitude of 0.4 MPa to match pressure amplitudes that were measured experimentally. As shown in Figure 2, appropriate time delays were applied to focus the acoustic waves correctly. </a:t>
-            </a:r>
-            <a:endParaRPr/>
+              <a:t>curvilinear C5-2 transducer focused at 70 mm in depth was simulated with 7 excitation cycles at an excitation frequency of 2.36 MHz to generate the face pressures used as an input to the KZK simulations. These face pressure waves was scaled to an amplitude of 0.4 MPa to match pressure amplitudes that were measured experimentally. As shown in Figure 2, appropriate time delays were applied to focus the acoustic waves correctly. </a:t>
+            </a:r>
+            <a:endParaRPr dirty="0"/>
           </a:p>
         </p:txBody>
       </p:sp>
@@ -2937,7 +3669,8 @@
           </a:ln>
         </p:spPr>
         <p:txBody>
-          <a:bodyPr lIns="90000" rIns="90000" tIns="45000" bIns="45000"/>
+          <a:bodyPr lIns="90000" tIns="45000" rIns="90000" bIns="45000"/>
+          <a:lstStyle/>
           <a:p>
             <a:r>
               <a:rPr lang="en-US" sz="1600">
@@ -2951,24 +3684,26 @@
       </p:sp>
       <p:pic>
         <p:nvPicPr>
-          <p:cNvPr id="75" name="" descr=""/>
+          <p:cNvPr id="75" name="Picture 74"/>
           <p:cNvPicPr/>
           <p:nvPr/>
         </p:nvPicPr>
         <p:blipFill>
-          <a:blip r:embed="rId9"/>
+          <a:blip r:embed="rId11"/>
           <a:stretch/>
         </p:blipFill>
         <p:spPr>
           <a:xfrm>
-            <a:off x="2286000" y="8503920"/>
-            <a:ext cx="3383280" cy="2468880"/>
+            <a:off x="2286000" y="8789760"/>
+            <a:ext cx="3468600" cy="2267640"/>
           </a:xfrm>
           <a:prstGeom prst="rect">
             <a:avLst/>
           </a:prstGeom>
           <a:ln>
-            <a:noFill/>
+            <a:solidFill>
+              <a:schemeClr val="tx1"/>
+            </a:solidFill>
           </a:ln>
         </p:spPr>
       </p:pic>
@@ -2992,44 +3727,59 @@
           </a:ln>
         </p:spPr>
         <p:txBody>
-          <a:bodyPr lIns="90000" rIns="90000" tIns="45000" bIns="45000"/>
-          <a:p>
-            <a:r>
-              <a:rPr lang="en-US" sz="1600">
+          <a:bodyPr lIns="90000" tIns="45000" rIns="90000" bIns="45000"/>
+          <a:lstStyle/>
+          <a:p>
+            <a:r>
+              <a:rPr lang="en-US" sz="1600" dirty="0" smtClean="0">
                 <a:latin typeface="Arial"/>
               </a:rPr>
-              <a:t>	</a:t>
-            </a:r>
-            <a:r>
-              <a:rPr lang="en-US" sz="1600">
+              <a:t>	Using </a:t>
+            </a:r>
+            <a:r>
+              <a:rPr lang="en-US" sz="1600" dirty="0">
                 <a:latin typeface="Arial"/>
               </a:rPr>
-              <a:t>Using these face pressure inputs, KZK simulations were run with various combinations of attenuation coefficients (α = 0.005, 0.3, 1.0, and 1.5 dB/cm/MHz) and nonlinear coefficients (β = 0, 3.5, and 7). The resulting intensity fields were visualized using ParaView.</a:t>
-            </a:r>
-            <a:endParaRPr/>
+              <a:t>these face pressure inputs, KZK simulations were run with various combinations of attenuation coefficients (α = 0.005, 0.3, 1.0, and 1.5 dB/cm/MHz) and nonlinear coefficients (β = 0, 3.5, and 7). The resulting intensity fields were visualized using </a:t>
+            </a:r>
+            <a:r>
+              <a:rPr lang="en-US" sz="1600" dirty="0" err="1">
+                <a:latin typeface="Arial"/>
+              </a:rPr>
+              <a:t>ParaView</a:t>
+            </a:r>
+            <a:r>
+              <a:rPr lang="en-US" sz="1600" dirty="0">
+                <a:latin typeface="Arial"/>
+              </a:rPr>
+              <a:t>.</a:t>
+            </a:r>
+            <a:endParaRPr dirty="0"/>
           </a:p>
         </p:txBody>
       </p:sp>
       <p:pic>
         <p:nvPicPr>
-          <p:cNvPr id="77" name="" descr=""/>
+          <p:cNvPr id="77" name="Picture 76"/>
           <p:cNvPicPr/>
           <p:nvPr/>
         </p:nvPicPr>
         <p:blipFill>
-          <a:blip r:embed="rId10"/>
+          <a:blip r:embed="rId12"/>
           <a:stretch/>
         </p:blipFill>
         <p:spPr>
           <a:xfrm>
-            <a:off x="1920240" y="13758840"/>
-            <a:ext cx="4389120" cy="3383280"/>
+            <a:off x="2000250" y="13927987"/>
+            <a:ext cx="4137660" cy="3267000"/>
           </a:xfrm>
           <a:prstGeom prst="rect">
             <a:avLst/>
           </a:prstGeom>
           <a:ln>
-            <a:noFill/>
+            <a:solidFill>
+              <a:schemeClr val="tx1"/>
+            </a:solidFill>
           </a:ln>
         </p:spPr>
       </p:pic>
@@ -3041,7 +3791,7 @@
         </p:nvSpPr>
         <p:spPr>
           <a:xfrm>
-            <a:off x="2194560" y="17190720"/>
+            <a:off x="2103120" y="17245995"/>
             <a:ext cx="3931920" cy="316080"/>
           </a:xfrm>
           <a:prstGeom prst="rect">
@@ -3053,20 +3803,524 @@
           </a:ln>
         </p:spPr>
         <p:txBody>
-          <a:bodyPr lIns="90000" rIns="90000" tIns="45000" bIns="45000"/>
-          <a:p>
-            <a:r>
-              <a:rPr lang="en-US" sz="1600">
+          <a:bodyPr lIns="90000" tIns="45000" rIns="90000" bIns="45000"/>
+          <a:lstStyle/>
+          <a:p>
+            <a:r>
+              <a:rPr lang="en-US" sz="1600" dirty="0">
                 <a:latin typeface="Arial"/>
               </a:rPr>
               <a:t>Figure 2: Simulated Element Time Delays</a:t>
             </a:r>
-            <a:endParaRPr/>
-          </a:p>
-        </p:txBody>
-      </p:sp>
+            <a:endParaRPr dirty="0"/>
+          </a:p>
+        </p:txBody>
+      </p:sp>
+      <p:sp>
+        <p:nvSpPr>
+          <p:cNvPr id="2" name="TextBox 1"/>
+          <p:cNvSpPr txBox="1"/>
+          <p:nvPr/>
+        </p:nvSpPr>
+        <p:spPr>
+          <a:xfrm>
+            <a:off x="16943610" y="4260943"/>
+            <a:ext cx="712841" cy="369332"/>
+          </a:xfrm>
+          <a:prstGeom prst="rect">
+            <a:avLst/>
+          </a:prstGeom>
+          <a:noFill/>
+        </p:spPr>
+        <p:txBody>
+          <a:bodyPr wrap="square" rtlCol="0">
+            <a:spAutoFit/>
+          </a:bodyPr>
+          <a:lstStyle/>
+          <a:p>
+            <a:r>
+              <a:rPr lang="en-US" dirty="0"/>
+              <a:t>β = </a:t>
+            </a:r>
+            <a:r>
+              <a:rPr lang="en-US" dirty="0" smtClean="0"/>
+              <a:t>0</a:t>
+            </a:r>
+            <a:endParaRPr lang="en-US" dirty="0"/>
+          </a:p>
+        </p:txBody>
+      </p:sp>
+      <p:sp>
+        <p:nvSpPr>
+          <p:cNvPr id="3" name="Rectangle 2"/>
+          <p:cNvSpPr/>
+          <p:nvPr/>
+        </p:nvSpPr>
+        <p:spPr>
+          <a:xfrm>
+            <a:off x="19197610" y="4257592"/>
+            <a:ext cx="930910" cy="369332"/>
+          </a:xfrm>
+          <a:prstGeom prst="rect">
+            <a:avLst/>
+          </a:prstGeom>
+        </p:spPr>
+        <p:txBody>
+          <a:bodyPr wrap="square">
+            <a:spAutoFit/>
+          </a:bodyPr>
+          <a:lstStyle/>
+          <a:p>
+            <a:r>
+              <a:rPr lang="en-US" dirty="0"/>
+              <a:t>β = </a:t>
+            </a:r>
+            <a:r>
+              <a:rPr lang="en-US" dirty="0" smtClean="0"/>
+              <a:t>3.5 </a:t>
+            </a:r>
+            <a:endParaRPr lang="en-US" dirty="0"/>
+          </a:p>
+        </p:txBody>
+      </p:sp>
+      <p:sp>
+        <p:nvSpPr>
+          <p:cNvPr id="4" name="Rectangle 3"/>
+          <p:cNvSpPr/>
+          <p:nvPr/>
+        </p:nvSpPr>
+        <p:spPr>
+          <a:xfrm>
+            <a:off x="21669680" y="4257592"/>
+            <a:ext cx="772969" cy="369332"/>
+          </a:xfrm>
+          <a:prstGeom prst="rect">
+            <a:avLst/>
+          </a:prstGeom>
+        </p:spPr>
+        <p:txBody>
+          <a:bodyPr wrap="none">
+            <a:spAutoFit/>
+          </a:bodyPr>
+          <a:lstStyle/>
+          <a:p>
+            <a:r>
+              <a:rPr lang="en-US" dirty="0"/>
+              <a:t>β = </a:t>
+            </a:r>
+            <a:r>
+              <a:rPr lang="en-US" dirty="0" smtClean="0"/>
+              <a:t>7 </a:t>
+            </a:r>
+            <a:endParaRPr lang="en-US" dirty="0"/>
+          </a:p>
+        </p:txBody>
+      </p:sp>
+      <p:sp>
+        <p:nvSpPr>
+          <p:cNvPr id="33" name="TextBox 32"/>
+          <p:cNvSpPr txBox="1"/>
+          <p:nvPr/>
+        </p:nvSpPr>
+        <p:spPr>
+          <a:xfrm>
+            <a:off x="16943609" y="8305800"/>
+            <a:ext cx="712841" cy="369332"/>
+          </a:xfrm>
+          <a:prstGeom prst="rect">
+            <a:avLst/>
+          </a:prstGeom>
+          <a:noFill/>
+        </p:spPr>
+        <p:txBody>
+          <a:bodyPr wrap="square" rtlCol="0">
+            <a:spAutoFit/>
+          </a:bodyPr>
+          <a:lstStyle/>
+          <a:p>
+            <a:r>
+              <a:rPr lang="en-US" dirty="0"/>
+              <a:t>β = </a:t>
+            </a:r>
+            <a:r>
+              <a:rPr lang="en-US" dirty="0" smtClean="0"/>
+              <a:t>0</a:t>
+            </a:r>
+            <a:endParaRPr lang="en-US" dirty="0"/>
+          </a:p>
+        </p:txBody>
+      </p:sp>
+      <p:sp>
+        <p:nvSpPr>
+          <p:cNvPr id="34" name="Rectangle 33"/>
+          <p:cNvSpPr/>
+          <p:nvPr/>
+        </p:nvSpPr>
+        <p:spPr>
+          <a:xfrm>
+            <a:off x="19195146" y="8329936"/>
+            <a:ext cx="930910" cy="369332"/>
+          </a:xfrm>
+          <a:prstGeom prst="rect">
+            <a:avLst/>
+          </a:prstGeom>
+        </p:spPr>
+        <p:txBody>
+          <a:bodyPr wrap="square">
+            <a:spAutoFit/>
+          </a:bodyPr>
+          <a:lstStyle/>
+          <a:p>
+            <a:r>
+              <a:rPr lang="en-US" dirty="0"/>
+              <a:t>β = </a:t>
+            </a:r>
+            <a:r>
+              <a:rPr lang="en-US" dirty="0" smtClean="0"/>
+              <a:t>3.5 </a:t>
+            </a:r>
+            <a:endParaRPr lang="en-US" dirty="0"/>
+          </a:p>
+        </p:txBody>
+      </p:sp>
+      <p:sp>
+        <p:nvSpPr>
+          <p:cNvPr id="35" name="Rectangle 34"/>
+          <p:cNvSpPr/>
+          <p:nvPr/>
+        </p:nvSpPr>
+        <p:spPr>
+          <a:xfrm>
+            <a:off x="21669680" y="8329936"/>
+            <a:ext cx="772969" cy="369332"/>
+          </a:xfrm>
+          <a:prstGeom prst="rect">
+            <a:avLst/>
+          </a:prstGeom>
+        </p:spPr>
+        <p:txBody>
+          <a:bodyPr wrap="none">
+            <a:spAutoFit/>
+          </a:bodyPr>
+          <a:lstStyle/>
+          <a:p>
+            <a:r>
+              <a:rPr lang="en-US" dirty="0"/>
+              <a:t>β = </a:t>
+            </a:r>
+            <a:r>
+              <a:rPr lang="en-US" dirty="0" smtClean="0"/>
+              <a:t>7 </a:t>
+            </a:r>
+            <a:endParaRPr lang="en-US" dirty="0"/>
+          </a:p>
+        </p:txBody>
+      </p:sp>
+      <p:cxnSp>
+        <p:nvCxnSpPr>
+          <p:cNvPr id="8" name="Straight Connector 7"/>
+          <p:cNvCxnSpPr/>
+          <p:nvPr/>
+        </p:nvCxnSpPr>
+        <p:spPr>
+          <a:xfrm>
+            <a:off x="11056442" y="6416384"/>
+            <a:ext cx="184471" cy="1"/>
+          </a:xfrm>
+          <a:prstGeom prst="line">
+            <a:avLst/>
+          </a:prstGeom>
+        </p:spPr>
+        <p:style>
+          <a:lnRef idx="1">
+            <a:schemeClr val="accent1"/>
+          </a:lnRef>
+          <a:fillRef idx="0">
+            <a:schemeClr val="accent1"/>
+          </a:fillRef>
+          <a:effectRef idx="0">
+            <a:schemeClr val="accent1"/>
+          </a:effectRef>
+          <a:fontRef idx="minor">
+            <a:schemeClr val="tx1"/>
+          </a:fontRef>
+        </p:style>
+      </p:cxnSp>
+      <p:cxnSp>
+        <p:nvCxnSpPr>
+          <p:cNvPr id="10" name="Straight Connector 9"/>
+          <p:cNvCxnSpPr/>
+          <p:nvPr/>
+        </p:nvCxnSpPr>
+        <p:spPr>
+          <a:xfrm flipV="1">
+            <a:off x="11240913" y="4548077"/>
+            <a:ext cx="0" cy="1868307"/>
+          </a:xfrm>
+          <a:prstGeom prst="line">
+            <a:avLst/>
+          </a:prstGeom>
+        </p:spPr>
+        <p:style>
+          <a:lnRef idx="1">
+            <a:schemeClr val="accent1"/>
+          </a:lnRef>
+          <a:fillRef idx="0">
+            <a:schemeClr val="accent1"/>
+          </a:fillRef>
+          <a:effectRef idx="0">
+            <a:schemeClr val="accent1"/>
+          </a:effectRef>
+          <a:fontRef idx="minor">
+            <a:schemeClr val="tx1"/>
+          </a:fontRef>
+        </p:style>
+      </p:cxnSp>
+      <p:cxnSp>
+        <p:nvCxnSpPr>
+          <p:cNvPr id="13" name="Straight Connector 12"/>
+          <p:cNvCxnSpPr/>
+          <p:nvPr/>
+        </p:nvCxnSpPr>
+        <p:spPr>
+          <a:xfrm>
+            <a:off x="11240913" y="4548077"/>
+            <a:ext cx="408162" cy="0"/>
+          </a:xfrm>
+          <a:prstGeom prst="line">
+            <a:avLst/>
+          </a:prstGeom>
+        </p:spPr>
+        <p:style>
+          <a:lnRef idx="1">
+            <a:schemeClr val="accent1"/>
+          </a:lnRef>
+          <a:fillRef idx="0">
+            <a:schemeClr val="accent1"/>
+          </a:fillRef>
+          <a:effectRef idx="0">
+            <a:schemeClr val="accent1"/>
+          </a:effectRef>
+          <a:fontRef idx="minor">
+            <a:schemeClr val="tx1"/>
+          </a:fontRef>
+        </p:style>
+      </p:cxnSp>
+      <p:cxnSp>
+        <p:nvCxnSpPr>
+          <p:cNvPr id="15" name="Straight Connector 14"/>
+          <p:cNvCxnSpPr/>
+          <p:nvPr/>
+        </p:nvCxnSpPr>
+        <p:spPr>
+          <a:xfrm>
+            <a:off x="11240913" y="6416384"/>
+            <a:ext cx="0" cy="1889416"/>
+          </a:xfrm>
+          <a:prstGeom prst="line">
+            <a:avLst/>
+          </a:prstGeom>
+        </p:spPr>
+        <p:style>
+          <a:lnRef idx="1">
+            <a:schemeClr val="accent1"/>
+          </a:lnRef>
+          <a:fillRef idx="0">
+            <a:schemeClr val="accent1"/>
+          </a:fillRef>
+          <a:effectRef idx="0">
+            <a:schemeClr val="accent1"/>
+          </a:effectRef>
+          <a:fontRef idx="minor">
+            <a:schemeClr val="tx1"/>
+          </a:fontRef>
+        </p:style>
+      </p:cxnSp>
+      <p:cxnSp>
+        <p:nvCxnSpPr>
+          <p:cNvPr id="17" name="Straight Connector 16"/>
+          <p:cNvCxnSpPr/>
+          <p:nvPr/>
+        </p:nvCxnSpPr>
+        <p:spPr>
+          <a:xfrm>
+            <a:off x="11240913" y="8305800"/>
+            <a:ext cx="379587" cy="0"/>
+          </a:xfrm>
+          <a:prstGeom prst="line">
+            <a:avLst/>
+          </a:prstGeom>
+        </p:spPr>
+        <p:style>
+          <a:lnRef idx="1">
+            <a:schemeClr val="accent1"/>
+          </a:lnRef>
+          <a:fillRef idx="0">
+            <a:schemeClr val="accent1"/>
+          </a:fillRef>
+          <a:effectRef idx="0">
+            <a:schemeClr val="accent1"/>
+          </a:effectRef>
+          <a:fontRef idx="minor">
+            <a:schemeClr val="tx1"/>
+          </a:fontRef>
+        </p:style>
+      </p:cxnSp>
+      <p:cxnSp>
+        <p:nvCxnSpPr>
+          <p:cNvPr id="85" name="Straight Connector 84"/>
+          <p:cNvCxnSpPr/>
+          <p:nvPr/>
+        </p:nvCxnSpPr>
+        <p:spPr>
+          <a:xfrm>
+            <a:off x="11021876" y="10504372"/>
+            <a:ext cx="184471" cy="1"/>
+          </a:xfrm>
+          <a:prstGeom prst="line">
+            <a:avLst/>
+          </a:prstGeom>
+        </p:spPr>
+        <p:style>
+          <a:lnRef idx="1">
+            <a:schemeClr val="accent1"/>
+          </a:lnRef>
+          <a:fillRef idx="0">
+            <a:schemeClr val="accent1"/>
+          </a:fillRef>
+          <a:effectRef idx="0">
+            <a:schemeClr val="accent1"/>
+          </a:effectRef>
+          <a:fontRef idx="minor">
+            <a:schemeClr val="tx1"/>
+          </a:fontRef>
+        </p:style>
+      </p:cxnSp>
+      <p:cxnSp>
+        <p:nvCxnSpPr>
+          <p:cNvPr id="86" name="Straight Connector 85"/>
+          <p:cNvCxnSpPr/>
+          <p:nvPr/>
+        </p:nvCxnSpPr>
+        <p:spPr>
+          <a:xfrm flipV="1">
+            <a:off x="11206347" y="8636065"/>
+            <a:ext cx="0" cy="1868307"/>
+          </a:xfrm>
+          <a:prstGeom prst="line">
+            <a:avLst/>
+          </a:prstGeom>
+        </p:spPr>
+        <p:style>
+          <a:lnRef idx="1">
+            <a:schemeClr val="accent1"/>
+          </a:lnRef>
+          <a:fillRef idx="0">
+            <a:schemeClr val="accent1"/>
+          </a:fillRef>
+          <a:effectRef idx="0">
+            <a:schemeClr val="accent1"/>
+          </a:effectRef>
+          <a:fontRef idx="minor">
+            <a:schemeClr val="tx1"/>
+          </a:fontRef>
+        </p:style>
+      </p:cxnSp>
+      <p:cxnSp>
+        <p:nvCxnSpPr>
+          <p:cNvPr id="87" name="Straight Connector 86"/>
+          <p:cNvCxnSpPr/>
+          <p:nvPr/>
+        </p:nvCxnSpPr>
+        <p:spPr>
+          <a:xfrm>
+            <a:off x="11206347" y="8636065"/>
+            <a:ext cx="408162" cy="0"/>
+          </a:xfrm>
+          <a:prstGeom prst="line">
+            <a:avLst/>
+          </a:prstGeom>
+        </p:spPr>
+        <p:style>
+          <a:lnRef idx="1">
+            <a:schemeClr val="accent1"/>
+          </a:lnRef>
+          <a:fillRef idx="0">
+            <a:schemeClr val="accent1"/>
+          </a:fillRef>
+          <a:effectRef idx="0">
+            <a:schemeClr val="accent1"/>
+          </a:effectRef>
+          <a:fontRef idx="minor">
+            <a:schemeClr val="tx1"/>
+          </a:fontRef>
+        </p:style>
+      </p:cxnSp>
+      <p:cxnSp>
+        <p:nvCxnSpPr>
+          <p:cNvPr id="88" name="Straight Connector 87"/>
+          <p:cNvCxnSpPr/>
+          <p:nvPr/>
+        </p:nvCxnSpPr>
+        <p:spPr>
+          <a:xfrm>
+            <a:off x="11206347" y="10504372"/>
+            <a:ext cx="0" cy="1889416"/>
+          </a:xfrm>
+          <a:prstGeom prst="line">
+            <a:avLst/>
+          </a:prstGeom>
+        </p:spPr>
+        <p:style>
+          <a:lnRef idx="1">
+            <a:schemeClr val="accent1"/>
+          </a:lnRef>
+          <a:fillRef idx="0">
+            <a:schemeClr val="accent1"/>
+          </a:fillRef>
+          <a:effectRef idx="0">
+            <a:schemeClr val="accent1"/>
+          </a:effectRef>
+          <a:fontRef idx="minor">
+            <a:schemeClr val="tx1"/>
+          </a:fontRef>
+        </p:style>
+      </p:cxnSp>
+      <p:cxnSp>
+        <p:nvCxnSpPr>
+          <p:cNvPr id="89" name="Straight Connector 88"/>
+          <p:cNvCxnSpPr/>
+          <p:nvPr/>
+        </p:nvCxnSpPr>
+        <p:spPr>
+          <a:xfrm>
+            <a:off x="11206347" y="12393788"/>
+            <a:ext cx="379587" cy="0"/>
+          </a:xfrm>
+          <a:prstGeom prst="line">
+            <a:avLst/>
+          </a:prstGeom>
+        </p:spPr>
+        <p:style>
+          <a:lnRef idx="1">
+            <a:schemeClr val="accent1"/>
+          </a:lnRef>
+          <a:fillRef idx="0">
+            <a:schemeClr val="accent1"/>
+          </a:fillRef>
+          <a:effectRef idx="0">
+            <a:schemeClr val="accent1"/>
+          </a:effectRef>
+          <a:fontRef idx="minor">
+            <a:schemeClr val="tx1"/>
+          </a:fontRef>
+        </p:style>
+      </p:cxnSp>
     </p:spTree>
   </p:cSld>
+  <p:clrMapOvr>
+    <a:masterClrMapping/>
+  </p:clrMapOvr>
   <p:timing>
     <p:tnLst>
       <p:par>
@@ -3075,14 +4329,14 @@
             <p:seq>
               <p:cTn id="2" nodeType="mainSeq"/>
               <p:prevCondLst>
-                <p:cond delay="0" evt="onPrev">
+                <p:cond evt="onPrev" delay="0">
                   <p:tgtEl>
                     <p:sldTgt/>
                   </p:tgtEl>
                 </p:cond>
               </p:prevCondLst>
               <p:nextCondLst>
-                <p:cond delay="0" evt="onNext">
+                <p:cond evt="onNext" delay="0">
                   <p:tgtEl>
                     <p:sldTgt/>
                   </p:tgtEl>
@@ -3317,6 +4571,8 @@
       </a:bgFillStyleLst>
     </a:fmtScheme>
   </a:themeElements>
+  <a:objectDefaults/>
+  <a:extraClrSchemeLst/>
 </a:theme>
 </file>
 
@@ -3540,5 +4796,7 @@
       </a:bgFillStyleLst>
     </a:fmtScheme>
   </a:themeElements>
+  <a:objectDefaults/>
+  <a:extraClrSchemeLst/>
 </a:theme>
 </file>
</xml_diff>

<commit_message>
updated poster with more plots of a=1.0 dB/cm/MHz cases. also added conclusion
</commit_message>
<xml_diff>
--- a/presentations/nc_bmes_sympo/nc_bmes_sympo.pptx
+++ b/presentations/nc_bmes_sympo/nc_bmes_sympo.pptx
@@ -1,409 +1,22 @@
 
 <file path=ppt/presentation.xml><?xml version="1.0" encoding="utf-8"?>
-<p:presentation xmlns:a="http://schemas.openxmlformats.org/drawingml/2006/main" xmlns:r="http://schemas.openxmlformats.org/officeDocument/2006/relationships" xmlns:p="http://schemas.openxmlformats.org/presentationml/2006/main">
+<p:presentation xmlns:a="http://schemas.openxmlformats.org/drawingml/2006/main" xmlns:p="http://schemas.openxmlformats.org/presentationml/2006/main" xmlns:r="http://schemas.openxmlformats.org/officeDocument/2006/relationships">
   <p:sldMasterIdLst>
-    <p:sldMasterId id="2147483648" r:id="rId1"/>
+    <p:sldMasterId id="2147483648" r:id="rId2"/>
   </p:sldMasterIdLst>
   <p:notesMasterIdLst>
     <p:notesMasterId r:id="rId3"/>
   </p:notesMasterIdLst>
   <p:sldIdLst>
-    <p:sldId id="256" r:id="rId2"/>
+    <p:sldId id="256" r:id="rId4"/>
   </p:sldIdLst>
   <p:sldSz cx="32918400" cy="19202400"/>
-  <p:notesSz cx="6980238" cy="9144000"/>
-  <p:defaultTextStyle>
-    <a:defPPr>
-      <a:defRPr lang="en-US"/>
-    </a:defPPr>
-    <a:lvl1pPr marL="0" algn="l" defTabSz="914400" rtl="0" eaLnBrk="1" latinLnBrk="0" hangingPunct="1">
-      <a:defRPr sz="1800" kern="1200">
-        <a:solidFill>
-          <a:schemeClr val="tx1"/>
-        </a:solidFill>
-        <a:latin typeface="+mn-lt"/>
-        <a:ea typeface="+mn-ea"/>
-        <a:cs typeface="+mn-cs"/>
-      </a:defRPr>
-    </a:lvl1pPr>
-    <a:lvl2pPr marL="457200" algn="l" defTabSz="914400" rtl="0" eaLnBrk="1" latinLnBrk="0" hangingPunct="1">
-      <a:defRPr sz="1800" kern="1200">
-        <a:solidFill>
-          <a:schemeClr val="tx1"/>
-        </a:solidFill>
-        <a:latin typeface="+mn-lt"/>
-        <a:ea typeface="+mn-ea"/>
-        <a:cs typeface="+mn-cs"/>
-      </a:defRPr>
-    </a:lvl2pPr>
-    <a:lvl3pPr marL="914400" algn="l" defTabSz="914400" rtl="0" eaLnBrk="1" latinLnBrk="0" hangingPunct="1">
-      <a:defRPr sz="1800" kern="1200">
-        <a:solidFill>
-          <a:schemeClr val="tx1"/>
-        </a:solidFill>
-        <a:latin typeface="+mn-lt"/>
-        <a:ea typeface="+mn-ea"/>
-        <a:cs typeface="+mn-cs"/>
-      </a:defRPr>
-    </a:lvl3pPr>
-    <a:lvl4pPr marL="1371600" algn="l" defTabSz="914400" rtl="0" eaLnBrk="1" latinLnBrk="0" hangingPunct="1">
-      <a:defRPr sz="1800" kern="1200">
-        <a:solidFill>
-          <a:schemeClr val="tx1"/>
-        </a:solidFill>
-        <a:latin typeface="+mn-lt"/>
-        <a:ea typeface="+mn-ea"/>
-        <a:cs typeface="+mn-cs"/>
-      </a:defRPr>
-    </a:lvl4pPr>
-    <a:lvl5pPr marL="1828800" algn="l" defTabSz="914400" rtl="0" eaLnBrk="1" latinLnBrk="0" hangingPunct="1">
-      <a:defRPr sz="1800" kern="1200">
-        <a:solidFill>
-          <a:schemeClr val="tx1"/>
-        </a:solidFill>
-        <a:latin typeface="+mn-lt"/>
-        <a:ea typeface="+mn-ea"/>
-        <a:cs typeface="+mn-cs"/>
-      </a:defRPr>
-    </a:lvl5pPr>
-    <a:lvl6pPr marL="2286000" algn="l" defTabSz="914400" rtl="0" eaLnBrk="1" latinLnBrk="0" hangingPunct="1">
-      <a:defRPr sz="1800" kern="1200">
-        <a:solidFill>
-          <a:schemeClr val="tx1"/>
-        </a:solidFill>
-        <a:latin typeface="+mn-lt"/>
-        <a:ea typeface="+mn-ea"/>
-        <a:cs typeface="+mn-cs"/>
-      </a:defRPr>
-    </a:lvl6pPr>
-    <a:lvl7pPr marL="2743200" algn="l" defTabSz="914400" rtl="0" eaLnBrk="1" latinLnBrk="0" hangingPunct="1">
-      <a:defRPr sz="1800" kern="1200">
-        <a:solidFill>
-          <a:schemeClr val="tx1"/>
-        </a:solidFill>
-        <a:latin typeface="+mn-lt"/>
-        <a:ea typeface="+mn-ea"/>
-        <a:cs typeface="+mn-cs"/>
-      </a:defRPr>
-    </a:lvl7pPr>
-    <a:lvl8pPr marL="3200400" algn="l" defTabSz="914400" rtl="0" eaLnBrk="1" latinLnBrk="0" hangingPunct="1">
-      <a:defRPr sz="1800" kern="1200">
-        <a:solidFill>
-          <a:schemeClr val="tx1"/>
-        </a:solidFill>
-        <a:latin typeface="+mn-lt"/>
-        <a:ea typeface="+mn-ea"/>
-        <a:cs typeface="+mn-cs"/>
-      </a:defRPr>
-    </a:lvl8pPr>
-    <a:lvl9pPr marL="3657600" algn="l" defTabSz="914400" rtl="0" eaLnBrk="1" latinLnBrk="0" hangingPunct="1">
-      <a:defRPr sz="1800" kern="1200">
-        <a:solidFill>
-          <a:schemeClr val="tx1"/>
-        </a:solidFill>
-        <a:latin typeface="+mn-lt"/>
-        <a:ea typeface="+mn-ea"/>
-        <a:cs typeface="+mn-cs"/>
-      </a:defRPr>
-    </a:lvl9pPr>
-  </p:defaultTextStyle>
+  <p:notesSz cx="6980237" cy="9144000"/>
 </p:presentation>
 </file>
 
 <file path=ppt/notesMasters/notesMaster1.xml><?xml version="1.0" encoding="utf-8"?>
-<p:notesMaster xmlns:a="http://schemas.openxmlformats.org/drawingml/2006/main" xmlns:r="http://schemas.openxmlformats.org/officeDocument/2006/relationships" xmlns:p="http://schemas.openxmlformats.org/presentationml/2006/main">
-  <p:cSld>
-    <p:bg>
-      <p:bgRef idx="1001">
-        <a:schemeClr val="bg1"/>
-      </p:bgRef>
-    </p:bg>
-    <p:spTree>
-      <p:nvGrpSpPr>
-        <p:cNvPr id="1" name=""/>
-        <p:cNvGrpSpPr/>
-        <p:nvPr/>
-      </p:nvGrpSpPr>
-      <p:grpSpPr>
-        <a:xfrm>
-          <a:off x="0" y="0"/>
-          <a:ext cx="0" cy="0"/>
-          <a:chOff x="0" y="0"/>
-          <a:chExt cx="0" cy="0"/>
-        </a:xfrm>
-      </p:grpSpPr>
-      <p:sp>
-        <p:nvSpPr>
-          <p:cNvPr id="46" name="PlaceHolder 1"/>
-          <p:cNvSpPr>
-            <a:spLocks noGrp="1"/>
-          </p:cNvSpPr>
-          <p:nvPr>
-            <p:ph type="body"/>
-          </p:nvPr>
-        </p:nvSpPr>
-        <p:spPr>
-          <a:xfrm>
-            <a:off x="777240" y="4777560"/>
-            <a:ext cx="6217560" cy="4525920"/>
-          </a:xfrm>
-          <a:prstGeom prst="rect">
-            <a:avLst/>
-          </a:prstGeom>
-        </p:spPr>
-        <p:txBody>
-          <a:bodyPr lIns="0" tIns="0" rIns="0" bIns="0"/>
-          <a:lstStyle/>
-          <a:p>
-            <a:r>
-              <a:rPr lang="en-US" sz="2000">
-                <a:latin typeface="Arial"/>
-              </a:rPr>
-              <a:t>Click to edit the notes format</a:t>
-            </a:r>
-            <a:endParaRPr/>
-          </a:p>
-        </p:txBody>
-      </p:sp>
-      <p:sp>
-        <p:nvSpPr>
-          <p:cNvPr id="47" name="PlaceHolder 2"/>
-          <p:cNvSpPr>
-            <a:spLocks noGrp="1"/>
-          </p:cNvSpPr>
-          <p:nvPr>
-            <p:ph type="hdr"/>
-          </p:nvPr>
-        </p:nvSpPr>
-        <p:spPr>
-          <a:xfrm>
-            <a:off x="0" y="0"/>
-            <a:ext cx="3372840" cy="502560"/>
-          </a:xfrm>
-          <a:prstGeom prst="rect">
-            <a:avLst/>
-          </a:prstGeom>
-        </p:spPr>
-        <p:txBody>
-          <a:bodyPr lIns="0" tIns="0" rIns="0" bIns="0"/>
-          <a:lstStyle/>
-          <a:p>
-            <a:r>
-              <a:rPr lang="en-US" sz="1400">
-                <a:latin typeface="Times New Roman"/>
-              </a:rPr>
-              <a:t>&lt;header&gt;</a:t>
-            </a:r>
-            <a:endParaRPr/>
-          </a:p>
-        </p:txBody>
-      </p:sp>
-      <p:sp>
-        <p:nvSpPr>
-          <p:cNvPr id="48" name="PlaceHolder 3"/>
-          <p:cNvSpPr>
-            <a:spLocks noGrp="1"/>
-          </p:cNvSpPr>
-          <p:nvPr>
-            <p:ph type="dt"/>
-          </p:nvPr>
-        </p:nvSpPr>
-        <p:spPr>
-          <a:xfrm>
-            <a:off x="4399200" y="0"/>
-            <a:ext cx="3372840" cy="502560"/>
-          </a:xfrm>
-          <a:prstGeom prst="rect">
-            <a:avLst/>
-          </a:prstGeom>
-        </p:spPr>
-        <p:txBody>
-          <a:bodyPr lIns="0" tIns="0" rIns="0" bIns="0"/>
-          <a:lstStyle/>
-          <a:p>
-            <a:pPr algn="r"/>
-            <a:r>
-              <a:rPr lang="en-US" sz="1400">
-                <a:latin typeface="Times New Roman"/>
-              </a:rPr>
-              <a:t>&lt;date/time&gt;</a:t>
-            </a:r>
-            <a:endParaRPr/>
-          </a:p>
-        </p:txBody>
-      </p:sp>
-      <p:sp>
-        <p:nvSpPr>
-          <p:cNvPr id="49" name="PlaceHolder 4"/>
-          <p:cNvSpPr>
-            <a:spLocks noGrp="1"/>
-          </p:cNvSpPr>
-          <p:nvPr>
-            <p:ph type="ftr"/>
-          </p:nvPr>
-        </p:nvSpPr>
-        <p:spPr>
-          <a:xfrm>
-            <a:off x="0" y="9555480"/>
-            <a:ext cx="3372840" cy="502560"/>
-          </a:xfrm>
-          <a:prstGeom prst="rect">
-            <a:avLst/>
-          </a:prstGeom>
-        </p:spPr>
-        <p:txBody>
-          <a:bodyPr lIns="0" tIns="0" rIns="0" bIns="0" anchor="b"/>
-          <a:lstStyle/>
-          <a:p>
-            <a:r>
-              <a:rPr lang="en-US" sz="1400">
-                <a:latin typeface="Times New Roman"/>
-              </a:rPr>
-              <a:t>&lt;footer&gt;</a:t>
-            </a:r>
-            <a:endParaRPr/>
-          </a:p>
-        </p:txBody>
-      </p:sp>
-      <p:sp>
-        <p:nvSpPr>
-          <p:cNvPr id="50" name="PlaceHolder 5"/>
-          <p:cNvSpPr>
-            <a:spLocks noGrp="1"/>
-          </p:cNvSpPr>
-          <p:nvPr>
-            <p:ph type="sldNum"/>
-          </p:nvPr>
-        </p:nvSpPr>
-        <p:spPr>
-          <a:xfrm>
-            <a:off x="4399200" y="9555480"/>
-            <a:ext cx="3372840" cy="502560"/>
-          </a:xfrm>
-          <a:prstGeom prst="rect">
-            <a:avLst/>
-          </a:prstGeom>
-        </p:spPr>
-        <p:txBody>
-          <a:bodyPr lIns="0" tIns="0" rIns="0" bIns="0" anchor="b"/>
-          <a:lstStyle/>
-          <a:p>
-            <a:pPr algn="r"/>
-            <a:fld id="{AEEC5A99-F4DE-4440-8F7F-7156E8958592}" type="slidenum">
-              <a:rPr lang="en-US" sz="1400">
-                <a:latin typeface="Times New Roman"/>
-              </a:rPr>
-              <a:t>‹#›</a:t>
-            </a:fld>
-            <a:endParaRPr/>
-          </a:p>
-        </p:txBody>
-      </p:sp>
-    </p:spTree>
-    <p:extLst>
-      <p:ext uri="{BB962C8B-B14F-4D97-AF65-F5344CB8AC3E}">
-        <p14:creationId xmlns:p14="http://schemas.microsoft.com/office/powerpoint/2010/main" val="4194691798"/>
-      </p:ext>
-    </p:extLst>
-  </p:cSld>
-  <p:clrMap bg1="lt1" tx1="dk1" bg2="lt2" tx2="dk2" accent1="accent1" accent2="accent2" accent3="accent3" accent4="accent4" accent5="accent5" accent6="accent6" hlink="hlink" folHlink="folHlink"/>
-  <p:notesStyle>
-    <a:lvl1pPr marL="0" algn="l" defTabSz="914400" rtl="0" eaLnBrk="1" latinLnBrk="0" hangingPunct="1">
-      <a:defRPr sz="1200" kern="1200">
-        <a:solidFill>
-          <a:schemeClr val="tx1"/>
-        </a:solidFill>
-        <a:latin typeface="+mn-lt"/>
-        <a:ea typeface="+mn-ea"/>
-        <a:cs typeface="+mn-cs"/>
-      </a:defRPr>
-    </a:lvl1pPr>
-    <a:lvl2pPr marL="457200" algn="l" defTabSz="914400" rtl="0" eaLnBrk="1" latinLnBrk="0" hangingPunct="1">
-      <a:defRPr sz="1200" kern="1200">
-        <a:solidFill>
-          <a:schemeClr val="tx1"/>
-        </a:solidFill>
-        <a:latin typeface="+mn-lt"/>
-        <a:ea typeface="+mn-ea"/>
-        <a:cs typeface="+mn-cs"/>
-      </a:defRPr>
-    </a:lvl2pPr>
-    <a:lvl3pPr marL="914400" algn="l" defTabSz="914400" rtl="0" eaLnBrk="1" latinLnBrk="0" hangingPunct="1">
-      <a:defRPr sz="1200" kern="1200">
-        <a:solidFill>
-          <a:schemeClr val="tx1"/>
-        </a:solidFill>
-        <a:latin typeface="+mn-lt"/>
-        <a:ea typeface="+mn-ea"/>
-        <a:cs typeface="+mn-cs"/>
-      </a:defRPr>
-    </a:lvl3pPr>
-    <a:lvl4pPr marL="1371600" algn="l" defTabSz="914400" rtl="0" eaLnBrk="1" latinLnBrk="0" hangingPunct="1">
-      <a:defRPr sz="1200" kern="1200">
-        <a:solidFill>
-          <a:schemeClr val="tx1"/>
-        </a:solidFill>
-        <a:latin typeface="+mn-lt"/>
-        <a:ea typeface="+mn-ea"/>
-        <a:cs typeface="+mn-cs"/>
-      </a:defRPr>
-    </a:lvl4pPr>
-    <a:lvl5pPr marL="1828800" algn="l" defTabSz="914400" rtl="0" eaLnBrk="1" latinLnBrk="0" hangingPunct="1">
-      <a:defRPr sz="1200" kern="1200">
-        <a:solidFill>
-          <a:schemeClr val="tx1"/>
-        </a:solidFill>
-        <a:latin typeface="+mn-lt"/>
-        <a:ea typeface="+mn-ea"/>
-        <a:cs typeface="+mn-cs"/>
-      </a:defRPr>
-    </a:lvl5pPr>
-    <a:lvl6pPr marL="2286000" algn="l" defTabSz="914400" rtl="0" eaLnBrk="1" latinLnBrk="0" hangingPunct="1">
-      <a:defRPr sz="1200" kern="1200">
-        <a:solidFill>
-          <a:schemeClr val="tx1"/>
-        </a:solidFill>
-        <a:latin typeface="+mn-lt"/>
-        <a:ea typeface="+mn-ea"/>
-        <a:cs typeface="+mn-cs"/>
-      </a:defRPr>
-    </a:lvl6pPr>
-    <a:lvl7pPr marL="2743200" algn="l" defTabSz="914400" rtl="0" eaLnBrk="1" latinLnBrk="0" hangingPunct="1">
-      <a:defRPr sz="1200" kern="1200">
-        <a:solidFill>
-          <a:schemeClr val="tx1"/>
-        </a:solidFill>
-        <a:latin typeface="+mn-lt"/>
-        <a:ea typeface="+mn-ea"/>
-        <a:cs typeface="+mn-cs"/>
-      </a:defRPr>
-    </a:lvl7pPr>
-    <a:lvl8pPr marL="3200400" algn="l" defTabSz="914400" rtl="0" eaLnBrk="1" latinLnBrk="0" hangingPunct="1">
-      <a:defRPr sz="1200" kern="1200">
-        <a:solidFill>
-          <a:schemeClr val="tx1"/>
-        </a:solidFill>
-        <a:latin typeface="+mn-lt"/>
-        <a:ea typeface="+mn-ea"/>
-        <a:cs typeface="+mn-cs"/>
-      </a:defRPr>
-    </a:lvl8pPr>
-    <a:lvl9pPr marL="3657600" algn="l" defTabSz="914400" rtl="0" eaLnBrk="1" latinLnBrk="0" hangingPunct="1">
-      <a:defRPr sz="1200" kern="1200">
-        <a:solidFill>
-          <a:schemeClr val="tx1"/>
-        </a:solidFill>
-        <a:latin typeface="+mn-lt"/>
-        <a:ea typeface="+mn-ea"/>
-        <a:cs typeface="+mn-cs"/>
-      </a:defRPr>
-    </a:lvl9pPr>
-  </p:notesStyle>
-</p:notesMaster>
-</file>
-
-<file path=ppt/notesSlides/notesSlide1.xml><?xml version="1.0" encoding="utf-8"?>
-<p:notes xmlns:a="http://schemas.openxmlformats.org/drawingml/2006/main" xmlns:r="http://schemas.openxmlformats.org/officeDocument/2006/relationships" xmlns:p="http://schemas.openxmlformats.org/presentationml/2006/main">
+<p:notesMaster xmlns:a="http://schemas.openxmlformats.org/drawingml/2006/main" xmlns:p="http://schemas.openxmlformats.org/presentationml/2006/main" xmlns:r="http://schemas.openxmlformats.org/officeDocument/2006/relationships">
   <p:cSld>
     <p:spTree>
       <p:nvGrpSpPr>
@@ -421,60 +34,7 @@
       </p:grpSpPr>
       <p:sp>
         <p:nvSpPr>
-          <p:cNvPr id="79" name="CustomShape 1"/>
-          <p:cNvSpPr/>
-          <p:nvPr/>
-        </p:nvSpPr>
-        <p:spPr>
-          <a:xfrm>
-            <a:off x="3954600" y="8685360"/>
-            <a:ext cx="3022920" cy="455760"/>
-          </a:xfrm>
-          <a:prstGeom prst="rect">
-            <a:avLst/>
-          </a:prstGeom>
-          <a:noFill/>
-          <a:ln>
-            <a:noFill/>
-          </a:ln>
-        </p:spPr>
-        <p:style>
-          <a:lnRef idx="0">
-            <a:scrgbClr r="0" g="0" b="0"/>
-          </a:lnRef>
-          <a:fillRef idx="0">
-            <a:scrgbClr r="0" g="0" b="0"/>
-          </a:fillRef>
-          <a:effectRef idx="0">
-            <a:scrgbClr r="0" g="0" b="0"/>
-          </a:effectRef>
-          <a:fontRef idx="minor"/>
-        </p:style>
-        <p:txBody>
-          <a:bodyPr lIns="90000" tIns="45000" rIns="90000" bIns="45000" anchor="b"/>
-          <a:lstStyle/>
-          <a:p>
-            <a:pPr algn="r">
-              <a:lnSpc>
-                <a:spcPct val="100000"/>
-              </a:lnSpc>
-            </a:pPr>
-            <a:fld id="{B1DD043B-C6F4-4A82-92B9-F76576D43F0E}" type="slidenum">
-              <a:rPr lang="en-US" sz="1200" strike="noStrike">
-                <a:solidFill>
-                  <a:srgbClr val="000000"/>
-                </a:solidFill>
-                <a:latin typeface="Arial"/>
-              </a:rPr>
-              <a:t>1</a:t>
-            </a:fld>
-            <a:endParaRPr/>
-          </a:p>
-        </p:txBody>
-      </p:sp>
-      <p:sp>
-        <p:nvSpPr>
-          <p:cNvPr id="80" name="PlaceHolder 2"/>
+          <p:cNvPr id="46" name="PlaceHolder 1"/>
           <p:cNvSpPr>
             <a:spLocks noGrp="1"/>
           </p:cNvSpPr>
@@ -484,36 +44,259 @@
         </p:nvSpPr>
         <p:spPr>
           <a:xfrm>
+            <a:off x="777240" y="4777560"/>
+            <a:ext cx="6217560" cy="4525920"/>
+          </a:xfrm>
+          <a:prstGeom prst="rect">
+            <a:avLst/>
+          </a:prstGeom>
+        </p:spPr>
+        <p:txBody>
+          <a:bodyPr lIns="0" rIns="0" tIns="0" bIns="0"/>
+          <a:p>
+            <a:r>
+              <a:rPr lang="en-US" sz="2000">
+                <a:latin typeface="Arial"/>
+              </a:rPr>
+              <a:t>Click to edit the notes format</a:t>
+            </a:r>
+            <a:endParaRPr/>
+          </a:p>
+        </p:txBody>
+      </p:sp>
+      <p:sp>
+        <p:nvSpPr>
+          <p:cNvPr id="47" name="PlaceHolder 2"/>
+          <p:cNvSpPr>
+            <a:spLocks noGrp="1"/>
+          </p:cNvSpPr>
+          <p:nvPr>
+            <p:ph type="hdr"/>
+          </p:nvPr>
+        </p:nvSpPr>
+        <p:spPr>
+          <a:xfrm>
+            <a:off x="0" y="0"/>
+            <a:ext cx="3372840" cy="502560"/>
+          </a:xfrm>
+          <a:prstGeom prst="rect">
+            <a:avLst/>
+          </a:prstGeom>
+        </p:spPr>
+        <p:txBody>
+          <a:bodyPr lIns="0" rIns="0" tIns="0" bIns="0"/>
+          <a:p>
+            <a:r>
+              <a:rPr lang="en-US" sz="1400">
+                <a:latin typeface="Times New Roman"/>
+              </a:rPr>
+              <a:t>&lt;header&gt;</a:t>
+            </a:r>
+            <a:endParaRPr/>
+          </a:p>
+        </p:txBody>
+      </p:sp>
+      <p:sp>
+        <p:nvSpPr>
+          <p:cNvPr id="48" name="PlaceHolder 3"/>
+          <p:cNvSpPr>
+            <a:spLocks noGrp="1"/>
+          </p:cNvSpPr>
+          <p:nvPr>
+            <p:ph type="dt"/>
+          </p:nvPr>
+        </p:nvSpPr>
+        <p:spPr>
+          <a:xfrm>
+            <a:off x="4399200" y="0"/>
+            <a:ext cx="3372840" cy="502560"/>
+          </a:xfrm>
+          <a:prstGeom prst="rect">
+            <a:avLst/>
+          </a:prstGeom>
+        </p:spPr>
+        <p:txBody>
+          <a:bodyPr lIns="0" rIns="0" tIns="0" bIns="0"/>
+          <a:p>
+            <a:pPr algn="r"/>
+            <a:r>
+              <a:rPr lang="en-US" sz="1400">
+                <a:latin typeface="Times New Roman"/>
+              </a:rPr>
+              <a:t>&lt;date/time&gt;</a:t>
+            </a:r>
+            <a:endParaRPr/>
+          </a:p>
+        </p:txBody>
+      </p:sp>
+      <p:sp>
+        <p:nvSpPr>
+          <p:cNvPr id="49" name="PlaceHolder 4"/>
+          <p:cNvSpPr>
+            <a:spLocks noGrp="1"/>
+          </p:cNvSpPr>
+          <p:nvPr>
+            <p:ph type="ftr"/>
+          </p:nvPr>
+        </p:nvSpPr>
+        <p:spPr>
+          <a:xfrm>
+            <a:off x="0" y="9555480"/>
+            <a:ext cx="3372840" cy="502560"/>
+          </a:xfrm>
+          <a:prstGeom prst="rect">
+            <a:avLst/>
+          </a:prstGeom>
+        </p:spPr>
+        <p:txBody>
+          <a:bodyPr lIns="0" rIns="0" tIns="0" bIns="0" anchor="b"/>
+          <a:p>
+            <a:r>
+              <a:rPr lang="en-US" sz="1400">
+                <a:latin typeface="Times New Roman"/>
+              </a:rPr>
+              <a:t>&lt;footer&gt;</a:t>
+            </a:r>
+            <a:endParaRPr/>
+          </a:p>
+        </p:txBody>
+      </p:sp>
+      <p:sp>
+        <p:nvSpPr>
+          <p:cNvPr id="50" name="PlaceHolder 5"/>
+          <p:cNvSpPr>
+            <a:spLocks noGrp="1"/>
+          </p:cNvSpPr>
+          <p:nvPr>
+            <p:ph type="sldNum"/>
+          </p:nvPr>
+        </p:nvSpPr>
+        <p:spPr>
+          <a:xfrm>
+            <a:off x="4399200" y="9555480"/>
+            <a:ext cx="3372840" cy="502560"/>
+          </a:xfrm>
+          <a:prstGeom prst="rect">
+            <a:avLst/>
+          </a:prstGeom>
+        </p:spPr>
+        <p:txBody>
+          <a:bodyPr lIns="0" rIns="0" tIns="0" bIns="0" anchor="b"/>
+          <a:p>
+            <a:pPr algn="r"/>
+            <a:fld id="{9E7EB633-4B69-4047-B30B-4BFD6B6F331B}" type="slidenum">
+              <a:rPr lang="en-US" sz="1400">
+                <a:latin typeface="Times New Roman"/>
+              </a:rPr>
+              <a:t>&lt;number&gt;</a:t>
+            </a:fld>
+            <a:endParaRPr/>
+          </a:p>
+        </p:txBody>
+      </p:sp>
+    </p:spTree>
+  </p:cSld>
+  <p:clrMap bg1="lt1" bg2="lt2" tx1="dk1" tx2="dk2" accent1="accent1" accent2="accent2" accent3="accent3" accent4="accent4" accent5="accent5" accent6="accent6" hlink="hlink" folHlink="folHlink"/>
+</p:notesMaster>
+</file>
+
+<file path=ppt/notesSlides/notesSlide1.xml><?xml version="1.0" encoding="utf-8"?>
+<p:notes xmlns:a="http://schemas.openxmlformats.org/drawingml/2006/main" xmlns:p="http://schemas.openxmlformats.org/presentationml/2006/main" xmlns:r="http://schemas.openxmlformats.org/officeDocument/2006/relationships">
+  <p:cSld>
+    <p:spTree>
+      <p:nvGrpSpPr>
+        <p:cNvPr id="1" name=""/>
+        <p:cNvGrpSpPr/>
+        <p:nvPr/>
+      </p:nvGrpSpPr>
+      <p:grpSpPr>
+        <a:xfrm>
+          <a:off x="0" y="0"/>
+          <a:ext cx="0" cy="0"/>
+          <a:chOff x="0" y="0"/>
+          <a:chExt cx="0" cy="0"/>
+        </a:xfrm>
+      </p:grpSpPr>
+      <p:sp>
+        <p:nvSpPr>
+          <p:cNvPr id="99" name="CustomShape 1"/>
+          <p:cNvSpPr/>
+          <p:nvPr/>
+        </p:nvSpPr>
+        <p:spPr>
+          <a:xfrm>
+            <a:off x="3954600" y="8685360"/>
+            <a:ext cx="3022560" cy="455400"/>
+          </a:xfrm>
+          <a:prstGeom prst="rect">
+            <a:avLst/>
+          </a:prstGeom>
+          <a:noFill/>
+          <a:ln>
+            <a:noFill/>
+          </a:ln>
+        </p:spPr>
+        <p:style>
+          <a:lnRef idx="0"/>
+          <a:fillRef idx="0"/>
+          <a:effectRef idx="0"/>
+          <a:fontRef idx="minor"/>
+        </p:style>
+        <p:txBody>
+          <a:bodyPr lIns="90000" rIns="90000" tIns="45000" bIns="45000" anchor="b"/>
+          <a:p>
+            <a:pPr algn="r">
+              <a:lnSpc>
+                <a:spcPct val="100000"/>
+              </a:lnSpc>
+            </a:pPr>
+            <a:fld id="{1D76AF32-4705-4CB4-BC5F-FF9078326EE8}" type="slidenum">
+              <a:rPr lang="en-US" sz="1200" strike="noStrike">
+                <a:solidFill>
+                  <a:srgbClr val="000000"/>
+                </a:solidFill>
+                <a:latin typeface="Arial"/>
+                <a:ea typeface="+mn-ea"/>
+              </a:rPr>
+              <a:t>&lt;number&gt;</a:t>
+            </a:fld>
+            <a:endParaRPr/>
+          </a:p>
+        </p:txBody>
+      </p:sp>
+      <p:sp>
+        <p:nvSpPr>
+          <p:cNvPr id="100" name="PlaceHolder 2"/>
+          <p:cNvSpPr>
+            <a:spLocks noGrp="1"/>
+          </p:cNvSpPr>
+          <p:nvPr>
+            <p:ph type="body"/>
+          </p:nvPr>
+        </p:nvSpPr>
+        <p:spPr>
+          <a:xfrm>
             <a:off x="698400" y="4343400"/>
-            <a:ext cx="5581800" cy="4113360"/>
-          </a:xfrm>
-          <a:prstGeom prst="rect">
-            <a:avLst/>
-          </a:prstGeom>
-        </p:spPr>
-        <p:txBody>
-          <a:bodyPr lIns="0" tIns="0" rIns="0" bIns="0"/>
-          <a:lstStyle/>
-          <a:p>
-            <a:endParaRPr dirty="0"/>
+            <a:ext cx="5581440" cy="4113000"/>
+          </a:xfrm>
+          <a:prstGeom prst="rect">
+            <a:avLst/>
+          </a:prstGeom>
+        </p:spPr>
+        <p:txBody>
+          <a:bodyPr lIns="0" rIns="0" tIns="0" bIns="0"/>
+          <a:p>
+            <a:endParaRPr/>
           </a:p>
         </p:txBody>
       </p:sp>
     </p:spTree>
-    <p:extLst>
-      <p:ext uri="{BB962C8B-B14F-4D97-AF65-F5344CB8AC3E}">
-        <p14:creationId xmlns:p14="http://schemas.microsoft.com/office/powerpoint/2010/main" val="2279249999"/>
-      </p:ext>
-    </p:extLst>
   </p:cSld>
-  <p:clrMapOvr>
-    <a:masterClrMapping/>
-  </p:clrMapOvr>
 </p:notes>
 </file>
 
 <file path=ppt/slideLayouts/slideLayout1.xml><?xml version="1.0" encoding="utf-8"?>
-<p:sldLayout xmlns:a="http://schemas.openxmlformats.org/drawingml/2006/main" xmlns:r="http://schemas.openxmlformats.org/officeDocument/2006/relationships" xmlns:p="http://schemas.openxmlformats.org/presentationml/2006/main" type="blank" preserve="1">
+<p:sldLayout xmlns:a="http://schemas.openxmlformats.org/drawingml/2006/main" xmlns:p="http://schemas.openxmlformats.org/presentationml/2006/main" xmlns:r="http://schemas.openxmlformats.org/officeDocument/2006/relationships" type="blank" preserve="1">
   <p:cSld name="Blank Slide">
     <p:spTree>
       <p:nvGrpSpPr>
@@ -531,14 +314,11 @@
       </p:grpSpPr>
     </p:spTree>
   </p:cSld>
-  <p:clrMapOvr>
-    <a:masterClrMapping/>
-  </p:clrMapOvr>
 </p:sldLayout>
 </file>
 
 <file path=ppt/slideLayouts/slideLayout10.xml><?xml version="1.0" encoding="utf-8"?>
-<p:sldLayout xmlns:a="http://schemas.openxmlformats.org/drawingml/2006/main" xmlns:r="http://schemas.openxmlformats.org/officeDocument/2006/relationships" xmlns:p="http://schemas.openxmlformats.org/presentationml/2006/main" type="objOverTx" preserve="1">
+<p:sldLayout xmlns:a="http://schemas.openxmlformats.org/drawingml/2006/main" xmlns:p="http://schemas.openxmlformats.org/presentationml/2006/main" xmlns:r="http://schemas.openxmlformats.org/officeDocument/2006/relationships" type="objOverTx" preserve="1">
   <p:cSld name="Title, Content over Content">
     <p:spTree>
       <p:nvGrpSpPr>
@@ -574,10 +354,8 @@
           </a:prstGeom>
         </p:spPr>
         <p:txBody>
-          <a:bodyPr lIns="0" tIns="0" rIns="0" bIns="0" anchor="ctr"/>
-          <a:lstStyle/>
-          <a:p>
-            <a:pPr algn="ctr"/>
+          <a:bodyPr lIns="0" rIns="0" tIns="0" bIns="0" anchor="ctr"/>
+          <a:p>
             <a:endParaRPr/>
           </a:p>
         </p:txBody>
@@ -602,8 +380,7 @@
           </a:prstGeom>
         </p:spPr>
         <p:txBody>
-          <a:bodyPr lIns="0" tIns="0" rIns="0" bIns="0"/>
-          <a:lstStyle/>
+          <a:bodyPr lIns="0" rIns="0" tIns="0" bIns="0"/>
           <a:p>
             <a:endParaRPr/>
           </a:p>
@@ -629,8 +406,7 @@
           </a:prstGeom>
         </p:spPr>
         <p:txBody>
-          <a:bodyPr lIns="0" tIns="0" rIns="0" bIns="0"/>
-          <a:lstStyle/>
+          <a:bodyPr lIns="0" rIns="0" tIns="0" bIns="0"/>
           <a:p>
             <a:endParaRPr/>
           </a:p>
@@ -638,14 +414,11 @@
       </p:sp>
     </p:spTree>
   </p:cSld>
-  <p:clrMapOvr>
-    <a:masterClrMapping/>
-  </p:clrMapOvr>
 </p:sldLayout>
 </file>
 
 <file path=ppt/slideLayouts/slideLayout11.xml><?xml version="1.0" encoding="utf-8"?>
-<p:sldLayout xmlns:a="http://schemas.openxmlformats.org/drawingml/2006/main" xmlns:r="http://schemas.openxmlformats.org/officeDocument/2006/relationships" xmlns:p="http://schemas.openxmlformats.org/presentationml/2006/main" type="fourObj" preserve="1">
+<p:sldLayout xmlns:a="http://schemas.openxmlformats.org/drawingml/2006/main" xmlns:p="http://schemas.openxmlformats.org/presentationml/2006/main" xmlns:r="http://schemas.openxmlformats.org/officeDocument/2006/relationships" type="fourObj" preserve="1">
   <p:cSld name="Title, 4 Content">
     <p:spTree>
       <p:nvGrpSpPr>
@@ -681,10 +454,8 @@
           </a:prstGeom>
         </p:spPr>
         <p:txBody>
-          <a:bodyPr lIns="0" tIns="0" rIns="0" bIns="0" anchor="ctr"/>
-          <a:lstStyle/>
-          <a:p>
-            <a:pPr algn="ctr"/>
+          <a:bodyPr lIns="0" rIns="0" tIns="0" bIns="0" anchor="ctr"/>
+          <a:p>
             <a:endParaRPr/>
           </a:p>
         </p:txBody>
@@ -709,8 +480,7 @@
           </a:prstGeom>
         </p:spPr>
         <p:txBody>
-          <a:bodyPr lIns="0" tIns="0" rIns="0" bIns="0"/>
-          <a:lstStyle/>
+          <a:bodyPr lIns="0" rIns="0" tIns="0" bIns="0"/>
           <a:p>
             <a:endParaRPr/>
           </a:p>
@@ -736,8 +506,7 @@
           </a:prstGeom>
         </p:spPr>
         <p:txBody>
-          <a:bodyPr lIns="0" tIns="0" rIns="0" bIns="0"/>
-          <a:lstStyle/>
+          <a:bodyPr lIns="0" rIns="0" tIns="0" bIns="0"/>
           <a:p>
             <a:endParaRPr/>
           </a:p>
@@ -763,8 +532,7 @@
           </a:prstGeom>
         </p:spPr>
         <p:txBody>
-          <a:bodyPr lIns="0" tIns="0" rIns="0" bIns="0"/>
-          <a:lstStyle/>
+          <a:bodyPr lIns="0" rIns="0" tIns="0" bIns="0"/>
           <a:p>
             <a:endParaRPr/>
           </a:p>
@@ -790,8 +558,7 @@
           </a:prstGeom>
         </p:spPr>
         <p:txBody>
-          <a:bodyPr lIns="0" tIns="0" rIns="0" bIns="0"/>
-          <a:lstStyle/>
+          <a:bodyPr lIns="0" rIns="0" tIns="0" bIns="0"/>
           <a:p>
             <a:endParaRPr/>
           </a:p>
@@ -799,14 +566,11 @@
       </p:sp>
     </p:spTree>
   </p:cSld>
-  <p:clrMapOvr>
-    <a:masterClrMapping/>
-  </p:clrMapOvr>
 </p:sldLayout>
 </file>
 
 <file path=ppt/slideLayouts/slideLayout12.xml><?xml version="1.0" encoding="utf-8"?>
-<p:sldLayout xmlns:a="http://schemas.openxmlformats.org/drawingml/2006/main" xmlns:r="http://schemas.openxmlformats.org/officeDocument/2006/relationships" xmlns:p="http://schemas.openxmlformats.org/presentationml/2006/main" type="blank" preserve="1">
+<p:sldLayout xmlns:a="http://schemas.openxmlformats.org/drawingml/2006/main" xmlns:p="http://schemas.openxmlformats.org/presentationml/2006/main" xmlns:r="http://schemas.openxmlformats.org/officeDocument/2006/relationships" type="blank" preserve="1">
   <p:cSld name="Title, 6 Content">
     <p:spTree>
       <p:nvGrpSpPr>
@@ -842,10 +606,8 @@
           </a:prstGeom>
         </p:spPr>
         <p:txBody>
-          <a:bodyPr lIns="0" tIns="0" rIns="0" bIns="0" anchor="ctr"/>
-          <a:lstStyle/>
-          <a:p>
-            <a:pPr algn="ctr"/>
+          <a:bodyPr lIns="0" rIns="0" tIns="0" bIns="0" anchor="ctr"/>
+          <a:p>
             <a:endParaRPr/>
           </a:p>
         </p:txBody>
@@ -870,8 +632,7 @@
           </a:prstGeom>
         </p:spPr>
         <p:txBody>
-          <a:bodyPr lIns="0" tIns="0" rIns="0" bIns="0"/>
-          <a:lstStyle/>
+          <a:bodyPr lIns="0" rIns="0" tIns="0" bIns="0"/>
           <a:p>
             <a:endParaRPr/>
           </a:p>
@@ -897,8 +658,7 @@
           </a:prstGeom>
         </p:spPr>
         <p:txBody>
-          <a:bodyPr lIns="0" tIns="0" rIns="0" bIns="0"/>
-          <a:lstStyle/>
+          <a:bodyPr lIns="0" rIns="0" tIns="0" bIns="0"/>
           <a:p>
             <a:endParaRPr/>
           </a:p>
@@ -906,7 +666,7 @@
       </p:sp>
       <p:pic>
         <p:nvPicPr>
-          <p:cNvPr id="44" name="Picture 43"/>
+          <p:cNvPr id="44" name="" descr=""/>
           <p:cNvPicPr/>
           <p:nvPr/>
         </p:nvPicPr>
@@ -929,12 +689,12 @@
       </p:pic>
       <p:pic>
         <p:nvPicPr>
-          <p:cNvPr id="45" name="Picture 44"/>
+          <p:cNvPr id="45" name="" descr=""/>
           <p:cNvPicPr/>
           <p:nvPr/>
         </p:nvPicPr>
         <p:blipFill>
-          <a:blip r:embed="rId2"/>
+          <a:blip r:embed="rId3"/>
           <a:stretch/>
         </p:blipFill>
         <p:spPr>
@@ -952,14 +712,11 @@
       </p:pic>
     </p:spTree>
   </p:cSld>
-  <p:clrMapOvr>
-    <a:masterClrMapping/>
-  </p:clrMapOvr>
 </p:sldLayout>
 </file>
 
 <file path=ppt/slideLayouts/slideLayout2.xml><?xml version="1.0" encoding="utf-8"?>
-<p:sldLayout xmlns:a="http://schemas.openxmlformats.org/drawingml/2006/main" xmlns:r="http://schemas.openxmlformats.org/officeDocument/2006/relationships" xmlns:p="http://schemas.openxmlformats.org/presentationml/2006/main" type="tx" preserve="1">
+<p:sldLayout xmlns:a="http://schemas.openxmlformats.org/drawingml/2006/main" xmlns:p="http://schemas.openxmlformats.org/presentationml/2006/main" xmlns:r="http://schemas.openxmlformats.org/officeDocument/2006/relationships" type="tx" preserve="1">
   <p:cSld name="Title Slide">
     <p:spTree>
       <p:nvGrpSpPr>
@@ -995,10 +752,8 @@
           </a:prstGeom>
         </p:spPr>
         <p:txBody>
-          <a:bodyPr lIns="0" tIns="0" rIns="0" bIns="0" anchor="ctr"/>
-          <a:lstStyle/>
-          <a:p>
-            <a:pPr algn="ctr"/>
+          <a:bodyPr lIns="0" rIns="0" tIns="0" bIns="0" anchor="ctr"/>
+          <a:p>
             <a:endParaRPr/>
           </a:p>
         </p:txBody>
@@ -1023,8 +778,7 @@
           </a:prstGeom>
         </p:spPr>
         <p:txBody>
-          <a:bodyPr lIns="0" tIns="0" rIns="0" bIns="0" anchor="ctr"/>
-          <a:lstStyle/>
+          <a:bodyPr lIns="0" rIns="0" tIns="0" bIns="0" anchor="ctr"/>
           <a:p>
             <a:pPr algn="ctr"/>
             <a:endParaRPr/>
@@ -1033,14 +787,11 @@
       </p:sp>
     </p:spTree>
   </p:cSld>
-  <p:clrMapOvr>
-    <a:masterClrMapping/>
-  </p:clrMapOvr>
 </p:sldLayout>
 </file>
 
 <file path=ppt/slideLayouts/slideLayout3.xml><?xml version="1.0" encoding="utf-8"?>
-<p:sldLayout xmlns:a="http://schemas.openxmlformats.org/drawingml/2006/main" xmlns:r="http://schemas.openxmlformats.org/officeDocument/2006/relationships" xmlns:p="http://schemas.openxmlformats.org/presentationml/2006/main" type="obj" preserve="1">
+<p:sldLayout xmlns:a="http://schemas.openxmlformats.org/drawingml/2006/main" xmlns:p="http://schemas.openxmlformats.org/presentationml/2006/main" xmlns:r="http://schemas.openxmlformats.org/officeDocument/2006/relationships" type="obj" preserve="1">
   <p:cSld name="Title, Content">
     <p:spTree>
       <p:nvGrpSpPr>
@@ -1076,10 +827,8 @@
           </a:prstGeom>
         </p:spPr>
         <p:txBody>
-          <a:bodyPr lIns="0" tIns="0" rIns="0" bIns="0" anchor="ctr"/>
-          <a:lstStyle/>
-          <a:p>
-            <a:pPr algn="ctr"/>
+          <a:bodyPr lIns="0" rIns="0" tIns="0" bIns="0" anchor="ctr"/>
+          <a:p>
             <a:endParaRPr/>
           </a:p>
         </p:txBody>
@@ -1104,8 +853,7 @@
           </a:prstGeom>
         </p:spPr>
         <p:txBody>
-          <a:bodyPr lIns="0" tIns="0" rIns="0" bIns="0"/>
-          <a:lstStyle/>
+          <a:bodyPr lIns="0" rIns="0" tIns="0" bIns="0"/>
           <a:p>
             <a:endParaRPr/>
           </a:p>
@@ -1113,14 +861,11 @@
       </p:sp>
     </p:spTree>
   </p:cSld>
-  <p:clrMapOvr>
-    <a:masterClrMapping/>
-  </p:clrMapOvr>
 </p:sldLayout>
 </file>
 
 <file path=ppt/slideLayouts/slideLayout4.xml><?xml version="1.0" encoding="utf-8"?>
-<p:sldLayout xmlns:a="http://schemas.openxmlformats.org/drawingml/2006/main" xmlns:r="http://schemas.openxmlformats.org/officeDocument/2006/relationships" xmlns:p="http://schemas.openxmlformats.org/presentationml/2006/main" type="twoObj" preserve="1">
+<p:sldLayout xmlns:a="http://schemas.openxmlformats.org/drawingml/2006/main" xmlns:p="http://schemas.openxmlformats.org/presentationml/2006/main" xmlns:r="http://schemas.openxmlformats.org/officeDocument/2006/relationships" type="twoObj" preserve="1">
   <p:cSld name="Title, 2 Content">
     <p:spTree>
       <p:nvGrpSpPr>
@@ -1156,10 +901,8 @@
           </a:prstGeom>
         </p:spPr>
         <p:txBody>
-          <a:bodyPr lIns="0" tIns="0" rIns="0" bIns="0" anchor="ctr"/>
-          <a:lstStyle/>
-          <a:p>
-            <a:pPr algn="ctr"/>
+          <a:bodyPr lIns="0" rIns="0" tIns="0" bIns="0" anchor="ctr"/>
+          <a:p>
             <a:endParaRPr/>
           </a:p>
         </p:txBody>
@@ -1184,8 +927,7 @@
           </a:prstGeom>
         </p:spPr>
         <p:txBody>
-          <a:bodyPr lIns="0" tIns="0" rIns="0" bIns="0"/>
-          <a:lstStyle/>
+          <a:bodyPr lIns="0" rIns="0" tIns="0" bIns="0"/>
           <a:p>
             <a:endParaRPr/>
           </a:p>
@@ -1211,8 +953,7 @@
           </a:prstGeom>
         </p:spPr>
         <p:txBody>
-          <a:bodyPr lIns="0" tIns="0" rIns="0" bIns="0"/>
-          <a:lstStyle/>
+          <a:bodyPr lIns="0" rIns="0" tIns="0" bIns="0"/>
           <a:p>
             <a:endParaRPr/>
           </a:p>
@@ -1220,14 +961,11 @@
       </p:sp>
     </p:spTree>
   </p:cSld>
-  <p:clrMapOvr>
-    <a:masterClrMapping/>
-  </p:clrMapOvr>
 </p:sldLayout>
 </file>
 
 <file path=ppt/slideLayouts/slideLayout5.xml><?xml version="1.0" encoding="utf-8"?>
-<p:sldLayout xmlns:a="http://schemas.openxmlformats.org/drawingml/2006/main" xmlns:r="http://schemas.openxmlformats.org/officeDocument/2006/relationships" xmlns:p="http://schemas.openxmlformats.org/presentationml/2006/main" type="titleOnly" preserve="1">
+<p:sldLayout xmlns:a="http://schemas.openxmlformats.org/drawingml/2006/main" xmlns:p="http://schemas.openxmlformats.org/presentationml/2006/main" xmlns:r="http://schemas.openxmlformats.org/officeDocument/2006/relationships" type="titleOnly" preserve="1">
   <p:cSld name="Title Only">
     <p:spTree>
       <p:nvGrpSpPr>
@@ -1263,24 +1001,19 @@
           </a:prstGeom>
         </p:spPr>
         <p:txBody>
-          <a:bodyPr lIns="0" tIns="0" rIns="0" bIns="0" anchor="ctr"/>
-          <a:lstStyle/>
-          <a:p>
-            <a:pPr algn="ctr"/>
+          <a:bodyPr lIns="0" rIns="0" tIns="0" bIns="0" anchor="ctr"/>
+          <a:p>
             <a:endParaRPr/>
           </a:p>
         </p:txBody>
       </p:sp>
     </p:spTree>
   </p:cSld>
-  <p:clrMapOvr>
-    <a:masterClrMapping/>
-  </p:clrMapOvr>
 </p:sldLayout>
 </file>
 
 <file path=ppt/slideLayouts/slideLayout6.xml><?xml version="1.0" encoding="utf-8"?>
-<p:sldLayout xmlns:a="http://schemas.openxmlformats.org/drawingml/2006/main" xmlns:r="http://schemas.openxmlformats.org/officeDocument/2006/relationships" xmlns:p="http://schemas.openxmlformats.org/presentationml/2006/main" type="objOnly" preserve="1">
+<p:sldLayout xmlns:a="http://schemas.openxmlformats.org/drawingml/2006/main" xmlns:p="http://schemas.openxmlformats.org/presentationml/2006/main" xmlns:r="http://schemas.openxmlformats.org/officeDocument/2006/relationships" type="objOnly" preserve="1">
   <p:cSld name="Centered Text">
     <p:spTree>
       <p:nvGrpSpPr>
@@ -1316,8 +1049,7 @@
           </a:prstGeom>
         </p:spPr>
         <p:txBody>
-          <a:bodyPr lIns="0" tIns="0" rIns="0" bIns="0" anchor="ctr"/>
-          <a:lstStyle/>
+          <a:bodyPr lIns="0" rIns="0" tIns="0" bIns="0" anchor="ctr"/>
           <a:p>
             <a:pPr algn="ctr"/>
             <a:endParaRPr/>
@@ -1326,14 +1058,11 @@
       </p:sp>
     </p:spTree>
   </p:cSld>
-  <p:clrMapOvr>
-    <a:masterClrMapping/>
-  </p:clrMapOvr>
 </p:sldLayout>
 </file>
 
 <file path=ppt/slideLayouts/slideLayout7.xml><?xml version="1.0" encoding="utf-8"?>
-<p:sldLayout xmlns:a="http://schemas.openxmlformats.org/drawingml/2006/main" xmlns:r="http://schemas.openxmlformats.org/officeDocument/2006/relationships" xmlns:p="http://schemas.openxmlformats.org/presentationml/2006/main" type="twoObjAndObj" preserve="1">
+<p:sldLayout xmlns:a="http://schemas.openxmlformats.org/drawingml/2006/main" xmlns:p="http://schemas.openxmlformats.org/presentationml/2006/main" xmlns:r="http://schemas.openxmlformats.org/officeDocument/2006/relationships" type="twoObjAndObj" preserve="1">
   <p:cSld name="Title, 2 Content and Content">
     <p:spTree>
       <p:nvGrpSpPr>
@@ -1369,10 +1098,8 @@
           </a:prstGeom>
         </p:spPr>
         <p:txBody>
-          <a:bodyPr lIns="0" tIns="0" rIns="0" bIns="0" anchor="ctr"/>
-          <a:lstStyle/>
-          <a:p>
-            <a:pPr algn="ctr"/>
+          <a:bodyPr lIns="0" rIns="0" tIns="0" bIns="0" anchor="ctr"/>
+          <a:p>
             <a:endParaRPr/>
           </a:p>
         </p:txBody>
@@ -1397,8 +1124,7 @@
           </a:prstGeom>
         </p:spPr>
         <p:txBody>
-          <a:bodyPr lIns="0" tIns="0" rIns="0" bIns="0"/>
-          <a:lstStyle/>
+          <a:bodyPr lIns="0" rIns="0" tIns="0" bIns="0"/>
           <a:p>
             <a:endParaRPr/>
           </a:p>
@@ -1424,8 +1150,7 @@
           </a:prstGeom>
         </p:spPr>
         <p:txBody>
-          <a:bodyPr lIns="0" tIns="0" rIns="0" bIns="0"/>
-          <a:lstStyle/>
+          <a:bodyPr lIns="0" rIns="0" tIns="0" bIns="0"/>
           <a:p>
             <a:endParaRPr/>
           </a:p>
@@ -1451,8 +1176,7 @@
           </a:prstGeom>
         </p:spPr>
         <p:txBody>
-          <a:bodyPr lIns="0" tIns="0" rIns="0" bIns="0"/>
-          <a:lstStyle/>
+          <a:bodyPr lIns="0" rIns="0" tIns="0" bIns="0"/>
           <a:p>
             <a:endParaRPr/>
           </a:p>
@@ -1460,14 +1184,11 @@
       </p:sp>
     </p:spTree>
   </p:cSld>
-  <p:clrMapOvr>
-    <a:masterClrMapping/>
-  </p:clrMapOvr>
 </p:sldLayout>
 </file>
 
 <file path=ppt/slideLayouts/slideLayout8.xml><?xml version="1.0" encoding="utf-8"?>
-<p:sldLayout xmlns:a="http://schemas.openxmlformats.org/drawingml/2006/main" xmlns:r="http://schemas.openxmlformats.org/officeDocument/2006/relationships" xmlns:p="http://schemas.openxmlformats.org/presentationml/2006/main" type="objAndTwoObj" preserve="1">
+<p:sldLayout xmlns:a="http://schemas.openxmlformats.org/drawingml/2006/main" xmlns:p="http://schemas.openxmlformats.org/presentationml/2006/main" xmlns:r="http://schemas.openxmlformats.org/officeDocument/2006/relationships" type="objAndTwoObj" preserve="1">
   <p:cSld name="Title Content and 2 Content">
     <p:spTree>
       <p:nvGrpSpPr>
@@ -1503,10 +1224,8 @@
           </a:prstGeom>
         </p:spPr>
         <p:txBody>
-          <a:bodyPr lIns="0" tIns="0" rIns="0" bIns="0" anchor="ctr"/>
-          <a:lstStyle/>
-          <a:p>
-            <a:pPr algn="ctr"/>
+          <a:bodyPr lIns="0" rIns="0" tIns="0" bIns="0" anchor="ctr"/>
+          <a:p>
             <a:endParaRPr/>
           </a:p>
         </p:txBody>
@@ -1531,8 +1250,7 @@
           </a:prstGeom>
         </p:spPr>
         <p:txBody>
-          <a:bodyPr lIns="0" tIns="0" rIns="0" bIns="0"/>
-          <a:lstStyle/>
+          <a:bodyPr lIns="0" rIns="0" tIns="0" bIns="0"/>
           <a:p>
             <a:endParaRPr/>
           </a:p>
@@ -1558,8 +1276,7 @@
           </a:prstGeom>
         </p:spPr>
         <p:txBody>
-          <a:bodyPr lIns="0" tIns="0" rIns="0" bIns="0"/>
-          <a:lstStyle/>
+          <a:bodyPr lIns="0" rIns="0" tIns="0" bIns="0"/>
           <a:p>
             <a:endParaRPr/>
           </a:p>
@@ -1585,8 +1302,7 @@
           </a:prstGeom>
         </p:spPr>
         <p:txBody>
-          <a:bodyPr lIns="0" tIns="0" rIns="0" bIns="0"/>
-          <a:lstStyle/>
+          <a:bodyPr lIns="0" rIns="0" tIns="0" bIns="0"/>
           <a:p>
             <a:endParaRPr/>
           </a:p>
@@ -1594,14 +1310,11 @@
       </p:sp>
     </p:spTree>
   </p:cSld>
-  <p:clrMapOvr>
-    <a:masterClrMapping/>
-  </p:clrMapOvr>
 </p:sldLayout>
 </file>
 
 <file path=ppt/slideLayouts/slideLayout9.xml><?xml version="1.0" encoding="utf-8"?>
-<p:sldLayout xmlns:a="http://schemas.openxmlformats.org/drawingml/2006/main" xmlns:r="http://schemas.openxmlformats.org/officeDocument/2006/relationships" xmlns:p="http://schemas.openxmlformats.org/presentationml/2006/main" type="twoObjOverTx" preserve="1">
+<p:sldLayout xmlns:a="http://schemas.openxmlformats.org/drawingml/2006/main" xmlns:p="http://schemas.openxmlformats.org/presentationml/2006/main" xmlns:r="http://schemas.openxmlformats.org/officeDocument/2006/relationships" type="twoObjOverTx" preserve="1">
   <p:cSld name="Title, 2 Content over Content">
     <p:spTree>
       <p:nvGrpSpPr>
@@ -1637,10 +1350,8 @@
           </a:prstGeom>
         </p:spPr>
         <p:txBody>
-          <a:bodyPr lIns="0" tIns="0" rIns="0" bIns="0" anchor="ctr"/>
-          <a:lstStyle/>
-          <a:p>
-            <a:pPr algn="ctr"/>
+          <a:bodyPr lIns="0" rIns="0" tIns="0" bIns="0" anchor="ctr"/>
+          <a:p>
             <a:endParaRPr/>
           </a:p>
         </p:txBody>
@@ -1665,8 +1376,7 @@
           </a:prstGeom>
         </p:spPr>
         <p:txBody>
-          <a:bodyPr lIns="0" tIns="0" rIns="0" bIns="0"/>
-          <a:lstStyle/>
+          <a:bodyPr lIns="0" rIns="0" tIns="0" bIns="0"/>
           <a:p>
             <a:endParaRPr/>
           </a:p>
@@ -1692,8 +1402,7 @@
           </a:prstGeom>
         </p:spPr>
         <p:txBody>
-          <a:bodyPr lIns="0" tIns="0" rIns="0" bIns="0"/>
-          <a:lstStyle/>
+          <a:bodyPr lIns="0" rIns="0" tIns="0" bIns="0"/>
           <a:p>
             <a:endParaRPr/>
           </a:p>
@@ -1719,8 +1428,7 @@
           </a:prstGeom>
         </p:spPr>
         <p:txBody>
-          <a:bodyPr lIns="0" tIns="0" rIns="0" bIns="0"/>
-          <a:lstStyle/>
+          <a:bodyPr lIns="0" rIns="0" tIns="0" bIns="0"/>
           <a:p>
             <a:endParaRPr/>
           </a:p>
@@ -1728,21 +1436,17 @@
       </p:sp>
     </p:spTree>
   </p:cSld>
-  <p:clrMapOvr>
-    <a:masterClrMapping/>
-  </p:clrMapOvr>
 </p:sldLayout>
 </file>
 
 <file path=ppt/slideMasters/slideMaster1.xml><?xml version="1.0" encoding="utf-8"?>
-<p:sldMaster xmlns:a="http://schemas.openxmlformats.org/drawingml/2006/main" xmlns:r="http://schemas.openxmlformats.org/officeDocument/2006/relationships" xmlns:p="http://schemas.openxmlformats.org/presentationml/2006/main">
+<p:sldMaster xmlns:a="http://schemas.openxmlformats.org/drawingml/2006/main" xmlns:p="http://schemas.openxmlformats.org/presentationml/2006/main" xmlns:r="http://schemas.openxmlformats.org/officeDocument/2006/relationships">
   <p:cSld>
     <p:bg>
       <p:bgPr>
         <a:solidFill>
-          <a:srgbClr val="63729D"/>
+          <a:srgbClr val="63729d"/>
         </a:solidFill>
-        <a:effectLst/>
       </p:bgPr>
     </p:bg>
     <p:spTree>
@@ -1761,20 +1465,20 @@
       </p:grpSpPr>
       <p:sp>
         <p:nvSpPr>
-          <p:cNvPr id="12" name="CustomShape 1"/>
+          <p:cNvPr id="0" name="CustomShape 1"/>
           <p:cNvSpPr/>
           <p:nvPr/>
         </p:nvSpPr>
         <p:spPr>
           <a:xfrm>
             <a:off x="0" y="0"/>
-            <a:ext cx="32916960" cy="2406960"/>
+            <a:ext cx="32916600" cy="2406600"/>
           </a:xfrm>
           <a:prstGeom prst="rect">
             <a:avLst/>
           </a:prstGeom>
           <a:solidFill>
-            <a:srgbClr val="000D26"/>
+            <a:srgbClr val="000d26"/>
           </a:solidFill>
           <a:ln w="9360">
             <a:solidFill>
@@ -1784,34 +1488,28 @@
           </a:ln>
         </p:spPr>
         <p:style>
-          <a:lnRef idx="0">
-            <a:scrgbClr r="0" g="0" b="0"/>
-          </a:lnRef>
-          <a:fillRef idx="0">
-            <a:scrgbClr r="0" g="0" b="0"/>
-          </a:fillRef>
-          <a:effectRef idx="0">
-            <a:scrgbClr r="0" g="0" b="0"/>
-          </a:effectRef>
+          <a:lnRef idx="0"/>
+          <a:fillRef idx="0"/>
+          <a:effectRef idx="0"/>
           <a:fontRef idx="minor"/>
         </p:style>
       </p:sp>
       <p:sp>
         <p:nvSpPr>
-          <p:cNvPr id="13" name="CustomShape 2"/>
+          <p:cNvPr id="1" name="CustomShape 2"/>
           <p:cNvSpPr/>
           <p:nvPr/>
         </p:nvSpPr>
         <p:spPr>
           <a:xfrm>
             <a:off x="519840" y="2895480"/>
-            <a:ext cx="7037640" cy="15870240"/>
+            <a:ext cx="7037280" cy="15869880"/>
           </a:xfrm>
           <a:prstGeom prst="rect">
             <a:avLst/>
           </a:prstGeom>
           <a:solidFill>
-            <a:srgbClr val="E6EAEE"/>
+            <a:srgbClr val="e6eaee"/>
           </a:solidFill>
           <a:ln w="9360">
             <a:solidFill>
@@ -1821,15 +1519,9 @@
           </a:ln>
         </p:spPr>
         <p:style>
-          <a:lnRef idx="0">
-            <a:scrgbClr r="0" g="0" b="0"/>
-          </a:lnRef>
-          <a:fillRef idx="0">
-            <a:scrgbClr r="0" g="0" b="0"/>
-          </a:fillRef>
-          <a:effectRef idx="0">
-            <a:scrgbClr r="0" g="0" b="0"/>
-          </a:effectRef>
+          <a:lnRef idx="0"/>
+          <a:fillRef idx="0"/>
+          <a:effectRef idx="0"/>
           <a:fontRef idx="minor"/>
         </p:style>
       </p:sp>
@@ -1842,7 +1534,7 @@
         <p:spPr>
           <a:xfrm>
             <a:off x="199080" y="1515960"/>
-            <a:ext cx="3189240" cy="1103040"/>
+            <a:ext cx="3188880" cy="1102680"/>
           </a:xfrm>
           <a:prstGeom prst="rect">
             <a:avLst/>
@@ -1853,20 +1545,13 @@
           </a:ln>
         </p:spPr>
         <p:style>
-          <a:lnRef idx="0">
-            <a:scrgbClr r="0" g="0" b="0"/>
-          </a:lnRef>
-          <a:fillRef idx="0">
-            <a:scrgbClr r="0" g="0" b="0"/>
-          </a:fillRef>
-          <a:effectRef idx="0">
-            <a:scrgbClr r="0" g="0" b="0"/>
-          </a:effectRef>
+          <a:lnRef idx="0"/>
+          <a:fillRef idx="0"/>
+          <a:effectRef idx="0"/>
           <a:fontRef idx="minor"/>
         </p:style>
         <p:txBody>
-          <a:bodyPr wrap="none" lIns="285120" tIns="285120" rIns="285120" bIns="285120"/>
-          <a:lstStyle/>
+          <a:bodyPr wrap="none" lIns="285120" rIns="285120" tIns="285120" bIns="285120"/>
           <a:p>
             <a:pPr>
               <a:lnSpc>
@@ -1874,9 +1559,9 @@
               </a:lnSpc>
             </a:pPr>
             <a:r>
-              <a:rPr lang="en-US" sz="3500" b="1" strike="noStrike">
+              <a:rPr b="1" lang="en-US" sz="3500" strike="noStrike">
                 <a:solidFill>
-                  <a:srgbClr val="F8F8F8"/>
+                  <a:srgbClr val="f8f8f8"/>
                 </a:solidFill>
                 <a:latin typeface="Verdana"/>
                 <a:ea typeface="DejaVu Sans"/>
@@ -1896,7 +1581,7 @@
         <p:spPr>
           <a:xfrm>
             <a:off x="0" y="0"/>
-            <a:ext cx="32916960" cy="19200960"/>
+            <a:ext cx="32916600" cy="19200600"/>
           </a:xfrm>
           <a:prstGeom prst="rect">
             <a:avLst/>
@@ -1910,15 +1595,9 @@
           </a:ln>
         </p:spPr>
         <p:style>
-          <a:lnRef idx="0">
-            <a:scrgbClr r="0" g="0" b="0"/>
-          </a:lnRef>
-          <a:fillRef idx="0">
-            <a:scrgbClr r="0" g="0" b="0"/>
-          </a:fillRef>
-          <a:effectRef idx="0">
-            <a:scrgbClr r="0" g="0" b="0"/>
-          </a:effectRef>
+          <a:lnRef idx="0"/>
+          <a:fillRef idx="0"/>
+          <a:effectRef idx="0"/>
           <a:fontRef idx="minor"/>
         </p:style>
       </p:sp>
@@ -1931,13 +1610,13 @@
         <p:spPr>
           <a:xfrm>
             <a:off x="8534520" y="2903760"/>
-            <a:ext cx="16031160" cy="15870240"/>
+            <a:ext cx="16030800" cy="15869880"/>
           </a:xfrm>
           <a:prstGeom prst="rect">
             <a:avLst/>
           </a:prstGeom>
           <a:solidFill>
-            <a:srgbClr val="E6EAEE"/>
+            <a:srgbClr val="e6eaee"/>
           </a:solidFill>
           <a:ln w="9360">
             <a:solidFill>
@@ -1947,15 +1626,9 @@
           </a:ln>
         </p:spPr>
         <p:style>
-          <a:lnRef idx="0">
-            <a:scrgbClr r="0" g="0" b="0"/>
-          </a:lnRef>
-          <a:fillRef idx="0">
-            <a:scrgbClr r="0" g="0" b="0"/>
-          </a:fillRef>
-          <a:effectRef idx="0">
-            <a:scrgbClr r="0" g="0" b="0"/>
-          </a:effectRef>
+          <a:lnRef idx="0"/>
+          <a:fillRef idx="0"/>
+          <a:effectRef idx="0"/>
           <a:fontRef idx="minor"/>
         </p:style>
       </p:sp>
@@ -1968,13 +1641,13 @@
         <p:spPr>
           <a:xfrm>
             <a:off x="25420320" y="2903760"/>
-            <a:ext cx="7035120" cy="15870240"/>
+            <a:ext cx="7034760" cy="15869880"/>
           </a:xfrm>
           <a:prstGeom prst="rect">
             <a:avLst/>
           </a:prstGeom>
           <a:solidFill>
-            <a:srgbClr val="E6EAEE"/>
+            <a:srgbClr val="e6eaee"/>
           </a:solidFill>
           <a:ln w="9360">
             <a:solidFill>
@@ -1984,15 +1657,9 @@
           </a:ln>
         </p:spPr>
         <p:style>
-          <a:lnRef idx="0">
-            <a:scrgbClr r="0" g="0" b="0"/>
-          </a:lnRef>
-          <a:fillRef idx="0">
-            <a:scrgbClr r="0" g="0" b="0"/>
-          </a:fillRef>
-          <a:effectRef idx="0">
-            <a:scrgbClr r="0" g="0" b="0"/>
-          </a:effectRef>
+          <a:lnRef idx="0"/>
+          <a:fillRef idx="0"/>
+          <a:effectRef idx="0"/>
           <a:fontRef idx="minor"/>
         </p:style>
       </p:sp>
@@ -2005,7 +1672,7 @@
         <p:spPr>
           <a:xfrm>
             <a:off x="714240" y="333360"/>
-            <a:ext cx="2113200" cy="1446480"/>
+            <a:ext cx="2112840" cy="1446120"/>
           </a:xfrm>
           <a:prstGeom prst="rect">
             <a:avLst/>
@@ -2016,15 +1683,9 @@
           </a:ln>
         </p:spPr>
         <p:style>
-          <a:lnRef idx="0">
-            <a:scrgbClr r="0" g="0" b="0"/>
-          </a:lnRef>
-          <a:fillRef idx="0">
-            <a:scrgbClr r="0" g="0" b="0"/>
-          </a:fillRef>
-          <a:effectRef idx="0">
-            <a:scrgbClr r="0" g="0" b="0"/>
-          </a:effectRef>
+          <a:lnRef idx="0"/>
+          <a:fillRef idx="0"/>
+          <a:effectRef idx="0"/>
           <a:fontRef idx="minor"/>
         </p:style>
       </p:sp>
@@ -2037,7 +1698,7 @@
         <p:spPr>
           <a:xfrm>
             <a:off x="895320" y="333360"/>
-            <a:ext cx="1427400" cy="1370160"/>
+            <a:ext cx="1427040" cy="1369800"/>
           </a:xfrm>
           <a:prstGeom prst="rect">
             <a:avLst/>
@@ -2048,15 +1709,9 @@
           </a:ln>
         </p:spPr>
         <p:style>
-          <a:lnRef idx="0">
-            <a:scrgbClr r="0" g="0" b="0"/>
-          </a:lnRef>
-          <a:fillRef idx="0">
-            <a:scrgbClr r="0" g="0" b="0"/>
-          </a:fillRef>
-          <a:effectRef idx="0">
-            <a:scrgbClr r="0" g="0" b="0"/>
-          </a:effectRef>
+          <a:lnRef idx="0"/>
+          <a:fillRef idx="0"/>
+          <a:effectRef idx="0"/>
           <a:fontRef idx="minor"/>
         </p:style>
       </p:sp>
@@ -2069,7 +1724,7 @@
         <p:spPr>
           <a:xfrm>
             <a:off x="64800" y="187200"/>
-            <a:ext cx="3088800" cy="1738440"/>
+            <a:ext cx="3088440" cy="1738080"/>
           </a:xfrm>
           <a:prstGeom prst="rect">
             <a:avLst/>
@@ -2080,32 +1735,26 @@
           </a:ln>
         </p:spPr>
         <p:style>
-          <a:lnRef idx="0">
-            <a:scrgbClr r="0" g="0" b="0"/>
-          </a:lnRef>
-          <a:fillRef idx="0">
-            <a:scrgbClr r="0" g="0" b="0"/>
-          </a:fillRef>
-          <a:effectRef idx="0">
-            <a:scrgbClr r="0" g="0" b="0"/>
-          </a:effectRef>
+          <a:lnRef idx="0"/>
+          <a:fillRef idx="0"/>
+          <a:effectRef idx="0"/>
           <a:fontRef idx="minor"/>
         </p:style>
       </p:sp>
       <p:pic>
         <p:nvPicPr>
-          <p:cNvPr id="9" name="Picture 17"/>
+          <p:cNvPr id="9" name="Picture 17" descr=""/>
           <p:cNvPicPr/>
           <p:nvPr/>
         </p:nvPicPr>
         <p:blipFill>
-          <a:blip r:embed="rId14"/>
+          <a:blip r:embed="rId2"/>
           <a:stretch/>
         </p:blipFill>
         <p:spPr>
           <a:xfrm>
             <a:off x="931680" y="249480"/>
-            <a:ext cx="1552320" cy="1501560"/>
+            <a:ext cx="1551960" cy="1501200"/>
           </a:xfrm>
           <a:prstGeom prst="rect">
             <a:avLst/>
@@ -2135,12 +1784,10 @@
           </a:prstGeom>
         </p:spPr>
         <p:txBody>
-          <a:bodyPr lIns="0" tIns="0" rIns="0" bIns="0" anchor="ctr"/>
-          <a:lstStyle/>
-          <a:p>
-            <a:pPr algn="ctr"/>
-            <a:r>
-              <a:rPr lang="en-US" sz="4400">
+          <a:bodyPr lIns="0" rIns="0" tIns="0" bIns="0" anchor="ctr"/>
+          <a:p>
+            <a:r>
+              <a:rPr lang="en-US">
                 <a:latin typeface="Arial"/>
               </a:rPr>
               <a:t>Click to edit the title text format</a:t>
@@ -2169,8 +1816,7 @@
           </a:prstGeom>
         </p:spPr>
         <p:txBody>
-          <a:bodyPr lIns="0" tIns="0" rIns="0" bIns="0"/>
-          <a:lstStyle/>
+          <a:bodyPr lIns="0" rIns="0" tIns="0" bIns="0"/>
           <a:p>
             <a:pPr>
               <a:buSzPct val="45000"/>
@@ -2178,7 +1824,7 @@
               <a:buChar char=""/>
             </a:pPr>
             <a:r>
-              <a:rPr lang="en-US" sz="3200">
+              <a:rPr lang="en-US" sz="2800">
                 <a:latin typeface="Arial"/>
               </a:rPr>
               <a:t>Click to edit the outline text format</a:t>
@@ -2192,7 +1838,7 @@
               <a:buChar char=""/>
             </a:pPr>
             <a:r>
-              <a:rPr lang="en-US" sz="2800">
+              <a:rPr lang="en-US" sz="2000">
                 <a:latin typeface="Arial"/>
               </a:rPr>
               <a:t>Second Outline Level</a:t>
@@ -2206,7 +1852,7 @@
               <a:buChar char=""/>
             </a:pPr>
             <a:r>
-              <a:rPr lang="en-US" sz="2400">
+              <a:rPr lang="en-US">
                 <a:latin typeface="Arial"/>
               </a:rPr>
               <a:t>Third Outline Level</a:t>
@@ -2220,7 +1866,7 @@
               <a:buChar char=""/>
             </a:pPr>
             <a:r>
-              <a:rPr lang="en-US" sz="2000">
+              <a:rPr lang="en-US">
                 <a:latin typeface="Arial"/>
               </a:rPr>
               <a:t>Fourth Outline Level</a:t>
@@ -2273,306 +1919,26 @@
       </p:sp>
     </p:spTree>
   </p:cSld>
-  <p:clrMap bg1="lt1" tx1="dk1" bg2="lt2" tx2="dk2" accent1="accent1" accent2="accent2" accent3="accent3" accent4="accent4" accent5="accent5" accent6="accent6" hlink="hlink" folHlink="folHlink"/>
+  <p:clrMap bg1="lt1" bg2="lt2" tx1="dk1" tx2="dk2" accent1="accent1" accent2="accent2" accent3="accent3" accent4="accent4" accent5="accent5" accent6="accent6" hlink="hlink" folHlink="folHlink"/>
   <p:sldLayoutIdLst>
-    <p:sldLayoutId id="2147483649" r:id="rId1"/>
-    <p:sldLayoutId id="2147483650" r:id="rId2"/>
-    <p:sldLayoutId id="2147483651" r:id="rId3"/>
-    <p:sldLayoutId id="2147483652" r:id="rId4"/>
-    <p:sldLayoutId id="2147483653" r:id="rId5"/>
-    <p:sldLayoutId id="2147483654" r:id="rId6"/>
-    <p:sldLayoutId id="2147483655" r:id="rId7"/>
-    <p:sldLayoutId id="2147483656" r:id="rId8"/>
-    <p:sldLayoutId id="2147483657" r:id="rId9"/>
-    <p:sldLayoutId id="2147483658" r:id="rId10"/>
-    <p:sldLayoutId id="2147483659" r:id="rId11"/>
-    <p:sldLayoutId id="2147483660" r:id="rId12"/>
+    <p:sldLayoutId id="2147483649" r:id="rId3"/>
+    <p:sldLayoutId id="2147483650" r:id="rId4"/>
+    <p:sldLayoutId id="2147483651" r:id="rId5"/>
+    <p:sldLayoutId id="2147483652" r:id="rId6"/>
+    <p:sldLayoutId id="2147483653" r:id="rId7"/>
+    <p:sldLayoutId id="2147483654" r:id="rId8"/>
+    <p:sldLayoutId id="2147483655" r:id="rId9"/>
+    <p:sldLayoutId id="2147483656" r:id="rId10"/>
+    <p:sldLayoutId id="2147483657" r:id="rId11"/>
+    <p:sldLayoutId id="2147483658" r:id="rId12"/>
+    <p:sldLayoutId id="2147483659" r:id="rId13"/>
+    <p:sldLayoutId id="2147483660" r:id="rId14"/>
   </p:sldLayoutIdLst>
-  <p:txStyles>
-    <p:titleStyle>
-      <a:lvl1pPr algn="l" defTabSz="914400" rtl="0" eaLnBrk="1" latinLnBrk="0" hangingPunct="1">
-        <a:lnSpc>
-          <a:spcPct val="90000"/>
-        </a:lnSpc>
-        <a:spcBef>
-          <a:spcPct val="0"/>
-        </a:spcBef>
-        <a:buNone/>
-        <a:defRPr sz="4400" kern="1200">
-          <a:solidFill>
-            <a:schemeClr val="tx1"/>
-          </a:solidFill>
-          <a:latin typeface="+mj-lt"/>
-          <a:ea typeface="+mj-ea"/>
-          <a:cs typeface="+mj-cs"/>
-        </a:defRPr>
-      </a:lvl1pPr>
-    </p:titleStyle>
-    <p:bodyStyle>
-      <a:lvl1pPr marL="228600" indent="-228600" algn="l" defTabSz="914400" rtl="0" eaLnBrk="1" latinLnBrk="0" hangingPunct="1">
-        <a:lnSpc>
-          <a:spcPct val="90000"/>
-        </a:lnSpc>
-        <a:spcBef>
-          <a:spcPts val="1000"/>
-        </a:spcBef>
-        <a:buFont typeface="Arial" panose="020B0604020202020204" pitchFamily="34" charset="0"/>
-        <a:buChar char="•"/>
-        <a:defRPr sz="2800" kern="1200">
-          <a:solidFill>
-            <a:schemeClr val="tx1"/>
-          </a:solidFill>
-          <a:latin typeface="+mn-lt"/>
-          <a:ea typeface="+mn-ea"/>
-          <a:cs typeface="+mn-cs"/>
-        </a:defRPr>
-      </a:lvl1pPr>
-      <a:lvl2pPr marL="685800" indent="-228600" algn="l" defTabSz="914400" rtl="0" eaLnBrk="1" latinLnBrk="0" hangingPunct="1">
-        <a:lnSpc>
-          <a:spcPct val="90000"/>
-        </a:lnSpc>
-        <a:spcBef>
-          <a:spcPts val="500"/>
-        </a:spcBef>
-        <a:buFont typeface="Arial" panose="020B0604020202020204" pitchFamily="34" charset="0"/>
-        <a:buChar char="•"/>
-        <a:defRPr sz="2400" kern="1200">
-          <a:solidFill>
-            <a:schemeClr val="tx1"/>
-          </a:solidFill>
-          <a:latin typeface="+mn-lt"/>
-          <a:ea typeface="+mn-ea"/>
-          <a:cs typeface="+mn-cs"/>
-        </a:defRPr>
-      </a:lvl2pPr>
-      <a:lvl3pPr marL="1143000" indent="-228600" algn="l" defTabSz="914400" rtl="0" eaLnBrk="1" latinLnBrk="0" hangingPunct="1">
-        <a:lnSpc>
-          <a:spcPct val="90000"/>
-        </a:lnSpc>
-        <a:spcBef>
-          <a:spcPts val="500"/>
-        </a:spcBef>
-        <a:buFont typeface="Arial" panose="020B0604020202020204" pitchFamily="34" charset="0"/>
-        <a:buChar char="•"/>
-        <a:defRPr sz="2000" kern="1200">
-          <a:solidFill>
-            <a:schemeClr val="tx1"/>
-          </a:solidFill>
-          <a:latin typeface="+mn-lt"/>
-          <a:ea typeface="+mn-ea"/>
-          <a:cs typeface="+mn-cs"/>
-        </a:defRPr>
-      </a:lvl3pPr>
-      <a:lvl4pPr marL="1600200" indent="-228600" algn="l" defTabSz="914400" rtl="0" eaLnBrk="1" latinLnBrk="0" hangingPunct="1">
-        <a:lnSpc>
-          <a:spcPct val="90000"/>
-        </a:lnSpc>
-        <a:spcBef>
-          <a:spcPts val="500"/>
-        </a:spcBef>
-        <a:buFont typeface="Arial" panose="020B0604020202020204" pitchFamily="34" charset="0"/>
-        <a:buChar char="•"/>
-        <a:defRPr sz="1800" kern="1200">
-          <a:solidFill>
-            <a:schemeClr val="tx1"/>
-          </a:solidFill>
-          <a:latin typeface="+mn-lt"/>
-          <a:ea typeface="+mn-ea"/>
-          <a:cs typeface="+mn-cs"/>
-        </a:defRPr>
-      </a:lvl4pPr>
-      <a:lvl5pPr marL="2057400" indent="-228600" algn="l" defTabSz="914400" rtl="0" eaLnBrk="1" latinLnBrk="0" hangingPunct="1">
-        <a:lnSpc>
-          <a:spcPct val="90000"/>
-        </a:lnSpc>
-        <a:spcBef>
-          <a:spcPts val="500"/>
-        </a:spcBef>
-        <a:buFont typeface="Arial" panose="020B0604020202020204" pitchFamily="34" charset="0"/>
-        <a:buChar char="•"/>
-        <a:defRPr sz="1800" kern="1200">
-          <a:solidFill>
-            <a:schemeClr val="tx1"/>
-          </a:solidFill>
-          <a:latin typeface="+mn-lt"/>
-          <a:ea typeface="+mn-ea"/>
-          <a:cs typeface="+mn-cs"/>
-        </a:defRPr>
-      </a:lvl5pPr>
-      <a:lvl6pPr marL="2514600" indent="-228600" algn="l" defTabSz="914400" rtl="0" eaLnBrk="1" latinLnBrk="0" hangingPunct="1">
-        <a:lnSpc>
-          <a:spcPct val="90000"/>
-        </a:lnSpc>
-        <a:spcBef>
-          <a:spcPts val="500"/>
-        </a:spcBef>
-        <a:buFont typeface="Arial" panose="020B0604020202020204" pitchFamily="34" charset="0"/>
-        <a:buChar char="•"/>
-        <a:defRPr sz="1800" kern="1200">
-          <a:solidFill>
-            <a:schemeClr val="tx1"/>
-          </a:solidFill>
-          <a:latin typeface="+mn-lt"/>
-          <a:ea typeface="+mn-ea"/>
-          <a:cs typeface="+mn-cs"/>
-        </a:defRPr>
-      </a:lvl6pPr>
-      <a:lvl7pPr marL="2971800" indent="-228600" algn="l" defTabSz="914400" rtl="0" eaLnBrk="1" latinLnBrk="0" hangingPunct="1">
-        <a:lnSpc>
-          <a:spcPct val="90000"/>
-        </a:lnSpc>
-        <a:spcBef>
-          <a:spcPts val="500"/>
-        </a:spcBef>
-        <a:buFont typeface="Arial" panose="020B0604020202020204" pitchFamily="34" charset="0"/>
-        <a:buChar char="•"/>
-        <a:defRPr sz="1800" kern="1200">
-          <a:solidFill>
-            <a:schemeClr val="tx1"/>
-          </a:solidFill>
-          <a:latin typeface="+mn-lt"/>
-          <a:ea typeface="+mn-ea"/>
-          <a:cs typeface="+mn-cs"/>
-        </a:defRPr>
-      </a:lvl7pPr>
-      <a:lvl8pPr marL="3429000" indent="-228600" algn="l" defTabSz="914400" rtl="0" eaLnBrk="1" latinLnBrk="0" hangingPunct="1">
-        <a:lnSpc>
-          <a:spcPct val="90000"/>
-        </a:lnSpc>
-        <a:spcBef>
-          <a:spcPts val="500"/>
-        </a:spcBef>
-        <a:buFont typeface="Arial" panose="020B0604020202020204" pitchFamily="34" charset="0"/>
-        <a:buChar char="•"/>
-        <a:defRPr sz="1800" kern="1200">
-          <a:solidFill>
-            <a:schemeClr val="tx1"/>
-          </a:solidFill>
-          <a:latin typeface="+mn-lt"/>
-          <a:ea typeface="+mn-ea"/>
-          <a:cs typeface="+mn-cs"/>
-        </a:defRPr>
-      </a:lvl8pPr>
-      <a:lvl9pPr marL="3886200" indent="-228600" algn="l" defTabSz="914400" rtl="0" eaLnBrk="1" latinLnBrk="0" hangingPunct="1">
-        <a:lnSpc>
-          <a:spcPct val="90000"/>
-        </a:lnSpc>
-        <a:spcBef>
-          <a:spcPts val="500"/>
-        </a:spcBef>
-        <a:buFont typeface="Arial" panose="020B0604020202020204" pitchFamily="34" charset="0"/>
-        <a:buChar char="•"/>
-        <a:defRPr sz="1800" kern="1200">
-          <a:solidFill>
-            <a:schemeClr val="tx1"/>
-          </a:solidFill>
-          <a:latin typeface="+mn-lt"/>
-          <a:ea typeface="+mn-ea"/>
-          <a:cs typeface="+mn-cs"/>
-        </a:defRPr>
-      </a:lvl9pPr>
-    </p:bodyStyle>
-    <p:otherStyle>
-      <a:defPPr>
-        <a:defRPr lang="en-US"/>
-      </a:defPPr>
-      <a:lvl1pPr marL="0" algn="l" defTabSz="914400" rtl="0" eaLnBrk="1" latinLnBrk="0" hangingPunct="1">
-        <a:defRPr sz="1800" kern="1200">
-          <a:solidFill>
-            <a:schemeClr val="tx1"/>
-          </a:solidFill>
-          <a:latin typeface="+mn-lt"/>
-          <a:ea typeface="+mn-ea"/>
-          <a:cs typeface="+mn-cs"/>
-        </a:defRPr>
-      </a:lvl1pPr>
-      <a:lvl2pPr marL="457200" algn="l" defTabSz="914400" rtl="0" eaLnBrk="1" latinLnBrk="0" hangingPunct="1">
-        <a:defRPr sz="1800" kern="1200">
-          <a:solidFill>
-            <a:schemeClr val="tx1"/>
-          </a:solidFill>
-          <a:latin typeface="+mn-lt"/>
-          <a:ea typeface="+mn-ea"/>
-          <a:cs typeface="+mn-cs"/>
-        </a:defRPr>
-      </a:lvl2pPr>
-      <a:lvl3pPr marL="914400" algn="l" defTabSz="914400" rtl="0" eaLnBrk="1" latinLnBrk="0" hangingPunct="1">
-        <a:defRPr sz="1800" kern="1200">
-          <a:solidFill>
-            <a:schemeClr val="tx1"/>
-          </a:solidFill>
-          <a:latin typeface="+mn-lt"/>
-          <a:ea typeface="+mn-ea"/>
-          <a:cs typeface="+mn-cs"/>
-        </a:defRPr>
-      </a:lvl3pPr>
-      <a:lvl4pPr marL="1371600" algn="l" defTabSz="914400" rtl="0" eaLnBrk="1" latinLnBrk="0" hangingPunct="1">
-        <a:defRPr sz="1800" kern="1200">
-          <a:solidFill>
-            <a:schemeClr val="tx1"/>
-          </a:solidFill>
-          <a:latin typeface="+mn-lt"/>
-          <a:ea typeface="+mn-ea"/>
-          <a:cs typeface="+mn-cs"/>
-        </a:defRPr>
-      </a:lvl4pPr>
-      <a:lvl5pPr marL="1828800" algn="l" defTabSz="914400" rtl="0" eaLnBrk="1" latinLnBrk="0" hangingPunct="1">
-        <a:defRPr sz="1800" kern="1200">
-          <a:solidFill>
-            <a:schemeClr val="tx1"/>
-          </a:solidFill>
-          <a:latin typeface="+mn-lt"/>
-          <a:ea typeface="+mn-ea"/>
-          <a:cs typeface="+mn-cs"/>
-        </a:defRPr>
-      </a:lvl5pPr>
-      <a:lvl6pPr marL="2286000" algn="l" defTabSz="914400" rtl="0" eaLnBrk="1" latinLnBrk="0" hangingPunct="1">
-        <a:defRPr sz="1800" kern="1200">
-          <a:solidFill>
-            <a:schemeClr val="tx1"/>
-          </a:solidFill>
-          <a:latin typeface="+mn-lt"/>
-          <a:ea typeface="+mn-ea"/>
-          <a:cs typeface="+mn-cs"/>
-        </a:defRPr>
-      </a:lvl6pPr>
-      <a:lvl7pPr marL="2743200" algn="l" defTabSz="914400" rtl="0" eaLnBrk="1" latinLnBrk="0" hangingPunct="1">
-        <a:defRPr sz="1800" kern="1200">
-          <a:solidFill>
-            <a:schemeClr val="tx1"/>
-          </a:solidFill>
-          <a:latin typeface="+mn-lt"/>
-          <a:ea typeface="+mn-ea"/>
-          <a:cs typeface="+mn-cs"/>
-        </a:defRPr>
-      </a:lvl7pPr>
-      <a:lvl8pPr marL="3200400" algn="l" defTabSz="914400" rtl="0" eaLnBrk="1" latinLnBrk="0" hangingPunct="1">
-        <a:defRPr sz="1800" kern="1200">
-          <a:solidFill>
-            <a:schemeClr val="tx1"/>
-          </a:solidFill>
-          <a:latin typeface="+mn-lt"/>
-          <a:ea typeface="+mn-ea"/>
-          <a:cs typeface="+mn-cs"/>
-        </a:defRPr>
-      </a:lvl8pPr>
-      <a:lvl9pPr marL="3657600" algn="l" defTabSz="914400" rtl="0" eaLnBrk="1" latinLnBrk="0" hangingPunct="1">
-        <a:defRPr sz="1800" kern="1200">
-          <a:solidFill>
-            <a:schemeClr val="tx1"/>
-          </a:solidFill>
-          <a:latin typeface="+mn-lt"/>
-          <a:ea typeface="+mn-ea"/>
-          <a:cs typeface="+mn-cs"/>
-        </a:defRPr>
-      </a:lvl9pPr>
-    </p:otherStyle>
-  </p:txStyles>
 </p:sldMaster>
 </file>
 
 <file path=ppt/slides/slide1.xml><?xml version="1.0" encoding="utf-8"?>
-<p:sld xmlns:a="http://schemas.openxmlformats.org/drawingml/2006/main" xmlns:r="http://schemas.openxmlformats.org/officeDocument/2006/relationships" xmlns:p="http://schemas.openxmlformats.org/presentationml/2006/main">
+<p:sld xmlns:a="http://schemas.openxmlformats.org/drawingml/2006/main" xmlns:p="http://schemas.openxmlformats.org/presentationml/2006/main" xmlns:r="http://schemas.openxmlformats.org/officeDocument/2006/relationships">
   <p:cSld>
     <p:spTree>
       <p:nvGrpSpPr>
@@ -2597,7 +1963,7 @@
         <p:spPr>
           <a:xfrm>
             <a:off x="4316400" y="434520"/>
-            <a:ext cx="24185880" cy="785880"/>
+            <a:ext cx="24185520" cy="785520"/>
           </a:xfrm>
           <a:prstGeom prst="rect">
             <a:avLst/>
@@ -2608,20 +1974,13 @@
           </a:ln>
         </p:spPr>
         <p:style>
-          <a:lnRef idx="0">
-            <a:scrgbClr r="0" g="0" b="0"/>
-          </a:lnRef>
-          <a:fillRef idx="0">
-            <a:scrgbClr r="0" g="0" b="0"/>
-          </a:fillRef>
-          <a:effectRef idx="0">
-            <a:scrgbClr r="0" g="0" b="0"/>
-          </a:effectRef>
+          <a:lnRef idx="0"/>
+          <a:fillRef idx="0"/>
+          <a:effectRef idx="0"/>
           <a:fontRef idx="minor"/>
         </p:style>
         <p:txBody>
-          <a:bodyPr lIns="56520" tIns="28080" rIns="56520" bIns="28080"/>
-          <a:lstStyle/>
+          <a:bodyPr lIns="56520" rIns="56520" tIns="28080" bIns="28080"/>
           <a:p>
             <a:pPr algn="ctr">
               <a:lnSpc>
@@ -2629,9 +1988,9 @@
               </a:lnSpc>
             </a:pPr>
             <a:r>
-              <a:rPr lang="en-US" sz="4800" b="1" strike="noStrike">
+              <a:rPr b="1" lang="en-US" sz="4800" strike="noStrike">
                 <a:solidFill>
-                  <a:srgbClr val="F8F8F8"/>
+                  <a:srgbClr val="f8f8f8"/>
                 </a:solidFill>
                 <a:latin typeface="Calibri"/>
                 <a:ea typeface="DejaVu Sans"/>
@@ -2670,7 +2029,7 @@
         <p:spPr>
           <a:xfrm>
             <a:off x="6521040" y="1035720"/>
-            <a:ext cx="19756080" cy="1748880"/>
+            <a:ext cx="19755720" cy="1748520"/>
           </a:xfrm>
           <a:prstGeom prst="rect">
             <a:avLst/>
@@ -2681,20 +2040,13 @@
           </a:ln>
         </p:spPr>
         <p:style>
-          <a:lnRef idx="0">
-            <a:scrgbClr r="0" g="0" b="0"/>
-          </a:lnRef>
-          <a:fillRef idx="0">
-            <a:scrgbClr r="0" g="0" b="0"/>
-          </a:fillRef>
-          <a:effectRef idx="0">
-            <a:scrgbClr r="0" g="0" b="0"/>
-          </a:effectRef>
+          <a:lnRef idx="0"/>
+          <a:fillRef idx="0"/>
+          <a:effectRef idx="0"/>
           <a:fontRef idx="minor"/>
         </p:style>
         <p:txBody>
-          <a:bodyPr lIns="329040" tIns="329040" rIns="329040" bIns="329040"/>
-          <a:lstStyle/>
+          <a:bodyPr lIns="329040" rIns="329040" tIns="329040" bIns="329040"/>
           <a:p>
             <a:pPr algn="ctr">
               <a:lnSpc>
@@ -2702,9 +2054,9 @@
               </a:lnSpc>
             </a:pPr>
             <a:r>
-              <a:rPr lang="en-US" sz="2800" b="1" strike="noStrike">
+              <a:rPr b="1" lang="en-US" sz="2800" strike="noStrike">
                 <a:solidFill>
-                  <a:srgbClr val="F8F8F8"/>
+                  <a:srgbClr val="f8f8f8"/>
                 </a:solidFill>
                 <a:latin typeface="Arial"/>
                 <a:ea typeface="DejaVu Sans"/>
@@ -2720,9 +2072,9 @@
               </a:lnSpc>
             </a:pPr>
             <a:r>
-              <a:rPr lang="en-US" sz="1600" b="1" strike="noStrike">
+              <a:rPr b="1" lang="en-US" sz="1600" strike="noStrike">
                 <a:solidFill>
-                  <a:srgbClr val="F8F8F8"/>
+                  <a:srgbClr val="f8f8f8"/>
                 </a:solidFill>
                 <a:latin typeface="Arial"/>
                 <a:ea typeface="DejaVu Sans"/>
@@ -2750,33 +2102,26 @@
         <p:spPr>
           <a:xfrm>
             <a:off x="25426440" y="2895840"/>
-            <a:ext cx="7034760" cy="527040"/>
+            <a:ext cx="7034400" cy="526680"/>
           </a:xfrm>
           <a:prstGeom prst="rect">
             <a:avLst/>
           </a:prstGeom>
           <a:solidFill>
-            <a:srgbClr val="000D26"/>
+            <a:srgbClr val="000d26"/>
           </a:solidFill>
           <a:ln w="9360">
             <a:noFill/>
           </a:ln>
         </p:spPr>
         <p:style>
-          <a:lnRef idx="0">
-            <a:scrgbClr r="0" g="0" b="0"/>
-          </a:lnRef>
-          <a:fillRef idx="0">
-            <a:scrgbClr r="0" g="0" b="0"/>
-          </a:fillRef>
-          <a:effectRef idx="0">
-            <a:scrgbClr r="0" g="0" b="0"/>
-          </a:effectRef>
+          <a:lnRef idx="0"/>
+          <a:fillRef idx="0"/>
+          <a:effectRef idx="0"/>
           <a:fontRef idx="minor"/>
         </p:style>
         <p:txBody>
-          <a:bodyPr lIns="56520" tIns="28080" rIns="56520" bIns="28080" anchor="ctr"/>
-          <a:lstStyle/>
+          <a:bodyPr lIns="56520" rIns="56520" tIns="28080" bIns="28080" anchor="ctr"/>
           <a:p>
             <a:pPr algn="ctr">
               <a:lnSpc>
@@ -2784,9 +2129,9 @@
               </a:lnSpc>
             </a:pPr>
             <a:r>
-              <a:rPr lang="en-US" sz="2800" b="1" strike="noStrike">
+              <a:rPr b="1" lang="en-US" sz="2800" strike="noStrike">
                 <a:solidFill>
-                  <a:srgbClr val="F8F8F8"/>
+                  <a:srgbClr val="f8f8f8"/>
                 </a:solidFill>
                 <a:latin typeface="Calibri"/>
                 <a:ea typeface="DejaVu Sans"/>
@@ -2806,33 +2151,26 @@
         <p:spPr>
           <a:xfrm>
             <a:off x="525960" y="2886840"/>
-            <a:ext cx="7036200" cy="537120"/>
+            <a:ext cx="7035840" cy="536760"/>
           </a:xfrm>
           <a:prstGeom prst="rect">
             <a:avLst/>
           </a:prstGeom>
           <a:solidFill>
-            <a:srgbClr val="000D26"/>
+            <a:srgbClr val="000d26"/>
           </a:solidFill>
           <a:ln w="9360">
             <a:noFill/>
           </a:ln>
         </p:spPr>
         <p:style>
-          <a:lnRef idx="0">
-            <a:scrgbClr r="0" g="0" b="0"/>
-          </a:lnRef>
-          <a:fillRef idx="0">
-            <a:scrgbClr r="0" g="0" b="0"/>
-          </a:fillRef>
-          <a:effectRef idx="0">
-            <a:scrgbClr r="0" g="0" b="0"/>
-          </a:effectRef>
+          <a:lnRef idx="0"/>
+          <a:fillRef idx="0"/>
+          <a:effectRef idx="0"/>
           <a:fontRef idx="minor"/>
         </p:style>
         <p:txBody>
-          <a:bodyPr lIns="56520" tIns="28080" rIns="56520" bIns="28080" anchor="ctr"/>
-          <a:lstStyle/>
+          <a:bodyPr lIns="56520" rIns="56520" tIns="28080" bIns="28080" anchor="ctr"/>
           <a:p>
             <a:pPr algn="ctr">
               <a:lnSpc>
@@ -2840,9 +2178,9 @@
               </a:lnSpc>
             </a:pPr>
             <a:r>
-              <a:rPr lang="en-US" sz="2800" b="1" strike="noStrike">
+              <a:rPr b="1" lang="en-US" sz="2800" strike="noStrike">
                 <a:solidFill>
-                  <a:srgbClr val="F8F8F8"/>
+                  <a:srgbClr val="f8f8f8"/>
                 </a:solidFill>
                 <a:latin typeface="Calibri"/>
                 <a:ea typeface="DejaVu Sans"/>
@@ -2861,34 +2199,27 @@
         </p:nvSpPr>
         <p:spPr>
           <a:xfrm>
-            <a:off x="25426440" y="10249560"/>
-            <a:ext cx="7034760" cy="527040"/>
+            <a:off x="25426800" y="11247120"/>
+            <a:ext cx="7034400" cy="526680"/>
           </a:xfrm>
           <a:prstGeom prst="rect">
             <a:avLst/>
           </a:prstGeom>
           <a:solidFill>
-            <a:srgbClr val="000D26"/>
+            <a:srgbClr val="000d26"/>
           </a:solidFill>
           <a:ln w="9360">
             <a:noFill/>
           </a:ln>
         </p:spPr>
         <p:style>
-          <a:lnRef idx="0">
-            <a:scrgbClr r="0" g="0" b="0"/>
-          </a:lnRef>
-          <a:fillRef idx="0">
-            <a:scrgbClr r="0" g="0" b="0"/>
-          </a:fillRef>
-          <a:effectRef idx="0">
-            <a:scrgbClr r="0" g="0" b="0"/>
-          </a:effectRef>
+          <a:lnRef idx="0"/>
+          <a:fillRef idx="0"/>
+          <a:effectRef idx="0"/>
           <a:fontRef idx="minor"/>
         </p:style>
         <p:txBody>
-          <a:bodyPr lIns="56520" tIns="28080" rIns="56520" bIns="28080" anchor="ctr"/>
-          <a:lstStyle/>
+          <a:bodyPr lIns="56520" rIns="56520" tIns="28080" bIns="28080" anchor="ctr"/>
           <a:p>
             <a:pPr algn="ctr">
               <a:lnSpc>
@@ -2896,9 +2227,9 @@
               </a:lnSpc>
             </a:pPr>
             <a:r>
-              <a:rPr lang="en-US" sz="2800" b="1" strike="noStrike">
+              <a:rPr b="1" lang="en-US" sz="2800" strike="noStrike">
                 <a:solidFill>
-                  <a:srgbClr val="F8F8F8"/>
+                  <a:srgbClr val="f8f8f8"/>
                 </a:solidFill>
                 <a:latin typeface="Calibri"/>
                 <a:ea typeface="DejaVu Sans"/>
@@ -2918,33 +2249,26 @@
         <p:spPr>
           <a:xfrm>
             <a:off x="25425000" y="16093440"/>
-            <a:ext cx="7035120" cy="527760"/>
+            <a:ext cx="7034760" cy="527400"/>
           </a:xfrm>
           <a:prstGeom prst="rect">
             <a:avLst/>
           </a:prstGeom>
           <a:solidFill>
-            <a:srgbClr val="000D26"/>
+            <a:srgbClr val="000d26"/>
           </a:solidFill>
           <a:ln w="9360">
             <a:noFill/>
           </a:ln>
         </p:spPr>
         <p:style>
-          <a:lnRef idx="0">
-            <a:scrgbClr r="0" g="0" b="0"/>
-          </a:lnRef>
-          <a:fillRef idx="0">
-            <a:scrgbClr r="0" g="0" b="0"/>
-          </a:fillRef>
-          <a:effectRef idx="0">
-            <a:scrgbClr r="0" g="0" b="0"/>
-          </a:effectRef>
+          <a:lnRef idx="0"/>
+          <a:fillRef idx="0"/>
+          <a:effectRef idx="0"/>
           <a:fontRef idx="minor"/>
         </p:style>
         <p:txBody>
-          <a:bodyPr lIns="56520" tIns="28080" rIns="56520" bIns="28080" anchor="ctr"/>
-          <a:lstStyle/>
+          <a:bodyPr lIns="56520" rIns="56520" tIns="28080" bIns="28080" anchor="ctr"/>
           <a:p>
             <a:pPr algn="ctr">
               <a:lnSpc>
@@ -2952,9 +2276,9 @@
               </a:lnSpc>
             </a:pPr>
             <a:r>
-              <a:rPr lang="en-US" sz="2800" b="1" strike="noStrike">
+              <a:rPr b="1" lang="en-US" sz="2800" strike="noStrike">
                 <a:solidFill>
-                  <a:srgbClr val="F8F8F8"/>
+                  <a:srgbClr val="f8f8f8"/>
                 </a:solidFill>
                 <a:latin typeface="Calibri"/>
                 <a:ea typeface="DejaVu Sans"/>
@@ -2974,33 +2298,26 @@
         <p:spPr>
           <a:xfrm>
             <a:off x="525960" y="11449080"/>
-            <a:ext cx="7040880" cy="537120"/>
+            <a:ext cx="7040520" cy="536760"/>
           </a:xfrm>
           <a:prstGeom prst="rect">
             <a:avLst/>
           </a:prstGeom>
           <a:solidFill>
-            <a:srgbClr val="000D26"/>
+            <a:srgbClr val="000d26"/>
           </a:solidFill>
           <a:ln w="9360">
             <a:noFill/>
           </a:ln>
         </p:spPr>
         <p:style>
-          <a:lnRef idx="0">
-            <a:scrgbClr r="0" g="0" b="0"/>
-          </a:lnRef>
-          <a:fillRef idx="0">
-            <a:scrgbClr r="0" g="0" b="0"/>
-          </a:fillRef>
-          <a:effectRef idx="0">
-            <a:scrgbClr r="0" g="0" b="0"/>
-          </a:effectRef>
+          <a:lnRef idx="0"/>
+          <a:fillRef idx="0"/>
+          <a:effectRef idx="0"/>
           <a:fontRef idx="minor"/>
         </p:style>
         <p:txBody>
-          <a:bodyPr lIns="56520" tIns="28080" rIns="56520" bIns="28080" anchor="ctr"/>
-          <a:lstStyle/>
+          <a:bodyPr lIns="56520" rIns="56520" tIns="28080" bIns="28080" anchor="ctr"/>
           <a:p>
             <a:pPr algn="ctr">
               <a:lnSpc>
@@ -3008,9 +2325,9 @@
               </a:lnSpc>
             </a:pPr>
             <a:r>
-              <a:rPr lang="en-US" sz="2800" b="1" strike="noStrike">
+              <a:rPr b="1" lang="en-US" sz="2800" strike="noStrike">
                 <a:solidFill>
-                  <a:srgbClr val="F8F8F8"/>
+                  <a:srgbClr val="f8f8f8"/>
                 </a:solidFill>
                 <a:latin typeface="Calibri"/>
                 <a:ea typeface="DejaVu Sans"/>
@@ -3030,33 +2347,26 @@
         <p:spPr>
           <a:xfrm>
             <a:off x="8532000" y="2889360"/>
-            <a:ext cx="16040686" cy="528840"/>
+            <a:ext cx="16040160" cy="528480"/>
           </a:xfrm>
           <a:prstGeom prst="rect">
             <a:avLst/>
           </a:prstGeom>
           <a:solidFill>
-            <a:srgbClr val="000D26"/>
+            <a:srgbClr val="000d26"/>
           </a:solidFill>
           <a:ln w="9360">
             <a:noFill/>
           </a:ln>
         </p:spPr>
         <p:style>
-          <a:lnRef idx="0">
-            <a:scrgbClr r="0" g="0" b="0"/>
-          </a:lnRef>
-          <a:fillRef idx="0">
-            <a:scrgbClr r="0" g="0" b="0"/>
-          </a:fillRef>
-          <a:effectRef idx="0">
-            <a:scrgbClr r="0" g="0" b="0"/>
-          </a:effectRef>
+          <a:lnRef idx="0"/>
+          <a:fillRef idx="0"/>
+          <a:effectRef idx="0"/>
           <a:fontRef idx="minor"/>
         </p:style>
         <p:txBody>
-          <a:bodyPr lIns="56520" tIns="28080" rIns="56520" bIns="28080" anchor="ctr"/>
-          <a:lstStyle/>
+          <a:bodyPr lIns="56520" rIns="56520" tIns="28080" bIns="28080" anchor="ctr"/>
           <a:p>
             <a:pPr algn="ctr">
               <a:lnSpc>
@@ -3064,9 +2374,9 @@
               </a:lnSpc>
             </a:pPr>
             <a:r>
-              <a:rPr lang="en-US" sz="2800" b="1" strike="noStrike">
+              <a:rPr b="1" lang="en-US" sz="2800" strike="noStrike">
                 <a:solidFill>
-                  <a:srgbClr val="F8F8F8"/>
+                  <a:srgbClr val="f8f8f8"/>
                 </a:solidFill>
                 <a:latin typeface="Calibri"/>
                 <a:ea typeface="DejaVu Sans"/>
@@ -3086,7 +2396,7 @@
         <p:spPr>
           <a:xfrm>
             <a:off x="822960" y="3497400"/>
-            <a:ext cx="6399720" cy="3909240"/>
+            <a:ext cx="6399360" cy="3908880"/>
           </a:xfrm>
           <a:prstGeom prst="rect">
             <a:avLst/>
@@ -3097,72 +2407,77 @@
           </a:ln>
         </p:spPr>
         <p:style>
-          <a:lnRef idx="0">
-            <a:scrgbClr r="0" g="0" b="0"/>
-          </a:lnRef>
-          <a:fillRef idx="0">
-            <a:scrgbClr r="0" g="0" b="0"/>
-          </a:fillRef>
-          <a:effectRef idx="0">
-            <a:scrgbClr r="0" g="0" b="0"/>
-          </a:effectRef>
+          <a:lnRef idx="0"/>
+          <a:fillRef idx="0"/>
+          <a:effectRef idx="0"/>
           <a:fontRef idx="minor"/>
         </p:style>
         <p:txBody>
-          <a:bodyPr lIns="90000" tIns="45000" rIns="90000" bIns="45000"/>
-          <a:lstStyle/>
-          <a:p>
-            <a:pPr algn="just"/>
-            <a:r>
-              <a:rPr lang="en-US" sz="1600" strike="noStrike" dirty="0">
+          <a:bodyPr lIns="90000" rIns="90000" tIns="45000" bIns="45000"/>
+          <a:p>
+            <a:pPr algn="just">
+              <a:lnSpc>
+                <a:spcPct val="100000"/>
+              </a:lnSpc>
+            </a:pPr>
+            <a:r>
+              <a:rPr lang="en-US" sz="1600" strike="noStrike">
                 <a:solidFill>
                   <a:srgbClr val="000000"/>
                 </a:solidFill>
                 <a:latin typeface="Arial"/>
                 <a:ea typeface="DejaVu Sans"/>
               </a:rPr>
-              <a:t>	Shear waves can be induced in tissues by acoustic radiation force created using an ultrasound probe. The shear wave speed of tissue can be measured by tracking the propagation of shear waves from their source using time-of-flight methods [1]. Tissue stiffness can be characterized using these shear wave speed measurements. </a:t>
-            </a:r>
-            <a:endParaRPr dirty="0"/>
-          </a:p>
-          <a:p>
-            <a:pPr algn="just"/>
-            <a:r>
-              <a:rPr lang="en-US" sz="1600" strike="noStrike" dirty="0">
+              <a:t>	</a:t>
+            </a:r>
+            <a:r>
+              <a:rPr lang="en-US" sz="1600" strike="noStrike">
                 <a:solidFill>
                   <a:srgbClr val="000000"/>
                 </a:solidFill>
                 <a:latin typeface="Arial"/>
                 <a:ea typeface="DejaVu Sans"/>
               </a:rPr>
-              <a:t>	Shear wave speed measurements have been shown to exhibit a depth dependent bias, which has the potential to cause misdiagnosis [2]. It was hypothesized that this depth dependence was caused by out-of-plane shear wave sources generated through nonlinear effects in acoustic propagation. These nonlinear effects are due to localized heating caused by acoustic waves with high pressure amplitudes This increases the sound speed in that specific region. Figure 1 shows the resulting </a:t>
-            </a:r>
-            <a:r>
-              <a:rPr lang="en-US" sz="1600" strike="noStrike" dirty="0" err="1">
+              <a:t>Shear waves can be induced in tissues by acoustic radiation force created using an ultrasound probe. The shear wave speed of tissue can be measured by tracking the propagation of shear waves from their source using time-of-flight methods [1]. Tissue stiffness can be characterized using these shear wave speed measurements. </a:t>
+            </a:r>
+            <a:endParaRPr/>
+          </a:p>
+          <a:p>
+            <a:pPr algn="just">
+              <a:lnSpc>
+                <a:spcPct val="100000"/>
+              </a:lnSpc>
+            </a:pPr>
+            <a:r>
+              <a:rPr lang="en-US" sz="1600" strike="noStrike">
                 <a:solidFill>
                   <a:srgbClr val="000000"/>
                 </a:solidFill>
                 <a:latin typeface="Arial"/>
                 <a:ea typeface="DejaVu Sans"/>
               </a:rPr>
-              <a:t>sawtooth</a:t>
-            </a:r>
-            <a:r>
-              <a:rPr lang="en-US" sz="1600" strike="noStrike" dirty="0">
+              <a:t>	</a:t>
+            </a:r>
+            <a:r>
+              <a:rPr lang="en-US" sz="1600" strike="noStrike">
                 <a:solidFill>
                   <a:srgbClr val="000000"/>
                 </a:solidFill>
                 <a:latin typeface="Arial"/>
                 <a:ea typeface="DejaVu Sans"/>
               </a:rPr>
-              <a:t> wave.</a:t>
-            </a:r>
-            <a:endParaRPr dirty="0"/>
-          </a:p>
-          <a:p>
-            <a:pPr algn="just"/>
-            <a:r>
-              <a:rPr lang="en-US" sz="1600" dirty="0">
+              <a:t>Shear wave speed measurements have been shown to exhibit a depth dependent bias, which has the potential to cause misdiagnosis [2]. It was hypothesized that this depth dependence was caused by out-of-plane shear wave sources generated through nonlinear effects in acoustic propagation. These nonlinear effects are due to localized heating caused by acoustic waves with high pressure amplitudes This increases the sound speed in that specific region. Figure 1 shows the resulting sawtooth wave.</a:t>
+            </a:r>
+            <a:endParaRPr/>
+          </a:p>
+          <a:p>
+            <a:pPr algn="just">
+              <a:lnSpc>
+                <a:spcPct val="100000"/>
+              </a:lnSpc>
+            </a:pPr>
+            <a:r>
+              <a:rPr lang="en-US" sz="1600" strike="noStrike">
                 <a:solidFill>
                   <a:srgbClr val="000000"/>
                 </a:solidFill>
@@ -3172,36 +2487,16 @@
               <a:t>	</a:t>
             </a:r>
             <a:r>
-              <a:rPr lang="en-US" sz="1600" strike="noStrike" dirty="0" smtClean="0">
+              <a:rPr lang="en-US" sz="1600" strike="noStrike">
                 <a:solidFill>
                   <a:srgbClr val="000000"/>
                 </a:solidFill>
                 <a:latin typeface="Arial"/>
                 <a:ea typeface="DejaVu Sans"/>
               </a:rPr>
-              <a:t>The </a:t>
-            </a:r>
-            <a:r>
-              <a:rPr lang="en-US" sz="1600" strike="noStrike" dirty="0" err="1">
-                <a:solidFill>
-                  <a:srgbClr val="000000"/>
-                </a:solidFill>
-                <a:latin typeface="Arial"/>
-                <a:ea typeface="DejaVu Sans"/>
-              </a:rPr>
-              <a:t>Khokhlov-Zabolotskaya-Kuznetsov</a:t>
-            </a:r>
-            <a:r>
-              <a:rPr lang="en-US" sz="1600" strike="noStrike" dirty="0">
-                <a:solidFill>
-                  <a:srgbClr val="000000"/>
-                </a:solidFill>
-                <a:latin typeface="Arial"/>
-                <a:ea typeface="DejaVu Sans"/>
-              </a:rPr>
-              <a:t> (KZK) nonlinear wave equation [3] was used to simulate acoustic waves propagating in differing media with various nonlinear coefficients. The simulated intensity field distributions showed that as nonlinearity increased, the maximum intensities tended towards shallower, laterally offset locations. It was also shown that as attenuation increased, the effects of nonlinearity were also diminished.</a:t>
-            </a:r>
-            <a:endParaRPr dirty="0"/>
+              <a:t>The Khokhlov-Zabolotskaya-Kuznetsov (KZK) nonlinear wave equation [3] was used to simulate acoustic waves propagating in differing media with various nonlinear coefficients. The simulated intensity field distributions showed that as nonlinearity increased, the maximum intensities tended towards shallower, laterally offset locations. It was also shown that as attenuation increased, the effects of nonlinearity were also diminished.</a:t>
+            </a:r>
+            <a:endParaRPr/>
           </a:p>
         </p:txBody>
       </p:sp>
@@ -3214,7 +2509,7 @@
         <p:spPr>
           <a:xfrm>
             <a:off x="25603200" y="16733520"/>
-            <a:ext cx="6674040" cy="1625040"/>
+            <a:ext cx="6673680" cy="1624680"/>
           </a:xfrm>
           <a:prstGeom prst="rect">
             <a:avLst/>
@@ -3225,21 +2520,19 @@
           </a:ln>
         </p:spPr>
         <p:style>
-          <a:lnRef idx="0">
-            <a:scrgbClr r="0" g="0" b="0"/>
-          </a:lnRef>
-          <a:fillRef idx="0">
-            <a:scrgbClr r="0" g="0" b="0"/>
-          </a:fillRef>
-          <a:effectRef idx="0">
-            <a:scrgbClr r="0" g="0" b="0"/>
-          </a:effectRef>
+          <a:lnRef idx="0"/>
+          <a:fillRef idx="0"/>
+          <a:effectRef idx="0"/>
           <a:fontRef idx="minor"/>
         </p:style>
         <p:txBody>
-          <a:bodyPr lIns="90000" tIns="45000" rIns="90000" bIns="45000"/>
-          <a:lstStyle/>
-          <a:p>
+          <a:bodyPr lIns="90000" rIns="90000" tIns="45000" bIns="45000"/>
+          <a:p>
+            <a:pPr>
+              <a:lnSpc>
+                <a:spcPct val="100000"/>
+              </a:lnSpc>
+            </a:pPr>
             <a:r>
               <a:rPr lang="en-US" sz="1200" strike="noStrike">
                 <a:solidFill>
@@ -3253,6 +2546,11 @@
             <a:endParaRPr/>
           </a:p>
           <a:p>
+            <a:pPr>
+              <a:lnSpc>
+                <a:spcPct val="100000"/>
+              </a:lnSpc>
+            </a:pPr>
             <a:r>
               <a:rPr lang="en-US" sz="1200" strike="noStrike">
                 <a:solidFill>
@@ -3266,6 +2564,11 @@
             <a:endParaRPr/>
           </a:p>
           <a:p>
+            <a:pPr>
+              <a:lnSpc>
+                <a:spcPct val="100000"/>
+              </a:lnSpc>
+            </a:pPr>
             <a:r>
               <a:rPr lang="en-US" sz="1200" strike="noStrike">
                 <a:solidFill>
@@ -3274,7 +2577,27 @@
                 <a:latin typeface="Arial"/>
                 <a:ea typeface="DejaVu Sans"/>
               </a:rPr>
-              <a:t>[3] Pinton, G. F., Dahl, J., Rosenzweig, S., &amp; Trahey, G. E. (2009). A heterogeneous nonlinear attenuating full-wave model of ultrasound. Ultrasonics, Ferroelectrics, and Frequency Control, IEEE Transactions on, 56(3), 474-488.</a:t>
+              <a:t>[3] Pinton, G. F., Dahl, J., Rosenzweig, S., &amp; Trahey, G. E. (2009). A heterogeneous nonlinear attenuating full-wave model of ultrasound. </a:t>
+            </a:r>
+            <a:r>
+              <a:rPr lang="en-US" sz="1200" strike="noStrike">
+                <a:solidFill>
+                  <a:srgbClr val="000000"/>
+                </a:solidFill>
+                <a:latin typeface="Arial"/>
+                <a:ea typeface="DejaVu Sans"/>
+              </a:rPr>
+              <a:t>IEEE Transactions on </a:t>
+            </a:r>
+            <a:r>
+              <a:rPr lang="en-US" sz="1200" strike="noStrike">
+                <a:solidFill>
+                  <a:srgbClr val="000000"/>
+                </a:solidFill>
+                <a:latin typeface="Arial"/>
+                <a:ea typeface="DejaVu Sans"/>
+              </a:rPr>
+              <a:t>Ultrasonics, Ferroelectrics, and Frequency Control, 56(3), 474-488.</a:t>
             </a:r>
             <a:endParaRPr/>
           </a:p>
@@ -3282,18 +2605,18 @@
       </p:sp>
       <p:pic>
         <p:nvPicPr>
-          <p:cNvPr id="62" name="Picture 61"/>
+          <p:cNvPr id="62" name="Picture 61" descr=""/>
           <p:cNvPicPr/>
           <p:nvPr/>
         </p:nvPicPr>
         <p:blipFill>
-          <a:blip r:embed="rId3"/>
+          <a:blip r:embed="rId1"/>
           <a:stretch/>
         </p:blipFill>
         <p:spPr>
           <a:xfrm>
-            <a:off x="11531853" y="4723374"/>
-            <a:ext cx="4315719" cy="3391709"/>
+            <a:off x="11536560" y="6178320"/>
+            <a:ext cx="4315320" cy="3391200"/>
           </a:xfrm>
           <a:prstGeom prst="rect">
             <a:avLst/>
@@ -3313,8 +2636,8 @@
         </p:nvSpPr>
         <p:spPr>
           <a:xfrm>
-            <a:off x="8682273" y="6204980"/>
-            <a:ext cx="2454120" cy="345960"/>
+            <a:off x="8686800" y="7660080"/>
+            <a:ext cx="2453760" cy="345600"/>
           </a:xfrm>
           <a:prstGeom prst="rect">
             <a:avLst/>
@@ -3325,46 +2648,48 @@
           </a:ln>
         </p:spPr>
         <p:style>
-          <a:lnRef idx="0">
-            <a:scrgbClr r="0" g="0" b="0"/>
-          </a:lnRef>
-          <a:fillRef idx="0">
-            <a:scrgbClr r="0" g="0" b="0"/>
-          </a:fillRef>
-          <a:effectRef idx="0">
-            <a:scrgbClr r="0" g="0" b="0"/>
-          </a:effectRef>
+          <a:lnRef idx="0"/>
+          <a:fillRef idx="0"/>
+          <a:effectRef idx="0"/>
           <a:fontRef idx="minor"/>
         </p:style>
         <p:txBody>
-          <a:bodyPr lIns="90000" tIns="45000" rIns="90000" bIns="45000"/>
-          <a:lstStyle/>
-          <a:p>
-            <a:r>
-              <a:rPr lang="en-US" strike="noStrike" dirty="0">
-                <a:latin typeface="Arial"/>
+          <a:bodyPr lIns="90000" rIns="90000" tIns="45000" bIns="45000"/>
+          <a:p>
+            <a:pPr>
+              <a:lnSpc>
+                <a:spcPct val="100000"/>
+              </a:lnSpc>
+            </a:pPr>
+            <a:r>
+              <a:rPr lang="en-US" strike="noStrike">
+                <a:solidFill>
+                  <a:srgbClr val="000000"/>
+                </a:solidFill>
+                <a:latin typeface="Arial"/>
+                <a:ea typeface="DejaVu Sans"/>
               </a:rPr>
               <a:t>α = 0.005 dB/cm/MHz </a:t>
             </a:r>
-            <a:endParaRPr dirty="0"/>
+            <a:endParaRPr/>
           </a:p>
         </p:txBody>
       </p:sp>
       <p:pic>
         <p:nvPicPr>
-          <p:cNvPr id="64" name="Picture 63"/>
+          <p:cNvPr id="64" name="Picture 63" descr=""/>
           <p:cNvPicPr/>
           <p:nvPr/>
         </p:nvPicPr>
-        <p:blipFill rotWithShape="1">
-          <a:blip r:embed="rId4"/>
-          <a:srcRect l="38156" r="38176" b="2711"/>
+        <p:blipFill>
+          <a:blip r:embed="rId2"/>
+          <a:srcRect l="-657187" t="0" r="-656618" b="77436"/>
           <a:stretch/>
         </p:blipFill>
         <p:spPr>
           <a:xfrm>
-            <a:off x="16352519" y="4720531"/>
-            <a:ext cx="1879643" cy="3391707"/>
+            <a:off x="16357320" y="6175800"/>
+            <a:ext cx="1879200" cy="3391200"/>
           </a:xfrm>
           <a:prstGeom prst="rect">
             <a:avLst/>
@@ -3378,19 +2703,19 @@
       </p:pic>
       <p:pic>
         <p:nvPicPr>
-          <p:cNvPr id="65" name="Picture 64"/>
+          <p:cNvPr id="65" name="Picture 64" descr=""/>
           <p:cNvPicPr/>
           <p:nvPr/>
         </p:nvPicPr>
-        <p:blipFill rotWithShape="1">
-          <a:blip r:embed="rId5"/>
-          <a:srcRect l="38119" t="2043" r="38041" b="2049"/>
+        <p:blipFill>
+          <a:blip r:embed="rId3"/>
+          <a:srcRect l="-658245" t="58320" r="-660483" b="58470"/>
           <a:stretch/>
         </p:blipFill>
         <p:spPr>
           <a:xfrm>
-            <a:off x="18737109" y="4723374"/>
-            <a:ext cx="1970241" cy="3388864"/>
+            <a:off x="18741960" y="6178320"/>
+            <a:ext cx="1969920" cy="3388680"/>
           </a:xfrm>
           <a:prstGeom prst="rect">
             <a:avLst/>
@@ -3404,19 +2729,19 @@
       </p:pic>
       <p:pic>
         <p:nvPicPr>
-          <p:cNvPr id="66" name="Picture 65"/>
+          <p:cNvPr id="66" name="Picture 65" descr=""/>
           <p:cNvPicPr/>
           <p:nvPr/>
         </p:nvPicPr>
-        <p:blipFill rotWithShape="1">
-          <a:blip r:embed="rId6"/>
-          <a:srcRect l="38102" t="-1" r="38355" b="2381"/>
+        <p:blipFill>
+          <a:blip r:embed="rId4"/>
+          <a:srcRect l="-658733" t="0" r="-651491" b="67991"/>
           <a:stretch/>
         </p:blipFill>
         <p:spPr>
           <a:xfrm>
-            <a:off x="21130260" y="4722484"/>
-            <a:ext cx="1893030" cy="3389754"/>
+            <a:off x="21134880" y="6177600"/>
+            <a:ext cx="1892520" cy="3389400"/>
           </a:xfrm>
           <a:prstGeom prst="rect">
             <a:avLst/>
@@ -3430,18 +2755,18 @@
       </p:pic>
       <p:pic>
         <p:nvPicPr>
-          <p:cNvPr id="67" name="Picture 66"/>
+          <p:cNvPr id="67" name="Picture 66" descr=""/>
           <p:cNvPicPr/>
           <p:nvPr/>
         </p:nvPicPr>
         <p:blipFill>
-          <a:blip r:embed="rId7"/>
+          <a:blip r:embed="rId5"/>
           <a:stretch/>
         </p:blipFill>
         <p:spPr>
           <a:xfrm>
-            <a:off x="11531852" y="8786800"/>
-            <a:ext cx="4315719" cy="3389754"/>
+            <a:off x="11643480" y="14772600"/>
+            <a:ext cx="4315320" cy="3389400"/>
           </a:xfrm>
           <a:prstGeom prst="rect">
             <a:avLst/>
@@ -3461,8 +2786,8 @@
         </p:nvSpPr>
         <p:spPr>
           <a:xfrm>
-            <a:off x="8855402" y="10340100"/>
-            <a:ext cx="2201040" cy="345960"/>
+            <a:off x="8966880" y="16326000"/>
+            <a:ext cx="2200680" cy="345600"/>
           </a:xfrm>
           <a:prstGeom prst="rect">
             <a:avLst/>
@@ -3473,46 +2798,48 @@
           </a:ln>
         </p:spPr>
         <p:style>
-          <a:lnRef idx="0">
-            <a:scrgbClr r="0" g="0" b="0"/>
-          </a:lnRef>
-          <a:fillRef idx="0">
-            <a:scrgbClr r="0" g="0" b="0"/>
-          </a:fillRef>
-          <a:effectRef idx="0">
-            <a:scrgbClr r="0" g="0" b="0"/>
-          </a:effectRef>
+          <a:lnRef idx="0"/>
+          <a:fillRef idx="0"/>
+          <a:effectRef idx="0"/>
           <a:fontRef idx="minor"/>
         </p:style>
         <p:txBody>
-          <a:bodyPr lIns="90000" tIns="45000" rIns="90000" bIns="45000"/>
-          <a:lstStyle/>
-          <a:p>
-            <a:r>
-              <a:rPr lang="en-US" strike="noStrike" dirty="0">
-                <a:latin typeface="Arial"/>
+          <a:bodyPr lIns="90000" rIns="90000" tIns="45000" bIns="45000"/>
+          <a:p>
+            <a:pPr>
+              <a:lnSpc>
+                <a:spcPct val="100000"/>
+              </a:lnSpc>
+            </a:pPr>
+            <a:r>
+              <a:rPr lang="en-US" strike="noStrike">
+                <a:solidFill>
+                  <a:srgbClr val="000000"/>
+                </a:solidFill>
+                <a:latin typeface="Arial"/>
+                <a:ea typeface="DejaVu Sans"/>
               </a:rPr>
               <a:t>α = 1.5 dB/cm/MHz </a:t>
             </a:r>
-            <a:endParaRPr dirty="0"/>
+            <a:endParaRPr/>
           </a:p>
         </p:txBody>
       </p:sp>
       <p:pic>
         <p:nvPicPr>
-          <p:cNvPr id="69" name="Picture 68"/>
+          <p:cNvPr id="69" name="Picture 68" descr=""/>
           <p:cNvPicPr/>
           <p:nvPr/>
         </p:nvPicPr>
-        <p:blipFill rotWithShape="1">
-          <a:blip r:embed="rId8"/>
-          <a:srcRect l="20829" r="20043" b="1675"/>
+        <p:blipFill>
+          <a:blip r:embed="rId6"/>
+          <a:srcRect l="595064" t="0" r="572616" b="47826"/>
           <a:stretch/>
         </p:blipFill>
         <p:spPr>
           <a:xfrm>
-            <a:off x="16352519" y="8786803"/>
-            <a:ext cx="1898203" cy="3389751"/>
+            <a:off x="16464240" y="14772600"/>
+            <a:ext cx="1897920" cy="3389400"/>
           </a:xfrm>
           <a:prstGeom prst="rect">
             <a:avLst/>
@@ -3526,19 +2853,19 @@
       </p:pic>
       <p:pic>
         <p:nvPicPr>
-          <p:cNvPr id="70" name="Picture 69"/>
+          <p:cNvPr id="70" name="Picture 69" descr=""/>
           <p:cNvPicPr/>
           <p:nvPr/>
         </p:nvPicPr>
-        <p:blipFill rotWithShape="1">
-          <a:blip r:embed="rId9"/>
-          <a:srcRect l="10860" t="6515" r="11361" b="2710"/>
+        <p:blipFill>
+          <a:blip r:embed="rId7"/>
+          <a:srcRect l="310205" t="186111" r="324526" b="77387"/>
           <a:stretch/>
         </p:blipFill>
         <p:spPr>
           <a:xfrm>
-            <a:off x="18780738" y="8786800"/>
-            <a:ext cx="1882981" cy="3389754"/>
+            <a:off x="18892440" y="14772600"/>
+            <a:ext cx="1882800" cy="3389400"/>
           </a:xfrm>
           <a:prstGeom prst="rect">
             <a:avLst/>
@@ -3552,19 +2879,19 @@
       </p:pic>
       <p:pic>
         <p:nvPicPr>
-          <p:cNvPr id="71" name="Picture 70"/>
+          <p:cNvPr id="71" name="Picture 70" descr=""/>
           <p:cNvPicPr/>
           <p:nvPr/>
         </p:nvPicPr>
-        <p:blipFill rotWithShape="1">
-          <a:blip r:embed="rId10"/>
-          <a:srcRect l="20244" r="20399"/>
+        <p:blipFill>
+          <a:blip r:embed="rId8"/>
+          <a:srcRect l="578352" t="0" r="582821" b="0"/>
           <a:stretch/>
         </p:blipFill>
         <p:spPr>
           <a:xfrm>
-            <a:off x="21130260" y="8786801"/>
-            <a:ext cx="1893030" cy="3389754"/>
+            <a:off x="21241800" y="14772600"/>
+            <a:ext cx="1892520" cy="3389400"/>
           </a:xfrm>
           <a:prstGeom prst="rect">
             <a:avLst/>
@@ -3578,14 +2905,14 @@
       </p:pic>
       <p:sp>
         <p:nvSpPr>
-          <p:cNvPr id="72" name="TextShape 14"/>
-          <p:cNvSpPr txBox="1"/>
-          <p:nvPr/>
-        </p:nvSpPr>
-        <p:spPr>
-          <a:xfrm>
-            <a:off x="25694640" y="10972800"/>
-            <a:ext cx="6492240" cy="346320"/>
+          <p:cNvPr id="72" name="CustomShape 14"/>
+          <p:cNvSpPr/>
+          <p:nvPr/>
+        </p:nvSpPr>
+        <p:spPr>
+          <a:xfrm>
+            <a:off x="25694640" y="11907000"/>
+            <a:ext cx="6491880" cy="345960"/>
           </a:xfrm>
           <a:prstGeom prst="rect">
             <a:avLst/>
@@ -3595,30 +2922,130 @@
             <a:noFill/>
           </a:ln>
         </p:spPr>
-        <p:txBody>
-          <a:bodyPr lIns="90000" tIns="45000" rIns="90000" bIns="45000"/>
-          <a:lstStyle/>
-          <a:p>
-            <a:r>
-              <a:rPr lang="en-US">
-                <a:latin typeface="Arial"/>
-              </a:rPr>
-              <a:t>The</a:t>
-            </a:r>
-            <a:endParaRPr/>
-          </a:p>
-        </p:txBody>
-      </p:sp>
-      <p:sp>
-        <p:nvSpPr>
-          <p:cNvPr id="73" name="TextShape 15"/>
-          <p:cNvSpPr txBox="1"/>
+        <p:style>
+          <a:lnRef idx="0"/>
+          <a:fillRef idx="0"/>
+          <a:effectRef idx="0"/>
+          <a:fontRef idx="minor"/>
+        </p:style>
+        <p:txBody>
+          <a:bodyPr lIns="90000" rIns="90000" tIns="45000" bIns="45000"/>
+          <a:p>
+            <a:pPr algn="just">
+              <a:lnSpc>
+                <a:spcPct val="100000"/>
+              </a:lnSpc>
+            </a:pPr>
+            <a:r>
+              <a:rPr lang="en-US" sz="1600" strike="noStrike">
+                <a:solidFill>
+                  <a:srgbClr val="000000"/>
+                </a:solidFill>
+                <a:latin typeface="Arial"/>
+                <a:ea typeface="DejaVu Sans"/>
+              </a:rPr>
+              <a:t>	</a:t>
+            </a:r>
+            <a:r>
+              <a:rPr lang="en-US" sz="1600" strike="noStrike">
+                <a:solidFill>
+                  <a:srgbClr val="000000"/>
+                </a:solidFill>
+                <a:latin typeface="Arial"/>
+                <a:ea typeface="DejaVu Sans"/>
+              </a:rPr>
+              <a:t>The effect of increasing nonlinearity on the intensity distribution of a focused ultrasound beam was investigated computationally using the KZK simulation. The results of these simulations provided strong evidence suggesting that </a:t>
+            </a:r>
+            <a:r>
+              <a:rPr lang="en-US" sz="1600" strike="noStrike">
+                <a:solidFill>
+                  <a:srgbClr val="000000"/>
+                </a:solidFill>
+                <a:latin typeface="Arial"/>
+                <a:ea typeface="DejaVu Sans"/>
+              </a:rPr>
+              <a:t>as the nonlinear coefficient of the medium increased,</a:t>
+            </a:r>
+            <a:r>
+              <a:rPr lang="en-US" sz="1600" strike="noStrike">
+                <a:solidFill>
+                  <a:srgbClr val="000000"/>
+                </a:solidFill>
+                <a:latin typeface="Arial"/>
+                <a:ea typeface="DejaVu Sans"/>
+              </a:rPr>
+              <a:t> the intensity field peaked at shallower positions that were offset on the lateral axis.</a:t>
+            </a:r>
+            <a:endParaRPr/>
+          </a:p>
+          <a:p>
+            <a:pPr algn="just">
+              <a:lnSpc>
+                <a:spcPct val="100000"/>
+              </a:lnSpc>
+            </a:pPr>
+            <a:r>
+              <a:rPr lang="en-US" sz="1600" strike="noStrike">
+                <a:solidFill>
+                  <a:srgbClr val="000000"/>
+                </a:solidFill>
+                <a:latin typeface="Arial"/>
+                <a:ea typeface="DejaVu Sans"/>
+              </a:rPr>
+              <a:t>	</a:t>
+            </a:r>
+            <a:r>
+              <a:rPr lang="en-US" sz="1600" strike="noStrike">
+                <a:solidFill>
+                  <a:srgbClr val="000000"/>
+                </a:solidFill>
+                <a:latin typeface="Arial"/>
+                <a:ea typeface="DejaVu Sans"/>
+              </a:rPr>
+              <a:t>It was also found that as the attenuation of the material increased, the effects of nonlinearity were dampened. This agreed well with what was predicted, since nonlinear effects were most prominent when pressure waves with immense amplitudes caused local temperature and sound speed increases.</a:t>
+            </a:r>
+            <a:endParaRPr/>
+          </a:p>
+          <a:p>
+            <a:pPr algn="just">
+              <a:lnSpc>
+                <a:spcPct val="100000"/>
+              </a:lnSpc>
+            </a:pPr>
+            <a:r>
+              <a:rPr lang="en-US" sz="1600" strike="noStrike">
+                <a:solidFill>
+                  <a:srgbClr val="000000"/>
+                </a:solidFill>
+                <a:latin typeface="Arial"/>
+                <a:ea typeface="DejaVu Sans"/>
+              </a:rPr>
+              <a:t>	</a:t>
+            </a:r>
+            <a:r>
+              <a:rPr lang="en-US" sz="1600" strike="noStrike">
+                <a:solidFill>
+                  <a:srgbClr val="000000"/>
+                </a:solidFill>
+                <a:latin typeface="Arial"/>
+                <a:ea typeface="DejaVu Sans"/>
+              </a:rPr>
+              <a:t>Finally, the next step is to simulate the shear waves created using these intensity data. This will help further characterize the bias on shear wave speed measurements. This information will be crucial for developing methods to possibly correct for this depth dependent measurement bias.</a:t>
+            </a:r>
+            <a:endParaRPr/>
+          </a:p>
+        </p:txBody>
+      </p:sp>
+      <p:sp>
+        <p:nvSpPr>
+          <p:cNvPr id="73" name="CustomShape 15"/>
+          <p:cNvSpPr/>
           <p:nvPr/>
         </p:nvSpPr>
         <p:spPr>
           <a:xfrm>
             <a:off x="822960" y="12088440"/>
-            <a:ext cx="6492240" cy="1670400"/>
+            <a:ext cx="6491880" cy="1670040"/>
           </a:xfrm>
           <a:prstGeom prst="rect">
             <a:avLst/>
@@ -3628,37 +3055,54 @@
             <a:noFill/>
           </a:ln>
         </p:spPr>
-        <p:txBody>
-          <a:bodyPr lIns="90000" tIns="45000" rIns="90000" bIns="45000"/>
-          <a:lstStyle/>
-          <a:p>
-            <a:pPr algn="just"/>
-            <a:r>
-              <a:rPr lang="en-US" sz="1600" dirty="0" smtClean="0">
-                <a:latin typeface="Arial"/>
-              </a:rPr>
-              <a:t>	A </a:t>
-            </a:r>
-            <a:r>
-              <a:rPr lang="en-US" sz="1600" dirty="0">
-                <a:latin typeface="Arial"/>
-              </a:rPr>
-              <a:t>curvilinear C5-2 transducer focused at 70 mm in depth was simulated with 7 excitation cycles at an excitation frequency of 2.36 MHz to generate the face pressures used as an input to the KZK simulations. These face pressure waves was scaled to an amplitude of 0.4 MPa to match pressure amplitudes that were measured experimentally. As shown in Figure 2, appropriate time delays were applied to focus the acoustic waves correctly. </a:t>
-            </a:r>
-            <a:endParaRPr dirty="0"/>
-          </a:p>
-        </p:txBody>
-      </p:sp>
-      <p:sp>
-        <p:nvSpPr>
-          <p:cNvPr id="74" name="TextShape 16"/>
-          <p:cNvSpPr txBox="1"/>
+        <p:style>
+          <a:lnRef idx="0"/>
+          <a:fillRef idx="0"/>
+          <a:effectRef idx="0"/>
+          <a:fontRef idx="minor"/>
+        </p:style>
+        <p:txBody>
+          <a:bodyPr lIns="90000" rIns="90000" tIns="45000" bIns="45000"/>
+          <a:p>
+            <a:pPr algn="just">
+              <a:lnSpc>
+                <a:spcPct val="100000"/>
+              </a:lnSpc>
+            </a:pPr>
+            <a:r>
+              <a:rPr lang="en-US" sz="1600" strike="noStrike">
+                <a:solidFill>
+                  <a:srgbClr val="000000"/>
+                </a:solidFill>
+                <a:latin typeface="Arial"/>
+                <a:ea typeface="DejaVu Sans"/>
+              </a:rPr>
+              <a:t>	</a:t>
+            </a:r>
+            <a:r>
+              <a:rPr lang="en-US" sz="1600" strike="noStrike">
+                <a:solidFill>
+                  <a:srgbClr val="000000"/>
+                </a:solidFill>
+                <a:latin typeface="Arial"/>
+                <a:ea typeface="DejaVu Sans"/>
+              </a:rPr>
+              <a:t>A curvilinear C5-2 transducer focused at 70 mm in depth was simulated with 7 excitation cycles at an excitation frequency of 2.36 MHz to generate the face pressures used as an input to the KZK simulations. These face pressure waves was scaled to an amplitude of 0.4 MPa to match pressure amplitudes that were measured experimentally. As shown in Figure 2, appropriate time delays were applied to focus the acoustic waves correctly. </a:t>
+            </a:r>
+            <a:endParaRPr/>
+          </a:p>
+        </p:txBody>
+      </p:sp>
+      <p:sp>
+        <p:nvSpPr>
+          <p:cNvPr id="74" name="CustomShape 16"/>
+          <p:cNvSpPr/>
           <p:nvPr/>
         </p:nvSpPr>
         <p:spPr>
           <a:xfrm>
             <a:off x="2377440" y="11057400"/>
-            <a:ext cx="3291840" cy="541800"/>
+            <a:ext cx="3291480" cy="541440"/>
           </a:xfrm>
           <a:prstGeom prst="rect">
             <a:avLst/>
@@ -3668,13 +3112,27 @@
             <a:noFill/>
           </a:ln>
         </p:spPr>
-        <p:txBody>
-          <a:bodyPr lIns="90000" tIns="45000" rIns="90000" bIns="45000"/>
-          <a:lstStyle/>
-          <a:p>
-            <a:r>
-              <a:rPr lang="en-US" sz="1600">
-                <a:latin typeface="Arial"/>
+        <p:style>
+          <a:lnRef idx="0"/>
+          <a:fillRef idx="0"/>
+          <a:effectRef idx="0"/>
+          <a:fontRef idx="minor"/>
+        </p:style>
+        <p:txBody>
+          <a:bodyPr lIns="90000" rIns="90000" tIns="45000" bIns="45000"/>
+          <a:p>
+            <a:pPr>
+              <a:lnSpc>
+                <a:spcPct val="100000"/>
+              </a:lnSpc>
+            </a:pPr>
+            <a:r>
+              <a:rPr lang="en-US" sz="1600" strike="noStrike">
+                <a:solidFill>
+                  <a:srgbClr val="000000"/>
+                </a:solidFill>
+                <a:latin typeface="Arial"/>
+                <a:ea typeface="DejaVu Sans"/>
               </a:rPr>
               <a:t>Figure 1: Nonlinear Acoustic Wave</a:t>
             </a:r>
@@ -3684,7 +3142,663 @@
       </p:sp>
       <p:pic>
         <p:nvPicPr>
-          <p:cNvPr id="75" name="Picture 74"/>
+          <p:cNvPr id="75" name="Picture 74" descr=""/>
+          <p:cNvPicPr/>
+          <p:nvPr/>
+        </p:nvPicPr>
+        <p:blipFill>
+          <a:blip r:embed="rId9"/>
+          <a:stretch/>
+        </p:blipFill>
+        <p:spPr>
+          <a:xfrm>
+            <a:off x="2089440" y="8595360"/>
+            <a:ext cx="3762720" cy="2409840"/>
+          </a:xfrm>
+          <a:prstGeom prst="rect">
+            <a:avLst/>
+          </a:prstGeom>
+          <a:ln>
+            <a:solidFill>
+              <a:schemeClr val="tx1"/>
+            </a:solidFill>
+          </a:ln>
+        </p:spPr>
+      </p:pic>
+      <p:sp>
+        <p:nvSpPr>
+          <p:cNvPr id="76" name="CustomShape 17"/>
+          <p:cNvSpPr/>
+          <p:nvPr/>
+        </p:nvSpPr>
+        <p:spPr>
+          <a:xfrm>
+            <a:off x="822960" y="17623080"/>
+            <a:ext cx="6400440" cy="992880"/>
+          </a:xfrm>
+          <a:prstGeom prst="rect">
+            <a:avLst/>
+          </a:prstGeom>
+          <a:noFill/>
+          <a:ln>
+            <a:noFill/>
+          </a:ln>
+        </p:spPr>
+        <p:style>
+          <a:lnRef idx="0"/>
+          <a:fillRef idx="0"/>
+          <a:effectRef idx="0"/>
+          <a:fontRef idx="minor"/>
+        </p:style>
+        <p:txBody>
+          <a:bodyPr lIns="90000" rIns="90000" tIns="45000" bIns="45000"/>
+          <a:p>
+            <a:pPr>
+              <a:lnSpc>
+                <a:spcPct val="100000"/>
+              </a:lnSpc>
+            </a:pPr>
+            <a:r>
+              <a:rPr lang="en-US" sz="1600" strike="noStrike">
+                <a:solidFill>
+                  <a:srgbClr val="000000"/>
+                </a:solidFill>
+                <a:latin typeface="Arial"/>
+                <a:ea typeface="DejaVu Sans"/>
+              </a:rPr>
+              <a:t>	</a:t>
+            </a:r>
+            <a:r>
+              <a:rPr lang="en-US" sz="1600" strike="noStrike">
+                <a:solidFill>
+                  <a:srgbClr val="000000"/>
+                </a:solidFill>
+                <a:latin typeface="Arial"/>
+                <a:ea typeface="DejaVu Sans"/>
+              </a:rPr>
+              <a:t>Using these face pressure inputs, KZK simulations were run with various combinations of attenuation coefficients (α = 0.005, 0.3, 1.0, and 1.5 dB/cm/MHz) and nonlinear coefficients (β = 0, 3.5, and 7). The resulting intensity fields were visualized using ParaView.</a:t>
+            </a:r>
+            <a:endParaRPr/>
+          </a:p>
+        </p:txBody>
+      </p:sp>
+      <p:pic>
+        <p:nvPicPr>
+          <p:cNvPr id="77" name="Picture 76" descr=""/>
+          <p:cNvPicPr/>
+          <p:nvPr/>
+        </p:nvPicPr>
+        <p:blipFill>
+          <a:blip r:embed="rId10"/>
+          <a:stretch/>
+        </p:blipFill>
+        <p:spPr>
+          <a:xfrm>
+            <a:off x="2000160" y="13928040"/>
+            <a:ext cx="4137480" cy="3266640"/>
+          </a:xfrm>
+          <a:prstGeom prst="rect">
+            <a:avLst/>
+          </a:prstGeom>
+          <a:ln>
+            <a:solidFill>
+              <a:schemeClr val="tx1"/>
+            </a:solidFill>
+          </a:ln>
+        </p:spPr>
+      </p:pic>
+      <p:sp>
+        <p:nvSpPr>
+          <p:cNvPr id="78" name="CustomShape 18"/>
+          <p:cNvSpPr/>
+          <p:nvPr/>
+        </p:nvSpPr>
+        <p:spPr>
+          <a:xfrm>
+            <a:off x="2103120" y="17246160"/>
+            <a:ext cx="3931560" cy="315720"/>
+          </a:xfrm>
+          <a:prstGeom prst="rect">
+            <a:avLst/>
+          </a:prstGeom>
+          <a:noFill/>
+          <a:ln>
+            <a:noFill/>
+          </a:ln>
+        </p:spPr>
+        <p:style>
+          <a:lnRef idx="0"/>
+          <a:fillRef idx="0"/>
+          <a:effectRef idx="0"/>
+          <a:fontRef idx="minor"/>
+        </p:style>
+        <p:txBody>
+          <a:bodyPr lIns="90000" rIns="90000" tIns="45000" bIns="45000"/>
+          <a:p>
+            <a:pPr>
+              <a:lnSpc>
+                <a:spcPct val="100000"/>
+              </a:lnSpc>
+            </a:pPr>
+            <a:r>
+              <a:rPr lang="en-US" sz="1600" strike="noStrike">
+                <a:solidFill>
+                  <a:srgbClr val="000000"/>
+                </a:solidFill>
+                <a:latin typeface="Arial"/>
+                <a:ea typeface="DejaVu Sans"/>
+              </a:rPr>
+              <a:t>Figure 2: Simulated Element Time Delays</a:t>
+            </a:r>
+            <a:endParaRPr/>
+          </a:p>
+        </p:txBody>
+      </p:sp>
+      <p:sp>
+        <p:nvSpPr>
+          <p:cNvPr id="79" name="CustomShape 19"/>
+          <p:cNvSpPr/>
+          <p:nvPr/>
+        </p:nvSpPr>
+        <p:spPr>
+          <a:xfrm>
+            <a:off x="16948440" y="5716080"/>
+            <a:ext cx="712440" cy="364680"/>
+          </a:xfrm>
+          <a:prstGeom prst="rect">
+            <a:avLst/>
+          </a:prstGeom>
+          <a:noFill/>
+          <a:ln>
+            <a:noFill/>
+          </a:ln>
+        </p:spPr>
+        <p:style>
+          <a:lnRef idx="0"/>
+          <a:fillRef idx="0"/>
+          <a:effectRef idx="0"/>
+          <a:fontRef idx="minor"/>
+        </p:style>
+        <p:txBody>
+          <a:bodyPr lIns="90000" rIns="90000" tIns="45000" bIns="45000"/>
+          <a:p>
+            <a:pPr>
+              <a:lnSpc>
+                <a:spcPct val="100000"/>
+              </a:lnSpc>
+            </a:pPr>
+            <a:r>
+              <a:rPr lang="en-US" strike="noStrike">
+                <a:solidFill>
+                  <a:srgbClr val="000000"/>
+                </a:solidFill>
+                <a:latin typeface="Arial"/>
+                <a:ea typeface="DejaVu Sans"/>
+              </a:rPr>
+              <a:t>β = 0</a:t>
+            </a:r>
+            <a:endParaRPr/>
+          </a:p>
+        </p:txBody>
+      </p:sp>
+      <p:sp>
+        <p:nvSpPr>
+          <p:cNvPr id="80" name="CustomShape 20"/>
+          <p:cNvSpPr/>
+          <p:nvPr/>
+        </p:nvSpPr>
+        <p:spPr>
+          <a:xfrm>
+            <a:off x="19202400" y="5712840"/>
+            <a:ext cx="930600" cy="364680"/>
+          </a:xfrm>
+          <a:prstGeom prst="rect">
+            <a:avLst/>
+          </a:prstGeom>
+          <a:noFill/>
+          <a:ln>
+            <a:noFill/>
+          </a:ln>
+        </p:spPr>
+        <p:style>
+          <a:lnRef idx="0"/>
+          <a:fillRef idx="0"/>
+          <a:effectRef idx="0"/>
+          <a:fontRef idx="minor"/>
+        </p:style>
+        <p:txBody>
+          <a:bodyPr lIns="90000" rIns="90000" tIns="45000" bIns="45000"/>
+          <a:p>
+            <a:pPr>
+              <a:lnSpc>
+                <a:spcPct val="100000"/>
+              </a:lnSpc>
+            </a:pPr>
+            <a:r>
+              <a:rPr lang="en-US" strike="noStrike">
+                <a:solidFill>
+                  <a:srgbClr val="000000"/>
+                </a:solidFill>
+                <a:latin typeface="Arial"/>
+                <a:ea typeface="DejaVu Sans"/>
+              </a:rPr>
+              <a:t>β = 3.5 </a:t>
+            </a:r>
+            <a:endParaRPr/>
+          </a:p>
+        </p:txBody>
+      </p:sp>
+      <p:sp>
+        <p:nvSpPr>
+          <p:cNvPr id="81" name="CustomShape 21"/>
+          <p:cNvSpPr/>
+          <p:nvPr/>
+        </p:nvSpPr>
+        <p:spPr>
+          <a:xfrm>
+            <a:off x="21678480" y="5712840"/>
+            <a:ext cx="764640" cy="364680"/>
+          </a:xfrm>
+          <a:prstGeom prst="rect">
+            <a:avLst/>
+          </a:prstGeom>
+          <a:noFill/>
+          <a:ln>
+            <a:noFill/>
+          </a:ln>
+        </p:spPr>
+        <p:style>
+          <a:lnRef idx="0"/>
+          <a:fillRef idx="0"/>
+          <a:effectRef idx="0"/>
+          <a:fontRef idx="minor"/>
+        </p:style>
+        <p:txBody>
+          <a:bodyPr wrap="none" lIns="90000" rIns="90000" tIns="45000" bIns="45000"/>
+          <a:p>
+            <a:pPr>
+              <a:lnSpc>
+                <a:spcPct val="100000"/>
+              </a:lnSpc>
+            </a:pPr>
+            <a:r>
+              <a:rPr lang="en-US" strike="noStrike">
+                <a:solidFill>
+                  <a:srgbClr val="000000"/>
+                </a:solidFill>
+                <a:latin typeface="Arial"/>
+                <a:ea typeface="DejaVu Sans"/>
+              </a:rPr>
+              <a:t>β = 7 </a:t>
+            </a:r>
+            <a:endParaRPr/>
+          </a:p>
+        </p:txBody>
+      </p:sp>
+      <p:sp>
+        <p:nvSpPr>
+          <p:cNvPr id="82" name="CustomShape 22"/>
+          <p:cNvSpPr/>
+          <p:nvPr/>
+        </p:nvSpPr>
+        <p:spPr>
+          <a:xfrm>
+            <a:off x="16948440" y="9761040"/>
+            <a:ext cx="712440" cy="364680"/>
+          </a:xfrm>
+          <a:prstGeom prst="rect">
+            <a:avLst/>
+          </a:prstGeom>
+          <a:noFill/>
+          <a:ln>
+            <a:noFill/>
+          </a:ln>
+        </p:spPr>
+        <p:style>
+          <a:lnRef idx="0"/>
+          <a:fillRef idx="0"/>
+          <a:effectRef idx="0"/>
+          <a:fontRef idx="minor"/>
+        </p:style>
+        <p:txBody>
+          <a:bodyPr lIns="90000" rIns="90000" tIns="45000" bIns="45000"/>
+          <a:p>
+            <a:pPr>
+              <a:lnSpc>
+                <a:spcPct val="100000"/>
+              </a:lnSpc>
+            </a:pPr>
+            <a:r>
+              <a:rPr lang="en-US" strike="noStrike">
+                <a:solidFill>
+                  <a:srgbClr val="000000"/>
+                </a:solidFill>
+                <a:latin typeface="Arial"/>
+                <a:ea typeface="DejaVu Sans"/>
+              </a:rPr>
+              <a:t>β = 0</a:t>
+            </a:r>
+            <a:endParaRPr/>
+          </a:p>
+        </p:txBody>
+      </p:sp>
+      <p:sp>
+        <p:nvSpPr>
+          <p:cNvPr id="83" name="CustomShape 23"/>
+          <p:cNvSpPr/>
+          <p:nvPr/>
+        </p:nvSpPr>
+        <p:spPr>
+          <a:xfrm>
+            <a:off x="19199880" y="9785160"/>
+            <a:ext cx="930600" cy="364680"/>
+          </a:xfrm>
+          <a:prstGeom prst="rect">
+            <a:avLst/>
+          </a:prstGeom>
+          <a:noFill/>
+          <a:ln>
+            <a:noFill/>
+          </a:ln>
+        </p:spPr>
+        <p:style>
+          <a:lnRef idx="0"/>
+          <a:fillRef idx="0"/>
+          <a:effectRef idx="0"/>
+          <a:fontRef idx="minor"/>
+        </p:style>
+        <p:txBody>
+          <a:bodyPr lIns="90000" rIns="90000" tIns="45000" bIns="45000"/>
+          <a:p>
+            <a:pPr>
+              <a:lnSpc>
+                <a:spcPct val="100000"/>
+              </a:lnSpc>
+            </a:pPr>
+            <a:r>
+              <a:rPr lang="en-US" strike="noStrike">
+                <a:solidFill>
+                  <a:srgbClr val="000000"/>
+                </a:solidFill>
+                <a:latin typeface="Arial"/>
+                <a:ea typeface="DejaVu Sans"/>
+              </a:rPr>
+              <a:t>β = 3.5 </a:t>
+            </a:r>
+            <a:endParaRPr/>
+          </a:p>
+        </p:txBody>
+      </p:sp>
+      <p:sp>
+        <p:nvSpPr>
+          <p:cNvPr id="84" name="CustomShape 24"/>
+          <p:cNvSpPr/>
+          <p:nvPr/>
+        </p:nvSpPr>
+        <p:spPr>
+          <a:xfrm>
+            <a:off x="21678480" y="9785160"/>
+            <a:ext cx="764640" cy="364680"/>
+          </a:xfrm>
+          <a:prstGeom prst="rect">
+            <a:avLst/>
+          </a:prstGeom>
+          <a:noFill/>
+          <a:ln>
+            <a:noFill/>
+          </a:ln>
+        </p:spPr>
+        <p:style>
+          <a:lnRef idx="0"/>
+          <a:fillRef idx="0"/>
+          <a:effectRef idx="0"/>
+          <a:fontRef idx="minor"/>
+        </p:style>
+        <p:txBody>
+          <a:bodyPr wrap="none" lIns="90000" rIns="90000" tIns="45000" bIns="45000"/>
+          <a:p>
+            <a:pPr>
+              <a:lnSpc>
+                <a:spcPct val="100000"/>
+              </a:lnSpc>
+            </a:pPr>
+            <a:r>
+              <a:rPr lang="en-US" strike="noStrike">
+                <a:solidFill>
+                  <a:srgbClr val="000000"/>
+                </a:solidFill>
+                <a:latin typeface="Arial"/>
+                <a:ea typeface="DejaVu Sans"/>
+              </a:rPr>
+              <a:t>β = 7 </a:t>
+            </a:r>
+            <a:endParaRPr/>
+          </a:p>
+        </p:txBody>
+      </p:sp>
+      <p:sp>
+        <p:nvSpPr>
+          <p:cNvPr id="85" name="Line 25"/>
+          <p:cNvSpPr/>
+          <p:nvPr/>
+        </p:nvSpPr>
+        <p:spPr>
+          <a:xfrm>
+            <a:off x="11061000" y="7871400"/>
+            <a:ext cx="184320" cy="0"/>
+          </a:xfrm>
+          <a:prstGeom prst="line">
+            <a:avLst/>
+          </a:prstGeom>
+          <a:ln>
+            <a:solidFill>
+              <a:srgbClr val="4a7ebb"/>
+            </a:solidFill>
+            <a:round/>
+          </a:ln>
+        </p:spPr>
+      </p:sp>
+      <p:sp>
+        <p:nvSpPr>
+          <p:cNvPr id="86" name="Line 26"/>
+          <p:cNvSpPr/>
+          <p:nvPr/>
+        </p:nvSpPr>
+        <p:spPr>
+          <a:xfrm flipV="1">
+            <a:off x="11245320" y="6003000"/>
+            <a:ext cx="0" cy="1868400"/>
+          </a:xfrm>
+          <a:prstGeom prst="line">
+            <a:avLst/>
+          </a:prstGeom>
+          <a:ln>
+            <a:solidFill>
+              <a:srgbClr val="4a7ebb"/>
+            </a:solidFill>
+            <a:round/>
+          </a:ln>
+        </p:spPr>
+      </p:sp>
+      <p:sp>
+        <p:nvSpPr>
+          <p:cNvPr id="87" name="Line 27"/>
+          <p:cNvSpPr/>
+          <p:nvPr/>
+        </p:nvSpPr>
+        <p:spPr>
+          <a:xfrm>
+            <a:off x="11245320" y="6003000"/>
+            <a:ext cx="408240" cy="0"/>
+          </a:xfrm>
+          <a:prstGeom prst="line">
+            <a:avLst/>
+          </a:prstGeom>
+          <a:ln>
+            <a:solidFill>
+              <a:srgbClr val="4a7ebb"/>
+            </a:solidFill>
+            <a:round/>
+          </a:ln>
+        </p:spPr>
+      </p:sp>
+      <p:sp>
+        <p:nvSpPr>
+          <p:cNvPr id="88" name="Line 28"/>
+          <p:cNvSpPr/>
+          <p:nvPr/>
+        </p:nvSpPr>
+        <p:spPr>
+          <a:xfrm>
+            <a:off x="11245320" y="7871400"/>
+            <a:ext cx="0" cy="1889280"/>
+          </a:xfrm>
+          <a:prstGeom prst="line">
+            <a:avLst/>
+          </a:prstGeom>
+          <a:ln>
+            <a:solidFill>
+              <a:srgbClr val="4a7ebb"/>
+            </a:solidFill>
+            <a:round/>
+          </a:ln>
+        </p:spPr>
+      </p:sp>
+      <p:sp>
+        <p:nvSpPr>
+          <p:cNvPr id="89" name="Line 29"/>
+          <p:cNvSpPr/>
+          <p:nvPr/>
+        </p:nvSpPr>
+        <p:spPr>
+          <a:xfrm>
+            <a:off x="11245320" y="9760680"/>
+            <a:ext cx="379800" cy="0"/>
+          </a:xfrm>
+          <a:prstGeom prst="line">
+            <a:avLst/>
+          </a:prstGeom>
+          <a:ln>
+            <a:solidFill>
+              <a:srgbClr val="4a7ebb"/>
+            </a:solidFill>
+            <a:round/>
+          </a:ln>
+        </p:spPr>
+      </p:sp>
+      <p:sp>
+        <p:nvSpPr>
+          <p:cNvPr id="90" name="Line 30"/>
+          <p:cNvSpPr/>
+          <p:nvPr/>
+        </p:nvSpPr>
+        <p:spPr>
+          <a:xfrm>
+            <a:off x="11133360" y="16489800"/>
+            <a:ext cx="184320" cy="0"/>
+          </a:xfrm>
+          <a:prstGeom prst="line">
+            <a:avLst/>
+          </a:prstGeom>
+          <a:ln>
+            <a:solidFill>
+              <a:srgbClr val="4a7ebb"/>
+            </a:solidFill>
+            <a:round/>
+          </a:ln>
+        </p:spPr>
+      </p:sp>
+      <p:sp>
+        <p:nvSpPr>
+          <p:cNvPr id="91" name="Line 31"/>
+          <p:cNvSpPr/>
+          <p:nvPr/>
+        </p:nvSpPr>
+        <p:spPr>
+          <a:xfrm flipV="1">
+            <a:off x="11317680" y="14621760"/>
+            <a:ext cx="0" cy="1868040"/>
+          </a:xfrm>
+          <a:prstGeom prst="line">
+            <a:avLst/>
+          </a:prstGeom>
+          <a:ln>
+            <a:solidFill>
+              <a:srgbClr val="4a7ebb"/>
+            </a:solidFill>
+            <a:round/>
+          </a:ln>
+        </p:spPr>
+      </p:sp>
+      <p:sp>
+        <p:nvSpPr>
+          <p:cNvPr id="92" name="Line 32"/>
+          <p:cNvSpPr/>
+          <p:nvPr/>
+        </p:nvSpPr>
+        <p:spPr>
+          <a:xfrm>
+            <a:off x="11317680" y="14621760"/>
+            <a:ext cx="408240" cy="0"/>
+          </a:xfrm>
+          <a:prstGeom prst="line">
+            <a:avLst/>
+          </a:prstGeom>
+          <a:ln>
+            <a:solidFill>
+              <a:srgbClr val="4a7ebb"/>
+            </a:solidFill>
+            <a:round/>
+          </a:ln>
+        </p:spPr>
+      </p:sp>
+      <p:sp>
+        <p:nvSpPr>
+          <p:cNvPr id="93" name="Line 33"/>
+          <p:cNvSpPr/>
+          <p:nvPr/>
+        </p:nvSpPr>
+        <p:spPr>
+          <a:xfrm>
+            <a:off x="11317680" y="16489800"/>
+            <a:ext cx="0" cy="1889640"/>
+          </a:xfrm>
+          <a:prstGeom prst="line">
+            <a:avLst/>
+          </a:prstGeom>
+          <a:ln>
+            <a:solidFill>
+              <a:srgbClr val="4a7ebb"/>
+            </a:solidFill>
+            <a:round/>
+          </a:ln>
+        </p:spPr>
+      </p:sp>
+      <p:sp>
+        <p:nvSpPr>
+          <p:cNvPr id="94" name="Line 34"/>
+          <p:cNvSpPr/>
+          <p:nvPr/>
+        </p:nvSpPr>
+        <p:spPr>
+          <a:xfrm>
+            <a:off x="11317680" y="18379440"/>
+            <a:ext cx="379800" cy="0"/>
+          </a:xfrm>
+          <a:prstGeom prst="line">
+            <a:avLst/>
+          </a:prstGeom>
+          <a:ln>
+            <a:solidFill>
+              <a:srgbClr val="4a7ebb"/>
+            </a:solidFill>
+            <a:round/>
+          </a:ln>
+        </p:spPr>
+      </p:sp>
+      <p:pic>
+        <p:nvPicPr>
+          <p:cNvPr id="95" name="" descr=""/>
           <p:cNvPicPr/>
           <p:nvPr/>
         </p:nvPicPr>
@@ -3694,73 +3808,20 @@
         </p:blipFill>
         <p:spPr>
           <a:xfrm>
-            <a:off x="2286000" y="8789760"/>
-            <a:ext cx="3468600" cy="2267640"/>
-          </a:xfrm>
-          <a:prstGeom prst="rect">
-            <a:avLst/>
-          </a:prstGeom>
-          <a:ln>
-            <a:solidFill>
-              <a:schemeClr val="tx1"/>
-            </a:solidFill>
-          </a:ln>
-        </p:spPr>
-      </p:pic>
-      <p:sp>
-        <p:nvSpPr>
-          <p:cNvPr id="76" name="TextShape 17"/>
-          <p:cNvSpPr txBox="1"/>
-          <p:nvPr/>
-        </p:nvSpPr>
-        <p:spPr>
-          <a:xfrm>
-            <a:off x="822960" y="17623080"/>
-            <a:ext cx="6400800" cy="993240"/>
-          </a:xfrm>
-          <a:prstGeom prst="rect">
-            <a:avLst/>
-          </a:prstGeom>
-          <a:noFill/>
+            <a:off x="11521440" y="10149840"/>
+            <a:ext cx="4297680" cy="3749040"/>
+          </a:xfrm>
+          <a:prstGeom prst="rect">
+            <a:avLst/>
+          </a:prstGeom>
           <a:ln>
             <a:noFill/>
           </a:ln>
         </p:spPr>
-        <p:txBody>
-          <a:bodyPr lIns="90000" tIns="45000" rIns="90000" bIns="45000"/>
-          <a:lstStyle/>
-          <a:p>
-            <a:r>
-              <a:rPr lang="en-US" sz="1600" dirty="0" smtClean="0">
-                <a:latin typeface="Arial"/>
-              </a:rPr>
-              <a:t>	Using </a:t>
-            </a:r>
-            <a:r>
-              <a:rPr lang="en-US" sz="1600" dirty="0">
-                <a:latin typeface="Arial"/>
-              </a:rPr>
-              <a:t>these face pressure inputs, KZK simulations were run with various combinations of attenuation coefficients (α = 0.005, 0.3, 1.0, and 1.5 dB/cm/MHz) and nonlinear coefficients (β = 0, 3.5, and 7). The resulting intensity fields were visualized using </a:t>
-            </a:r>
-            <a:r>
-              <a:rPr lang="en-US" sz="1600" dirty="0" err="1">
-                <a:latin typeface="Arial"/>
-              </a:rPr>
-              <a:t>ParaView</a:t>
-            </a:r>
-            <a:r>
-              <a:rPr lang="en-US" sz="1600" dirty="0">
-                <a:latin typeface="Arial"/>
-              </a:rPr>
-              <a:t>.</a:t>
-            </a:r>
-            <a:endParaRPr dirty="0"/>
-          </a:p>
-        </p:txBody>
-      </p:sp>
+      </p:pic>
       <p:pic>
         <p:nvPicPr>
-          <p:cNvPr id="77" name="Picture 76"/>
+          <p:cNvPr id="96" name="" descr=""/>
           <p:cNvPicPr/>
           <p:nvPr/>
         </p:nvPicPr>
@@ -3770,557 +3831,65 @@
         </p:blipFill>
         <p:spPr>
           <a:xfrm>
-            <a:off x="2000250" y="13927987"/>
-            <a:ext cx="4137660" cy="3267000"/>
-          </a:xfrm>
-          <a:prstGeom prst="rect">
-            <a:avLst/>
-          </a:prstGeom>
-          <a:ln>
-            <a:solidFill>
-              <a:schemeClr val="tx1"/>
-            </a:solidFill>
-          </a:ln>
-        </p:spPr>
-      </p:pic>
-      <p:sp>
-        <p:nvSpPr>
-          <p:cNvPr id="78" name="TextShape 18"/>
-          <p:cNvSpPr txBox="1"/>
-          <p:nvPr/>
-        </p:nvSpPr>
-        <p:spPr>
-          <a:xfrm>
-            <a:off x="2103120" y="17245995"/>
-            <a:ext cx="3931920" cy="316080"/>
-          </a:xfrm>
-          <a:prstGeom prst="rect">
-            <a:avLst/>
-          </a:prstGeom>
-          <a:noFill/>
+            <a:off x="16002000" y="10515600"/>
+            <a:ext cx="2560320" cy="3017520"/>
+          </a:xfrm>
+          <a:prstGeom prst="rect">
+            <a:avLst/>
+          </a:prstGeom>
           <a:ln>
             <a:noFill/>
           </a:ln>
         </p:spPr>
-        <p:txBody>
-          <a:bodyPr lIns="90000" tIns="45000" rIns="90000" bIns="45000"/>
-          <a:lstStyle/>
-          <a:p>
-            <a:r>
-              <a:rPr lang="en-US" sz="1600" dirty="0">
-                <a:latin typeface="Arial"/>
-              </a:rPr>
-              <a:t>Figure 2: Simulated Element Time Delays</a:t>
-            </a:r>
-            <a:endParaRPr dirty="0"/>
-          </a:p>
-        </p:txBody>
-      </p:sp>
-      <p:sp>
-        <p:nvSpPr>
-          <p:cNvPr id="2" name="TextBox 1"/>
-          <p:cNvSpPr txBox="1"/>
-          <p:nvPr/>
-        </p:nvSpPr>
-        <p:spPr>
-          <a:xfrm>
-            <a:off x="16943610" y="4260943"/>
-            <a:ext cx="712841" cy="369332"/>
-          </a:xfrm>
-          <a:prstGeom prst="rect">
-            <a:avLst/>
-          </a:prstGeom>
-          <a:noFill/>
-        </p:spPr>
-        <p:txBody>
-          <a:bodyPr wrap="square" rtlCol="0">
-            <a:spAutoFit/>
-          </a:bodyPr>
-          <a:lstStyle/>
-          <a:p>
-            <a:r>
-              <a:rPr lang="en-US" dirty="0"/>
-              <a:t>β = </a:t>
-            </a:r>
-            <a:r>
-              <a:rPr lang="en-US" dirty="0" smtClean="0"/>
-              <a:t>0</a:t>
-            </a:r>
-            <a:endParaRPr lang="en-US" dirty="0"/>
-          </a:p>
-        </p:txBody>
-      </p:sp>
-      <p:sp>
-        <p:nvSpPr>
-          <p:cNvPr id="3" name="Rectangle 2"/>
-          <p:cNvSpPr/>
-          <p:nvPr/>
-        </p:nvSpPr>
-        <p:spPr>
-          <a:xfrm>
-            <a:off x="19197610" y="4257592"/>
-            <a:ext cx="930910" cy="369332"/>
-          </a:xfrm>
-          <a:prstGeom prst="rect">
-            <a:avLst/>
-          </a:prstGeom>
-        </p:spPr>
-        <p:txBody>
-          <a:bodyPr wrap="square">
-            <a:spAutoFit/>
-          </a:bodyPr>
-          <a:lstStyle/>
-          <a:p>
-            <a:r>
-              <a:rPr lang="en-US" dirty="0"/>
-              <a:t>β = </a:t>
-            </a:r>
-            <a:r>
-              <a:rPr lang="en-US" dirty="0" smtClean="0"/>
-              <a:t>3.5 </a:t>
-            </a:r>
-            <a:endParaRPr lang="en-US" dirty="0"/>
-          </a:p>
-        </p:txBody>
-      </p:sp>
-      <p:sp>
-        <p:nvSpPr>
-          <p:cNvPr id="4" name="Rectangle 3"/>
-          <p:cNvSpPr/>
-          <p:nvPr/>
-        </p:nvSpPr>
-        <p:spPr>
-          <a:xfrm>
-            <a:off x="21669680" y="4257592"/>
-            <a:ext cx="772969" cy="369332"/>
-          </a:xfrm>
-          <a:prstGeom prst="rect">
-            <a:avLst/>
-          </a:prstGeom>
-        </p:spPr>
-        <p:txBody>
-          <a:bodyPr wrap="none">
-            <a:spAutoFit/>
-          </a:bodyPr>
-          <a:lstStyle/>
-          <a:p>
-            <a:r>
-              <a:rPr lang="en-US" dirty="0"/>
-              <a:t>β = </a:t>
-            </a:r>
-            <a:r>
-              <a:rPr lang="en-US" dirty="0" smtClean="0"/>
-              <a:t>7 </a:t>
-            </a:r>
-            <a:endParaRPr lang="en-US" dirty="0"/>
-          </a:p>
-        </p:txBody>
-      </p:sp>
-      <p:sp>
-        <p:nvSpPr>
-          <p:cNvPr id="33" name="TextBox 32"/>
-          <p:cNvSpPr txBox="1"/>
-          <p:nvPr/>
-        </p:nvSpPr>
-        <p:spPr>
-          <a:xfrm>
-            <a:off x="16943609" y="8305800"/>
-            <a:ext cx="712841" cy="369332"/>
-          </a:xfrm>
-          <a:prstGeom prst="rect">
-            <a:avLst/>
-          </a:prstGeom>
-          <a:noFill/>
-        </p:spPr>
-        <p:txBody>
-          <a:bodyPr wrap="square" rtlCol="0">
-            <a:spAutoFit/>
-          </a:bodyPr>
-          <a:lstStyle/>
-          <a:p>
-            <a:r>
-              <a:rPr lang="en-US" dirty="0"/>
-              <a:t>β = </a:t>
-            </a:r>
-            <a:r>
-              <a:rPr lang="en-US" dirty="0" smtClean="0"/>
-              <a:t>0</a:t>
-            </a:r>
-            <a:endParaRPr lang="en-US" dirty="0"/>
-          </a:p>
-        </p:txBody>
-      </p:sp>
-      <p:sp>
-        <p:nvSpPr>
-          <p:cNvPr id="34" name="Rectangle 33"/>
-          <p:cNvSpPr/>
-          <p:nvPr/>
-        </p:nvSpPr>
-        <p:spPr>
-          <a:xfrm>
-            <a:off x="19195146" y="8329936"/>
-            <a:ext cx="930910" cy="369332"/>
-          </a:xfrm>
-          <a:prstGeom prst="rect">
-            <a:avLst/>
-          </a:prstGeom>
-        </p:spPr>
-        <p:txBody>
-          <a:bodyPr wrap="square">
-            <a:spAutoFit/>
-          </a:bodyPr>
-          <a:lstStyle/>
-          <a:p>
-            <a:r>
-              <a:rPr lang="en-US" dirty="0"/>
-              <a:t>β = </a:t>
-            </a:r>
-            <a:r>
-              <a:rPr lang="en-US" dirty="0" smtClean="0"/>
-              <a:t>3.5 </a:t>
-            </a:r>
-            <a:endParaRPr lang="en-US" dirty="0"/>
-          </a:p>
-        </p:txBody>
-      </p:sp>
-      <p:sp>
-        <p:nvSpPr>
-          <p:cNvPr id="35" name="Rectangle 34"/>
-          <p:cNvSpPr/>
-          <p:nvPr/>
-        </p:nvSpPr>
-        <p:spPr>
-          <a:xfrm>
-            <a:off x="21669680" y="8329936"/>
-            <a:ext cx="772969" cy="369332"/>
-          </a:xfrm>
-          <a:prstGeom prst="rect">
-            <a:avLst/>
-          </a:prstGeom>
-        </p:spPr>
-        <p:txBody>
-          <a:bodyPr wrap="none">
-            <a:spAutoFit/>
-          </a:bodyPr>
-          <a:lstStyle/>
-          <a:p>
-            <a:r>
-              <a:rPr lang="en-US" dirty="0"/>
-              <a:t>β = </a:t>
-            </a:r>
-            <a:r>
-              <a:rPr lang="en-US" dirty="0" smtClean="0"/>
-              <a:t>7 </a:t>
-            </a:r>
-            <a:endParaRPr lang="en-US" dirty="0"/>
-          </a:p>
-        </p:txBody>
-      </p:sp>
-      <p:cxnSp>
-        <p:nvCxnSpPr>
-          <p:cNvPr id="8" name="Straight Connector 7"/>
-          <p:cNvCxnSpPr/>
-          <p:nvPr/>
-        </p:nvCxnSpPr>
-        <p:spPr>
-          <a:xfrm>
-            <a:off x="11056442" y="6416384"/>
-            <a:ext cx="184471" cy="1"/>
-          </a:xfrm>
-          <a:prstGeom prst="line">
-            <a:avLst/>
-          </a:prstGeom>
-        </p:spPr>
-        <p:style>
-          <a:lnRef idx="1">
-            <a:schemeClr val="accent1"/>
-          </a:lnRef>
-          <a:fillRef idx="0">
-            <a:schemeClr val="accent1"/>
-          </a:fillRef>
-          <a:effectRef idx="0">
-            <a:schemeClr val="accent1"/>
-          </a:effectRef>
-          <a:fontRef idx="minor">
-            <a:schemeClr val="tx1"/>
-          </a:fontRef>
-        </p:style>
-      </p:cxnSp>
-      <p:cxnSp>
-        <p:nvCxnSpPr>
-          <p:cNvPr id="10" name="Straight Connector 9"/>
-          <p:cNvCxnSpPr/>
-          <p:nvPr/>
-        </p:nvCxnSpPr>
-        <p:spPr>
-          <a:xfrm flipV="1">
-            <a:off x="11240913" y="4548077"/>
-            <a:ext cx="0" cy="1868307"/>
-          </a:xfrm>
-          <a:prstGeom prst="line">
-            <a:avLst/>
-          </a:prstGeom>
-        </p:spPr>
-        <p:style>
-          <a:lnRef idx="1">
-            <a:schemeClr val="accent1"/>
-          </a:lnRef>
-          <a:fillRef idx="0">
-            <a:schemeClr val="accent1"/>
-          </a:fillRef>
-          <a:effectRef idx="0">
-            <a:schemeClr val="accent1"/>
-          </a:effectRef>
-          <a:fontRef idx="minor">
-            <a:schemeClr val="tx1"/>
-          </a:fontRef>
-        </p:style>
-      </p:cxnSp>
-      <p:cxnSp>
-        <p:nvCxnSpPr>
-          <p:cNvPr id="13" name="Straight Connector 12"/>
-          <p:cNvCxnSpPr/>
-          <p:nvPr/>
-        </p:nvCxnSpPr>
-        <p:spPr>
-          <a:xfrm>
-            <a:off x="11240913" y="4548077"/>
-            <a:ext cx="408162" cy="0"/>
-          </a:xfrm>
-          <a:prstGeom prst="line">
-            <a:avLst/>
-          </a:prstGeom>
-        </p:spPr>
-        <p:style>
-          <a:lnRef idx="1">
-            <a:schemeClr val="accent1"/>
-          </a:lnRef>
-          <a:fillRef idx="0">
-            <a:schemeClr val="accent1"/>
-          </a:fillRef>
-          <a:effectRef idx="0">
-            <a:schemeClr val="accent1"/>
-          </a:effectRef>
-          <a:fontRef idx="minor">
-            <a:schemeClr val="tx1"/>
-          </a:fontRef>
-        </p:style>
-      </p:cxnSp>
-      <p:cxnSp>
-        <p:nvCxnSpPr>
-          <p:cNvPr id="15" name="Straight Connector 14"/>
-          <p:cNvCxnSpPr/>
-          <p:nvPr/>
-        </p:nvCxnSpPr>
-        <p:spPr>
-          <a:xfrm>
-            <a:off x="11240913" y="6416384"/>
-            <a:ext cx="0" cy="1889416"/>
-          </a:xfrm>
-          <a:prstGeom prst="line">
-            <a:avLst/>
-          </a:prstGeom>
-        </p:spPr>
-        <p:style>
-          <a:lnRef idx="1">
-            <a:schemeClr val="accent1"/>
-          </a:lnRef>
-          <a:fillRef idx="0">
-            <a:schemeClr val="accent1"/>
-          </a:fillRef>
-          <a:effectRef idx="0">
-            <a:schemeClr val="accent1"/>
-          </a:effectRef>
-          <a:fontRef idx="minor">
-            <a:schemeClr val="tx1"/>
-          </a:fontRef>
-        </p:style>
-      </p:cxnSp>
-      <p:cxnSp>
-        <p:nvCxnSpPr>
-          <p:cNvPr id="17" name="Straight Connector 16"/>
-          <p:cNvCxnSpPr/>
-          <p:nvPr/>
-        </p:nvCxnSpPr>
-        <p:spPr>
-          <a:xfrm>
-            <a:off x="11240913" y="8305800"/>
-            <a:ext cx="379587" cy="0"/>
-          </a:xfrm>
-          <a:prstGeom prst="line">
-            <a:avLst/>
-          </a:prstGeom>
-        </p:spPr>
-        <p:style>
-          <a:lnRef idx="1">
-            <a:schemeClr val="accent1"/>
-          </a:lnRef>
-          <a:fillRef idx="0">
-            <a:schemeClr val="accent1"/>
-          </a:fillRef>
-          <a:effectRef idx="0">
-            <a:schemeClr val="accent1"/>
-          </a:effectRef>
-          <a:fontRef idx="minor">
-            <a:schemeClr val="tx1"/>
-          </a:fontRef>
-        </p:style>
-      </p:cxnSp>
-      <p:cxnSp>
-        <p:nvCxnSpPr>
-          <p:cNvPr id="85" name="Straight Connector 84"/>
-          <p:cNvCxnSpPr/>
-          <p:nvPr/>
-        </p:nvCxnSpPr>
-        <p:spPr>
-          <a:xfrm>
-            <a:off x="11021876" y="10504372"/>
-            <a:ext cx="184471" cy="1"/>
-          </a:xfrm>
-          <a:prstGeom prst="line">
-            <a:avLst/>
-          </a:prstGeom>
-        </p:spPr>
-        <p:style>
-          <a:lnRef idx="1">
-            <a:schemeClr val="accent1"/>
-          </a:lnRef>
-          <a:fillRef idx="0">
-            <a:schemeClr val="accent1"/>
-          </a:fillRef>
-          <a:effectRef idx="0">
-            <a:schemeClr val="accent1"/>
-          </a:effectRef>
-          <a:fontRef idx="minor">
-            <a:schemeClr val="tx1"/>
-          </a:fontRef>
-        </p:style>
-      </p:cxnSp>
-      <p:cxnSp>
-        <p:nvCxnSpPr>
-          <p:cNvPr id="86" name="Straight Connector 85"/>
-          <p:cNvCxnSpPr/>
-          <p:nvPr/>
-        </p:nvCxnSpPr>
-        <p:spPr>
-          <a:xfrm flipV="1">
-            <a:off x="11206347" y="8636065"/>
-            <a:ext cx="0" cy="1868307"/>
-          </a:xfrm>
-          <a:prstGeom prst="line">
-            <a:avLst/>
-          </a:prstGeom>
-        </p:spPr>
-        <p:style>
-          <a:lnRef idx="1">
-            <a:schemeClr val="accent1"/>
-          </a:lnRef>
-          <a:fillRef idx="0">
-            <a:schemeClr val="accent1"/>
-          </a:fillRef>
-          <a:effectRef idx="0">
-            <a:schemeClr val="accent1"/>
-          </a:effectRef>
-          <a:fontRef idx="minor">
-            <a:schemeClr val="tx1"/>
-          </a:fontRef>
-        </p:style>
-      </p:cxnSp>
-      <p:cxnSp>
-        <p:nvCxnSpPr>
-          <p:cNvPr id="87" name="Straight Connector 86"/>
-          <p:cNvCxnSpPr/>
-          <p:nvPr/>
-        </p:nvCxnSpPr>
-        <p:spPr>
-          <a:xfrm>
-            <a:off x="11206347" y="8636065"/>
-            <a:ext cx="408162" cy="0"/>
-          </a:xfrm>
-          <a:prstGeom prst="line">
-            <a:avLst/>
-          </a:prstGeom>
-        </p:spPr>
-        <p:style>
-          <a:lnRef idx="1">
-            <a:schemeClr val="accent1"/>
-          </a:lnRef>
-          <a:fillRef idx="0">
-            <a:schemeClr val="accent1"/>
-          </a:fillRef>
-          <a:effectRef idx="0">
-            <a:schemeClr val="accent1"/>
-          </a:effectRef>
-          <a:fontRef idx="minor">
-            <a:schemeClr val="tx1"/>
-          </a:fontRef>
-        </p:style>
-      </p:cxnSp>
-      <p:cxnSp>
-        <p:nvCxnSpPr>
-          <p:cNvPr id="88" name="Straight Connector 87"/>
-          <p:cNvCxnSpPr/>
-          <p:nvPr/>
-        </p:nvCxnSpPr>
-        <p:spPr>
-          <a:xfrm>
-            <a:off x="11206347" y="10504372"/>
-            <a:ext cx="0" cy="1889416"/>
-          </a:xfrm>
-          <a:prstGeom prst="line">
-            <a:avLst/>
-          </a:prstGeom>
-        </p:spPr>
-        <p:style>
-          <a:lnRef idx="1">
-            <a:schemeClr val="accent1"/>
-          </a:lnRef>
-          <a:fillRef idx="0">
-            <a:schemeClr val="accent1"/>
-          </a:fillRef>
-          <a:effectRef idx="0">
-            <a:schemeClr val="accent1"/>
-          </a:effectRef>
-          <a:fontRef idx="minor">
-            <a:schemeClr val="tx1"/>
-          </a:fontRef>
-        </p:style>
-      </p:cxnSp>
-      <p:cxnSp>
-        <p:nvCxnSpPr>
-          <p:cNvPr id="89" name="Straight Connector 88"/>
-          <p:cNvCxnSpPr/>
-          <p:nvPr/>
-        </p:nvCxnSpPr>
-        <p:spPr>
-          <a:xfrm>
-            <a:off x="11206347" y="12393788"/>
-            <a:ext cx="379587" cy="0"/>
-          </a:xfrm>
-          <a:prstGeom prst="line">
-            <a:avLst/>
-          </a:prstGeom>
-        </p:spPr>
-        <p:style>
-          <a:lnRef idx="1">
-            <a:schemeClr val="accent1"/>
-          </a:lnRef>
-          <a:fillRef idx="0">
-            <a:schemeClr val="accent1"/>
-          </a:fillRef>
-          <a:effectRef idx="0">
-            <a:schemeClr val="accent1"/>
-          </a:effectRef>
-          <a:fontRef idx="minor">
-            <a:schemeClr val="tx1"/>
-          </a:fontRef>
-        </p:style>
-      </p:cxnSp>
+      </p:pic>
+      <p:pic>
+        <p:nvPicPr>
+          <p:cNvPr id="97" name="" descr=""/>
+          <p:cNvPicPr/>
+          <p:nvPr/>
+        </p:nvPicPr>
+        <p:blipFill>
+          <a:blip r:embed="rId13"/>
+          <a:stretch/>
+        </p:blipFill>
+        <p:spPr>
+          <a:xfrm>
+            <a:off x="18836640" y="10424160"/>
+            <a:ext cx="2113560" cy="3108960"/>
+          </a:xfrm>
+          <a:prstGeom prst="rect">
+            <a:avLst/>
+          </a:prstGeom>
+          <a:ln>
+            <a:noFill/>
+          </a:ln>
+        </p:spPr>
+      </p:pic>
+      <p:pic>
+        <p:nvPicPr>
+          <p:cNvPr id="98" name="" descr=""/>
+          <p:cNvPicPr/>
+          <p:nvPr/>
+        </p:nvPicPr>
+        <p:blipFill>
+          <a:blip r:embed="rId14"/>
+          <a:stretch/>
+        </p:blipFill>
+        <p:spPr>
+          <a:xfrm>
+            <a:off x="21396960" y="10515600"/>
+            <a:ext cx="2011680" cy="3840480"/>
+          </a:xfrm>
+          <a:prstGeom prst="rect">
+            <a:avLst/>
+          </a:prstGeom>
+          <a:ln>
+            <a:noFill/>
+          </a:ln>
+        </p:spPr>
+      </p:pic>
     </p:spTree>
   </p:cSld>
-  <p:clrMapOvr>
-    <a:masterClrMapping/>
-  </p:clrMapOvr>
   <p:timing>
     <p:tnLst>
       <p:par>
@@ -4329,14 +3898,14 @@
             <p:seq>
               <p:cTn id="2" nodeType="mainSeq"/>
               <p:prevCondLst>
-                <p:cond evt="onPrev" delay="0">
+                <p:cond delay="0" evt="onPrev">
                   <p:tgtEl>
                     <p:sldTgt/>
                   </p:tgtEl>
                 </p:cond>
               </p:prevCondLst>
               <p:nextCondLst>
-                <p:cond evt="onNext" delay="0">
+                <p:cond delay="0" evt="onNext">
                   <p:tgtEl>
                     <p:sldTgt/>
                   </p:tgtEl>
@@ -4571,8 +4140,6 @@
       </a:bgFillStyleLst>
     </a:fmtScheme>
   </a:themeElements>
-  <a:objectDefaults/>
-  <a:extraClrSchemeLst/>
 </a:theme>
 </file>
 
@@ -4796,7 +4363,5 @@
       </a:bgFillStyleLst>
     </a:fmtScheme>
   </a:themeElements>
-  <a:objectDefaults/>
-  <a:extraClrSchemeLst/>
 </a:theme>
 </file>
</xml_diff>

<commit_message>
updated poster with new images. also added pdf
</commit_message>
<xml_diff>
--- a/presentations/nc_bmes_sympo/nc_bmes_sympo.pptx
+++ b/presentations/nc_bmes_sympo/nc_bmes_sympo.pptx
@@ -107,6 +107,11 @@
       </a:defRPr>
     </a:lvl9pPr>
   </p:defaultTextStyle>
+  <p:extLst>
+    <p:ext uri="{EFAFB233-063F-42B5-8137-9DF3F51BA10A}">
+      <p15:sldGuideLst xmlns:p15="http://schemas.microsoft.com/office/powerpoint/2012/main"/>
+    </p:ext>
+  </p:extLst>
 </p:presentation>
 </file>
 
@@ -3418,20 +3423,817 @@
           </a:p>
         </p:txBody>
       </p:sp>
+      <p:sp>
+        <p:nvSpPr>
+          <p:cNvPr id="63" name="CustomShape 12"/>
+          <p:cNvSpPr/>
+          <p:nvPr/>
+        </p:nvSpPr>
+        <p:spPr>
+          <a:xfrm>
+            <a:off x="8686800" y="7660080"/>
+            <a:ext cx="2453400" cy="345240"/>
+          </a:xfrm>
+          <a:prstGeom prst="rect">
+            <a:avLst/>
+          </a:prstGeom>
+          <a:noFill/>
+          <a:ln>
+            <a:noFill/>
+          </a:ln>
+        </p:spPr>
+        <p:style>
+          <a:lnRef idx="0">
+            <a:scrgbClr r="0" g="0" b="0"/>
+          </a:lnRef>
+          <a:fillRef idx="0">
+            <a:scrgbClr r="0" g="0" b="0"/>
+          </a:fillRef>
+          <a:effectRef idx="0">
+            <a:scrgbClr r="0" g="0" b="0"/>
+          </a:effectRef>
+          <a:fontRef idx="minor"/>
+        </p:style>
+        <p:txBody>
+          <a:bodyPr lIns="90000" tIns="45000" rIns="90000" bIns="45000"/>
+          <a:lstStyle/>
+          <a:p>
+            <a:pPr>
+              <a:lnSpc>
+                <a:spcPct val="100000"/>
+              </a:lnSpc>
+            </a:pPr>
+            <a:r>
+              <a:rPr lang="en-US" strike="noStrike" dirty="0">
+                <a:solidFill>
+                  <a:srgbClr val="000000"/>
+                </a:solidFill>
+                <a:latin typeface="Arial"/>
+                <a:ea typeface="DejaVu Sans"/>
+              </a:rPr>
+              <a:t>α = 0.005 dB/cm/MHz </a:t>
+            </a:r>
+            <a:endParaRPr dirty="0"/>
+          </a:p>
+        </p:txBody>
+      </p:sp>
+      <p:sp>
+        <p:nvSpPr>
+          <p:cNvPr id="68" name="CustomShape 13"/>
+          <p:cNvSpPr/>
+          <p:nvPr/>
+        </p:nvSpPr>
+        <p:spPr>
+          <a:xfrm>
+            <a:off x="8888391" y="16078210"/>
+            <a:ext cx="2200320" cy="345240"/>
+          </a:xfrm>
+          <a:prstGeom prst="rect">
+            <a:avLst/>
+          </a:prstGeom>
+          <a:noFill/>
+          <a:ln>
+            <a:noFill/>
+          </a:ln>
+        </p:spPr>
+        <p:style>
+          <a:lnRef idx="0">
+            <a:scrgbClr r="0" g="0" b="0"/>
+          </a:lnRef>
+          <a:fillRef idx="0">
+            <a:scrgbClr r="0" g="0" b="0"/>
+          </a:fillRef>
+          <a:effectRef idx="0">
+            <a:scrgbClr r="0" g="0" b="0"/>
+          </a:effectRef>
+          <a:fontRef idx="minor"/>
+        </p:style>
+        <p:txBody>
+          <a:bodyPr lIns="90000" tIns="45000" rIns="90000" bIns="45000"/>
+          <a:lstStyle/>
+          <a:p>
+            <a:pPr>
+              <a:lnSpc>
+                <a:spcPct val="100000"/>
+              </a:lnSpc>
+            </a:pPr>
+            <a:r>
+              <a:rPr lang="en-US" strike="noStrike" dirty="0">
+                <a:solidFill>
+                  <a:srgbClr val="000000"/>
+                </a:solidFill>
+                <a:latin typeface="Arial"/>
+                <a:ea typeface="DejaVu Sans"/>
+              </a:rPr>
+              <a:t>α = 1.5 dB/cm/MHz </a:t>
+            </a:r>
+            <a:endParaRPr dirty="0"/>
+          </a:p>
+        </p:txBody>
+      </p:sp>
+      <p:sp>
+        <p:nvSpPr>
+          <p:cNvPr id="72" name="CustomShape 14"/>
+          <p:cNvSpPr/>
+          <p:nvPr/>
+        </p:nvSpPr>
+        <p:spPr>
+          <a:xfrm>
+            <a:off x="25694640" y="11907000"/>
+            <a:ext cx="6491520" cy="345600"/>
+          </a:xfrm>
+          <a:prstGeom prst="rect">
+            <a:avLst/>
+          </a:prstGeom>
+          <a:noFill/>
+          <a:ln>
+            <a:noFill/>
+          </a:ln>
+        </p:spPr>
+        <p:style>
+          <a:lnRef idx="0">
+            <a:scrgbClr r="0" g="0" b="0"/>
+          </a:lnRef>
+          <a:fillRef idx="0">
+            <a:scrgbClr r="0" g="0" b="0"/>
+          </a:fillRef>
+          <a:effectRef idx="0">
+            <a:scrgbClr r="0" g="0" b="0"/>
+          </a:effectRef>
+          <a:fontRef idx="minor"/>
+        </p:style>
+        <p:txBody>
+          <a:bodyPr lIns="90000" tIns="45000" rIns="90000" bIns="45000"/>
+          <a:lstStyle/>
+          <a:p>
+            <a:pPr algn="just">
+              <a:lnSpc>
+                <a:spcPct val="100000"/>
+              </a:lnSpc>
+            </a:pPr>
+            <a:r>
+              <a:rPr lang="en-US" sz="1600" strike="noStrike" dirty="0">
+                <a:solidFill>
+                  <a:srgbClr val="000000"/>
+                </a:solidFill>
+                <a:latin typeface="Arial"/>
+                <a:ea typeface="DejaVu Sans"/>
+              </a:rPr>
+              <a:t>	The effect of increasing nonlinearity on the intensity distribution of a focused ultrasound beam was investigated computationally using the KZK simulation. The results of these simulations provided strong evidence suggesting that as the nonlinear coefficient of the medium increased, the intensity field peaked at shallower positions that were offset on the lateral axis.</a:t>
+            </a:r>
+            <a:endParaRPr dirty="0"/>
+          </a:p>
+          <a:p>
+            <a:pPr algn="just">
+              <a:lnSpc>
+                <a:spcPct val="100000"/>
+              </a:lnSpc>
+            </a:pPr>
+            <a:r>
+              <a:rPr lang="en-US" sz="1600" strike="noStrike" dirty="0">
+                <a:solidFill>
+                  <a:srgbClr val="000000"/>
+                </a:solidFill>
+                <a:latin typeface="Arial"/>
+                <a:ea typeface="DejaVu Sans"/>
+              </a:rPr>
+              <a:t>	It was also found that as the attenuation of the material increased, the effects of nonlinearity were dampened. This agreed well with what was predicted, since nonlinear effects were most prominent when pressure waves with immense amplitudes caused local temperature and sound speed increases.</a:t>
+            </a:r>
+            <a:endParaRPr dirty="0"/>
+          </a:p>
+          <a:p>
+            <a:pPr algn="just">
+              <a:lnSpc>
+                <a:spcPct val="100000"/>
+              </a:lnSpc>
+            </a:pPr>
+            <a:r>
+              <a:rPr lang="en-US" sz="1600" strike="noStrike" dirty="0">
+                <a:solidFill>
+                  <a:srgbClr val="000000"/>
+                </a:solidFill>
+                <a:latin typeface="Arial"/>
+                <a:ea typeface="DejaVu Sans"/>
+              </a:rPr>
+              <a:t>	Finally, the next step is to simulate the shear waves created using these intensity data. This will help further characterize the bias on shear wave speed measurements. This information will be crucial for developing methods to possibly correct for this depth dependent measurement bias.</a:t>
+            </a:r>
+            <a:endParaRPr dirty="0"/>
+          </a:p>
+        </p:txBody>
+      </p:sp>
+      <p:sp>
+        <p:nvSpPr>
+          <p:cNvPr id="73" name="CustomShape 15"/>
+          <p:cNvSpPr/>
+          <p:nvPr/>
+        </p:nvSpPr>
+        <p:spPr>
+          <a:xfrm>
+            <a:off x="822960" y="12088440"/>
+            <a:ext cx="6491520" cy="1669680"/>
+          </a:xfrm>
+          <a:prstGeom prst="rect">
+            <a:avLst/>
+          </a:prstGeom>
+          <a:noFill/>
+          <a:ln>
+            <a:noFill/>
+          </a:ln>
+        </p:spPr>
+        <p:style>
+          <a:lnRef idx="0">
+            <a:scrgbClr r="0" g="0" b="0"/>
+          </a:lnRef>
+          <a:fillRef idx="0">
+            <a:scrgbClr r="0" g="0" b="0"/>
+          </a:fillRef>
+          <a:effectRef idx="0">
+            <a:scrgbClr r="0" g="0" b="0"/>
+          </a:effectRef>
+          <a:fontRef idx="minor"/>
+        </p:style>
+        <p:txBody>
+          <a:bodyPr lIns="90000" tIns="45000" rIns="90000" bIns="45000"/>
+          <a:lstStyle/>
+          <a:p>
+            <a:pPr algn="just">
+              <a:lnSpc>
+                <a:spcPct val="100000"/>
+              </a:lnSpc>
+            </a:pPr>
+            <a:r>
+              <a:rPr lang="en-US" sz="1600" strike="noStrike">
+                <a:solidFill>
+                  <a:srgbClr val="000000"/>
+                </a:solidFill>
+                <a:latin typeface="Arial"/>
+                <a:ea typeface="DejaVu Sans"/>
+              </a:rPr>
+              <a:t>	A curvilinear C5-2 transducer focused at 70 mm in depth was simulated with 7 excitation cycles at an excitation frequency of 2.36 MHz to generate the face pressures used as an input to the KZK simulations. These face pressure waves was scaled to an amplitude of 0.4 MPa to match pressure amplitudes that were measured experimentally. As shown in Figure 2, appropriate time delays were applied to focus the acoustic waves correctly. </a:t>
+            </a:r>
+            <a:endParaRPr/>
+          </a:p>
+        </p:txBody>
+      </p:sp>
+      <p:sp>
+        <p:nvSpPr>
+          <p:cNvPr id="74" name="CustomShape 16"/>
+          <p:cNvSpPr/>
+          <p:nvPr/>
+        </p:nvSpPr>
+        <p:spPr>
+          <a:xfrm>
+            <a:off x="2377440" y="11057400"/>
+            <a:ext cx="3291120" cy="541080"/>
+          </a:xfrm>
+          <a:prstGeom prst="rect">
+            <a:avLst/>
+          </a:prstGeom>
+          <a:noFill/>
+          <a:ln>
+            <a:noFill/>
+          </a:ln>
+        </p:spPr>
+        <p:style>
+          <a:lnRef idx="0">
+            <a:scrgbClr r="0" g="0" b="0"/>
+          </a:lnRef>
+          <a:fillRef idx="0">
+            <a:scrgbClr r="0" g="0" b="0"/>
+          </a:fillRef>
+          <a:effectRef idx="0">
+            <a:scrgbClr r="0" g="0" b="0"/>
+          </a:effectRef>
+          <a:fontRef idx="minor"/>
+        </p:style>
+        <p:txBody>
+          <a:bodyPr lIns="90000" tIns="45000" rIns="90000" bIns="45000"/>
+          <a:lstStyle/>
+          <a:p>
+            <a:pPr>
+              <a:lnSpc>
+                <a:spcPct val="100000"/>
+              </a:lnSpc>
+            </a:pPr>
+            <a:r>
+              <a:rPr lang="en-US" sz="1600" strike="noStrike">
+                <a:solidFill>
+                  <a:srgbClr val="000000"/>
+                </a:solidFill>
+                <a:latin typeface="Arial"/>
+                <a:ea typeface="DejaVu Sans"/>
+              </a:rPr>
+              <a:t>Figure 1: Nonlinear Acoustic Wave</a:t>
+            </a:r>
+            <a:endParaRPr/>
+          </a:p>
+        </p:txBody>
+      </p:sp>
+      <p:sp>
+        <p:nvSpPr>
+          <p:cNvPr id="76" name="CustomShape 17"/>
+          <p:cNvSpPr/>
+          <p:nvPr/>
+        </p:nvSpPr>
+        <p:spPr>
+          <a:xfrm>
+            <a:off x="822960" y="17623080"/>
+            <a:ext cx="6400080" cy="992520"/>
+          </a:xfrm>
+          <a:prstGeom prst="rect">
+            <a:avLst/>
+          </a:prstGeom>
+          <a:noFill/>
+          <a:ln>
+            <a:noFill/>
+          </a:ln>
+        </p:spPr>
+        <p:style>
+          <a:lnRef idx="0">
+            <a:scrgbClr r="0" g="0" b="0"/>
+          </a:lnRef>
+          <a:fillRef idx="0">
+            <a:scrgbClr r="0" g="0" b="0"/>
+          </a:fillRef>
+          <a:effectRef idx="0">
+            <a:scrgbClr r="0" g="0" b="0"/>
+          </a:effectRef>
+          <a:fontRef idx="minor"/>
+        </p:style>
+        <p:txBody>
+          <a:bodyPr lIns="90000" tIns="45000" rIns="90000" bIns="45000"/>
+          <a:lstStyle/>
+          <a:p>
+            <a:pPr algn="just">
+              <a:lnSpc>
+                <a:spcPct val="100000"/>
+              </a:lnSpc>
+            </a:pPr>
+            <a:r>
+              <a:rPr lang="en-US" sz="1600" strike="noStrike" dirty="0">
+                <a:solidFill>
+                  <a:srgbClr val="000000"/>
+                </a:solidFill>
+                <a:latin typeface="Arial"/>
+                <a:ea typeface="DejaVu Sans"/>
+              </a:rPr>
+              <a:t>	Using these face pressure inputs, KZK simulations were run with various combinations of attenuation coefficients (α = 0.005, 0.3, 1.0, and 1.5 dB/cm/MHz) and nonlinear coefficients (β = 0, 3.5, and 7). The resulting intensity fields </a:t>
+            </a:r>
+            <a:r>
+              <a:rPr lang="en-US" sz="1600" strike="noStrike" dirty="0" smtClean="0">
+                <a:solidFill>
+                  <a:srgbClr val="000000"/>
+                </a:solidFill>
+                <a:latin typeface="Arial"/>
+                <a:ea typeface="DejaVu Sans"/>
+              </a:rPr>
+              <a:t>were normalized and compared.</a:t>
+            </a:r>
+            <a:endParaRPr dirty="0"/>
+          </a:p>
+        </p:txBody>
+      </p:sp>
+      <p:sp>
+        <p:nvSpPr>
+          <p:cNvPr id="78" name="CustomShape 18"/>
+          <p:cNvSpPr/>
+          <p:nvPr/>
+        </p:nvSpPr>
+        <p:spPr>
+          <a:xfrm>
+            <a:off x="2103120" y="17246160"/>
+            <a:ext cx="3931200" cy="315360"/>
+          </a:xfrm>
+          <a:prstGeom prst="rect">
+            <a:avLst/>
+          </a:prstGeom>
+          <a:noFill/>
+          <a:ln>
+            <a:noFill/>
+          </a:ln>
+        </p:spPr>
+        <p:style>
+          <a:lnRef idx="0">
+            <a:scrgbClr r="0" g="0" b="0"/>
+          </a:lnRef>
+          <a:fillRef idx="0">
+            <a:scrgbClr r="0" g="0" b="0"/>
+          </a:fillRef>
+          <a:effectRef idx="0">
+            <a:scrgbClr r="0" g="0" b="0"/>
+          </a:effectRef>
+          <a:fontRef idx="minor"/>
+        </p:style>
+        <p:txBody>
+          <a:bodyPr lIns="90000" tIns="45000" rIns="90000" bIns="45000"/>
+          <a:lstStyle/>
+          <a:p>
+            <a:pPr>
+              <a:lnSpc>
+                <a:spcPct val="100000"/>
+              </a:lnSpc>
+            </a:pPr>
+            <a:r>
+              <a:rPr lang="en-US" sz="1600" strike="noStrike">
+                <a:solidFill>
+                  <a:srgbClr val="000000"/>
+                </a:solidFill>
+                <a:latin typeface="Arial"/>
+                <a:ea typeface="DejaVu Sans"/>
+              </a:rPr>
+              <a:t>Figure 2: Simulated Element Time Delays</a:t>
+            </a:r>
+            <a:endParaRPr/>
+          </a:p>
+        </p:txBody>
+      </p:sp>
+      <p:sp>
+        <p:nvSpPr>
+          <p:cNvPr id="82" name="CustomShape 22"/>
+          <p:cNvSpPr/>
+          <p:nvPr/>
+        </p:nvSpPr>
+        <p:spPr>
+          <a:xfrm>
+            <a:off x="17054325" y="9887339"/>
+            <a:ext cx="1012416" cy="364320"/>
+          </a:xfrm>
+          <a:prstGeom prst="rect">
+            <a:avLst/>
+          </a:prstGeom>
+          <a:noFill/>
+          <a:ln>
+            <a:noFill/>
+          </a:ln>
+        </p:spPr>
+        <p:style>
+          <a:lnRef idx="0">
+            <a:scrgbClr r="0" g="0" b="0"/>
+          </a:lnRef>
+          <a:fillRef idx="0">
+            <a:scrgbClr r="0" g="0" b="0"/>
+          </a:fillRef>
+          <a:effectRef idx="0">
+            <a:scrgbClr r="0" g="0" b="0"/>
+          </a:effectRef>
+          <a:fontRef idx="minor"/>
+        </p:style>
+        <p:txBody>
+          <a:bodyPr lIns="90000" tIns="45000" rIns="90000" bIns="45000"/>
+          <a:lstStyle/>
+          <a:p>
+            <a:pPr>
+              <a:lnSpc>
+                <a:spcPct val="100000"/>
+              </a:lnSpc>
+            </a:pPr>
+            <a:r>
+              <a:rPr lang="en-US" sz="2400" strike="noStrike" dirty="0">
+                <a:solidFill>
+                  <a:srgbClr val="000000"/>
+                </a:solidFill>
+                <a:latin typeface="Arial"/>
+                <a:ea typeface="DejaVu Sans"/>
+              </a:rPr>
+              <a:t>β = 0</a:t>
+            </a:r>
+            <a:endParaRPr sz="2400" dirty="0"/>
+          </a:p>
+        </p:txBody>
+      </p:sp>
+      <p:sp>
+        <p:nvSpPr>
+          <p:cNvPr id="83" name="CustomShape 23"/>
+          <p:cNvSpPr/>
+          <p:nvPr/>
+        </p:nvSpPr>
+        <p:spPr>
+          <a:xfrm>
+            <a:off x="19607294" y="9868730"/>
+            <a:ext cx="1203944" cy="364320"/>
+          </a:xfrm>
+          <a:prstGeom prst="rect">
+            <a:avLst/>
+          </a:prstGeom>
+          <a:noFill/>
+          <a:ln>
+            <a:noFill/>
+          </a:ln>
+        </p:spPr>
+        <p:style>
+          <a:lnRef idx="0">
+            <a:scrgbClr r="0" g="0" b="0"/>
+          </a:lnRef>
+          <a:fillRef idx="0">
+            <a:scrgbClr r="0" g="0" b="0"/>
+          </a:fillRef>
+          <a:effectRef idx="0">
+            <a:scrgbClr r="0" g="0" b="0"/>
+          </a:effectRef>
+          <a:fontRef idx="minor"/>
+        </p:style>
+        <p:txBody>
+          <a:bodyPr lIns="90000" tIns="45000" rIns="90000" bIns="45000"/>
+          <a:lstStyle/>
+          <a:p>
+            <a:pPr>
+              <a:lnSpc>
+                <a:spcPct val="100000"/>
+              </a:lnSpc>
+            </a:pPr>
+            <a:r>
+              <a:rPr lang="en-US" sz="2400" strike="noStrike" dirty="0">
+                <a:solidFill>
+                  <a:srgbClr val="000000"/>
+                </a:solidFill>
+                <a:latin typeface="Arial"/>
+                <a:ea typeface="DejaVu Sans"/>
+              </a:rPr>
+              <a:t>β = 3.5 </a:t>
+            </a:r>
+            <a:endParaRPr sz="2400" dirty="0"/>
+          </a:p>
+        </p:txBody>
+      </p:sp>
+      <p:sp>
+        <p:nvSpPr>
+          <p:cNvPr id="84" name="CustomShape 24"/>
+          <p:cNvSpPr/>
+          <p:nvPr/>
+        </p:nvSpPr>
+        <p:spPr>
+          <a:xfrm>
+            <a:off x="22508991" y="9868730"/>
+            <a:ext cx="764280" cy="364320"/>
+          </a:xfrm>
+          <a:prstGeom prst="rect">
+            <a:avLst/>
+          </a:prstGeom>
+          <a:noFill/>
+          <a:ln>
+            <a:noFill/>
+          </a:ln>
+        </p:spPr>
+        <p:style>
+          <a:lnRef idx="0">
+            <a:scrgbClr r="0" g="0" b="0"/>
+          </a:lnRef>
+          <a:fillRef idx="0">
+            <a:scrgbClr r="0" g="0" b="0"/>
+          </a:fillRef>
+          <a:effectRef idx="0">
+            <a:scrgbClr r="0" g="0" b="0"/>
+          </a:effectRef>
+          <a:fontRef idx="minor"/>
+        </p:style>
+        <p:txBody>
+          <a:bodyPr wrap="none" lIns="90000" tIns="45000" rIns="90000" bIns="45000"/>
+          <a:lstStyle/>
+          <a:p>
+            <a:pPr>
+              <a:lnSpc>
+                <a:spcPct val="100000"/>
+              </a:lnSpc>
+            </a:pPr>
+            <a:r>
+              <a:rPr lang="en-US" sz="2400" strike="noStrike" dirty="0">
+                <a:solidFill>
+                  <a:srgbClr val="000000"/>
+                </a:solidFill>
+                <a:latin typeface="Arial"/>
+                <a:ea typeface="DejaVu Sans"/>
+              </a:rPr>
+              <a:t>β = 7 </a:t>
+            </a:r>
+            <a:endParaRPr sz="2400" dirty="0"/>
+          </a:p>
+        </p:txBody>
+      </p:sp>
+      <p:sp>
+        <p:nvSpPr>
+          <p:cNvPr id="85" name="Line 25"/>
+          <p:cNvSpPr/>
+          <p:nvPr/>
+        </p:nvSpPr>
+        <p:spPr>
+          <a:xfrm>
+            <a:off x="11061000" y="7871400"/>
+            <a:ext cx="184320" cy="0"/>
+          </a:xfrm>
+          <a:prstGeom prst="line">
+            <a:avLst/>
+          </a:prstGeom>
+          <a:ln>
+            <a:solidFill>
+              <a:srgbClr val="4A7EBB"/>
+            </a:solidFill>
+          </a:ln>
+        </p:spPr>
+      </p:sp>
+      <p:sp>
+        <p:nvSpPr>
+          <p:cNvPr id="86" name="Line 26"/>
+          <p:cNvSpPr/>
+          <p:nvPr/>
+        </p:nvSpPr>
+        <p:spPr>
+          <a:xfrm flipV="1">
+            <a:off x="11245320" y="6003000"/>
+            <a:ext cx="0" cy="1868400"/>
+          </a:xfrm>
+          <a:prstGeom prst="line">
+            <a:avLst/>
+          </a:prstGeom>
+          <a:ln>
+            <a:solidFill>
+              <a:srgbClr val="4A7EBB"/>
+            </a:solidFill>
+          </a:ln>
+        </p:spPr>
+      </p:sp>
+      <p:sp>
+        <p:nvSpPr>
+          <p:cNvPr id="87" name="Line 27"/>
+          <p:cNvSpPr/>
+          <p:nvPr/>
+        </p:nvSpPr>
+        <p:spPr>
+          <a:xfrm>
+            <a:off x="11245320" y="6003000"/>
+            <a:ext cx="408240" cy="0"/>
+          </a:xfrm>
+          <a:prstGeom prst="line">
+            <a:avLst/>
+          </a:prstGeom>
+          <a:ln>
+            <a:solidFill>
+              <a:srgbClr val="4A7EBB"/>
+            </a:solidFill>
+          </a:ln>
+        </p:spPr>
+      </p:sp>
+      <p:sp>
+        <p:nvSpPr>
+          <p:cNvPr id="88" name="Line 28"/>
+          <p:cNvSpPr/>
+          <p:nvPr/>
+        </p:nvSpPr>
+        <p:spPr>
+          <a:xfrm>
+            <a:off x="11245320" y="7871400"/>
+            <a:ext cx="0" cy="1889280"/>
+          </a:xfrm>
+          <a:prstGeom prst="line">
+            <a:avLst/>
+          </a:prstGeom>
+          <a:ln>
+            <a:solidFill>
+              <a:srgbClr val="4A7EBB"/>
+            </a:solidFill>
+          </a:ln>
+        </p:spPr>
+      </p:sp>
+      <p:sp>
+        <p:nvSpPr>
+          <p:cNvPr id="89" name="Line 29"/>
+          <p:cNvSpPr/>
+          <p:nvPr/>
+        </p:nvSpPr>
+        <p:spPr>
+          <a:xfrm>
+            <a:off x="11245320" y="9760680"/>
+            <a:ext cx="379800" cy="0"/>
+          </a:xfrm>
+          <a:prstGeom prst="line">
+            <a:avLst/>
+          </a:prstGeom>
+          <a:ln>
+            <a:solidFill>
+              <a:srgbClr val="4A7EBB"/>
+            </a:solidFill>
+          </a:ln>
+        </p:spPr>
+      </p:sp>
+      <p:sp>
+        <p:nvSpPr>
+          <p:cNvPr id="90" name="Line 30"/>
+          <p:cNvSpPr/>
+          <p:nvPr/>
+        </p:nvSpPr>
+        <p:spPr>
+          <a:xfrm>
+            <a:off x="11059470" y="16188010"/>
+            <a:ext cx="184320" cy="0"/>
+          </a:xfrm>
+          <a:prstGeom prst="line">
+            <a:avLst/>
+          </a:prstGeom>
+          <a:ln>
+            <a:solidFill>
+              <a:srgbClr val="4A7EBB"/>
+            </a:solidFill>
+          </a:ln>
+        </p:spPr>
+      </p:sp>
+      <p:sp>
+        <p:nvSpPr>
+          <p:cNvPr id="91" name="Line 31"/>
+          <p:cNvSpPr/>
+          <p:nvPr/>
+        </p:nvSpPr>
+        <p:spPr>
+          <a:xfrm flipV="1">
+            <a:off x="11243790" y="14301647"/>
+            <a:ext cx="0" cy="1886362"/>
+          </a:xfrm>
+          <a:prstGeom prst="line">
+            <a:avLst/>
+          </a:prstGeom>
+          <a:ln>
+            <a:solidFill>
+              <a:srgbClr val="4A7EBB"/>
+            </a:solidFill>
+          </a:ln>
+        </p:spPr>
+      </p:sp>
+      <p:sp>
+        <p:nvSpPr>
+          <p:cNvPr id="92" name="Line 32"/>
+          <p:cNvSpPr/>
+          <p:nvPr/>
+        </p:nvSpPr>
+        <p:spPr>
+          <a:xfrm>
+            <a:off x="11243790" y="14301647"/>
+            <a:ext cx="408240" cy="0"/>
+          </a:xfrm>
+          <a:prstGeom prst="line">
+            <a:avLst/>
+          </a:prstGeom>
+          <a:ln>
+            <a:solidFill>
+              <a:srgbClr val="4A7EBB"/>
+            </a:solidFill>
+          </a:ln>
+        </p:spPr>
+      </p:sp>
+      <p:sp>
+        <p:nvSpPr>
+          <p:cNvPr id="93" name="Line 33"/>
+          <p:cNvSpPr/>
+          <p:nvPr/>
+        </p:nvSpPr>
+        <p:spPr>
+          <a:xfrm>
+            <a:off x="11243790" y="16188010"/>
+            <a:ext cx="0" cy="1889640"/>
+          </a:xfrm>
+          <a:prstGeom prst="line">
+            <a:avLst/>
+          </a:prstGeom>
+          <a:ln>
+            <a:solidFill>
+              <a:srgbClr val="4A7EBB"/>
+            </a:solidFill>
+          </a:ln>
+        </p:spPr>
+      </p:sp>
+      <p:sp>
+        <p:nvSpPr>
+          <p:cNvPr id="94" name="Line 34"/>
+          <p:cNvSpPr/>
+          <p:nvPr/>
+        </p:nvSpPr>
+        <p:spPr>
+          <a:xfrm>
+            <a:off x="11243790" y="18077650"/>
+            <a:ext cx="379800" cy="0"/>
+          </a:xfrm>
+          <a:prstGeom prst="line">
+            <a:avLst/>
+          </a:prstGeom>
+          <a:ln>
+            <a:solidFill>
+              <a:srgbClr val="4A7EBB"/>
+            </a:solidFill>
+          </a:ln>
+        </p:spPr>
+      </p:sp>
       <p:pic>
         <p:nvPicPr>
-          <p:cNvPr id="62" name="Picture 61"/>
+          <p:cNvPr id="96" name="Picture 95"/>
           <p:cNvPicPr/>
           <p:nvPr/>
         </p:nvPicPr>
-        <p:blipFill>
+        <p:blipFill rotWithShape="1">
           <a:blip r:embed="rId3"/>
+          <a:srcRect l="33596" t="2201" r="33290" b="2777"/>
           <a:stretch/>
         </p:blipFill>
         <p:spPr>
           <a:xfrm>
-            <a:off x="11536560" y="6178320"/>
-            <a:ext cx="4314960" cy="3390840"/>
+            <a:off x="16353084" y="10310946"/>
+            <a:ext cx="2221370" cy="3391707"/>
           </a:xfrm>
           <a:prstGeom prst="rect">
             <a:avLst/>
@@ -3443,74 +4245,21 @@
           </a:ln>
         </p:spPr>
       </p:pic>
-      <p:sp>
-        <p:nvSpPr>
-          <p:cNvPr id="63" name="CustomShape 12"/>
-          <p:cNvSpPr/>
-          <p:nvPr/>
-        </p:nvSpPr>
-        <p:spPr>
-          <a:xfrm>
-            <a:off x="8686800" y="7660080"/>
-            <a:ext cx="2453400" cy="345240"/>
-          </a:xfrm>
-          <a:prstGeom prst="rect">
-            <a:avLst/>
-          </a:prstGeom>
-          <a:noFill/>
-          <a:ln>
-            <a:noFill/>
-          </a:ln>
-        </p:spPr>
-        <p:style>
-          <a:lnRef idx="0">
-            <a:scrgbClr r="0" g="0" b="0"/>
-          </a:lnRef>
-          <a:fillRef idx="0">
-            <a:scrgbClr r="0" g="0" b="0"/>
-          </a:fillRef>
-          <a:effectRef idx="0">
-            <a:scrgbClr r="0" g="0" b="0"/>
-          </a:effectRef>
-          <a:fontRef idx="minor"/>
-        </p:style>
-        <p:txBody>
-          <a:bodyPr lIns="90000" tIns="45000" rIns="90000" bIns="45000"/>
-          <a:lstStyle/>
-          <a:p>
-            <a:pPr>
-              <a:lnSpc>
-                <a:spcPct val="100000"/>
-              </a:lnSpc>
-            </a:pPr>
-            <a:r>
-              <a:rPr lang="en-US" strike="noStrike" dirty="0">
-                <a:solidFill>
-                  <a:srgbClr val="000000"/>
-                </a:solidFill>
-                <a:latin typeface="Arial"/>
-                <a:ea typeface="DejaVu Sans"/>
-              </a:rPr>
-              <a:t>α = 0.005 dB/cm/MHz </a:t>
-            </a:r>
-            <a:endParaRPr dirty="0"/>
-          </a:p>
-        </p:txBody>
-      </p:sp>
       <p:pic>
         <p:nvPicPr>
-          <p:cNvPr id="67" name="Picture 66"/>
+          <p:cNvPr id="97" name="Picture 96"/>
           <p:cNvPicPr/>
           <p:nvPr/>
         </p:nvPicPr>
-        <p:blipFill>
+        <p:blipFill rotWithShape="1">
           <a:blip r:embed="rId4"/>
+          <a:srcRect l="33085" t="2022" r="33335" b="2378"/>
           <a:stretch/>
         </p:blipFill>
         <p:spPr>
           <a:xfrm>
-            <a:off x="11535030" y="14493490"/>
-            <a:ext cx="4314960" cy="3389040"/>
+            <a:off x="19019315" y="10310944"/>
+            <a:ext cx="2221609" cy="3391707"/>
           </a:xfrm>
           <a:prstGeom prst="rect">
             <a:avLst/>
@@ -3522,272 +4271,21 @@
           </a:ln>
         </p:spPr>
       </p:pic>
-      <p:sp>
-        <p:nvSpPr>
-          <p:cNvPr id="68" name="CustomShape 13"/>
-          <p:cNvSpPr/>
-          <p:nvPr/>
-        </p:nvSpPr>
-        <p:spPr>
-          <a:xfrm>
-            <a:off x="8888391" y="16078210"/>
-            <a:ext cx="2200320" cy="345240"/>
-          </a:xfrm>
-          <a:prstGeom prst="rect">
-            <a:avLst/>
-          </a:prstGeom>
-          <a:noFill/>
-          <a:ln>
-            <a:noFill/>
-          </a:ln>
-        </p:spPr>
-        <p:style>
-          <a:lnRef idx="0">
-            <a:scrgbClr r="0" g="0" b="0"/>
-          </a:lnRef>
-          <a:fillRef idx="0">
-            <a:scrgbClr r="0" g="0" b="0"/>
-          </a:fillRef>
-          <a:effectRef idx="0">
-            <a:scrgbClr r="0" g="0" b="0"/>
-          </a:effectRef>
-          <a:fontRef idx="minor"/>
-        </p:style>
-        <p:txBody>
-          <a:bodyPr lIns="90000" tIns="45000" rIns="90000" bIns="45000"/>
-          <a:lstStyle/>
-          <a:p>
-            <a:pPr>
-              <a:lnSpc>
-                <a:spcPct val="100000"/>
-              </a:lnSpc>
-            </a:pPr>
-            <a:r>
-              <a:rPr lang="en-US" strike="noStrike" dirty="0">
-                <a:solidFill>
-                  <a:srgbClr val="000000"/>
-                </a:solidFill>
-                <a:latin typeface="Arial"/>
-                <a:ea typeface="DejaVu Sans"/>
-              </a:rPr>
-              <a:t>α = 1.5 dB/cm/MHz </a:t>
-            </a:r>
-            <a:endParaRPr dirty="0"/>
-          </a:p>
-        </p:txBody>
-      </p:sp>
-      <p:sp>
-        <p:nvSpPr>
-          <p:cNvPr id="72" name="CustomShape 14"/>
-          <p:cNvSpPr/>
-          <p:nvPr/>
-        </p:nvSpPr>
-        <p:spPr>
-          <a:xfrm>
-            <a:off x="25694640" y="11907000"/>
-            <a:ext cx="6491520" cy="345600"/>
-          </a:xfrm>
-          <a:prstGeom prst="rect">
-            <a:avLst/>
-          </a:prstGeom>
-          <a:noFill/>
-          <a:ln>
-            <a:noFill/>
-          </a:ln>
-        </p:spPr>
-        <p:style>
-          <a:lnRef idx="0">
-            <a:scrgbClr r="0" g="0" b="0"/>
-          </a:lnRef>
-          <a:fillRef idx="0">
-            <a:scrgbClr r="0" g="0" b="0"/>
-          </a:fillRef>
-          <a:effectRef idx="0">
-            <a:scrgbClr r="0" g="0" b="0"/>
-          </a:effectRef>
-          <a:fontRef idx="minor"/>
-        </p:style>
-        <p:txBody>
-          <a:bodyPr lIns="90000" tIns="45000" rIns="90000" bIns="45000"/>
-          <a:lstStyle/>
-          <a:p>
-            <a:pPr algn="just">
-              <a:lnSpc>
-                <a:spcPct val="100000"/>
-              </a:lnSpc>
-            </a:pPr>
-            <a:r>
-              <a:rPr lang="en-US" sz="1600" strike="noStrike" dirty="0">
-                <a:solidFill>
-                  <a:srgbClr val="000000"/>
-                </a:solidFill>
-                <a:latin typeface="Arial"/>
-                <a:ea typeface="DejaVu Sans"/>
-              </a:rPr>
-              <a:t>	The effect of increasing nonlinearity on the intensity distribution of a focused ultrasound beam was investigated computationally using the KZK simulation. The results of these simulations provided strong evidence suggesting that as the nonlinear coefficient of the medium increased, the intensity field peaked at shallower positions that were offset on the lateral axis.</a:t>
-            </a:r>
-            <a:endParaRPr dirty="0"/>
-          </a:p>
-          <a:p>
-            <a:pPr algn="just">
-              <a:lnSpc>
-                <a:spcPct val="100000"/>
-              </a:lnSpc>
-            </a:pPr>
-            <a:r>
-              <a:rPr lang="en-US" sz="1600" strike="noStrike" dirty="0">
-                <a:solidFill>
-                  <a:srgbClr val="000000"/>
-                </a:solidFill>
-                <a:latin typeface="Arial"/>
-                <a:ea typeface="DejaVu Sans"/>
-              </a:rPr>
-              <a:t>	It was also found that as the attenuation of the material increased, the effects of nonlinearity were dampened. This agreed well with what was predicted, since nonlinear effects were most prominent when pressure waves with immense amplitudes caused local temperature and sound speed increases.</a:t>
-            </a:r>
-            <a:endParaRPr dirty="0"/>
-          </a:p>
-          <a:p>
-            <a:pPr algn="just">
-              <a:lnSpc>
-                <a:spcPct val="100000"/>
-              </a:lnSpc>
-            </a:pPr>
-            <a:r>
-              <a:rPr lang="en-US" sz="1600" strike="noStrike" dirty="0">
-                <a:solidFill>
-                  <a:srgbClr val="000000"/>
-                </a:solidFill>
-                <a:latin typeface="Arial"/>
-                <a:ea typeface="DejaVu Sans"/>
-              </a:rPr>
-              <a:t>	Finally, the next step is to simulate the shear waves created using these intensity data. This will help further characterize the bias on shear wave speed measurements. This information will be crucial for developing methods to possibly correct for this depth dependent measurement bias.</a:t>
-            </a:r>
-            <a:endParaRPr dirty="0"/>
-          </a:p>
-        </p:txBody>
-      </p:sp>
-      <p:sp>
-        <p:nvSpPr>
-          <p:cNvPr id="73" name="CustomShape 15"/>
-          <p:cNvSpPr/>
-          <p:nvPr/>
-        </p:nvSpPr>
-        <p:spPr>
-          <a:xfrm>
-            <a:off x="822960" y="12088440"/>
-            <a:ext cx="6491520" cy="1669680"/>
-          </a:xfrm>
-          <a:prstGeom prst="rect">
-            <a:avLst/>
-          </a:prstGeom>
-          <a:noFill/>
-          <a:ln>
-            <a:noFill/>
-          </a:ln>
-        </p:spPr>
-        <p:style>
-          <a:lnRef idx="0">
-            <a:scrgbClr r="0" g="0" b="0"/>
-          </a:lnRef>
-          <a:fillRef idx="0">
-            <a:scrgbClr r="0" g="0" b="0"/>
-          </a:fillRef>
-          <a:effectRef idx="0">
-            <a:scrgbClr r="0" g="0" b="0"/>
-          </a:effectRef>
-          <a:fontRef idx="minor"/>
-        </p:style>
-        <p:txBody>
-          <a:bodyPr lIns="90000" tIns="45000" rIns="90000" bIns="45000"/>
-          <a:lstStyle/>
-          <a:p>
-            <a:pPr algn="just">
-              <a:lnSpc>
-                <a:spcPct val="100000"/>
-              </a:lnSpc>
-            </a:pPr>
-            <a:r>
-              <a:rPr lang="en-US" sz="1600" strike="noStrike">
-                <a:solidFill>
-                  <a:srgbClr val="000000"/>
-                </a:solidFill>
-                <a:latin typeface="Arial"/>
-                <a:ea typeface="DejaVu Sans"/>
-              </a:rPr>
-              <a:t>	A curvilinear C5-2 transducer focused at 70 mm in depth was simulated with 7 excitation cycles at an excitation frequency of 2.36 MHz to generate the face pressures used as an input to the KZK simulations. These face pressure waves was scaled to an amplitude of 0.4 MPa to match pressure amplitudes that were measured experimentally. As shown in Figure 2, appropriate time delays were applied to focus the acoustic waves correctly. </a:t>
-            </a:r>
-            <a:endParaRPr/>
-          </a:p>
-        </p:txBody>
-      </p:sp>
-      <p:sp>
-        <p:nvSpPr>
-          <p:cNvPr id="74" name="CustomShape 16"/>
-          <p:cNvSpPr/>
-          <p:nvPr/>
-        </p:nvSpPr>
-        <p:spPr>
-          <a:xfrm>
-            <a:off x="2377440" y="11057400"/>
-            <a:ext cx="3291120" cy="541080"/>
-          </a:xfrm>
-          <a:prstGeom prst="rect">
-            <a:avLst/>
-          </a:prstGeom>
-          <a:noFill/>
-          <a:ln>
-            <a:noFill/>
-          </a:ln>
-        </p:spPr>
-        <p:style>
-          <a:lnRef idx="0">
-            <a:scrgbClr r="0" g="0" b="0"/>
-          </a:lnRef>
-          <a:fillRef idx="0">
-            <a:scrgbClr r="0" g="0" b="0"/>
-          </a:fillRef>
-          <a:effectRef idx="0">
-            <a:scrgbClr r="0" g="0" b="0"/>
-          </a:effectRef>
-          <a:fontRef idx="minor"/>
-        </p:style>
-        <p:txBody>
-          <a:bodyPr lIns="90000" tIns="45000" rIns="90000" bIns="45000"/>
-          <a:lstStyle/>
-          <a:p>
-            <a:pPr>
-              <a:lnSpc>
-                <a:spcPct val="100000"/>
-              </a:lnSpc>
-            </a:pPr>
-            <a:r>
-              <a:rPr lang="en-US" sz="1600" strike="noStrike">
-                <a:solidFill>
-                  <a:srgbClr val="000000"/>
-                </a:solidFill>
-                <a:latin typeface="Arial"/>
-                <a:ea typeface="DejaVu Sans"/>
-              </a:rPr>
-              <a:t>Figure 1: Nonlinear Acoustic Wave</a:t>
-            </a:r>
-            <a:endParaRPr/>
-          </a:p>
-        </p:txBody>
-      </p:sp>
       <p:pic>
         <p:nvPicPr>
-          <p:cNvPr id="75" name="Picture 74"/>
+          <p:cNvPr id="98" name="Picture 97"/>
           <p:cNvPicPr/>
           <p:nvPr/>
         </p:nvPicPr>
-        <p:blipFill>
+        <p:blipFill rotWithShape="1">
           <a:blip r:embed="rId5"/>
+          <a:srcRect l="33197" t="2357" r="33179" b="2521"/>
           <a:stretch/>
         </p:blipFill>
         <p:spPr>
           <a:xfrm>
-            <a:off x="2254140" y="8723081"/>
-            <a:ext cx="3579120" cy="2308399"/>
+            <a:off x="21781856" y="10310945"/>
+            <a:ext cx="2221610" cy="3391707"/>
           </a:xfrm>
           <a:prstGeom prst="rect">
             <a:avLst/>
@@ -3799,84 +4297,117 @@
           </a:ln>
         </p:spPr>
       </p:pic>
-      <p:sp>
-        <p:nvSpPr>
-          <p:cNvPr id="76" name="CustomShape 17"/>
-          <p:cNvSpPr/>
-          <p:nvPr/>
-        </p:nvSpPr>
-        <p:spPr>
-          <a:xfrm>
-            <a:off x="822960" y="17623080"/>
-            <a:ext cx="6400080" cy="992520"/>
-          </a:xfrm>
-          <a:prstGeom prst="rect">
-            <a:avLst/>
-          </a:prstGeom>
-          <a:noFill/>
+      <p:pic>
+        <p:nvPicPr>
+          <p:cNvPr id="99" name="Picture 98"/>
+          <p:cNvPicPr/>
+          <p:nvPr/>
+        </p:nvPicPr>
+        <p:blipFill rotWithShape="1">
+          <a:blip r:embed="rId6"/>
+          <a:srcRect l="37778" r="21598"/>
+          <a:stretch/>
+        </p:blipFill>
+        <p:spPr>
+          <a:xfrm>
+            <a:off x="30196737" y="3855162"/>
+            <a:ext cx="1929994" cy="2923084"/>
+          </a:xfrm>
+          <a:prstGeom prst="rect">
+            <a:avLst/>
+          </a:prstGeom>
           <a:ln>
             <a:noFill/>
           </a:ln>
         </p:spPr>
-        <p:style>
-          <a:lnRef idx="0">
-            <a:scrgbClr r="0" g="0" b="0"/>
-          </a:lnRef>
-          <a:fillRef idx="0">
-            <a:scrgbClr r="0" g="0" b="0"/>
-          </a:fillRef>
-          <a:effectRef idx="0">
-            <a:scrgbClr r="0" g="0" b="0"/>
-          </a:effectRef>
-          <a:fontRef idx="minor"/>
-        </p:style>
-        <p:txBody>
-          <a:bodyPr lIns="90000" tIns="45000" rIns="90000" bIns="45000"/>
-          <a:lstStyle/>
-          <a:p>
-            <a:pPr algn="just">
-              <a:lnSpc>
-                <a:spcPct val="100000"/>
-              </a:lnSpc>
-            </a:pPr>
-            <a:r>
-              <a:rPr lang="en-US" sz="1600" strike="noStrike" dirty="0">
-                <a:solidFill>
-                  <a:srgbClr val="000000"/>
-                </a:solidFill>
-                <a:latin typeface="Arial"/>
-                <a:ea typeface="DejaVu Sans"/>
-              </a:rPr>
-              <a:t>	Using these face pressure inputs, KZK simulations were run with various combinations of attenuation coefficients (α = 0.005, 0.3, 1.0, and 1.5 dB/cm/MHz) and nonlinear coefficients (β = 0, 3.5, and 7). The resulting intensity fields </a:t>
-            </a:r>
-            <a:r>
-              <a:rPr lang="en-US" sz="1600" strike="noStrike" dirty="0" smtClean="0">
-                <a:solidFill>
-                  <a:srgbClr val="000000"/>
-                </a:solidFill>
-                <a:latin typeface="Arial"/>
-                <a:ea typeface="DejaVu Sans"/>
-              </a:rPr>
-              <a:t>were normalized and compared.</a:t>
-            </a:r>
-            <a:endParaRPr dirty="0"/>
-          </a:p>
-        </p:txBody>
-      </p:sp>
+      </p:pic>
       <p:pic>
         <p:nvPicPr>
-          <p:cNvPr id="77" name="Picture 76"/>
+          <p:cNvPr id="100" name="Picture 99"/>
           <p:cNvPicPr/>
           <p:nvPr/>
         </p:nvPicPr>
-        <p:blipFill>
-          <a:blip r:embed="rId6"/>
+        <p:blipFill rotWithShape="1">
+          <a:blip r:embed="rId7"/>
+          <a:srcRect l="31714" r="15256"/>
           <a:stretch/>
         </p:blipFill>
         <p:spPr>
           <a:xfrm>
-            <a:off x="2000160" y="13928040"/>
-            <a:ext cx="4137120" cy="3266280"/>
+            <a:off x="27586185" y="3855162"/>
+            <a:ext cx="2047971" cy="2923952"/>
+          </a:xfrm>
+          <a:prstGeom prst="rect">
+            <a:avLst/>
+          </a:prstGeom>
+          <a:ln>
+            <a:noFill/>
+          </a:ln>
+        </p:spPr>
+      </p:pic>
+      <p:pic>
+        <p:nvPicPr>
+          <p:cNvPr id="101" name="Picture 100"/>
+          <p:cNvPicPr/>
+          <p:nvPr/>
+        </p:nvPicPr>
+        <p:blipFill rotWithShape="1">
+          <a:blip r:embed="rId8"/>
+          <a:srcRect l="31549" r="9692"/>
+          <a:stretch/>
+        </p:blipFill>
+        <p:spPr>
+          <a:xfrm>
+            <a:off x="27573279" y="7024763"/>
+            <a:ext cx="2047971" cy="2923952"/>
+          </a:xfrm>
+          <a:prstGeom prst="rect">
+            <a:avLst/>
+          </a:prstGeom>
+          <a:ln>
+            <a:noFill/>
+          </a:ln>
+        </p:spPr>
+      </p:pic>
+      <p:pic>
+        <p:nvPicPr>
+          <p:cNvPr id="102" name="Picture 101"/>
+          <p:cNvPicPr/>
+          <p:nvPr/>
+        </p:nvPicPr>
+        <p:blipFill rotWithShape="1">
+          <a:blip r:embed="rId9"/>
+          <a:srcRect l="37499" r="21555"/>
+          <a:stretch/>
+        </p:blipFill>
+        <p:spPr>
+          <a:xfrm>
+            <a:off x="30196737" y="7022427"/>
+            <a:ext cx="1929994" cy="2892814"/>
+          </a:xfrm>
+          <a:prstGeom prst="rect">
+            <a:avLst/>
+          </a:prstGeom>
+          <a:ln>
+            <a:noFill/>
+          </a:ln>
+        </p:spPr>
+      </p:pic>
+      <p:pic>
+        <p:nvPicPr>
+          <p:cNvPr id="103" name="Picture 102"/>
+          <p:cNvPicPr/>
+          <p:nvPr/>
+        </p:nvPicPr>
+        <p:blipFill rotWithShape="1">
+          <a:blip r:embed="rId10"/>
+          <a:srcRect l="38156" r="38176" b="2711"/>
+          <a:stretch/>
+        </p:blipFill>
+        <p:spPr>
+          <a:xfrm>
+            <a:off x="16353084" y="6178320"/>
+            <a:ext cx="2221370" cy="3391707"/>
           </a:xfrm>
           <a:prstGeom prst="rect">
             <a:avLst/>
@@ -3888,446 +4419,21 @@
           </a:ln>
         </p:spPr>
       </p:pic>
-      <p:sp>
-        <p:nvSpPr>
-          <p:cNvPr id="78" name="CustomShape 18"/>
-          <p:cNvSpPr/>
-          <p:nvPr/>
-        </p:nvSpPr>
-        <p:spPr>
-          <a:xfrm>
-            <a:off x="2103120" y="17246160"/>
-            <a:ext cx="3931200" cy="315360"/>
-          </a:xfrm>
-          <a:prstGeom prst="rect">
-            <a:avLst/>
-          </a:prstGeom>
-          <a:noFill/>
-          <a:ln>
-            <a:noFill/>
-          </a:ln>
-        </p:spPr>
-        <p:style>
-          <a:lnRef idx="0">
-            <a:scrgbClr r="0" g="0" b="0"/>
-          </a:lnRef>
-          <a:fillRef idx="0">
-            <a:scrgbClr r="0" g="0" b="0"/>
-          </a:fillRef>
-          <a:effectRef idx="0">
-            <a:scrgbClr r="0" g="0" b="0"/>
-          </a:effectRef>
-          <a:fontRef idx="minor"/>
-        </p:style>
-        <p:txBody>
-          <a:bodyPr lIns="90000" tIns="45000" rIns="90000" bIns="45000"/>
-          <a:lstStyle/>
-          <a:p>
-            <a:pPr>
-              <a:lnSpc>
-                <a:spcPct val="100000"/>
-              </a:lnSpc>
-            </a:pPr>
-            <a:r>
-              <a:rPr lang="en-US" sz="1600" strike="noStrike">
-                <a:solidFill>
-                  <a:srgbClr val="000000"/>
-                </a:solidFill>
-                <a:latin typeface="Arial"/>
-                <a:ea typeface="DejaVu Sans"/>
-              </a:rPr>
-              <a:t>Figure 2: Simulated Element Time Delays</a:t>
-            </a:r>
-            <a:endParaRPr/>
-          </a:p>
-        </p:txBody>
-      </p:sp>
-      <p:sp>
-        <p:nvSpPr>
-          <p:cNvPr id="82" name="CustomShape 22"/>
-          <p:cNvSpPr/>
-          <p:nvPr/>
-        </p:nvSpPr>
-        <p:spPr>
-          <a:xfrm>
-            <a:off x="17108110" y="9868730"/>
-            <a:ext cx="712080" cy="364320"/>
-          </a:xfrm>
-          <a:prstGeom prst="rect">
-            <a:avLst/>
-          </a:prstGeom>
-          <a:noFill/>
-          <a:ln>
-            <a:noFill/>
-          </a:ln>
-        </p:spPr>
-        <p:style>
-          <a:lnRef idx="0">
-            <a:scrgbClr r="0" g="0" b="0"/>
-          </a:lnRef>
-          <a:fillRef idx="0">
-            <a:scrgbClr r="0" g="0" b="0"/>
-          </a:fillRef>
-          <a:effectRef idx="0">
-            <a:scrgbClr r="0" g="0" b="0"/>
-          </a:effectRef>
-          <a:fontRef idx="minor"/>
-        </p:style>
-        <p:txBody>
-          <a:bodyPr lIns="90000" tIns="45000" rIns="90000" bIns="45000"/>
-          <a:lstStyle/>
-          <a:p>
-            <a:pPr>
-              <a:lnSpc>
-                <a:spcPct val="100000"/>
-              </a:lnSpc>
-            </a:pPr>
-            <a:r>
-              <a:rPr lang="en-US" strike="noStrike" dirty="0">
-                <a:solidFill>
-                  <a:srgbClr val="000000"/>
-                </a:solidFill>
-                <a:latin typeface="Arial"/>
-                <a:ea typeface="DejaVu Sans"/>
-              </a:rPr>
-              <a:t>β = 0</a:t>
-            </a:r>
-            <a:endParaRPr dirty="0"/>
-          </a:p>
-        </p:txBody>
-      </p:sp>
-      <p:sp>
-        <p:nvSpPr>
-          <p:cNvPr id="83" name="CustomShape 23"/>
-          <p:cNvSpPr/>
-          <p:nvPr/>
-        </p:nvSpPr>
-        <p:spPr>
-          <a:xfrm>
-            <a:off x="19664999" y="9870420"/>
-            <a:ext cx="930240" cy="364320"/>
-          </a:xfrm>
-          <a:prstGeom prst="rect">
-            <a:avLst/>
-          </a:prstGeom>
-          <a:noFill/>
-          <a:ln>
-            <a:noFill/>
-          </a:ln>
-        </p:spPr>
-        <p:style>
-          <a:lnRef idx="0">
-            <a:scrgbClr r="0" g="0" b="0"/>
-          </a:lnRef>
-          <a:fillRef idx="0">
-            <a:scrgbClr r="0" g="0" b="0"/>
-          </a:fillRef>
-          <a:effectRef idx="0">
-            <a:scrgbClr r="0" g="0" b="0"/>
-          </a:effectRef>
-          <a:fontRef idx="minor"/>
-        </p:style>
-        <p:txBody>
-          <a:bodyPr lIns="90000" tIns="45000" rIns="90000" bIns="45000"/>
-          <a:lstStyle/>
-          <a:p>
-            <a:pPr>
-              <a:lnSpc>
-                <a:spcPct val="100000"/>
-              </a:lnSpc>
-            </a:pPr>
-            <a:r>
-              <a:rPr lang="en-US" strike="noStrike" dirty="0">
-                <a:solidFill>
-                  <a:srgbClr val="000000"/>
-                </a:solidFill>
-                <a:latin typeface="Arial"/>
-                <a:ea typeface="DejaVu Sans"/>
-              </a:rPr>
-              <a:t>β = 3.5 </a:t>
-            </a:r>
-            <a:endParaRPr dirty="0"/>
-          </a:p>
-        </p:txBody>
-      </p:sp>
-      <p:sp>
-        <p:nvSpPr>
-          <p:cNvPr id="84" name="CustomShape 24"/>
-          <p:cNvSpPr/>
-          <p:nvPr/>
-        </p:nvSpPr>
-        <p:spPr>
-          <a:xfrm>
-            <a:off x="22582649" y="9868730"/>
-            <a:ext cx="764280" cy="364320"/>
-          </a:xfrm>
-          <a:prstGeom prst="rect">
-            <a:avLst/>
-          </a:prstGeom>
-          <a:noFill/>
-          <a:ln>
-            <a:noFill/>
-          </a:ln>
-        </p:spPr>
-        <p:style>
-          <a:lnRef idx="0">
-            <a:scrgbClr r="0" g="0" b="0"/>
-          </a:lnRef>
-          <a:fillRef idx="0">
-            <a:scrgbClr r="0" g="0" b="0"/>
-          </a:fillRef>
-          <a:effectRef idx="0">
-            <a:scrgbClr r="0" g="0" b="0"/>
-          </a:effectRef>
-          <a:fontRef idx="minor"/>
-        </p:style>
-        <p:txBody>
-          <a:bodyPr wrap="none" lIns="90000" tIns="45000" rIns="90000" bIns="45000"/>
-          <a:lstStyle/>
-          <a:p>
-            <a:pPr>
-              <a:lnSpc>
-                <a:spcPct val="100000"/>
-              </a:lnSpc>
-            </a:pPr>
-            <a:r>
-              <a:rPr lang="en-US" strike="noStrike" dirty="0">
-                <a:solidFill>
-                  <a:srgbClr val="000000"/>
-                </a:solidFill>
-                <a:latin typeface="Arial"/>
-                <a:ea typeface="DejaVu Sans"/>
-              </a:rPr>
-              <a:t>β = 7 </a:t>
-            </a:r>
-            <a:endParaRPr dirty="0"/>
-          </a:p>
-        </p:txBody>
-      </p:sp>
-      <p:sp>
-        <p:nvSpPr>
-          <p:cNvPr id="85" name="Line 25"/>
-          <p:cNvSpPr/>
-          <p:nvPr/>
-        </p:nvSpPr>
-        <p:spPr>
-          <a:xfrm>
-            <a:off x="11061000" y="7871400"/>
-            <a:ext cx="184320" cy="0"/>
-          </a:xfrm>
-          <a:prstGeom prst="line">
-            <a:avLst/>
-          </a:prstGeom>
-          <a:ln>
-            <a:solidFill>
-              <a:srgbClr val="4A7EBB"/>
-            </a:solidFill>
-          </a:ln>
-        </p:spPr>
-      </p:sp>
-      <p:sp>
-        <p:nvSpPr>
-          <p:cNvPr id="86" name="Line 26"/>
-          <p:cNvSpPr/>
-          <p:nvPr/>
-        </p:nvSpPr>
-        <p:spPr>
-          <a:xfrm flipV="1">
-            <a:off x="11245320" y="6003000"/>
-            <a:ext cx="0" cy="1868400"/>
-          </a:xfrm>
-          <a:prstGeom prst="line">
-            <a:avLst/>
-          </a:prstGeom>
-          <a:ln>
-            <a:solidFill>
-              <a:srgbClr val="4A7EBB"/>
-            </a:solidFill>
-          </a:ln>
-        </p:spPr>
-      </p:sp>
-      <p:sp>
-        <p:nvSpPr>
-          <p:cNvPr id="87" name="Line 27"/>
-          <p:cNvSpPr/>
-          <p:nvPr/>
-        </p:nvSpPr>
-        <p:spPr>
-          <a:xfrm>
-            <a:off x="11245320" y="6003000"/>
-            <a:ext cx="408240" cy="0"/>
-          </a:xfrm>
-          <a:prstGeom prst="line">
-            <a:avLst/>
-          </a:prstGeom>
-          <a:ln>
-            <a:solidFill>
-              <a:srgbClr val="4A7EBB"/>
-            </a:solidFill>
-          </a:ln>
-        </p:spPr>
-      </p:sp>
-      <p:sp>
-        <p:nvSpPr>
-          <p:cNvPr id="88" name="Line 28"/>
-          <p:cNvSpPr/>
-          <p:nvPr/>
-        </p:nvSpPr>
-        <p:spPr>
-          <a:xfrm>
-            <a:off x="11245320" y="7871400"/>
-            <a:ext cx="0" cy="1889280"/>
-          </a:xfrm>
-          <a:prstGeom prst="line">
-            <a:avLst/>
-          </a:prstGeom>
-          <a:ln>
-            <a:solidFill>
-              <a:srgbClr val="4A7EBB"/>
-            </a:solidFill>
-          </a:ln>
-        </p:spPr>
-      </p:sp>
-      <p:sp>
-        <p:nvSpPr>
-          <p:cNvPr id="89" name="Line 29"/>
-          <p:cNvSpPr/>
-          <p:nvPr/>
-        </p:nvSpPr>
-        <p:spPr>
-          <a:xfrm>
-            <a:off x="11245320" y="9760680"/>
-            <a:ext cx="379800" cy="0"/>
-          </a:xfrm>
-          <a:prstGeom prst="line">
-            <a:avLst/>
-          </a:prstGeom>
-          <a:ln>
-            <a:solidFill>
-              <a:srgbClr val="4A7EBB"/>
-            </a:solidFill>
-          </a:ln>
-        </p:spPr>
-      </p:sp>
-      <p:sp>
-        <p:nvSpPr>
-          <p:cNvPr id="90" name="Line 30"/>
-          <p:cNvSpPr/>
-          <p:nvPr/>
-        </p:nvSpPr>
-        <p:spPr>
-          <a:xfrm>
-            <a:off x="11059470" y="16188010"/>
-            <a:ext cx="184320" cy="0"/>
-          </a:xfrm>
-          <a:prstGeom prst="line">
-            <a:avLst/>
-          </a:prstGeom>
-          <a:ln>
-            <a:solidFill>
-              <a:srgbClr val="4A7EBB"/>
-            </a:solidFill>
-          </a:ln>
-        </p:spPr>
-      </p:sp>
-      <p:sp>
-        <p:nvSpPr>
-          <p:cNvPr id="91" name="Line 31"/>
-          <p:cNvSpPr/>
-          <p:nvPr/>
-        </p:nvSpPr>
-        <p:spPr>
-          <a:xfrm flipV="1">
-            <a:off x="11243790" y="14301647"/>
-            <a:ext cx="0" cy="1886362"/>
-          </a:xfrm>
-          <a:prstGeom prst="line">
-            <a:avLst/>
-          </a:prstGeom>
-          <a:ln>
-            <a:solidFill>
-              <a:srgbClr val="4A7EBB"/>
-            </a:solidFill>
-          </a:ln>
-        </p:spPr>
-      </p:sp>
-      <p:sp>
-        <p:nvSpPr>
-          <p:cNvPr id="92" name="Line 32"/>
-          <p:cNvSpPr/>
-          <p:nvPr/>
-        </p:nvSpPr>
-        <p:spPr>
-          <a:xfrm>
-            <a:off x="11243790" y="14301647"/>
-            <a:ext cx="408240" cy="0"/>
-          </a:xfrm>
-          <a:prstGeom prst="line">
-            <a:avLst/>
-          </a:prstGeom>
-          <a:ln>
-            <a:solidFill>
-              <a:srgbClr val="4A7EBB"/>
-            </a:solidFill>
-          </a:ln>
-        </p:spPr>
-      </p:sp>
-      <p:sp>
-        <p:nvSpPr>
-          <p:cNvPr id="93" name="Line 33"/>
-          <p:cNvSpPr/>
-          <p:nvPr/>
-        </p:nvSpPr>
-        <p:spPr>
-          <a:xfrm>
-            <a:off x="11243790" y="16188010"/>
-            <a:ext cx="0" cy="1889640"/>
-          </a:xfrm>
-          <a:prstGeom prst="line">
-            <a:avLst/>
-          </a:prstGeom>
-          <a:ln>
-            <a:solidFill>
-              <a:srgbClr val="4A7EBB"/>
-            </a:solidFill>
-          </a:ln>
-        </p:spPr>
-      </p:sp>
-      <p:sp>
-        <p:nvSpPr>
-          <p:cNvPr id="94" name="Line 34"/>
-          <p:cNvSpPr/>
-          <p:nvPr/>
-        </p:nvSpPr>
-        <p:spPr>
-          <a:xfrm>
-            <a:off x="11243790" y="18077650"/>
-            <a:ext cx="379800" cy="0"/>
-          </a:xfrm>
-          <a:prstGeom prst="line">
-            <a:avLst/>
-          </a:prstGeom>
-          <a:ln>
-            <a:solidFill>
-              <a:srgbClr val="4A7EBB"/>
-            </a:solidFill>
-          </a:ln>
-        </p:spPr>
-      </p:sp>
       <p:pic>
         <p:nvPicPr>
-          <p:cNvPr id="95" name="Picture 94"/>
+          <p:cNvPr id="104" name="Picture 103"/>
           <p:cNvPicPr/>
           <p:nvPr/>
         </p:nvPicPr>
-        <p:blipFill>
-          <a:blip r:embed="rId7"/>
+        <p:blipFill rotWithShape="1">
+          <a:blip r:embed="rId11"/>
+          <a:srcRect l="38119" t="2043" r="38041" b="2049"/>
           <a:stretch/>
         </p:blipFill>
         <p:spPr>
           <a:xfrm>
-            <a:off x="11538090" y="10310946"/>
-            <a:ext cx="4311900" cy="3391707"/>
+            <a:off x="19019315" y="6176968"/>
+            <a:ext cx="2221609" cy="3388864"/>
           </a:xfrm>
           <a:prstGeom prst="rect">
             <a:avLst/>
@@ -4341,19 +4447,19 @@
       </p:pic>
       <p:pic>
         <p:nvPicPr>
-          <p:cNvPr id="96" name="Picture 95"/>
+          <p:cNvPr id="105" name="Picture 104"/>
           <p:cNvPicPr/>
           <p:nvPr/>
         </p:nvPicPr>
         <p:blipFill rotWithShape="1">
-          <a:blip r:embed="rId8"/>
-          <a:srcRect l="33596" t="2201" r="33290" b="2777"/>
+          <a:blip r:embed="rId12"/>
+          <a:srcRect l="38102" t="-1" r="38355" b="2381"/>
           <a:stretch/>
         </p:blipFill>
         <p:spPr>
           <a:xfrm>
-            <a:off x="16353084" y="10310946"/>
-            <a:ext cx="2221370" cy="3391707"/>
+            <a:off x="21781856" y="6176968"/>
+            <a:ext cx="2221610" cy="3389754"/>
           </a:xfrm>
           <a:prstGeom prst="rect">
             <a:avLst/>
@@ -4365,232 +4471,6 @@
           </a:ln>
         </p:spPr>
       </p:pic>
-      <p:pic>
-        <p:nvPicPr>
-          <p:cNvPr id="97" name="Picture 96"/>
-          <p:cNvPicPr/>
-          <p:nvPr/>
-        </p:nvPicPr>
-        <p:blipFill rotWithShape="1">
-          <a:blip r:embed="rId9"/>
-          <a:srcRect l="33085" t="2022" r="33335" b="2378"/>
-          <a:stretch/>
-        </p:blipFill>
-        <p:spPr>
-          <a:xfrm>
-            <a:off x="19019315" y="10310944"/>
-            <a:ext cx="2221609" cy="3391707"/>
-          </a:xfrm>
-          <a:prstGeom prst="rect">
-            <a:avLst/>
-          </a:prstGeom>
-          <a:ln>
-            <a:solidFill>
-              <a:schemeClr val="tx1"/>
-            </a:solidFill>
-          </a:ln>
-        </p:spPr>
-      </p:pic>
-      <p:pic>
-        <p:nvPicPr>
-          <p:cNvPr id="98" name="Picture 97"/>
-          <p:cNvPicPr/>
-          <p:nvPr/>
-        </p:nvPicPr>
-        <p:blipFill rotWithShape="1">
-          <a:blip r:embed="rId10"/>
-          <a:srcRect l="33197" t="2357" r="33179" b="2521"/>
-          <a:stretch/>
-        </p:blipFill>
-        <p:spPr>
-          <a:xfrm>
-            <a:off x="21781856" y="10310945"/>
-            <a:ext cx="2221610" cy="3391707"/>
-          </a:xfrm>
-          <a:prstGeom prst="rect">
-            <a:avLst/>
-          </a:prstGeom>
-          <a:ln>
-            <a:solidFill>
-              <a:schemeClr val="tx1"/>
-            </a:solidFill>
-          </a:ln>
-        </p:spPr>
-      </p:pic>
-      <p:pic>
-        <p:nvPicPr>
-          <p:cNvPr id="99" name="Picture 98"/>
-          <p:cNvPicPr/>
-          <p:nvPr/>
-        </p:nvPicPr>
-        <p:blipFill rotWithShape="1">
-          <a:blip r:embed="rId11"/>
-          <a:srcRect l="37778" r="21598"/>
-          <a:stretch/>
-        </p:blipFill>
-        <p:spPr>
-          <a:xfrm>
-            <a:off x="30196737" y="3855162"/>
-            <a:ext cx="1929994" cy="2923084"/>
-          </a:xfrm>
-          <a:prstGeom prst="rect">
-            <a:avLst/>
-          </a:prstGeom>
-          <a:ln>
-            <a:noFill/>
-          </a:ln>
-        </p:spPr>
-      </p:pic>
-      <p:pic>
-        <p:nvPicPr>
-          <p:cNvPr id="100" name="Picture 99"/>
-          <p:cNvPicPr/>
-          <p:nvPr/>
-        </p:nvPicPr>
-        <p:blipFill rotWithShape="1">
-          <a:blip r:embed="rId12"/>
-          <a:srcRect l="31714" r="15256"/>
-          <a:stretch/>
-        </p:blipFill>
-        <p:spPr>
-          <a:xfrm>
-            <a:off x="27586185" y="3855162"/>
-            <a:ext cx="2047971" cy="2923952"/>
-          </a:xfrm>
-          <a:prstGeom prst="rect">
-            <a:avLst/>
-          </a:prstGeom>
-          <a:ln>
-            <a:noFill/>
-          </a:ln>
-        </p:spPr>
-      </p:pic>
-      <p:pic>
-        <p:nvPicPr>
-          <p:cNvPr id="101" name="Picture 100"/>
-          <p:cNvPicPr/>
-          <p:nvPr/>
-        </p:nvPicPr>
-        <p:blipFill rotWithShape="1">
-          <a:blip r:embed="rId13"/>
-          <a:srcRect l="31549" r="9692"/>
-          <a:stretch/>
-        </p:blipFill>
-        <p:spPr>
-          <a:xfrm>
-            <a:off x="27573279" y="7024763"/>
-            <a:ext cx="2047971" cy="2923952"/>
-          </a:xfrm>
-          <a:prstGeom prst="rect">
-            <a:avLst/>
-          </a:prstGeom>
-          <a:ln>
-            <a:noFill/>
-          </a:ln>
-        </p:spPr>
-      </p:pic>
-      <p:pic>
-        <p:nvPicPr>
-          <p:cNvPr id="102" name="Picture 101"/>
-          <p:cNvPicPr/>
-          <p:nvPr/>
-        </p:nvPicPr>
-        <p:blipFill rotWithShape="1">
-          <a:blip r:embed="rId14"/>
-          <a:srcRect l="37499" r="21555"/>
-          <a:stretch/>
-        </p:blipFill>
-        <p:spPr>
-          <a:xfrm>
-            <a:off x="30196737" y="7022427"/>
-            <a:ext cx="1929994" cy="2892814"/>
-          </a:xfrm>
-          <a:prstGeom prst="rect">
-            <a:avLst/>
-          </a:prstGeom>
-          <a:ln>
-            <a:noFill/>
-          </a:ln>
-        </p:spPr>
-      </p:pic>
-      <p:pic>
-        <p:nvPicPr>
-          <p:cNvPr id="103" name="Picture 102"/>
-          <p:cNvPicPr/>
-          <p:nvPr/>
-        </p:nvPicPr>
-        <p:blipFill rotWithShape="1">
-          <a:blip r:embed="rId15"/>
-          <a:srcRect l="38156" r="38176" b="2711"/>
-          <a:stretch/>
-        </p:blipFill>
-        <p:spPr>
-          <a:xfrm>
-            <a:off x="16353084" y="6178320"/>
-            <a:ext cx="2221370" cy="3391707"/>
-          </a:xfrm>
-          <a:prstGeom prst="rect">
-            <a:avLst/>
-          </a:prstGeom>
-          <a:ln>
-            <a:solidFill>
-              <a:schemeClr val="tx1"/>
-            </a:solidFill>
-          </a:ln>
-        </p:spPr>
-      </p:pic>
-      <p:pic>
-        <p:nvPicPr>
-          <p:cNvPr id="104" name="Picture 103"/>
-          <p:cNvPicPr/>
-          <p:nvPr/>
-        </p:nvPicPr>
-        <p:blipFill rotWithShape="1">
-          <a:blip r:embed="rId16"/>
-          <a:srcRect l="38119" t="2043" r="38041" b="2049"/>
-          <a:stretch/>
-        </p:blipFill>
-        <p:spPr>
-          <a:xfrm>
-            <a:off x="19019315" y="6176968"/>
-            <a:ext cx="2221609" cy="3388864"/>
-          </a:xfrm>
-          <a:prstGeom prst="rect">
-            <a:avLst/>
-          </a:prstGeom>
-          <a:ln>
-            <a:solidFill>
-              <a:schemeClr val="tx1"/>
-            </a:solidFill>
-          </a:ln>
-        </p:spPr>
-      </p:pic>
-      <p:pic>
-        <p:nvPicPr>
-          <p:cNvPr id="105" name="Picture 104"/>
-          <p:cNvPicPr/>
-          <p:nvPr/>
-        </p:nvPicPr>
-        <p:blipFill rotWithShape="1">
-          <a:blip r:embed="rId17"/>
-          <a:srcRect l="38102" t="-1" r="38355" b="2381"/>
-          <a:stretch/>
-        </p:blipFill>
-        <p:spPr>
-          <a:xfrm>
-            <a:off x="21781856" y="6176968"/>
-            <a:ext cx="2221610" cy="3389754"/>
-          </a:xfrm>
-          <a:prstGeom prst="rect">
-            <a:avLst/>
-          </a:prstGeom>
-          <a:ln>
-            <a:solidFill>
-              <a:schemeClr val="tx1"/>
-            </a:solidFill>
-          </a:ln>
-        </p:spPr>
-      </p:pic>
       <p:sp>
         <p:nvSpPr>
           <p:cNvPr id="106" name="TextBox 1"/>
@@ -4599,8 +4479,8 @@
         </p:nvSpPr>
         <p:spPr>
           <a:xfrm>
-            <a:off x="17107349" y="5696974"/>
-            <a:ext cx="712841" cy="369332"/>
+            <a:off x="17009965" y="5696973"/>
+            <a:ext cx="897102" cy="461665"/>
           </a:xfrm>
           <a:prstGeom prst="rect">
             <a:avLst/>
@@ -4708,14 +4588,14 @@
           </a:lstStyle>
           <a:p>
             <a:r>
-              <a:rPr lang="en-US" dirty="0"/>
+              <a:rPr lang="en-US" sz="2400" dirty="0"/>
               <a:t>β = </a:t>
             </a:r>
             <a:r>
-              <a:rPr lang="en-US" dirty="0" smtClean="0"/>
+              <a:rPr lang="en-US" sz="2400" dirty="0" smtClean="0"/>
               <a:t>0</a:t>
             </a:r>
-            <a:endParaRPr lang="en-US" dirty="0"/>
+            <a:endParaRPr lang="en-US" sz="2400" dirty="0"/>
           </a:p>
         </p:txBody>
       </p:sp>
@@ -4727,8 +4607,8 @@
         </p:nvSpPr>
         <p:spPr>
           <a:xfrm>
-            <a:off x="19737199" y="5696974"/>
-            <a:ext cx="930910" cy="369332"/>
+            <a:off x="19487769" y="5630856"/>
+            <a:ext cx="1339193" cy="461665"/>
           </a:xfrm>
           <a:prstGeom prst="rect">
             <a:avLst/>
@@ -4835,14 +4715,14 @@
           </a:lstStyle>
           <a:p>
             <a:r>
-              <a:rPr lang="en-US" dirty="0"/>
+              <a:rPr lang="en-US" sz="2400" dirty="0"/>
               <a:t>β = </a:t>
             </a:r>
             <a:r>
-              <a:rPr lang="en-US" dirty="0" smtClean="0"/>
+              <a:rPr lang="en-US" sz="2400" dirty="0" smtClean="0"/>
               <a:t>3.5 </a:t>
             </a:r>
-            <a:endParaRPr lang="en-US" dirty="0"/>
+            <a:endParaRPr lang="en-US" sz="2400" dirty="0"/>
           </a:p>
         </p:txBody>
       </p:sp>
@@ -4854,8 +4734,8 @@
         </p:nvSpPr>
         <p:spPr>
           <a:xfrm>
-            <a:off x="22582649" y="5696974"/>
-            <a:ext cx="772969" cy="369332"/>
+            <a:off x="22407665" y="5658608"/>
+            <a:ext cx="966931" cy="461665"/>
           </a:xfrm>
           <a:prstGeom prst="rect">
             <a:avLst/>
@@ -4962,14 +4842,14 @@
           </a:lstStyle>
           <a:p>
             <a:r>
-              <a:rPr lang="en-US" dirty="0"/>
+              <a:rPr lang="en-US" sz="2400" dirty="0"/>
               <a:t>β = </a:t>
             </a:r>
             <a:r>
-              <a:rPr lang="en-US" dirty="0" smtClean="0"/>
+              <a:rPr lang="en-US" sz="2400" dirty="0" smtClean="0"/>
               <a:t>7 </a:t>
             </a:r>
-            <a:endParaRPr lang="en-US" dirty="0"/>
+            <a:endParaRPr lang="en-US" sz="2400" dirty="0"/>
           </a:p>
         </p:txBody>
       </p:sp>
@@ -4980,7 +4860,7 @@
           <p:nvPr/>
         </p:nvPicPr>
         <p:blipFill rotWithShape="1">
-          <a:blip r:embed="rId18"/>
+          <a:blip r:embed="rId13"/>
           <a:srcRect l="20829" r="20043" b="1675"/>
           <a:stretch/>
         </p:blipFill>
@@ -5006,7 +4886,7 @@
           <p:nvPr/>
         </p:nvPicPr>
         <p:blipFill rotWithShape="1">
-          <a:blip r:embed="rId19"/>
+          <a:blip r:embed="rId14"/>
           <a:srcRect l="10860" t="6515" r="11361" b="2710"/>
           <a:stretch/>
         </p:blipFill>
@@ -5032,7 +4912,7 @@
           <p:nvPr/>
         </p:nvPicPr>
         <p:blipFill rotWithShape="1">
-          <a:blip r:embed="rId20"/>
+          <a:blip r:embed="rId15"/>
           <a:srcRect l="20244" r="20399"/>
           <a:stretch/>
         </p:blipFill>
@@ -5059,8 +4939,8 @@
         </p:nvSpPr>
         <p:spPr>
           <a:xfrm>
-            <a:off x="17105818" y="14066132"/>
-            <a:ext cx="712841" cy="369332"/>
+            <a:off x="16985939" y="14019965"/>
+            <a:ext cx="1134587" cy="461665"/>
           </a:xfrm>
           <a:prstGeom prst="rect">
             <a:avLst/>
@@ -5168,14 +5048,14 @@
           </a:lstStyle>
           <a:p>
             <a:r>
-              <a:rPr lang="en-US" dirty="0"/>
+              <a:rPr lang="en-US" sz="2400" dirty="0"/>
               <a:t>β = </a:t>
             </a:r>
             <a:r>
-              <a:rPr lang="en-US" dirty="0" smtClean="0"/>
+              <a:rPr lang="en-US" sz="2400" dirty="0" smtClean="0"/>
               <a:t>0</a:t>
             </a:r>
-            <a:endParaRPr lang="en-US" dirty="0"/>
+            <a:endParaRPr lang="en-US" sz="2400" dirty="0"/>
           </a:p>
         </p:txBody>
       </p:sp>
@@ -5187,8 +5067,8 @@
         </p:nvSpPr>
         <p:spPr>
           <a:xfrm>
-            <a:off x="19663469" y="14066132"/>
-            <a:ext cx="930910" cy="369332"/>
+            <a:off x="19545526" y="14066132"/>
+            <a:ext cx="1323417" cy="461665"/>
           </a:xfrm>
           <a:prstGeom prst="rect">
             <a:avLst/>
@@ -5295,14 +5175,14 @@
           </a:lstStyle>
           <a:p>
             <a:r>
-              <a:rPr lang="en-US" dirty="0"/>
+              <a:rPr lang="en-US" sz="2400" dirty="0"/>
               <a:t>β = </a:t>
             </a:r>
             <a:r>
-              <a:rPr lang="en-US" dirty="0" smtClean="0"/>
+              <a:rPr lang="en-US" sz="2400" dirty="0" smtClean="0"/>
               <a:t>3.5 </a:t>
             </a:r>
-            <a:endParaRPr lang="en-US" dirty="0"/>
+            <a:endParaRPr lang="en-US" sz="2400" dirty="0"/>
           </a:p>
         </p:txBody>
       </p:sp>
@@ -5314,8 +5194,8 @@
         </p:nvSpPr>
         <p:spPr>
           <a:xfrm>
-            <a:off x="22576774" y="14066132"/>
-            <a:ext cx="772969" cy="369332"/>
+            <a:off x="22487504" y="13997935"/>
+            <a:ext cx="966931" cy="461665"/>
           </a:xfrm>
           <a:prstGeom prst="rect">
             <a:avLst/>
@@ -5422,14 +5302,14 @@
           </a:lstStyle>
           <a:p>
             <a:r>
-              <a:rPr lang="en-US" dirty="0"/>
+              <a:rPr lang="en-US" sz="2400" dirty="0"/>
               <a:t>β = </a:t>
             </a:r>
             <a:r>
-              <a:rPr lang="en-US" dirty="0" smtClean="0"/>
+              <a:rPr lang="en-US" sz="2400" dirty="0" smtClean="0"/>
               <a:t>7 </a:t>
             </a:r>
-            <a:endParaRPr lang="en-US" dirty="0"/>
+            <a:endParaRPr lang="en-US" sz="2400" dirty="0"/>
           </a:p>
         </p:txBody>
       </p:sp>
@@ -5646,19 +5526,7 @@
             <a:pPr algn="just"/>
             <a:r>
               <a:rPr lang="en-US" sz="1400" dirty="0" smtClean="0"/>
-              <a:t>These plots were generated by subtracting the </a:t>
-            </a:r>
-            <a:r>
-              <a:rPr lang="en-US" sz="1400" dirty="0" smtClean="0"/>
-              <a:t>β = 3.5 normalized intensity fields from the β = 0 intensity fields for the 0.005 dB/cm/MHz and 1.0 dB/cm/MHz cases. </a:t>
-            </a:r>
-            <a:r>
-              <a:rPr lang="en-US" sz="1400" dirty="0" smtClean="0"/>
-              <a:t>Contour plots of the resulting matrix were made.</a:t>
-            </a:r>
-            <a:r>
-              <a:rPr lang="en-US" sz="1400" dirty="0" smtClean="0"/>
-              <a:t> Note that the magnitude of the differences is an order of magnitude lower for the 1.0 dB/cm/MHz case.</a:t>
+              <a:t>These plots were generated by subtracting the β = 3.5 normalized intensity fields from the β = 0 intensity fields for the 0.005 dB/cm/MHz and 1.0 dB/cm/MHz cases. Contour plots of the resulting matrix were made. Note that the magnitude of the differences is an order of magnitude lower for the 1.0 dB/cm/MHz case.</a:t>
             </a:r>
           </a:p>
         </p:txBody>
@@ -5671,8 +5539,8 @@
         </p:nvSpPr>
         <p:spPr>
           <a:xfrm>
-            <a:off x="25635828" y="5144084"/>
-            <a:ext cx="1676400" cy="345240"/>
+            <a:off x="25464537" y="5128043"/>
+            <a:ext cx="2133993" cy="514524"/>
           </a:xfrm>
           <a:prstGeom prst="rect">
             <a:avLst/>
@@ -5704,7 +5572,7 @@
               </a:lnSpc>
             </a:pPr>
             <a:r>
-              <a:rPr lang="en-US" sz="1200" strike="noStrike" dirty="0">
+              <a:rPr lang="en-US" sz="1400" strike="noStrike" dirty="0">
                 <a:solidFill>
                   <a:srgbClr val="000000"/>
                 </a:solidFill>
@@ -5713,7 +5581,7 @@
               </a:rPr>
               <a:t>α = 0.005 dB/cm/MHz </a:t>
             </a:r>
-            <a:endParaRPr sz="1200" dirty="0"/>
+            <a:endParaRPr sz="1400" dirty="0"/>
           </a:p>
         </p:txBody>
       </p:sp>
@@ -5725,8 +5593,8 @@
         </p:nvSpPr>
         <p:spPr>
           <a:xfrm>
-            <a:off x="25825748" y="8351201"/>
-            <a:ext cx="1676400" cy="345240"/>
+            <a:off x="25571257" y="8354817"/>
+            <a:ext cx="1794810" cy="289988"/>
           </a:xfrm>
           <a:prstGeom prst="rect">
             <a:avLst/>
@@ -5758,7 +5626,7 @@
               </a:lnSpc>
             </a:pPr>
             <a:r>
-              <a:rPr lang="en-US" sz="1200" strike="noStrike" dirty="0">
+              <a:rPr lang="en-US" sz="1400" strike="noStrike" dirty="0">
                 <a:solidFill>
                   <a:srgbClr val="000000"/>
                 </a:solidFill>
@@ -5768,7 +5636,7 @@
               <a:t>α = </a:t>
             </a:r>
             <a:r>
-              <a:rPr lang="en-US" sz="1200" dirty="0" smtClean="0">
+              <a:rPr lang="en-US" sz="1400" dirty="0" smtClean="0">
                 <a:solidFill>
                   <a:srgbClr val="000000"/>
                 </a:solidFill>
@@ -5778,7 +5646,7 @@
               <a:t>1.0</a:t>
             </a:r>
             <a:r>
-              <a:rPr lang="en-US" sz="1200" strike="noStrike" dirty="0" smtClean="0">
+              <a:rPr lang="en-US" sz="1400" strike="noStrike" dirty="0" smtClean="0">
                 <a:solidFill>
                   <a:srgbClr val="000000"/>
                 </a:solidFill>
@@ -5788,7 +5656,7 @@
               <a:t> </a:t>
             </a:r>
             <a:r>
-              <a:rPr lang="en-US" sz="1200" strike="noStrike" dirty="0">
+              <a:rPr lang="en-US" sz="1400" strike="noStrike" dirty="0">
                 <a:solidFill>
                   <a:srgbClr val="000000"/>
                 </a:solidFill>
@@ -5797,7 +5665,7 @@
               </a:rPr>
               <a:t>dB/cm/MHz </a:t>
             </a:r>
-            <a:endParaRPr sz="1200" dirty="0"/>
+            <a:endParaRPr sz="1400" dirty="0"/>
           </a:p>
         </p:txBody>
       </p:sp>
@@ -5809,7 +5677,7 @@
         </p:nvSpPr>
         <p:spPr>
           <a:xfrm>
-            <a:off x="27771970" y="3555720"/>
+            <a:off x="27866850" y="3497400"/>
             <a:ext cx="1676400" cy="345240"/>
           </a:xfrm>
           <a:prstGeom prst="rect">
@@ -5842,15 +5710,24 @@
               </a:lnSpc>
             </a:pPr>
             <a:r>
-              <a:rPr lang="en-US" sz="1200" dirty="0" smtClean="0">
+              <a:rPr lang="en-US" dirty="0" smtClean="0">
                 <a:solidFill>
                   <a:srgbClr val="000000"/>
                 </a:solidFill>
                 <a:latin typeface="Arial"/>
               </a:rPr>
-              <a:t>Center Lateral Plane</a:t>
-            </a:r>
-            <a:endParaRPr sz="1200" dirty="0"/>
+              <a:t>Lateral </a:t>
+            </a:r>
+            <a:r>
+              <a:rPr lang="en-US" dirty="0" smtClean="0">
+                <a:solidFill>
+                  <a:srgbClr val="000000"/>
+                </a:solidFill>
+                <a:latin typeface="Arial"/>
+              </a:rPr>
+              <a:t>Plane</a:t>
+            </a:r>
+            <a:endParaRPr dirty="0"/>
           </a:p>
         </p:txBody>
       </p:sp>
@@ -5862,7 +5739,7 @@
         </p:nvSpPr>
         <p:spPr>
           <a:xfrm>
-            <a:off x="30314626" y="3555720"/>
+            <a:off x="30164837" y="3497120"/>
             <a:ext cx="1961894" cy="345240"/>
           </a:xfrm>
           <a:prstGeom prst="rect">
@@ -5895,16 +5772,36 @@
               </a:lnSpc>
             </a:pPr>
             <a:r>
-              <a:rPr lang="en-US" sz="1200" strike="noStrike" dirty="0" smtClean="0">
+              <a:rPr lang="en-US" strike="noStrike" dirty="0" err="1" smtClean="0">
                 <a:solidFill>
                   <a:srgbClr val="000000"/>
                 </a:solidFill>
                 <a:latin typeface="Arial"/>
                 <a:ea typeface="DejaVu Sans"/>
               </a:rPr>
-              <a:t>Center Elevation Plane</a:t>
-            </a:r>
-            <a:endParaRPr sz="1200" dirty="0"/>
+              <a:t>Elevational</a:t>
+            </a:r>
+            <a:r>
+              <a:rPr lang="en-US" strike="noStrike" dirty="0" smtClean="0">
+                <a:solidFill>
+                  <a:srgbClr val="000000"/>
+                </a:solidFill>
+                <a:latin typeface="Arial"/>
+                <a:ea typeface="DejaVu Sans"/>
+              </a:rPr>
+              <a:t> </a:t>
+            </a:r>
+            <a:r>
+              <a:rPr lang="en-US" strike="noStrike" dirty="0" smtClean="0">
+                <a:solidFill>
+                  <a:srgbClr val="000000"/>
+                </a:solidFill>
+                <a:latin typeface="Arial"/>
+                <a:ea typeface="DejaVu Sans"/>
+              </a:rPr>
+              <a:t>Plane</a:t>
+            </a:r>
+            <a:endParaRPr dirty="0"/>
           </a:p>
         </p:txBody>
       </p:sp>
@@ -6214,15 +6111,7 @@
             </a:r>
             <a:r>
               <a:rPr lang="en-US" dirty="0" smtClean="0"/>
-              <a:t>. Plots of the normalized axial intensities at the center lateral and elevation positions can be seen in the leftmost column. Contour plots of the normalized intensities generated with </a:t>
-            </a:r>
-            <a:r>
-              <a:rPr lang="en-US" dirty="0" smtClean="0"/>
-              <a:t>β = 0, 3.5, and 7</a:t>
-            </a:r>
-            <a:r>
-              <a:rPr lang="en-US" dirty="0" smtClean="0"/>
-              <a:t> were created in </a:t>
+              <a:t>. Plots of the normalized axial intensities at the center lateral and elevation positions can be seen in the leftmost column. Contour plots of the normalized intensities generated with β = 0, 3.5, and 7 were created in </a:t>
             </a:r>
             <a:r>
               <a:rPr lang="en-US" dirty="0" err="1" smtClean="0"/>
@@ -6321,6 +6210,166 @@
           </a:p>
         </p:txBody>
       </p:sp>
+      <p:pic>
+        <p:nvPicPr>
+          <p:cNvPr id="2" name="Picture 1"/>
+          <p:cNvPicPr>
+            <a:picLocks noChangeAspect="1"/>
+          </p:cNvPicPr>
+          <p:nvPr/>
+        </p:nvPicPr>
+        <p:blipFill>
+          <a:blip r:embed="rId16" cstate="print">
+            <a:extLst>
+              <a:ext uri="{28A0092B-C50C-407E-A947-70E740481C1C}">
+                <a14:useLocalDpi xmlns:a14="http://schemas.microsoft.com/office/drawing/2010/main" val="0"/>
+              </a:ext>
+            </a:extLst>
+          </a:blip>
+          <a:stretch>
+            <a:fillRect/>
+          </a:stretch>
+        </p:blipFill>
+        <p:spPr>
+          <a:xfrm>
+            <a:off x="2460657" y="8737262"/>
+            <a:ext cx="3216125" cy="2308399"/>
+          </a:xfrm>
+          <a:prstGeom prst="rect">
+            <a:avLst/>
+          </a:prstGeom>
+          <a:ln>
+            <a:solidFill>
+              <a:schemeClr val="tx1"/>
+            </a:solidFill>
+          </a:ln>
+        </p:spPr>
+      </p:pic>
+      <p:pic>
+        <p:nvPicPr>
+          <p:cNvPr id="5" name="Picture 4"/>
+          <p:cNvPicPr>
+            <a:picLocks noChangeAspect="1"/>
+          </p:cNvPicPr>
+          <p:nvPr/>
+        </p:nvPicPr>
+        <p:blipFill>
+          <a:blip r:embed="rId17" cstate="print">
+            <a:extLst>
+              <a:ext uri="{28A0092B-C50C-407E-A947-70E740481C1C}">
+                <a14:useLocalDpi xmlns:a14="http://schemas.microsoft.com/office/drawing/2010/main" val="0"/>
+              </a:ext>
+            </a:extLst>
+          </a:blip>
+          <a:stretch>
+            <a:fillRect/>
+          </a:stretch>
+        </p:blipFill>
+        <p:spPr>
+          <a:xfrm>
+            <a:off x="1799251" y="13894090"/>
+            <a:ext cx="4446418" cy="3334813"/>
+          </a:xfrm>
+          <a:prstGeom prst="rect">
+            <a:avLst/>
+          </a:prstGeom>
+          <a:ln>
+            <a:solidFill>
+              <a:schemeClr val="tx1"/>
+            </a:solidFill>
+          </a:ln>
+        </p:spPr>
+      </p:pic>
+      <p:pic>
+        <p:nvPicPr>
+          <p:cNvPr id="7" name="Picture 6"/>
+          <p:cNvPicPr>
+            <a:picLocks noChangeAspect="1"/>
+          </p:cNvPicPr>
+          <p:nvPr/>
+        </p:nvPicPr>
+        <p:blipFill>
+          <a:blip r:embed="rId18" cstate="print">
+            <a:extLst>
+              <a:ext uri="{28A0092B-C50C-407E-A947-70E740481C1C}">
+                <a14:useLocalDpi xmlns:a14="http://schemas.microsoft.com/office/drawing/2010/main" val="0"/>
+              </a:ext>
+            </a:extLst>
+          </a:blip>
+          <a:stretch>
+            <a:fillRect/>
+          </a:stretch>
+        </p:blipFill>
+        <p:spPr>
+          <a:xfrm>
+            <a:off x="11535030" y="6153018"/>
+            <a:ext cx="4314960" cy="3452057"/>
+          </a:xfrm>
+          <a:prstGeom prst="rect">
+            <a:avLst/>
+          </a:prstGeom>
+        </p:spPr>
+      </p:pic>
+      <p:pic>
+        <p:nvPicPr>
+          <p:cNvPr id="8" name="Picture 7"/>
+          <p:cNvPicPr>
+            <a:picLocks noChangeAspect="1"/>
+          </p:cNvPicPr>
+          <p:nvPr/>
+        </p:nvPicPr>
+        <p:blipFill>
+          <a:blip r:embed="rId19" cstate="print">
+            <a:extLst>
+              <a:ext uri="{28A0092B-C50C-407E-A947-70E740481C1C}">
+                <a14:useLocalDpi xmlns:a14="http://schemas.microsoft.com/office/drawing/2010/main" val="0"/>
+              </a:ext>
+            </a:extLst>
+          </a:blip>
+          <a:stretch>
+            <a:fillRect/>
+          </a:stretch>
+        </p:blipFill>
+        <p:spPr>
+          <a:xfrm>
+            <a:off x="11532009" y="10324848"/>
+            <a:ext cx="4321002" cy="3452864"/>
+          </a:xfrm>
+          <a:prstGeom prst="rect">
+            <a:avLst/>
+          </a:prstGeom>
+        </p:spPr>
+      </p:pic>
+      <p:pic>
+        <p:nvPicPr>
+          <p:cNvPr id="10" name="Picture 9"/>
+          <p:cNvPicPr>
+            <a:picLocks noChangeAspect="1"/>
+          </p:cNvPicPr>
+          <p:nvPr/>
+        </p:nvPicPr>
+        <p:blipFill>
+          <a:blip r:embed="rId20" cstate="print">
+            <a:extLst>
+              <a:ext uri="{28A0092B-C50C-407E-A947-70E740481C1C}">
+                <a14:useLocalDpi xmlns:a14="http://schemas.microsoft.com/office/drawing/2010/main" val="0"/>
+              </a:ext>
+            </a:extLst>
+          </a:blip>
+          <a:stretch>
+            <a:fillRect/>
+          </a:stretch>
+        </p:blipFill>
+        <p:spPr>
+          <a:xfrm>
+            <a:off x="11561142" y="14459600"/>
+            <a:ext cx="4317981" cy="3422929"/>
+          </a:xfrm>
+          <a:prstGeom prst="rect">
+            <a:avLst/>
+          </a:prstGeom>
+        </p:spPr>
+      </p:pic>
     </p:spTree>
   </p:cSld>
   <p:clrMapOvr>

</xml_diff>